<commit_message>
Vortrag: Kleine Änderung in der Gliederung.
</commit_message>
<xml_diff>
--- a/Dokumente/Vortrag/Wahrnehmungsorientiertes_Volumen-Rendering.pptx
+++ b/Dokumente/Vortrag/Wahrnehmungsorientiertes_Volumen-Rendering.pptx
@@ -546,6 +546,90 @@
           <a:bodyPr/>
           <a:lstStyle/>
           <a:p>
+            <a:endParaRPr lang="de-DE" dirty="0"/>
+          </a:p>
+        </p:txBody>
+      </p:sp>
+      <p:sp>
+        <p:nvSpPr>
+          <p:cNvPr id="4" name="Foliennummernplatzhalter 3"/>
+          <p:cNvSpPr>
+            <a:spLocks noGrp="1"/>
+          </p:cNvSpPr>
+          <p:nvPr>
+            <p:ph type="sldNum" sz="quarter" idx="5"/>
+          </p:nvPr>
+        </p:nvSpPr>
+        <p:spPr/>
+        <p:txBody>
+          <a:bodyPr/>
+          <a:lstStyle/>
+          <a:p>
+            <a:fld id="{6F4F2A7C-E896-4C15-99D8-2B5BC94A4F36}" type="slidenum">
+              <a:rPr lang="de-DE" smtClean="0"/>
+              <a:t>1</a:t>
+            </a:fld>
+            <a:endParaRPr lang="de-DE"/>
+          </a:p>
+        </p:txBody>
+      </p:sp>
+    </p:spTree>
+    <p:extLst>
+      <p:ext uri="{BB962C8B-B14F-4D97-AF65-F5344CB8AC3E}">
+        <p14:creationId xmlns:p14="http://schemas.microsoft.com/office/powerpoint/2010/main" val="2862582317"/>
+      </p:ext>
+    </p:extLst>
+  </p:cSld>
+  <p:clrMapOvr>
+    <a:masterClrMapping/>
+  </p:clrMapOvr>
+</p:notes>
+</file>
+
+<file path=ppt/notesSlides/notesSlide2.xml><?xml version="1.0" encoding="utf-8"?>
+<p:notes xmlns:a="http://schemas.openxmlformats.org/drawingml/2006/main" xmlns:r="http://schemas.openxmlformats.org/officeDocument/2006/relationships" xmlns:p="http://schemas.openxmlformats.org/presentationml/2006/main">
+  <p:cSld>
+    <p:spTree>
+      <p:nvGrpSpPr>
+        <p:cNvPr id="1" name=""/>
+        <p:cNvGrpSpPr/>
+        <p:nvPr/>
+      </p:nvGrpSpPr>
+      <p:grpSpPr>
+        <a:xfrm>
+          <a:off x="0" y="0"/>
+          <a:ext cx="0" cy="0"/>
+          <a:chOff x="0" y="0"/>
+          <a:chExt cx="0" cy="0"/>
+        </a:xfrm>
+      </p:grpSpPr>
+      <p:sp>
+        <p:nvSpPr>
+          <p:cNvPr id="2" name="Folienbildplatzhalter 1"/>
+          <p:cNvSpPr>
+            <a:spLocks noGrp="1" noRot="1" noChangeAspect="1"/>
+          </p:cNvSpPr>
+          <p:nvPr>
+            <p:ph type="sldImg"/>
+          </p:nvPr>
+        </p:nvSpPr>
+        <p:spPr/>
+      </p:sp>
+      <p:sp>
+        <p:nvSpPr>
+          <p:cNvPr id="3" name="Notizenplatzhalter 2"/>
+          <p:cNvSpPr>
+            <a:spLocks noGrp="1"/>
+          </p:cNvSpPr>
+          <p:nvPr>
+            <p:ph type="body" idx="1"/>
+          </p:nvPr>
+        </p:nvSpPr>
+        <p:spPr/>
+        <p:txBody>
+          <a:bodyPr/>
+          <a:lstStyle/>
+          <a:p>
             <a:r>
               <a:rPr lang="de-DE" dirty="0"/>
               <a:t>Motivation:</a:t>
@@ -554,7 +638,39 @@
           <a:p>
             <a:r>
               <a:rPr lang="de-DE" dirty="0"/>
-              <a:t>-- Probleme der technischen Entwicklungen der Pixelanzahl, Probleme des Volumenrenderings, Lösungsansatz untersuchen mit Hauptaspekt Performanz</a:t>
+              <a:t>-- Probleme der technischen Entwicklungen der Pixelanzahl, Probleme des Volumenrenderings, Lösungsansatz untersuchen mit Hauptaspekt Performanz (Es gibt Datenbasierte Methoden wie EES und </a:t>
+            </a:r>
+            <a:r>
+              <a:rPr lang="de-DE" dirty="0" err="1"/>
+              <a:t>early</a:t>
+            </a:r>
+            <a:r>
+              <a:rPr lang="de-DE" dirty="0"/>
+              <a:t> </a:t>
+            </a:r>
+            <a:r>
+              <a:rPr lang="de-DE" dirty="0" err="1"/>
+              <a:t>ray</a:t>
+            </a:r>
+            <a:r>
+              <a:rPr lang="de-DE" dirty="0"/>
+              <a:t> </a:t>
+            </a:r>
+            <a:r>
+              <a:rPr lang="de-DE" dirty="0" err="1"/>
+              <a:t>termination</a:t>
+            </a:r>
+            <a:r>
+              <a:rPr lang="de-DE" dirty="0"/>
+              <a:t> aber diese sind schon stark </a:t>
+            </a:r>
+            <a:r>
+              <a:rPr lang="de-DE" dirty="0" err="1"/>
+              <a:t>ausgereitzt</a:t>
+            </a:r>
+            <a:r>
+              <a:rPr lang="de-DE" dirty="0"/>
+              <a:t>)</a:t>
             </a:r>
           </a:p>
           <a:p>
@@ -683,7 +799,13 @@
             </a:r>
             <a:r>
               <a:rPr lang="de-DE" dirty="0"/>
-              <a:t>, Simulieren der Blickposition, Reduzierung der Abtastrate im Objekt- und Bildbereich, Sammeln von Messwerten (Mausbewegung)</a:t>
+              <a:t>, Simulieren der Blickposition, Reduzierung der Abtastrate im Objekt- und Bildbereich</a:t>
+            </a:r>
+          </a:p>
+          <a:p>
+            <a:r>
+              <a:rPr lang="de-DE" dirty="0"/>
+              <a:t>Implementierung:</a:t>
             </a:r>
           </a:p>
           <a:p>
@@ -692,13 +814,7 @@
           <a:p>
             <a:r>
               <a:rPr lang="de-DE" dirty="0"/>
-              <a:t>Implementierung:</a:t>
-            </a:r>
-          </a:p>
-          <a:p>
-            <a:r>
-              <a:rPr lang="de-DE" dirty="0"/>
-              <a:t>-- Umsetzung des Entwurfs, Reduzierung der Abtastrate im Objektraum, Erster Ansatz zur Reduzierung der Abtastrate im Bildraum, Zweiter Ansatz zu Reduzierung der Abtastrate im Bildraum, Sammeln von Messwerten</a:t>
+              <a:t>-- Umsetzung des Entwurfs, Reduzierung der Abtastrate im Objektraum, Erster Ansatz zur Reduzierung der Abtastrate im Bildraum, Zweiter Ansatz zu Reduzierung der Abtastrate im Bildraum</a:t>
             </a:r>
           </a:p>
           <a:p>
@@ -713,7 +829,7 @@
           <a:p>
             <a:r>
               <a:rPr lang="de-DE" dirty="0"/>
-              <a:t>-- </a:t>
+              <a:t>-- Sammeln von Messwerten, Bilder/Videos, </a:t>
             </a:r>
             <a:r>
               <a:rPr lang="de-DE" dirty="0" err="1"/>
@@ -736,7 +852,7 @@
           <a:p>
             <a:r>
               <a:rPr lang="de-DE" dirty="0"/>
-              <a:t>-- Fazit</a:t>
+              <a:t>-- Fazit, Ausblick</a:t>
             </a:r>
           </a:p>
           <a:p>

</xml_diff>

<commit_message>
Vortrag: Volumenrendering und Eyetracking.
</commit_message>
<xml_diff>
--- a/Dokumente/Vortrag/Wahrnehmungsorientiertes_Volumen-Rendering.pptx
+++ b/Dokumente/Vortrag/Wahrnehmungsorientiertes_Volumen-Rendering.pptx
@@ -5,7 +5,7 @@
     <p:sldMasterId id="2147483648" r:id="rId1"/>
   </p:sldMasterIdLst>
   <p:notesMasterIdLst>
-    <p:notesMasterId r:id="rId17"/>
+    <p:notesMasterId r:id="rId18"/>
   </p:notesMasterIdLst>
   <p:sldIdLst>
     <p:sldId id="259" r:id="rId2"/>
@@ -16,13 +16,14 @@
     <p:sldId id="263" r:id="rId7"/>
     <p:sldId id="272" r:id="rId8"/>
     <p:sldId id="264" r:id="rId9"/>
-    <p:sldId id="265" r:id="rId10"/>
-    <p:sldId id="266" r:id="rId11"/>
-    <p:sldId id="267" r:id="rId12"/>
-    <p:sldId id="268" r:id="rId13"/>
-    <p:sldId id="269" r:id="rId14"/>
-    <p:sldId id="270" r:id="rId15"/>
-    <p:sldId id="271" r:id="rId16"/>
+    <p:sldId id="274" r:id="rId10"/>
+    <p:sldId id="265" r:id="rId11"/>
+    <p:sldId id="266" r:id="rId12"/>
+    <p:sldId id="267" r:id="rId13"/>
+    <p:sldId id="268" r:id="rId14"/>
+    <p:sldId id="269" r:id="rId15"/>
+    <p:sldId id="270" r:id="rId16"/>
+    <p:sldId id="271" r:id="rId17"/>
   </p:sldIdLst>
   <p:sldSz cx="9144000" cy="5143500" type="screen16x9"/>
   <p:notesSz cx="6858000" cy="9144000"/>
@@ -236,7 +237,7 @@
           <a:p>
             <a:fld id="{3D100699-F170-47EF-8601-8ACFF448602A}" type="datetimeFigureOut">
               <a:rPr lang="de-DE" smtClean="0"/>
-              <a:t>07.11.2018</a:t>
+              <a:t>08.11.2018</a:t>
             </a:fld>
             <a:endParaRPr lang="de-DE"/>
           </a:p>
@@ -1682,6 +1683,26 @@
           <a:bodyPr/>
           <a:lstStyle/>
           <a:p>
+            <a:r>
+              <a:rPr lang="de-DE" dirty="0"/>
+              <a:t>Volumenrendering und Transferfunktion:</a:t>
+            </a:r>
+          </a:p>
+          <a:p>
+            <a:r>
+              <a:rPr lang="de-DE" dirty="0"/>
+              <a:t>-- Kurz wie funktioniert das Ganze, 3D Volumen mit </a:t>
+            </a:r>
+            <a:r>
+              <a:rPr lang="de-DE" dirty="0" err="1"/>
+              <a:t>Voxel</a:t>
+            </a:r>
+            <a:r>
+              <a:rPr lang="de-DE" dirty="0"/>
+              <a:t>, Abtasten von Strahlen, Berechnen der Farbwerte</a:t>
+            </a:r>
+          </a:p>
+          <a:p>
             <a:endParaRPr lang="de-DE" dirty="0"/>
           </a:p>
         </p:txBody>
@@ -1713,6 +1734,117 @@
     <p:extLst>
       <p:ext uri="{BB962C8B-B14F-4D97-AF65-F5344CB8AC3E}">
         <p14:creationId xmlns:p14="http://schemas.microsoft.com/office/powerpoint/2010/main" val="2224000810"/>
+      </p:ext>
+    </p:extLst>
+  </p:cSld>
+  <p:clrMapOvr>
+    <a:masterClrMapping/>
+  </p:clrMapOvr>
+</p:notes>
+</file>
+
+<file path=ppt/notesSlides/notesSlide9.xml><?xml version="1.0" encoding="utf-8"?>
+<p:notes xmlns:a="http://schemas.openxmlformats.org/drawingml/2006/main" xmlns:r="http://schemas.openxmlformats.org/officeDocument/2006/relationships" xmlns:p="http://schemas.openxmlformats.org/presentationml/2006/main">
+  <p:cSld>
+    <p:spTree>
+      <p:nvGrpSpPr>
+        <p:cNvPr id="1" name=""/>
+        <p:cNvGrpSpPr/>
+        <p:nvPr/>
+      </p:nvGrpSpPr>
+      <p:grpSpPr>
+        <a:xfrm>
+          <a:off x="0" y="0"/>
+          <a:ext cx="0" cy="0"/>
+          <a:chOff x="0" y="0"/>
+          <a:chExt cx="0" cy="0"/>
+        </a:xfrm>
+      </p:grpSpPr>
+      <p:sp>
+        <p:nvSpPr>
+          <p:cNvPr id="2" name="Folienbildplatzhalter 1"/>
+          <p:cNvSpPr>
+            <a:spLocks noGrp="1" noRot="1" noChangeAspect="1"/>
+          </p:cNvSpPr>
+          <p:nvPr>
+            <p:ph type="sldImg"/>
+          </p:nvPr>
+        </p:nvSpPr>
+        <p:spPr/>
+      </p:sp>
+      <p:sp>
+        <p:nvSpPr>
+          <p:cNvPr id="3" name="Notizenplatzhalter 2"/>
+          <p:cNvSpPr>
+            <a:spLocks noGrp="1"/>
+          </p:cNvSpPr>
+          <p:nvPr>
+            <p:ph type="body" idx="1"/>
+          </p:nvPr>
+        </p:nvSpPr>
+        <p:spPr/>
+        <p:txBody>
+          <a:bodyPr/>
+          <a:lstStyle/>
+          <a:p>
+            <a:r>
+              <a:rPr lang="de-DE" dirty="0"/>
+              <a:t>Eyetracking:</a:t>
+            </a:r>
+          </a:p>
+          <a:p>
+            <a:r>
+              <a:rPr lang="de-DE" dirty="0"/>
+              <a:t>-- Was es ist, wie es funktioniert, welches Gerät habe ich verwendet?</a:t>
+            </a:r>
+          </a:p>
+          <a:p>
+            <a:endParaRPr lang="de-DE" dirty="0"/>
+          </a:p>
+          <a:p>
+            <a:r>
+              <a:rPr lang="de-DE" dirty="0"/>
+              <a:t>Bild1: https://www.tobiipro.com/imagevault/publishedmedia/wtj5bngwymxv5372umt4/Tobii_Pro_Spectrum_Hero_Shot_3_1.png</a:t>
+            </a:r>
+          </a:p>
+          <a:p>
+            <a:r>
+              <a:rPr lang="de-DE" dirty="0"/>
+              <a:t>Bild2: http://www.tobiidynavox.de/wp-content/uploads/2014/01/tobiidynavox-eyetracking-reflections-1920x1080px.gif</a:t>
+            </a:r>
+          </a:p>
+          <a:p>
+            <a:endParaRPr lang="de-DE" dirty="0"/>
+          </a:p>
+        </p:txBody>
+      </p:sp>
+      <p:sp>
+        <p:nvSpPr>
+          <p:cNvPr id="4" name="Foliennummernplatzhalter 3"/>
+          <p:cNvSpPr>
+            <a:spLocks noGrp="1"/>
+          </p:cNvSpPr>
+          <p:nvPr>
+            <p:ph type="sldNum" sz="quarter" idx="5"/>
+          </p:nvPr>
+        </p:nvSpPr>
+        <p:spPr/>
+        <p:txBody>
+          <a:bodyPr/>
+          <a:lstStyle/>
+          <a:p>
+            <a:fld id="{6F4F2A7C-E896-4C15-99D8-2B5BC94A4F36}" type="slidenum">
+              <a:rPr lang="de-DE" smtClean="0"/>
+              <a:t>10</a:t>
+            </a:fld>
+            <a:endParaRPr lang="de-DE"/>
+          </a:p>
+        </p:txBody>
+      </p:sp>
+    </p:spTree>
+    <p:extLst>
+      <p:ext uri="{BB962C8B-B14F-4D97-AF65-F5344CB8AC3E}">
+        <p14:creationId xmlns:p14="http://schemas.microsoft.com/office/powerpoint/2010/main" val="2198411781"/>
       </p:ext>
     </p:extLst>
   </p:cSld>
@@ -3852,7 +3984,7 @@
           <p:cNvPr id="2" name="Inhaltsplatzhalter 1">
             <a:extLst>
               <a:ext uri="{FF2B5EF4-FFF2-40B4-BE49-F238E27FC236}">
-                <a16:creationId xmlns:a16="http://schemas.microsoft.com/office/drawing/2014/main" id="{2BFC54A6-CF1E-4705-BBE0-0F5AF5BE1FA3}"/>
+                <a16:creationId xmlns:a16="http://schemas.microsoft.com/office/drawing/2014/main" id="{C62841FF-ED95-410A-A44C-4CD3F18EDF65}"/>
               </a:ext>
             </a:extLst>
           </p:cNvPr>
@@ -3868,7 +4000,44 @@
           <a:bodyPr/>
           <a:lstStyle/>
           <a:p>
-            <a:endParaRPr lang="de-DE"/>
+            <a:r>
+              <a:rPr lang="de-DE" dirty="0"/>
+              <a:t>Messen von Augenaktivitäten</a:t>
+            </a:r>
+          </a:p>
+          <a:p>
+            <a:r>
+              <a:rPr lang="de-DE" dirty="0"/>
+              <a:t>Informationen über Blickposition und –verlauf</a:t>
+            </a:r>
+          </a:p>
+          <a:p>
+            <a:r>
+              <a:rPr lang="de-DE" dirty="0" err="1"/>
+              <a:t>Tobii</a:t>
+            </a:r>
+            <a:r>
+              <a:rPr lang="de-DE" dirty="0"/>
+              <a:t> Pro </a:t>
+            </a:r>
+            <a:r>
+              <a:rPr lang="de-DE" dirty="0" err="1"/>
+              <a:t>Spectrum</a:t>
+            </a:r>
+            <a:r>
+              <a:rPr lang="de-DE" dirty="0"/>
+              <a:t> Eyetracker</a:t>
+            </a:r>
+          </a:p>
+          <a:p>
+            <a:pPr lvl="1"/>
+            <a:r>
+              <a:rPr lang="de-DE" dirty="0"/>
+              <a:t>1200 Hz</a:t>
+            </a:r>
+          </a:p>
+          <a:p>
+            <a:endParaRPr lang="de-DE" dirty="0"/>
           </a:p>
         </p:txBody>
       </p:sp>
@@ -3877,7 +4046,7 @@
           <p:cNvPr id="3" name="Foliennummernplatzhalter 2">
             <a:extLst>
               <a:ext uri="{FF2B5EF4-FFF2-40B4-BE49-F238E27FC236}">
-                <a16:creationId xmlns:a16="http://schemas.microsoft.com/office/drawing/2014/main" id="{C68930AE-E0C2-4512-88F5-C8FB2408B8A7}"/>
+                <a16:creationId xmlns:a16="http://schemas.microsoft.com/office/drawing/2014/main" id="{603903D2-F9DC-4D39-B875-B0D05A83EBC9}"/>
               </a:ext>
             </a:extLst>
           </p:cNvPr>
@@ -3906,7 +4075,7 @@
           <p:cNvPr id="4" name="Titel 3">
             <a:extLst>
               <a:ext uri="{FF2B5EF4-FFF2-40B4-BE49-F238E27FC236}">
-                <a16:creationId xmlns:a16="http://schemas.microsoft.com/office/drawing/2014/main" id="{8E1DF498-9417-4C18-AE3C-AD5C3FECA02A}"/>
+                <a16:creationId xmlns:a16="http://schemas.microsoft.com/office/drawing/2014/main" id="{967B9506-C4D3-48E3-83E9-BC865F3F5D31}"/>
               </a:ext>
             </a:extLst>
           </p:cNvPr>
@@ -3924,15 +4093,122 @@
           <a:p>
             <a:r>
               <a:rPr lang="de-DE" dirty="0"/>
-              <a:t>GPU Architektur</a:t>
-            </a:r>
-          </a:p>
-        </p:txBody>
-      </p:sp>
+              <a:t>Eyetracking</a:t>
+            </a:r>
+          </a:p>
+        </p:txBody>
+      </p:sp>
+      <p:pic>
+        <p:nvPicPr>
+          <p:cNvPr id="6" name="Grafik 5">
+            <a:extLst>
+              <a:ext uri="{FF2B5EF4-FFF2-40B4-BE49-F238E27FC236}">
+                <a16:creationId xmlns:a16="http://schemas.microsoft.com/office/drawing/2014/main" id="{12E546CC-A99D-4E2B-BB8B-BC70ECA926F1}"/>
+              </a:ext>
+            </a:extLst>
+          </p:cNvPr>
+          <p:cNvPicPr>
+            <a:picLocks noChangeAspect="1"/>
+          </p:cNvPicPr>
+          <p:nvPr/>
+        </p:nvPicPr>
+        <p:blipFill rotWithShape="1">
+          <a:blip r:embed="rId3" cstate="print">
+            <a:extLst>
+              <a:ext uri="{28A0092B-C50C-407E-A947-70E740481C1C}">
+                <a14:useLocalDpi xmlns:a14="http://schemas.microsoft.com/office/drawing/2010/main" val="0"/>
+              </a:ext>
+            </a:extLst>
+          </a:blip>
+          <a:srcRect l="36219" t="2551" r="36219" b="2551"/>
+          <a:stretch/>
+        </p:blipFill>
+        <p:spPr>
+          <a:xfrm>
+            <a:off x="6080212" y="333363"/>
+            <a:ext cx="1789656" cy="2054991"/>
+          </a:xfrm>
+          <a:prstGeom prst="rect">
+            <a:avLst/>
+          </a:prstGeom>
+        </p:spPr>
+      </p:pic>
+      <p:pic>
+        <p:nvPicPr>
+          <p:cNvPr id="9" name="Grafik 8">
+            <a:extLst>
+              <a:ext uri="{FF2B5EF4-FFF2-40B4-BE49-F238E27FC236}">
+                <a16:creationId xmlns:a16="http://schemas.microsoft.com/office/drawing/2014/main" id="{3643476E-66C6-4A2D-BAE6-00252FCFDDC4}"/>
+              </a:ext>
+            </a:extLst>
+          </p:cNvPr>
+          <p:cNvPicPr>
+            <a:picLocks noChangeAspect="1"/>
+          </p:cNvPicPr>
+          <p:nvPr/>
+        </p:nvPicPr>
+        <p:blipFill>
+          <a:blip r:embed="rId4" cstate="print">
+            <a:extLst>
+              <a:ext uri="{28A0092B-C50C-407E-A947-70E740481C1C}">
+                <a14:useLocalDpi xmlns:a14="http://schemas.microsoft.com/office/drawing/2010/main" val="0"/>
+              </a:ext>
+            </a:extLst>
+          </a:blip>
+          <a:stretch>
+            <a:fillRect/>
+          </a:stretch>
+        </p:blipFill>
+        <p:spPr>
+          <a:xfrm>
+            <a:off x="755576" y="2897845"/>
+            <a:ext cx="2879466" cy="1619699"/>
+          </a:xfrm>
+          <a:prstGeom prst="rect">
+            <a:avLst/>
+          </a:prstGeom>
+        </p:spPr>
+      </p:pic>
+      <p:pic>
+        <p:nvPicPr>
+          <p:cNvPr id="11" name="Grafik 10">
+            <a:extLst>
+              <a:ext uri="{FF2B5EF4-FFF2-40B4-BE49-F238E27FC236}">
+                <a16:creationId xmlns:a16="http://schemas.microsoft.com/office/drawing/2014/main" id="{BD30F8EE-801F-41F2-B1EA-BC20237AA6F4}"/>
+              </a:ext>
+            </a:extLst>
+          </p:cNvPr>
+          <p:cNvPicPr>
+            <a:picLocks noChangeAspect="1"/>
+          </p:cNvPicPr>
+          <p:nvPr/>
+        </p:nvPicPr>
+        <p:blipFill>
+          <a:blip r:embed="rId5" cstate="print">
+            <a:extLst>
+              <a:ext uri="{28A0092B-C50C-407E-A947-70E740481C1C}">
+                <a14:useLocalDpi xmlns:a14="http://schemas.microsoft.com/office/drawing/2010/main" val="0"/>
+              </a:ext>
+            </a:extLst>
+          </a:blip>
+          <a:stretch>
+            <a:fillRect/>
+          </a:stretch>
+        </p:blipFill>
+        <p:spPr>
+          <a:xfrm>
+            <a:off x="4283968" y="2500307"/>
+            <a:ext cx="3585900" cy="2285689"/>
+          </a:xfrm>
+          <a:prstGeom prst="rect">
+            <a:avLst/>
+          </a:prstGeom>
+        </p:spPr>
+      </p:pic>
     </p:spTree>
     <p:extLst>
       <p:ext uri="{BB962C8B-B14F-4D97-AF65-F5344CB8AC3E}">
-        <p14:creationId xmlns:p14="http://schemas.microsoft.com/office/powerpoint/2010/main" val="3045631903"/>
+        <p14:creationId xmlns:p14="http://schemas.microsoft.com/office/powerpoint/2010/main" val="1763769228"/>
       </p:ext>
     </p:extLst>
   </p:cSld>
@@ -3964,7 +4240,7 @@
           <p:cNvPr id="2" name="Inhaltsplatzhalter 1">
             <a:extLst>
               <a:ext uri="{FF2B5EF4-FFF2-40B4-BE49-F238E27FC236}">
-                <a16:creationId xmlns:a16="http://schemas.microsoft.com/office/drawing/2014/main" id="{2196B620-9307-4A32-8E0F-A79CD82C6141}"/>
+                <a16:creationId xmlns:a16="http://schemas.microsoft.com/office/drawing/2014/main" id="{2BFC54A6-CF1E-4705-BBE0-0F5AF5BE1FA3}"/>
               </a:ext>
             </a:extLst>
           </p:cNvPr>
@@ -3989,7 +4265,7 @@
           <p:cNvPr id="3" name="Foliennummernplatzhalter 2">
             <a:extLst>
               <a:ext uri="{FF2B5EF4-FFF2-40B4-BE49-F238E27FC236}">
-                <a16:creationId xmlns:a16="http://schemas.microsoft.com/office/drawing/2014/main" id="{81704736-F46B-49C0-9EFA-AA28A087FC33}"/>
+                <a16:creationId xmlns:a16="http://schemas.microsoft.com/office/drawing/2014/main" id="{C68930AE-E0C2-4512-88F5-C8FB2408B8A7}"/>
               </a:ext>
             </a:extLst>
           </p:cNvPr>
@@ -4018,7 +4294,7 @@
           <p:cNvPr id="4" name="Titel 3">
             <a:extLst>
               <a:ext uri="{FF2B5EF4-FFF2-40B4-BE49-F238E27FC236}">
-                <a16:creationId xmlns:a16="http://schemas.microsoft.com/office/drawing/2014/main" id="{76FB193F-48F1-49DB-BECE-D330734D424E}"/>
+                <a16:creationId xmlns:a16="http://schemas.microsoft.com/office/drawing/2014/main" id="{8E1DF498-9417-4C18-AE3C-AD5C3FECA02A}"/>
               </a:ext>
             </a:extLst>
           </p:cNvPr>
@@ -4036,7 +4312,7 @@
           <a:p>
             <a:r>
               <a:rPr lang="de-DE" dirty="0"/>
-              <a:t>Entwurf</a:t>
+              <a:t>GPU Architektur</a:t>
             </a:r>
           </a:p>
         </p:txBody>
@@ -4044,7 +4320,7 @@
     </p:spTree>
     <p:extLst>
       <p:ext uri="{BB962C8B-B14F-4D97-AF65-F5344CB8AC3E}">
-        <p14:creationId xmlns:p14="http://schemas.microsoft.com/office/powerpoint/2010/main" val="2764741092"/>
+        <p14:creationId xmlns:p14="http://schemas.microsoft.com/office/powerpoint/2010/main" val="3045631903"/>
       </p:ext>
     </p:extLst>
   </p:cSld>
@@ -4076,7 +4352,7 @@
           <p:cNvPr id="2" name="Inhaltsplatzhalter 1">
             <a:extLst>
               <a:ext uri="{FF2B5EF4-FFF2-40B4-BE49-F238E27FC236}">
-                <a16:creationId xmlns:a16="http://schemas.microsoft.com/office/drawing/2014/main" id="{909906C3-EB48-4504-B6CF-891967643E60}"/>
+                <a16:creationId xmlns:a16="http://schemas.microsoft.com/office/drawing/2014/main" id="{2196B620-9307-4A32-8E0F-A79CD82C6141}"/>
               </a:ext>
             </a:extLst>
           </p:cNvPr>
@@ -4101,7 +4377,7 @@
           <p:cNvPr id="3" name="Foliennummernplatzhalter 2">
             <a:extLst>
               <a:ext uri="{FF2B5EF4-FFF2-40B4-BE49-F238E27FC236}">
-                <a16:creationId xmlns:a16="http://schemas.microsoft.com/office/drawing/2014/main" id="{FC907AE8-75FA-4153-8576-FAD37DFF097F}"/>
+                <a16:creationId xmlns:a16="http://schemas.microsoft.com/office/drawing/2014/main" id="{81704736-F46B-49C0-9EFA-AA28A087FC33}"/>
               </a:ext>
             </a:extLst>
           </p:cNvPr>
@@ -4130,7 +4406,7 @@
           <p:cNvPr id="4" name="Titel 3">
             <a:extLst>
               <a:ext uri="{FF2B5EF4-FFF2-40B4-BE49-F238E27FC236}">
-                <a16:creationId xmlns:a16="http://schemas.microsoft.com/office/drawing/2014/main" id="{8FB73CFF-2580-4E40-ACFF-1D3CE9431CEA}"/>
+                <a16:creationId xmlns:a16="http://schemas.microsoft.com/office/drawing/2014/main" id="{76FB193F-48F1-49DB-BECE-D330734D424E}"/>
               </a:ext>
             </a:extLst>
           </p:cNvPr>
@@ -4148,7 +4424,7 @@
           <a:p>
             <a:r>
               <a:rPr lang="de-DE" dirty="0"/>
-              <a:t>Implementierung</a:t>
+              <a:t>Entwurf</a:t>
             </a:r>
           </a:p>
         </p:txBody>
@@ -4156,7 +4432,7 @@
     </p:spTree>
     <p:extLst>
       <p:ext uri="{BB962C8B-B14F-4D97-AF65-F5344CB8AC3E}">
-        <p14:creationId xmlns:p14="http://schemas.microsoft.com/office/powerpoint/2010/main" val="3741742311"/>
+        <p14:creationId xmlns:p14="http://schemas.microsoft.com/office/powerpoint/2010/main" val="2764741092"/>
       </p:ext>
     </p:extLst>
   </p:cSld>
@@ -4188,7 +4464,7 @@
           <p:cNvPr id="2" name="Inhaltsplatzhalter 1">
             <a:extLst>
               <a:ext uri="{FF2B5EF4-FFF2-40B4-BE49-F238E27FC236}">
-                <a16:creationId xmlns:a16="http://schemas.microsoft.com/office/drawing/2014/main" id="{0356811E-A147-472F-A750-95CA0DFB70F1}"/>
+                <a16:creationId xmlns:a16="http://schemas.microsoft.com/office/drawing/2014/main" id="{909906C3-EB48-4504-B6CF-891967643E60}"/>
               </a:ext>
             </a:extLst>
           </p:cNvPr>
@@ -4213,7 +4489,7 @@
           <p:cNvPr id="3" name="Foliennummernplatzhalter 2">
             <a:extLst>
               <a:ext uri="{FF2B5EF4-FFF2-40B4-BE49-F238E27FC236}">
-                <a16:creationId xmlns:a16="http://schemas.microsoft.com/office/drawing/2014/main" id="{075C3468-4FAE-4482-A6B1-80A1C1D916C8}"/>
+                <a16:creationId xmlns:a16="http://schemas.microsoft.com/office/drawing/2014/main" id="{FC907AE8-75FA-4153-8576-FAD37DFF097F}"/>
               </a:ext>
             </a:extLst>
           </p:cNvPr>
@@ -4242,7 +4518,7 @@
           <p:cNvPr id="4" name="Titel 3">
             <a:extLst>
               <a:ext uri="{FF2B5EF4-FFF2-40B4-BE49-F238E27FC236}">
-                <a16:creationId xmlns:a16="http://schemas.microsoft.com/office/drawing/2014/main" id="{667732E9-823B-48E1-94F0-E4B095B29007}"/>
+                <a16:creationId xmlns:a16="http://schemas.microsoft.com/office/drawing/2014/main" id="{8FB73CFF-2580-4E40-ACFF-1D3CE9431CEA}"/>
               </a:ext>
             </a:extLst>
           </p:cNvPr>
@@ -4260,7 +4536,7 @@
           <a:p>
             <a:r>
               <a:rPr lang="de-DE" dirty="0"/>
-              <a:t>Ergebnisse</a:t>
+              <a:t>Implementierung</a:t>
             </a:r>
           </a:p>
         </p:txBody>
@@ -4268,7 +4544,7 @@
     </p:spTree>
     <p:extLst>
       <p:ext uri="{BB962C8B-B14F-4D97-AF65-F5344CB8AC3E}">
-        <p14:creationId xmlns:p14="http://schemas.microsoft.com/office/powerpoint/2010/main" val="1293666043"/>
+        <p14:creationId xmlns:p14="http://schemas.microsoft.com/office/powerpoint/2010/main" val="3741742311"/>
       </p:ext>
     </p:extLst>
   </p:cSld>
@@ -4300,7 +4576,7 @@
           <p:cNvPr id="2" name="Inhaltsplatzhalter 1">
             <a:extLst>
               <a:ext uri="{FF2B5EF4-FFF2-40B4-BE49-F238E27FC236}">
-                <a16:creationId xmlns:a16="http://schemas.microsoft.com/office/drawing/2014/main" id="{65A8FDFA-9158-4F5B-B217-58F4813EA1D4}"/>
+                <a16:creationId xmlns:a16="http://schemas.microsoft.com/office/drawing/2014/main" id="{0356811E-A147-472F-A750-95CA0DFB70F1}"/>
               </a:ext>
             </a:extLst>
           </p:cNvPr>
@@ -4325,7 +4601,7 @@
           <p:cNvPr id="3" name="Foliennummernplatzhalter 2">
             <a:extLst>
               <a:ext uri="{FF2B5EF4-FFF2-40B4-BE49-F238E27FC236}">
-                <a16:creationId xmlns:a16="http://schemas.microsoft.com/office/drawing/2014/main" id="{3A92B2AE-FD91-476E-A0BA-A33507D415F7}"/>
+                <a16:creationId xmlns:a16="http://schemas.microsoft.com/office/drawing/2014/main" id="{075C3468-4FAE-4482-A6B1-80A1C1D916C8}"/>
               </a:ext>
             </a:extLst>
           </p:cNvPr>
@@ -4354,7 +4630,7 @@
           <p:cNvPr id="4" name="Titel 3">
             <a:extLst>
               <a:ext uri="{FF2B5EF4-FFF2-40B4-BE49-F238E27FC236}">
-                <a16:creationId xmlns:a16="http://schemas.microsoft.com/office/drawing/2014/main" id="{1CEDDF61-A407-4902-8BFD-CC56DD364054}"/>
+                <a16:creationId xmlns:a16="http://schemas.microsoft.com/office/drawing/2014/main" id="{667732E9-823B-48E1-94F0-E4B095B29007}"/>
               </a:ext>
             </a:extLst>
           </p:cNvPr>
@@ -4372,7 +4648,7 @@
           <a:p>
             <a:r>
               <a:rPr lang="de-DE" dirty="0"/>
-              <a:t>Fazit</a:t>
+              <a:t>Ergebnisse</a:t>
             </a:r>
           </a:p>
         </p:txBody>
@@ -4380,7 +4656,7 @@
     </p:spTree>
     <p:extLst>
       <p:ext uri="{BB962C8B-B14F-4D97-AF65-F5344CB8AC3E}">
-        <p14:creationId xmlns:p14="http://schemas.microsoft.com/office/powerpoint/2010/main" val="3815123622"/>
+        <p14:creationId xmlns:p14="http://schemas.microsoft.com/office/powerpoint/2010/main" val="1293666043"/>
       </p:ext>
     </p:extLst>
   </p:cSld>
@@ -4412,6 +4688,118 @@
           <p:cNvPr id="2" name="Inhaltsplatzhalter 1">
             <a:extLst>
               <a:ext uri="{FF2B5EF4-FFF2-40B4-BE49-F238E27FC236}">
+                <a16:creationId xmlns:a16="http://schemas.microsoft.com/office/drawing/2014/main" id="{65A8FDFA-9158-4F5B-B217-58F4813EA1D4}"/>
+              </a:ext>
+            </a:extLst>
+          </p:cNvPr>
+          <p:cNvSpPr>
+            <a:spLocks noGrp="1"/>
+          </p:cNvSpPr>
+          <p:nvPr>
+            <p:ph idx="1"/>
+          </p:nvPr>
+        </p:nvSpPr>
+        <p:spPr/>
+        <p:txBody>
+          <a:bodyPr/>
+          <a:lstStyle/>
+          <a:p>
+            <a:endParaRPr lang="de-DE"/>
+          </a:p>
+        </p:txBody>
+      </p:sp>
+      <p:sp>
+        <p:nvSpPr>
+          <p:cNvPr id="3" name="Foliennummernplatzhalter 2">
+            <a:extLst>
+              <a:ext uri="{FF2B5EF4-FFF2-40B4-BE49-F238E27FC236}">
+                <a16:creationId xmlns:a16="http://schemas.microsoft.com/office/drawing/2014/main" id="{3A92B2AE-FD91-476E-A0BA-A33507D415F7}"/>
+              </a:ext>
+            </a:extLst>
+          </p:cNvPr>
+          <p:cNvSpPr>
+            <a:spLocks noGrp="1"/>
+          </p:cNvSpPr>
+          <p:nvPr>
+            <p:ph type="sldNum" sz="quarter" idx="12"/>
+          </p:nvPr>
+        </p:nvSpPr>
+        <p:spPr/>
+        <p:txBody>
+          <a:bodyPr/>
+          <a:lstStyle/>
+          <a:p>
+            <a:fld id="{29AD3987-26BA-49DC-BA24-72731371DC9F}" type="slidenum">
+              <a:rPr lang="de-DE" smtClean="0"/>
+              <a:t>15</a:t>
+            </a:fld>
+            <a:endParaRPr lang="de-DE" dirty="0"/>
+          </a:p>
+        </p:txBody>
+      </p:sp>
+      <p:sp>
+        <p:nvSpPr>
+          <p:cNvPr id="4" name="Titel 3">
+            <a:extLst>
+              <a:ext uri="{FF2B5EF4-FFF2-40B4-BE49-F238E27FC236}">
+                <a16:creationId xmlns:a16="http://schemas.microsoft.com/office/drawing/2014/main" id="{1CEDDF61-A407-4902-8BFD-CC56DD364054}"/>
+              </a:ext>
+            </a:extLst>
+          </p:cNvPr>
+          <p:cNvSpPr>
+            <a:spLocks noGrp="1"/>
+          </p:cNvSpPr>
+          <p:nvPr>
+            <p:ph type="title"/>
+          </p:nvPr>
+        </p:nvSpPr>
+        <p:spPr/>
+        <p:txBody>
+          <a:bodyPr/>
+          <a:lstStyle/>
+          <a:p>
+            <a:r>
+              <a:rPr lang="de-DE" dirty="0"/>
+              <a:t>Fazit</a:t>
+            </a:r>
+          </a:p>
+        </p:txBody>
+      </p:sp>
+    </p:spTree>
+    <p:extLst>
+      <p:ext uri="{BB962C8B-B14F-4D97-AF65-F5344CB8AC3E}">
+        <p14:creationId xmlns:p14="http://schemas.microsoft.com/office/powerpoint/2010/main" val="3815123622"/>
+      </p:ext>
+    </p:extLst>
+  </p:cSld>
+  <p:clrMapOvr>
+    <a:masterClrMapping/>
+  </p:clrMapOvr>
+</p:sld>
+</file>
+
+<file path=ppt/slides/slide16.xml><?xml version="1.0" encoding="utf-8"?>
+<p:sld xmlns:a="http://schemas.openxmlformats.org/drawingml/2006/main" xmlns:r="http://schemas.openxmlformats.org/officeDocument/2006/relationships" xmlns:p="http://schemas.openxmlformats.org/presentationml/2006/main">
+  <p:cSld>
+    <p:spTree>
+      <p:nvGrpSpPr>
+        <p:cNvPr id="1" name=""/>
+        <p:cNvGrpSpPr/>
+        <p:nvPr/>
+      </p:nvGrpSpPr>
+      <p:grpSpPr>
+        <a:xfrm>
+          <a:off x="0" y="0"/>
+          <a:ext cx="0" cy="0"/>
+          <a:chOff x="0" y="0"/>
+          <a:chExt cx="0" cy="0"/>
+        </a:xfrm>
+      </p:grpSpPr>
+      <p:sp>
+        <p:nvSpPr>
+          <p:cNvPr id="2" name="Inhaltsplatzhalter 1">
+            <a:extLst>
+              <a:ext uri="{FF2B5EF4-FFF2-40B4-BE49-F238E27FC236}">
                 <a16:creationId xmlns:a16="http://schemas.microsoft.com/office/drawing/2014/main" id="{002BA65F-1EFC-48C1-9C31-D228E1A6EE9B}"/>
               </a:ext>
             </a:extLst>
@@ -4455,7 +4843,7 @@
           <a:p>
             <a:fld id="{29AD3987-26BA-49DC-BA24-72731371DC9F}" type="slidenum">
               <a:rPr lang="de-DE" smtClean="0"/>
-              <a:t>15</a:t>
+              <a:t>16</a:t>
             </a:fld>
             <a:endParaRPr lang="de-DE" dirty="0"/>
           </a:p>
@@ -5714,6 +6102,78 @@
           <a:chExt cx="0" cy="0"/>
         </a:xfrm>
       </p:grpSpPr>
+      <p:pic>
+        <p:nvPicPr>
+          <p:cNvPr id="8" name="Grafik 7">
+            <a:extLst>
+              <a:ext uri="{FF2B5EF4-FFF2-40B4-BE49-F238E27FC236}">
+                <a16:creationId xmlns:a16="http://schemas.microsoft.com/office/drawing/2014/main" id="{308FDB43-4A79-4A31-B41C-894ACC0E1EB9}"/>
+              </a:ext>
+            </a:extLst>
+          </p:cNvPr>
+          <p:cNvPicPr>
+            <a:picLocks noChangeAspect="1"/>
+          </p:cNvPicPr>
+          <p:nvPr/>
+        </p:nvPicPr>
+        <p:blipFill>
+          <a:blip r:embed="rId3">
+            <a:extLst>
+              <a:ext uri="{28A0092B-C50C-407E-A947-70E740481C1C}">
+                <a14:useLocalDpi xmlns:a14="http://schemas.microsoft.com/office/drawing/2010/main" val="0"/>
+              </a:ext>
+            </a:extLst>
+          </a:blip>
+          <a:stretch>
+            <a:fillRect/>
+          </a:stretch>
+        </p:blipFill>
+        <p:spPr>
+          <a:xfrm>
+            <a:off x="1331640" y="2302017"/>
+            <a:ext cx="2448272" cy="1807554"/>
+          </a:xfrm>
+          <a:prstGeom prst="rect">
+            <a:avLst/>
+          </a:prstGeom>
+        </p:spPr>
+      </p:pic>
+      <p:pic>
+        <p:nvPicPr>
+          <p:cNvPr id="6" name="Grafik 5">
+            <a:extLst>
+              <a:ext uri="{FF2B5EF4-FFF2-40B4-BE49-F238E27FC236}">
+                <a16:creationId xmlns:a16="http://schemas.microsoft.com/office/drawing/2014/main" id="{C10856B3-6AF0-478D-945A-1B6EF23EA8BC}"/>
+              </a:ext>
+            </a:extLst>
+          </p:cNvPr>
+          <p:cNvPicPr>
+            <a:picLocks noChangeAspect="1"/>
+          </p:cNvPicPr>
+          <p:nvPr/>
+        </p:nvPicPr>
+        <p:blipFill>
+          <a:blip r:embed="rId4">
+            <a:extLst>
+              <a:ext uri="{28A0092B-C50C-407E-A947-70E740481C1C}">
+                <a14:useLocalDpi xmlns:a14="http://schemas.microsoft.com/office/drawing/2010/main" val="0"/>
+              </a:ext>
+            </a:extLst>
+          </a:blip>
+          <a:stretch>
+            <a:fillRect/>
+          </a:stretch>
+        </p:blipFill>
+        <p:spPr>
+          <a:xfrm>
+            <a:off x="4421924" y="2427734"/>
+            <a:ext cx="3115906" cy="1347779"/>
+          </a:xfrm>
+          <a:prstGeom prst="rect">
+            <a:avLst/>
+          </a:prstGeom>
+        </p:spPr>
+      </p:pic>
       <p:sp>
         <p:nvSpPr>
           <p:cNvPr id="2" name="Inhaltsplatzhalter 1">
@@ -5730,12 +6190,62 @@
             <p:ph idx="1"/>
           </p:nvPr>
         </p:nvSpPr>
-        <p:spPr/>
-        <p:txBody>
-          <a:bodyPr/>
-          <a:lstStyle/>
+        <p:spPr>
+          <a:xfrm>
+            <a:off x="251520" y="1202574"/>
+            <a:ext cx="8640960" cy="3400026"/>
+          </a:xfrm>
+        </p:spPr>
+        <p:txBody>
+          <a:bodyPr/>
+          <a:lstStyle/>
+          <a:p>
+            <a:r>
+              <a:rPr lang="de-DE" dirty="0"/>
+              <a:t>Dreidimensionales Bild</a:t>
+            </a:r>
+          </a:p>
+          <a:p>
+            <a:r>
+              <a:rPr lang="de-DE" dirty="0"/>
+              <a:t>Bestehend aus </a:t>
+            </a:r>
+            <a:r>
+              <a:rPr lang="de-DE" dirty="0" err="1"/>
+              <a:t>Voxel</a:t>
+            </a:r>
+            <a:r>
+              <a:rPr lang="de-DE" dirty="0"/>
+              <a:t> (statt Texel in 2D)</a:t>
+            </a:r>
+          </a:p>
+          <a:p>
+            <a:pPr lvl="1"/>
+            <a:r>
+              <a:rPr lang="de-DE" dirty="0"/>
+              <a:t>Position, Ausdehnung, Dichte</a:t>
+            </a:r>
+          </a:p>
           <a:p>
             <a:endParaRPr lang="de-DE" dirty="0"/>
+          </a:p>
+          <a:p>
+            <a:endParaRPr lang="de-DE" dirty="0"/>
+          </a:p>
+          <a:p>
+            <a:endParaRPr lang="de-DE" dirty="0"/>
+          </a:p>
+          <a:p>
+            <a:endParaRPr lang="de-DE" dirty="0"/>
+          </a:p>
+          <a:p>
+            <a:endParaRPr lang="de-DE" dirty="0"/>
+          </a:p>
+          <a:p>
+            <a:r>
+              <a:rPr lang="de-DE" dirty="0"/>
+              <a:t>Transferfunktion bildet Dichtewerte auf Farbwerte ab</a:t>
+            </a:r>
           </a:p>
         </p:txBody>
       </p:sp>
@@ -5831,7 +6341,7 @@
           <p:cNvPr id="2" name="Inhaltsplatzhalter 1">
             <a:extLst>
               <a:ext uri="{FF2B5EF4-FFF2-40B4-BE49-F238E27FC236}">
-                <a16:creationId xmlns:a16="http://schemas.microsoft.com/office/drawing/2014/main" id="{C62841FF-ED95-410A-A44C-4CD3F18EDF65}"/>
+                <a16:creationId xmlns:a16="http://schemas.microsoft.com/office/drawing/2014/main" id="{92287F96-52E6-4087-ADAD-DA48F5DD37E8}"/>
               </a:ext>
             </a:extLst>
           </p:cNvPr>
@@ -5847,7 +6357,10 @@
           <a:bodyPr/>
           <a:lstStyle/>
           <a:p>
-            <a:endParaRPr lang="de-DE"/>
+            <a:r>
+              <a:rPr lang="de-DE" dirty="0"/>
+              <a:t>Unterschiedliche Transferfunktionen machen unterschiedliche Informationen des Volumens sichtbar</a:t>
+            </a:r>
           </a:p>
         </p:txBody>
       </p:sp>
@@ -5856,7 +6369,7 @@
           <p:cNvPr id="3" name="Foliennummernplatzhalter 2">
             <a:extLst>
               <a:ext uri="{FF2B5EF4-FFF2-40B4-BE49-F238E27FC236}">
-                <a16:creationId xmlns:a16="http://schemas.microsoft.com/office/drawing/2014/main" id="{603903D2-F9DC-4D39-B875-B0D05A83EBC9}"/>
+                <a16:creationId xmlns:a16="http://schemas.microsoft.com/office/drawing/2014/main" id="{4CAF63B8-3ECE-493C-9B79-1A5292EEF70A}"/>
               </a:ext>
             </a:extLst>
           </p:cNvPr>
@@ -5885,7 +6398,7 @@
           <p:cNvPr id="4" name="Titel 3">
             <a:extLst>
               <a:ext uri="{FF2B5EF4-FFF2-40B4-BE49-F238E27FC236}">
-                <a16:creationId xmlns:a16="http://schemas.microsoft.com/office/drawing/2014/main" id="{967B9506-C4D3-48E3-83E9-BC865F3F5D31}"/>
+                <a16:creationId xmlns:a16="http://schemas.microsoft.com/office/drawing/2014/main" id="{9BB500FE-8952-45BE-A881-234A47F4B50E}"/>
               </a:ext>
             </a:extLst>
           </p:cNvPr>
@@ -5903,15 +6416,85 @@
           <a:p>
             <a:r>
               <a:rPr lang="de-DE" dirty="0"/>
-              <a:t>Eyetracking</a:t>
-            </a:r>
-          </a:p>
-        </p:txBody>
-      </p:sp>
+              <a:t>Volumenrendering</a:t>
+            </a:r>
+          </a:p>
+        </p:txBody>
+      </p:sp>
+      <p:pic>
+        <p:nvPicPr>
+          <p:cNvPr id="5" name="Grafik 4">
+            <a:extLst>
+              <a:ext uri="{FF2B5EF4-FFF2-40B4-BE49-F238E27FC236}">
+                <a16:creationId xmlns:a16="http://schemas.microsoft.com/office/drawing/2014/main" id="{3F3082C0-CA5E-4F25-96B4-7EC98ECADB5D}"/>
+              </a:ext>
+            </a:extLst>
+          </p:cNvPr>
+          <p:cNvPicPr>
+            <a:picLocks noChangeAspect="1"/>
+          </p:cNvPicPr>
+          <p:nvPr/>
+        </p:nvPicPr>
+        <p:blipFill rotWithShape="1">
+          <a:blip r:embed="rId2" cstate="print">
+            <a:extLst>
+              <a:ext uri="{28A0092B-C50C-407E-A947-70E740481C1C}">
+                <a14:useLocalDpi xmlns:a14="http://schemas.microsoft.com/office/drawing/2010/main" val="0"/>
+              </a:ext>
+            </a:extLst>
+          </a:blip>
+          <a:srcRect l="11911" t="-4498" r="24708" b="2148"/>
+          <a:stretch/>
+        </p:blipFill>
+        <p:spPr>
+          <a:xfrm>
+            <a:off x="971600" y="1793264"/>
+            <a:ext cx="3240360" cy="3019834"/>
+          </a:xfrm>
+          <a:prstGeom prst="rect">
+            <a:avLst/>
+          </a:prstGeom>
+        </p:spPr>
+      </p:pic>
+      <p:pic>
+        <p:nvPicPr>
+          <p:cNvPr id="6" name="Grafik 5">
+            <a:extLst>
+              <a:ext uri="{FF2B5EF4-FFF2-40B4-BE49-F238E27FC236}">
+                <a16:creationId xmlns:a16="http://schemas.microsoft.com/office/drawing/2014/main" id="{615A0C70-4517-4417-9203-44398BDF654F}"/>
+              </a:ext>
+            </a:extLst>
+          </p:cNvPr>
+          <p:cNvPicPr>
+            <a:picLocks noChangeAspect="1"/>
+          </p:cNvPicPr>
+          <p:nvPr/>
+        </p:nvPicPr>
+        <p:blipFill rotWithShape="1">
+          <a:blip r:embed="rId3" cstate="print">
+            <a:extLst>
+              <a:ext uri="{28A0092B-C50C-407E-A947-70E740481C1C}">
+                <a14:useLocalDpi xmlns:a14="http://schemas.microsoft.com/office/drawing/2010/main" val="0"/>
+              </a:ext>
+            </a:extLst>
+          </a:blip>
+          <a:srcRect l="16901" t="2673" r="19718"/>
+          <a:stretch/>
+        </p:blipFill>
+        <p:spPr>
+          <a:xfrm>
+            <a:off x="5038369" y="1941410"/>
+            <a:ext cx="3240360" cy="2871688"/>
+          </a:xfrm>
+          <a:prstGeom prst="rect">
+            <a:avLst/>
+          </a:prstGeom>
+        </p:spPr>
+      </p:pic>
     </p:spTree>
     <p:extLst>
       <p:ext uri="{BB962C8B-B14F-4D97-AF65-F5344CB8AC3E}">
-        <p14:creationId xmlns:p14="http://schemas.microsoft.com/office/powerpoint/2010/main" val="1763769228"/>
+        <p14:creationId xmlns:p14="http://schemas.microsoft.com/office/powerpoint/2010/main" val="3273524817"/>
       </p:ext>
     </p:extLst>
   </p:cSld>

</xml_diff>

<commit_message>
Vortrag: Entwurf und Implementierung nur sehr grob.
</commit_message>
<xml_diff>
--- a/Dokumente/Vortrag/Wahrnehmungsorientiertes_Volumen-Rendering.pptx
+++ b/Dokumente/Vortrag/Wahrnehmungsorientiertes_Volumen-Rendering.pptx
@@ -5,7 +5,7 @@
     <p:sldMasterId id="2147483648" r:id="rId1"/>
   </p:sldMasterIdLst>
   <p:notesMasterIdLst>
-    <p:notesMasterId r:id="rId20"/>
+    <p:notesMasterId r:id="rId21"/>
   </p:notesMasterIdLst>
   <p:sldIdLst>
     <p:sldId id="259" r:id="rId2"/>
@@ -23,9 +23,10 @@
     <p:sldId id="276" r:id="rId14"/>
     <p:sldId id="267" r:id="rId15"/>
     <p:sldId id="268" r:id="rId16"/>
-    <p:sldId id="269" r:id="rId17"/>
-    <p:sldId id="270" r:id="rId18"/>
-    <p:sldId id="271" r:id="rId19"/>
+    <p:sldId id="277" r:id="rId17"/>
+    <p:sldId id="269" r:id="rId18"/>
+    <p:sldId id="270" r:id="rId19"/>
+    <p:sldId id="271" r:id="rId20"/>
   </p:sldIdLst>
   <p:sldSz cx="9144000" cy="5143500" type="screen16x9"/>
   <p:notesSz cx="6858000" cy="9144000"/>
@@ -795,6 +796,275 @@
 </p:notes>
 </file>
 
+<file path=ppt/notesSlides/notesSlide12.xml><?xml version="1.0" encoding="utf-8"?>
+<p:notes xmlns:a="http://schemas.openxmlformats.org/drawingml/2006/main" xmlns:r="http://schemas.openxmlformats.org/officeDocument/2006/relationships" xmlns:p="http://schemas.openxmlformats.org/presentationml/2006/main">
+  <p:cSld>
+    <p:spTree>
+      <p:nvGrpSpPr>
+        <p:cNvPr id="1" name=""/>
+        <p:cNvGrpSpPr/>
+        <p:nvPr/>
+      </p:nvGrpSpPr>
+      <p:grpSpPr>
+        <a:xfrm>
+          <a:off x="0" y="0"/>
+          <a:ext cx="0" cy="0"/>
+          <a:chOff x="0" y="0"/>
+          <a:chExt cx="0" cy="0"/>
+        </a:xfrm>
+      </p:grpSpPr>
+      <p:sp>
+        <p:nvSpPr>
+          <p:cNvPr id="2" name="Folienbildplatzhalter 1"/>
+          <p:cNvSpPr>
+            <a:spLocks noGrp="1" noRot="1" noChangeAspect="1"/>
+          </p:cNvSpPr>
+          <p:nvPr>
+            <p:ph type="sldImg"/>
+          </p:nvPr>
+        </p:nvSpPr>
+        <p:spPr/>
+      </p:sp>
+      <p:sp>
+        <p:nvSpPr>
+          <p:cNvPr id="3" name="Notizenplatzhalter 2"/>
+          <p:cNvSpPr>
+            <a:spLocks noGrp="1"/>
+          </p:cNvSpPr>
+          <p:nvPr>
+            <p:ph type="body" idx="1"/>
+          </p:nvPr>
+        </p:nvSpPr>
+        <p:spPr/>
+        <p:txBody>
+          <a:bodyPr/>
+          <a:lstStyle/>
+          <a:p>
+            <a:r>
+              <a:rPr lang="de-DE" dirty="0"/>
+              <a:t>Entwurf:</a:t>
+            </a:r>
+          </a:p>
+          <a:p>
+            <a:r>
+              <a:rPr lang="de-DE" dirty="0"/>
+              <a:t>-- Ausgangprojekt </a:t>
+            </a:r>
+            <a:r>
+              <a:rPr lang="de-DE" dirty="0" err="1"/>
+              <a:t>Raycaster</a:t>
+            </a:r>
+            <a:r>
+              <a:rPr lang="de-DE" dirty="0"/>
+              <a:t>, Simulieren der Blickposition, Reduzierung der Abtastrate im Objekt- und Bildbereich</a:t>
+            </a:r>
+          </a:p>
+        </p:txBody>
+      </p:sp>
+      <p:sp>
+        <p:nvSpPr>
+          <p:cNvPr id="4" name="Foliennummernplatzhalter 3"/>
+          <p:cNvSpPr>
+            <a:spLocks noGrp="1"/>
+          </p:cNvSpPr>
+          <p:nvPr>
+            <p:ph type="sldNum" sz="quarter" idx="5"/>
+          </p:nvPr>
+        </p:nvSpPr>
+        <p:spPr/>
+        <p:txBody>
+          <a:bodyPr/>
+          <a:lstStyle/>
+          <a:p>
+            <a:fld id="{6F4F2A7C-E896-4C15-99D8-2B5BC94A4F36}" type="slidenum">
+              <a:rPr lang="de-DE" smtClean="0"/>
+              <a:t>14</a:t>
+            </a:fld>
+            <a:endParaRPr lang="de-DE"/>
+          </a:p>
+        </p:txBody>
+      </p:sp>
+    </p:spTree>
+    <p:extLst>
+      <p:ext uri="{BB962C8B-B14F-4D97-AF65-F5344CB8AC3E}">
+        <p14:creationId xmlns:p14="http://schemas.microsoft.com/office/powerpoint/2010/main" val="3834442345"/>
+      </p:ext>
+    </p:extLst>
+  </p:cSld>
+  <p:clrMapOvr>
+    <a:masterClrMapping/>
+  </p:clrMapOvr>
+</p:notes>
+</file>
+
+<file path=ppt/notesSlides/notesSlide13.xml><?xml version="1.0" encoding="utf-8"?>
+<p:notes xmlns:a="http://schemas.openxmlformats.org/drawingml/2006/main" xmlns:r="http://schemas.openxmlformats.org/officeDocument/2006/relationships" xmlns:p="http://schemas.openxmlformats.org/presentationml/2006/main">
+  <p:cSld>
+    <p:spTree>
+      <p:nvGrpSpPr>
+        <p:cNvPr id="1" name=""/>
+        <p:cNvGrpSpPr/>
+        <p:nvPr/>
+      </p:nvGrpSpPr>
+      <p:grpSpPr>
+        <a:xfrm>
+          <a:off x="0" y="0"/>
+          <a:ext cx="0" cy="0"/>
+          <a:chOff x="0" y="0"/>
+          <a:chExt cx="0" cy="0"/>
+        </a:xfrm>
+      </p:grpSpPr>
+      <p:sp>
+        <p:nvSpPr>
+          <p:cNvPr id="2" name="Folienbildplatzhalter 1"/>
+          <p:cNvSpPr>
+            <a:spLocks noGrp="1" noRot="1" noChangeAspect="1"/>
+          </p:cNvSpPr>
+          <p:nvPr>
+            <p:ph type="sldImg"/>
+          </p:nvPr>
+        </p:nvSpPr>
+        <p:spPr/>
+      </p:sp>
+      <p:sp>
+        <p:nvSpPr>
+          <p:cNvPr id="3" name="Notizenplatzhalter 2"/>
+          <p:cNvSpPr>
+            <a:spLocks noGrp="1"/>
+          </p:cNvSpPr>
+          <p:nvPr>
+            <p:ph type="body" idx="1"/>
+          </p:nvPr>
+        </p:nvSpPr>
+        <p:spPr/>
+        <p:txBody>
+          <a:bodyPr/>
+          <a:lstStyle/>
+          <a:p>
+            <a:endParaRPr lang="de-DE" dirty="0"/>
+          </a:p>
+        </p:txBody>
+      </p:sp>
+      <p:sp>
+        <p:nvSpPr>
+          <p:cNvPr id="4" name="Foliennummernplatzhalter 3"/>
+          <p:cNvSpPr>
+            <a:spLocks noGrp="1"/>
+          </p:cNvSpPr>
+          <p:nvPr>
+            <p:ph type="sldNum" sz="quarter" idx="5"/>
+          </p:nvPr>
+        </p:nvSpPr>
+        <p:spPr/>
+        <p:txBody>
+          <a:bodyPr/>
+          <a:lstStyle/>
+          <a:p>
+            <a:fld id="{6F4F2A7C-E896-4C15-99D8-2B5BC94A4F36}" type="slidenum">
+              <a:rPr lang="de-DE" smtClean="0"/>
+              <a:t>15</a:t>
+            </a:fld>
+            <a:endParaRPr lang="de-DE"/>
+          </a:p>
+        </p:txBody>
+      </p:sp>
+    </p:spTree>
+    <p:extLst>
+      <p:ext uri="{BB962C8B-B14F-4D97-AF65-F5344CB8AC3E}">
+        <p14:creationId xmlns:p14="http://schemas.microsoft.com/office/powerpoint/2010/main" val="1983490928"/>
+      </p:ext>
+    </p:extLst>
+  </p:cSld>
+  <p:clrMapOvr>
+    <a:masterClrMapping/>
+  </p:clrMapOvr>
+</p:notes>
+</file>
+
+<file path=ppt/notesSlides/notesSlide14.xml><?xml version="1.0" encoding="utf-8"?>
+<p:notes xmlns:a="http://schemas.openxmlformats.org/drawingml/2006/main" xmlns:r="http://schemas.openxmlformats.org/officeDocument/2006/relationships" xmlns:p="http://schemas.openxmlformats.org/presentationml/2006/main">
+  <p:cSld>
+    <p:spTree>
+      <p:nvGrpSpPr>
+        <p:cNvPr id="1" name=""/>
+        <p:cNvGrpSpPr/>
+        <p:nvPr/>
+      </p:nvGrpSpPr>
+      <p:grpSpPr>
+        <a:xfrm>
+          <a:off x="0" y="0"/>
+          <a:ext cx="0" cy="0"/>
+          <a:chOff x="0" y="0"/>
+          <a:chExt cx="0" cy="0"/>
+        </a:xfrm>
+      </p:grpSpPr>
+      <p:sp>
+        <p:nvSpPr>
+          <p:cNvPr id="2" name="Folienbildplatzhalter 1"/>
+          <p:cNvSpPr>
+            <a:spLocks noGrp="1" noRot="1" noChangeAspect="1"/>
+          </p:cNvSpPr>
+          <p:nvPr>
+            <p:ph type="sldImg"/>
+          </p:nvPr>
+        </p:nvSpPr>
+        <p:spPr/>
+      </p:sp>
+      <p:sp>
+        <p:nvSpPr>
+          <p:cNvPr id="3" name="Notizenplatzhalter 2"/>
+          <p:cNvSpPr>
+            <a:spLocks noGrp="1"/>
+          </p:cNvSpPr>
+          <p:nvPr>
+            <p:ph type="body" idx="1"/>
+          </p:nvPr>
+        </p:nvSpPr>
+        <p:spPr/>
+        <p:txBody>
+          <a:bodyPr/>
+          <a:lstStyle/>
+          <a:p>
+            <a:endParaRPr lang="de-DE"/>
+          </a:p>
+        </p:txBody>
+      </p:sp>
+      <p:sp>
+        <p:nvSpPr>
+          <p:cNvPr id="4" name="Foliennummernplatzhalter 3"/>
+          <p:cNvSpPr>
+            <a:spLocks noGrp="1"/>
+          </p:cNvSpPr>
+          <p:nvPr>
+            <p:ph type="sldNum" sz="quarter" idx="5"/>
+          </p:nvPr>
+        </p:nvSpPr>
+        <p:spPr/>
+        <p:txBody>
+          <a:bodyPr/>
+          <a:lstStyle/>
+          <a:p>
+            <a:fld id="{6F4F2A7C-E896-4C15-99D8-2B5BC94A4F36}" type="slidenum">
+              <a:rPr lang="de-DE" smtClean="0"/>
+              <a:t>17</a:t>
+            </a:fld>
+            <a:endParaRPr lang="de-DE"/>
+          </a:p>
+        </p:txBody>
+      </p:sp>
+    </p:spTree>
+    <p:extLst>
+      <p:ext uri="{BB962C8B-B14F-4D97-AF65-F5344CB8AC3E}">
+        <p14:creationId xmlns:p14="http://schemas.microsoft.com/office/powerpoint/2010/main" val="2812053294"/>
+      </p:ext>
+    </p:extLst>
+  </p:cSld>
+  <p:clrMapOvr>
+    <a:masterClrMapping/>
+  </p:clrMapOvr>
+</p:notes>
+</file>
+
 <file path=ppt/notesSlides/notesSlide2.xml><?xml version="1.0" encoding="utf-8"?>
 <p:notes xmlns:a="http://schemas.openxmlformats.org/drawingml/2006/main" xmlns:r="http://schemas.openxmlformats.org/officeDocument/2006/relationships" xmlns:p="http://schemas.openxmlformats.org/presentationml/2006/main">
   <p:cSld>
@@ -1192,13 +1462,13 @@
             </a:r>
           </a:p>
           <a:p>
+            <a:endParaRPr lang="de-DE" dirty="0"/>
+          </a:p>
+          <a:p>
             <a:r>
               <a:rPr lang="de-DE" dirty="0"/>
               <a:t>Implementierung:</a:t>
             </a:r>
-          </a:p>
-          <a:p>
-            <a:endParaRPr lang="de-DE" dirty="0"/>
           </a:p>
           <a:p>
             <a:r>
@@ -4978,10 +5248,83 @@
         </p:nvSpPr>
         <p:spPr/>
         <p:txBody>
-          <a:bodyPr/>
-          <a:lstStyle/>
-          <a:p>
-            <a:endParaRPr lang="de-DE"/>
+          <a:bodyPr>
+            <a:normAutofit lnSpcReduction="10000"/>
+          </a:bodyPr>
+          <a:lstStyle/>
+          <a:p>
+            <a:r>
+              <a:rPr lang="de-DE" dirty="0"/>
+              <a:t>Simulation der Blickposition durch die Maus</a:t>
+            </a:r>
+          </a:p>
+          <a:p>
+            <a:r>
+              <a:rPr lang="de-DE" dirty="0"/>
+              <a:t>Reduzierung der Abtastrate im peripheren Bereich</a:t>
+            </a:r>
+          </a:p>
+          <a:p>
+            <a:pPr lvl="1"/>
+            <a:r>
+              <a:rPr lang="de-DE" dirty="0"/>
+              <a:t>Objektraum</a:t>
+            </a:r>
+          </a:p>
+          <a:p>
+            <a:pPr lvl="1"/>
+            <a:r>
+              <a:rPr lang="de-DE" dirty="0"/>
+              <a:t>Bildraum</a:t>
+            </a:r>
+          </a:p>
+          <a:p>
+            <a:r>
+              <a:rPr lang="de-DE" dirty="0"/>
+              <a:t>Methode 1:</a:t>
+            </a:r>
+          </a:p>
+          <a:p>
+            <a:pPr lvl="1"/>
+            <a:r>
+              <a:rPr lang="de-DE" dirty="0"/>
+              <a:t>Zwei </a:t>
+            </a:r>
+            <a:r>
+              <a:rPr lang="de-DE" dirty="0" err="1"/>
+              <a:t>Raycasts</a:t>
+            </a:r>
+            <a:endParaRPr lang="de-DE" dirty="0"/>
+          </a:p>
+          <a:p>
+            <a:pPr lvl="1"/>
+            <a:r>
+              <a:rPr lang="de-DE" dirty="0"/>
+              <a:t>Zusammenfügen der Bilder</a:t>
+            </a:r>
+          </a:p>
+          <a:p>
+            <a:r>
+              <a:rPr lang="de-DE" dirty="0"/>
+              <a:t>Methode 2:</a:t>
+            </a:r>
+          </a:p>
+          <a:p>
+            <a:pPr lvl="1"/>
+            <a:r>
+              <a:rPr lang="de-DE" dirty="0"/>
+              <a:t>Index Mapping</a:t>
+            </a:r>
+          </a:p>
+          <a:p>
+            <a:pPr lvl="1"/>
+            <a:r>
+              <a:rPr lang="de-DE" dirty="0"/>
+              <a:t>Bilineare Interpolation</a:t>
+            </a:r>
+          </a:p>
+          <a:p>
+            <a:endParaRPr lang="de-DE" dirty="0"/>
           </a:p>
         </p:txBody>
       </p:sp>
@@ -5093,7 +5436,10 @@
           <a:bodyPr/>
           <a:lstStyle/>
           <a:p>
-            <a:endParaRPr lang="de-DE"/>
+            <a:r>
+              <a:rPr lang="de-DE" dirty="0"/>
+              <a:t>Methode 1:</a:t>
+            </a:r>
           </a:p>
         </p:txBody>
       </p:sp>
@@ -5154,6 +5500,78 @@
           </a:p>
         </p:txBody>
       </p:sp>
+      <p:pic>
+        <p:nvPicPr>
+          <p:cNvPr id="10" name="Grafik 9">
+            <a:extLst>
+              <a:ext uri="{FF2B5EF4-FFF2-40B4-BE49-F238E27FC236}">
+                <a16:creationId xmlns:a16="http://schemas.microsoft.com/office/drawing/2014/main" id="{F3E19597-94D1-4A74-936E-FDBD1336E161}"/>
+              </a:ext>
+            </a:extLst>
+          </p:cNvPr>
+          <p:cNvPicPr>
+            <a:picLocks noChangeAspect="1"/>
+          </p:cNvPicPr>
+          <p:nvPr/>
+        </p:nvPicPr>
+        <p:blipFill>
+          <a:blip r:embed="rId3" cstate="print">
+            <a:extLst>
+              <a:ext uri="{28A0092B-C50C-407E-A947-70E740481C1C}">
+                <a14:useLocalDpi xmlns:a14="http://schemas.microsoft.com/office/drawing/2010/main" val="0"/>
+              </a:ext>
+            </a:extLst>
+          </a:blip>
+          <a:stretch>
+            <a:fillRect/>
+          </a:stretch>
+        </p:blipFill>
+        <p:spPr>
+          <a:xfrm>
+            <a:off x="948762" y="1779662"/>
+            <a:ext cx="3430052" cy="2571750"/>
+          </a:xfrm>
+          <a:prstGeom prst="rect">
+            <a:avLst/>
+          </a:prstGeom>
+        </p:spPr>
+      </p:pic>
+      <p:pic>
+        <p:nvPicPr>
+          <p:cNvPr id="12" name="Grafik 11">
+            <a:extLst>
+              <a:ext uri="{FF2B5EF4-FFF2-40B4-BE49-F238E27FC236}">
+                <a16:creationId xmlns:a16="http://schemas.microsoft.com/office/drawing/2014/main" id="{E7E28F38-A82D-4CBA-B2DB-E0EDDBDFE1E4}"/>
+              </a:ext>
+            </a:extLst>
+          </p:cNvPr>
+          <p:cNvPicPr>
+            <a:picLocks noChangeAspect="1"/>
+          </p:cNvPicPr>
+          <p:nvPr/>
+        </p:nvPicPr>
+        <p:blipFill>
+          <a:blip r:embed="rId4" cstate="print">
+            <a:extLst>
+              <a:ext uri="{28A0092B-C50C-407E-A947-70E740481C1C}">
+                <a14:useLocalDpi xmlns:a14="http://schemas.microsoft.com/office/drawing/2010/main" val="0"/>
+              </a:ext>
+            </a:extLst>
+          </a:blip>
+          <a:stretch>
+            <a:fillRect/>
+          </a:stretch>
+        </p:blipFill>
+        <p:spPr>
+          <a:xfrm>
+            <a:off x="5075221" y="1779662"/>
+            <a:ext cx="3430052" cy="2571750"/>
+          </a:xfrm>
+          <a:prstGeom prst="rect">
+            <a:avLst/>
+          </a:prstGeom>
+        </p:spPr>
+      </p:pic>
     </p:spTree>
     <p:extLst>
       <p:ext uri="{BB962C8B-B14F-4D97-AF65-F5344CB8AC3E}">
@@ -5189,7 +5607,7 @@
           <p:cNvPr id="2" name="Inhaltsplatzhalter 1">
             <a:extLst>
               <a:ext uri="{FF2B5EF4-FFF2-40B4-BE49-F238E27FC236}">
-                <a16:creationId xmlns:a16="http://schemas.microsoft.com/office/drawing/2014/main" id="{0356811E-A147-472F-A750-95CA0DFB70F1}"/>
+                <a16:creationId xmlns:a16="http://schemas.microsoft.com/office/drawing/2014/main" id="{62D100E4-4706-46C7-B53D-6BBB4377D35B}"/>
               </a:ext>
             </a:extLst>
           </p:cNvPr>
@@ -5205,7 +5623,10 @@
           <a:bodyPr/>
           <a:lstStyle/>
           <a:p>
-            <a:endParaRPr lang="de-DE"/>
+            <a:r>
+              <a:rPr lang="de-DE" dirty="0"/>
+              <a:t>Methode 2:</a:t>
+            </a:r>
           </a:p>
         </p:txBody>
       </p:sp>
@@ -5214,7 +5635,7 @@
           <p:cNvPr id="3" name="Foliennummernplatzhalter 2">
             <a:extLst>
               <a:ext uri="{FF2B5EF4-FFF2-40B4-BE49-F238E27FC236}">
-                <a16:creationId xmlns:a16="http://schemas.microsoft.com/office/drawing/2014/main" id="{075C3468-4FAE-4482-A6B1-80A1C1D916C8}"/>
+                <a16:creationId xmlns:a16="http://schemas.microsoft.com/office/drawing/2014/main" id="{87F5C460-EC07-4F65-AC06-B7309CBAC798}"/>
               </a:ext>
             </a:extLst>
           </p:cNvPr>
@@ -5243,7 +5664,7 @@
           <p:cNvPr id="4" name="Titel 3">
             <a:extLst>
               <a:ext uri="{FF2B5EF4-FFF2-40B4-BE49-F238E27FC236}">
-                <a16:creationId xmlns:a16="http://schemas.microsoft.com/office/drawing/2014/main" id="{667732E9-823B-48E1-94F0-E4B095B29007}"/>
+                <a16:creationId xmlns:a16="http://schemas.microsoft.com/office/drawing/2014/main" id="{BC913892-4BF1-4471-BADB-CC4342BAC277}"/>
               </a:ext>
             </a:extLst>
           </p:cNvPr>
@@ -5261,15 +5682,87 @@
           <a:p>
             <a:r>
               <a:rPr lang="de-DE" dirty="0"/>
-              <a:t>Ergebnisse</a:t>
-            </a:r>
-          </a:p>
-        </p:txBody>
-      </p:sp>
+              <a:t>Implementierung</a:t>
+            </a:r>
+          </a:p>
+        </p:txBody>
+      </p:sp>
+      <p:pic>
+        <p:nvPicPr>
+          <p:cNvPr id="6" name="Grafik 5">
+            <a:extLst>
+              <a:ext uri="{FF2B5EF4-FFF2-40B4-BE49-F238E27FC236}">
+                <a16:creationId xmlns:a16="http://schemas.microsoft.com/office/drawing/2014/main" id="{2E791947-7C3E-47C0-B59E-E079F9A896B1}"/>
+              </a:ext>
+            </a:extLst>
+          </p:cNvPr>
+          <p:cNvPicPr>
+            <a:picLocks noChangeAspect="1"/>
+          </p:cNvPicPr>
+          <p:nvPr/>
+        </p:nvPicPr>
+        <p:blipFill>
+          <a:blip r:embed="rId2">
+            <a:extLst>
+              <a:ext uri="{28A0092B-C50C-407E-A947-70E740481C1C}">
+                <a14:useLocalDpi xmlns:a14="http://schemas.microsoft.com/office/drawing/2010/main" val="0"/>
+              </a:ext>
+            </a:extLst>
+          </a:blip>
+          <a:stretch>
+            <a:fillRect/>
+          </a:stretch>
+        </p:blipFill>
+        <p:spPr>
+          <a:xfrm>
+            <a:off x="971600" y="1779662"/>
+            <a:ext cx="3395712" cy="2540587"/>
+          </a:xfrm>
+          <a:prstGeom prst="rect">
+            <a:avLst/>
+          </a:prstGeom>
+        </p:spPr>
+      </p:pic>
+      <p:pic>
+        <p:nvPicPr>
+          <p:cNvPr id="8" name="Grafik 7">
+            <a:extLst>
+              <a:ext uri="{FF2B5EF4-FFF2-40B4-BE49-F238E27FC236}">
+                <a16:creationId xmlns:a16="http://schemas.microsoft.com/office/drawing/2014/main" id="{FBC65D97-28B2-4D91-9FF2-1F651D7E1DCF}"/>
+              </a:ext>
+            </a:extLst>
+          </p:cNvPr>
+          <p:cNvPicPr>
+            <a:picLocks noChangeAspect="1"/>
+          </p:cNvPicPr>
+          <p:nvPr/>
+        </p:nvPicPr>
+        <p:blipFill>
+          <a:blip r:embed="rId3">
+            <a:extLst>
+              <a:ext uri="{28A0092B-C50C-407E-A947-70E740481C1C}">
+                <a14:useLocalDpi xmlns:a14="http://schemas.microsoft.com/office/drawing/2010/main" val="0"/>
+              </a:ext>
+            </a:extLst>
+          </a:blip>
+          <a:stretch>
+            <a:fillRect/>
+          </a:stretch>
+        </p:blipFill>
+        <p:spPr>
+          <a:xfrm>
+            <a:off x="5076056" y="1779662"/>
+            <a:ext cx="3395712" cy="2540587"/>
+          </a:xfrm>
+          <a:prstGeom prst="rect">
+            <a:avLst/>
+          </a:prstGeom>
+        </p:spPr>
+      </p:pic>
     </p:spTree>
     <p:extLst>
       <p:ext uri="{BB962C8B-B14F-4D97-AF65-F5344CB8AC3E}">
-        <p14:creationId xmlns:p14="http://schemas.microsoft.com/office/powerpoint/2010/main" val="1293666043"/>
+        <p14:creationId xmlns:p14="http://schemas.microsoft.com/office/powerpoint/2010/main" val="2161052520"/>
       </p:ext>
     </p:extLst>
   </p:cSld>
@@ -5301,7 +5794,7 @@
           <p:cNvPr id="2" name="Inhaltsplatzhalter 1">
             <a:extLst>
               <a:ext uri="{FF2B5EF4-FFF2-40B4-BE49-F238E27FC236}">
-                <a16:creationId xmlns:a16="http://schemas.microsoft.com/office/drawing/2014/main" id="{65A8FDFA-9158-4F5B-B217-58F4813EA1D4}"/>
+                <a16:creationId xmlns:a16="http://schemas.microsoft.com/office/drawing/2014/main" id="{0356811E-A147-472F-A750-95CA0DFB70F1}"/>
               </a:ext>
             </a:extLst>
           </p:cNvPr>
@@ -5317,7 +5810,7 @@
           <a:bodyPr/>
           <a:lstStyle/>
           <a:p>
-            <a:endParaRPr lang="de-DE"/>
+            <a:endParaRPr lang="de-DE" dirty="0"/>
           </a:p>
         </p:txBody>
       </p:sp>
@@ -5326,7 +5819,7 @@
           <p:cNvPr id="3" name="Foliennummernplatzhalter 2">
             <a:extLst>
               <a:ext uri="{FF2B5EF4-FFF2-40B4-BE49-F238E27FC236}">
-                <a16:creationId xmlns:a16="http://schemas.microsoft.com/office/drawing/2014/main" id="{3A92B2AE-FD91-476E-A0BA-A33507D415F7}"/>
+                <a16:creationId xmlns:a16="http://schemas.microsoft.com/office/drawing/2014/main" id="{075C3468-4FAE-4482-A6B1-80A1C1D916C8}"/>
               </a:ext>
             </a:extLst>
           </p:cNvPr>
@@ -5355,7 +5848,7 @@
           <p:cNvPr id="4" name="Titel 3">
             <a:extLst>
               <a:ext uri="{FF2B5EF4-FFF2-40B4-BE49-F238E27FC236}">
-                <a16:creationId xmlns:a16="http://schemas.microsoft.com/office/drawing/2014/main" id="{1CEDDF61-A407-4902-8BFD-CC56DD364054}"/>
+                <a16:creationId xmlns:a16="http://schemas.microsoft.com/office/drawing/2014/main" id="{667732E9-823B-48E1-94F0-E4B095B29007}"/>
               </a:ext>
             </a:extLst>
           </p:cNvPr>
@@ -5373,7 +5866,7 @@
           <a:p>
             <a:r>
               <a:rPr lang="de-DE" dirty="0"/>
-              <a:t>Fazit</a:t>
+              <a:t>Ergebnisse</a:t>
             </a:r>
           </a:p>
         </p:txBody>
@@ -5381,7 +5874,7 @@
     </p:spTree>
     <p:extLst>
       <p:ext uri="{BB962C8B-B14F-4D97-AF65-F5344CB8AC3E}">
-        <p14:creationId xmlns:p14="http://schemas.microsoft.com/office/powerpoint/2010/main" val="3815123622"/>
+        <p14:creationId xmlns:p14="http://schemas.microsoft.com/office/powerpoint/2010/main" val="1293666043"/>
       </p:ext>
     </p:extLst>
   </p:cSld>
@@ -5413,7 +5906,7 @@
           <p:cNvPr id="2" name="Inhaltsplatzhalter 1">
             <a:extLst>
               <a:ext uri="{FF2B5EF4-FFF2-40B4-BE49-F238E27FC236}">
-                <a16:creationId xmlns:a16="http://schemas.microsoft.com/office/drawing/2014/main" id="{002BA65F-1EFC-48C1-9C31-D228E1A6EE9B}"/>
+                <a16:creationId xmlns:a16="http://schemas.microsoft.com/office/drawing/2014/main" id="{65A8FDFA-9158-4F5B-B217-58F4813EA1D4}"/>
               </a:ext>
             </a:extLst>
           </p:cNvPr>
@@ -5438,7 +5931,7 @@
           <p:cNvPr id="3" name="Foliennummernplatzhalter 2">
             <a:extLst>
               <a:ext uri="{FF2B5EF4-FFF2-40B4-BE49-F238E27FC236}">
-                <a16:creationId xmlns:a16="http://schemas.microsoft.com/office/drawing/2014/main" id="{EE12B332-6480-47FC-9A50-7AAC660ABDFE}"/>
+                <a16:creationId xmlns:a16="http://schemas.microsoft.com/office/drawing/2014/main" id="{3A92B2AE-FD91-476E-A0BA-A33507D415F7}"/>
               </a:ext>
             </a:extLst>
           </p:cNvPr>
@@ -5457,6 +5950,118 @@
             <a:fld id="{29AD3987-26BA-49DC-BA24-72731371DC9F}" type="slidenum">
               <a:rPr lang="de-DE" smtClean="0"/>
               <a:t>18</a:t>
+            </a:fld>
+            <a:endParaRPr lang="de-DE" dirty="0"/>
+          </a:p>
+        </p:txBody>
+      </p:sp>
+      <p:sp>
+        <p:nvSpPr>
+          <p:cNvPr id="4" name="Titel 3">
+            <a:extLst>
+              <a:ext uri="{FF2B5EF4-FFF2-40B4-BE49-F238E27FC236}">
+                <a16:creationId xmlns:a16="http://schemas.microsoft.com/office/drawing/2014/main" id="{1CEDDF61-A407-4902-8BFD-CC56DD364054}"/>
+              </a:ext>
+            </a:extLst>
+          </p:cNvPr>
+          <p:cNvSpPr>
+            <a:spLocks noGrp="1"/>
+          </p:cNvSpPr>
+          <p:nvPr>
+            <p:ph type="title"/>
+          </p:nvPr>
+        </p:nvSpPr>
+        <p:spPr/>
+        <p:txBody>
+          <a:bodyPr/>
+          <a:lstStyle/>
+          <a:p>
+            <a:r>
+              <a:rPr lang="de-DE" dirty="0"/>
+              <a:t>Fazit</a:t>
+            </a:r>
+          </a:p>
+        </p:txBody>
+      </p:sp>
+    </p:spTree>
+    <p:extLst>
+      <p:ext uri="{BB962C8B-B14F-4D97-AF65-F5344CB8AC3E}">
+        <p14:creationId xmlns:p14="http://schemas.microsoft.com/office/powerpoint/2010/main" val="3815123622"/>
+      </p:ext>
+    </p:extLst>
+  </p:cSld>
+  <p:clrMapOvr>
+    <a:masterClrMapping/>
+  </p:clrMapOvr>
+</p:sld>
+</file>
+
+<file path=ppt/slides/slide19.xml><?xml version="1.0" encoding="utf-8"?>
+<p:sld xmlns:a="http://schemas.openxmlformats.org/drawingml/2006/main" xmlns:r="http://schemas.openxmlformats.org/officeDocument/2006/relationships" xmlns:p="http://schemas.openxmlformats.org/presentationml/2006/main">
+  <p:cSld>
+    <p:spTree>
+      <p:nvGrpSpPr>
+        <p:cNvPr id="1" name=""/>
+        <p:cNvGrpSpPr/>
+        <p:nvPr/>
+      </p:nvGrpSpPr>
+      <p:grpSpPr>
+        <a:xfrm>
+          <a:off x="0" y="0"/>
+          <a:ext cx="0" cy="0"/>
+          <a:chOff x="0" y="0"/>
+          <a:chExt cx="0" cy="0"/>
+        </a:xfrm>
+      </p:grpSpPr>
+      <p:sp>
+        <p:nvSpPr>
+          <p:cNvPr id="2" name="Inhaltsplatzhalter 1">
+            <a:extLst>
+              <a:ext uri="{FF2B5EF4-FFF2-40B4-BE49-F238E27FC236}">
+                <a16:creationId xmlns:a16="http://schemas.microsoft.com/office/drawing/2014/main" id="{002BA65F-1EFC-48C1-9C31-D228E1A6EE9B}"/>
+              </a:ext>
+            </a:extLst>
+          </p:cNvPr>
+          <p:cNvSpPr>
+            <a:spLocks noGrp="1"/>
+          </p:cNvSpPr>
+          <p:nvPr>
+            <p:ph idx="1"/>
+          </p:nvPr>
+        </p:nvSpPr>
+        <p:spPr/>
+        <p:txBody>
+          <a:bodyPr/>
+          <a:lstStyle/>
+          <a:p>
+            <a:endParaRPr lang="de-DE"/>
+          </a:p>
+        </p:txBody>
+      </p:sp>
+      <p:sp>
+        <p:nvSpPr>
+          <p:cNvPr id="3" name="Foliennummernplatzhalter 2">
+            <a:extLst>
+              <a:ext uri="{FF2B5EF4-FFF2-40B4-BE49-F238E27FC236}">
+                <a16:creationId xmlns:a16="http://schemas.microsoft.com/office/drawing/2014/main" id="{EE12B332-6480-47FC-9A50-7AAC660ABDFE}"/>
+              </a:ext>
+            </a:extLst>
+          </p:cNvPr>
+          <p:cNvSpPr>
+            <a:spLocks noGrp="1"/>
+          </p:cNvSpPr>
+          <p:nvPr>
+            <p:ph type="sldNum" sz="quarter" idx="12"/>
+          </p:nvPr>
+        </p:nvSpPr>
+        <p:spPr/>
+        <p:txBody>
+          <a:bodyPr/>
+          <a:lstStyle/>
+          <a:p>
+            <a:fld id="{29AD3987-26BA-49DC-BA24-72731371DC9F}" type="slidenum">
+              <a:rPr lang="de-DE" smtClean="0"/>
+              <a:t>19</a:t>
             </a:fld>
             <a:endParaRPr lang="de-DE" dirty="0"/>
           </a:p>

</xml_diff>

<commit_message>
Vortrag: Ergebnisse nur sehr grob.
</commit_message>
<xml_diff>
--- a/Dokumente/Vortrag/Wahrnehmungsorientiertes_Volumen-Rendering.pptx
+++ b/Dokumente/Vortrag/Wahrnehmungsorientiertes_Volumen-Rendering.pptx
@@ -5,7 +5,7 @@
     <p:sldMasterId id="2147483648" r:id="rId1"/>
   </p:sldMasterIdLst>
   <p:notesMasterIdLst>
-    <p:notesMasterId r:id="rId21"/>
+    <p:notesMasterId r:id="rId22"/>
   </p:notesMasterIdLst>
   <p:sldIdLst>
     <p:sldId id="259" r:id="rId2"/>
@@ -25,8 +25,9 @@
     <p:sldId id="268" r:id="rId16"/>
     <p:sldId id="277" r:id="rId17"/>
     <p:sldId id="269" r:id="rId18"/>
-    <p:sldId id="270" r:id="rId19"/>
-    <p:sldId id="271" r:id="rId20"/>
+    <p:sldId id="278" r:id="rId19"/>
+    <p:sldId id="270" r:id="rId20"/>
+    <p:sldId id="271" r:id="rId21"/>
   </p:sldIdLst>
   <p:sldSz cx="9144000" cy="5143500" type="screen16x9"/>
   <p:notesSz cx="6858000" cy="9144000"/>
@@ -1025,7 +1026,7 @@
           <a:bodyPr/>
           <a:lstStyle/>
           <a:p>
-            <a:endParaRPr lang="de-DE"/>
+            <a:endParaRPr lang="de-DE" dirty="0"/>
           </a:p>
         </p:txBody>
       </p:sp>
@@ -5791,31 +5792,6 @@
       </p:grpSpPr>
       <p:sp>
         <p:nvSpPr>
-          <p:cNvPr id="2" name="Inhaltsplatzhalter 1">
-            <a:extLst>
-              <a:ext uri="{FF2B5EF4-FFF2-40B4-BE49-F238E27FC236}">
-                <a16:creationId xmlns:a16="http://schemas.microsoft.com/office/drawing/2014/main" id="{0356811E-A147-472F-A750-95CA0DFB70F1}"/>
-              </a:ext>
-            </a:extLst>
-          </p:cNvPr>
-          <p:cNvSpPr>
-            <a:spLocks noGrp="1"/>
-          </p:cNvSpPr>
-          <p:nvPr>
-            <p:ph idx="1"/>
-          </p:nvPr>
-        </p:nvSpPr>
-        <p:spPr/>
-        <p:txBody>
-          <a:bodyPr/>
-          <a:lstStyle/>
-          <a:p>
-            <a:endParaRPr lang="de-DE" dirty="0"/>
-          </a:p>
-        </p:txBody>
-      </p:sp>
-      <p:sp>
-        <p:nvSpPr>
           <p:cNvPr id="3" name="Foliennummernplatzhalter 2">
             <a:extLst>
               <a:ext uri="{FF2B5EF4-FFF2-40B4-BE49-F238E27FC236}">
@@ -5871,6 +5847,42 @@
           </a:p>
         </p:txBody>
       </p:sp>
+      <p:pic>
+        <p:nvPicPr>
+          <p:cNvPr id="6" name="Grafik 5">
+            <a:extLst>
+              <a:ext uri="{FF2B5EF4-FFF2-40B4-BE49-F238E27FC236}">
+                <a16:creationId xmlns:a16="http://schemas.microsoft.com/office/drawing/2014/main" id="{08B59588-FD1D-474C-BF43-0EB096E60C4F}"/>
+              </a:ext>
+            </a:extLst>
+          </p:cNvPr>
+          <p:cNvPicPr>
+            <a:picLocks noChangeAspect="1"/>
+          </p:cNvPicPr>
+          <p:nvPr/>
+        </p:nvPicPr>
+        <p:blipFill>
+          <a:blip r:embed="rId3" cstate="print">
+            <a:extLst>
+              <a:ext uri="{28A0092B-C50C-407E-A947-70E740481C1C}">
+                <a14:useLocalDpi xmlns:a14="http://schemas.microsoft.com/office/drawing/2010/main" val="0"/>
+              </a:ext>
+            </a:extLst>
+          </a:blip>
+          <a:stretch>
+            <a:fillRect/>
+          </a:stretch>
+        </p:blipFill>
+        <p:spPr>
+          <a:xfrm>
+            <a:off x="746164" y="992076"/>
+            <a:ext cx="7651672" cy="3687035"/>
+          </a:xfrm>
+          <a:prstGeom prst="rect">
+            <a:avLst/>
+          </a:prstGeom>
+        </p:spPr>
+      </p:pic>
     </p:spTree>
     <p:extLst>
       <p:ext uri="{BB962C8B-B14F-4D97-AF65-F5344CB8AC3E}">
@@ -5903,35 +5915,10 @@
       </p:grpSpPr>
       <p:sp>
         <p:nvSpPr>
-          <p:cNvPr id="2" name="Inhaltsplatzhalter 1">
+          <p:cNvPr id="3" name="Foliennummernplatzhalter 2">
             <a:extLst>
               <a:ext uri="{FF2B5EF4-FFF2-40B4-BE49-F238E27FC236}">
-                <a16:creationId xmlns:a16="http://schemas.microsoft.com/office/drawing/2014/main" id="{65A8FDFA-9158-4F5B-B217-58F4813EA1D4}"/>
-              </a:ext>
-            </a:extLst>
-          </p:cNvPr>
-          <p:cNvSpPr>
-            <a:spLocks noGrp="1"/>
-          </p:cNvSpPr>
-          <p:nvPr>
-            <p:ph idx="1"/>
-          </p:nvPr>
-        </p:nvSpPr>
-        <p:spPr/>
-        <p:txBody>
-          <a:bodyPr/>
-          <a:lstStyle/>
-          <a:p>
-            <a:endParaRPr lang="de-DE"/>
-          </a:p>
-        </p:txBody>
-      </p:sp>
-      <p:sp>
-        <p:nvSpPr>
-          <p:cNvPr id="3" name="Foliennummernplatzhalter 2">
-            <a:extLst>
-              <a:ext uri="{FF2B5EF4-FFF2-40B4-BE49-F238E27FC236}">
-                <a16:creationId xmlns:a16="http://schemas.microsoft.com/office/drawing/2014/main" id="{3A92B2AE-FD91-476E-A0BA-A33507D415F7}"/>
+                <a16:creationId xmlns:a16="http://schemas.microsoft.com/office/drawing/2014/main" id="{06DC71DB-4248-4307-BB8A-3BDF77728C55}"/>
               </a:ext>
             </a:extLst>
           </p:cNvPr>
@@ -5960,7 +5947,7 @@
           <p:cNvPr id="4" name="Titel 3">
             <a:extLst>
               <a:ext uri="{FF2B5EF4-FFF2-40B4-BE49-F238E27FC236}">
-                <a16:creationId xmlns:a16="http://schemas.microsoft.com/office/drawing/2014/main" id="{1CEDDF61-A407-4902-8BFD-CC56DD364054}"/>
+                <a16:creationId xmlns:a16="http://schemas.microsoft.com/office/drawing/2014/main" id="{3A57D045-BC4D-47CC-B4AD-DEBF3CE554F8}"/>
               </a:ext>
             </a:extLst>
           </p:cNvPr>
@@ -5978,15 +5965,51 @@
           <a:p>
             <a:r>
               <a:rPr lang="de-DE" dirty="0"/>
-              <a:t>Fazit</a:t>
-            </a:r>
-          </a:p>
-        </p:txBody>
-      </p:sp>
+              <a:t>Ergebnisse</a:t>
+            </a:r>
+          </a:p>
+        </p:txBody>
+      </p:sp>
+      <p:pic>
+        <p:nvPicPr>
+          <p:cNvPr id="6" name="Grafik 5">
+            <a:extLst>
+              <a:ext uri="{FF2B5EF4-FFF2-40B4-BE49-F238E27FC236}">
+                <a16:creationId xmlns:a16="http://schemas.microsoft.com/office/drawing/2014/main" id="{37345268-195B-4920-B4A8-7DEF60C158D3}"/>
+              </a:ext>
+            </a:extLst>
+          </p:cNvPr>
+          <p:cNvPicPr>
+            <a:picLocks noChangeAspect="1"/>
+          </p:cNvPicPr>
+          <p:nvPr/>
+        </p:nvPicPr>
+        <p:blipFill>
+          <a:blip r:embed="rId2">
+            <a:extLst>
+              <a:ext uri="{28A0092B-C50C-407E-A947-70E740481C1C}">
+                <a14:useLocalDpi xmlns:a14="http://schemas.microsoft.com/office/drawing/2010/main" val="0"/>
+              </a:ext>
+            </a:extLst>
+          </a:blip>
+          <a:stretch>
+            <a:fillRect/>
+          </a:stretch>
+        </p:blipFill>
+        <p:spPr>
+          <a:xfrm>
+            <a:off x="642920" y="1081020"/>
+            <a:ext cx="7858159" cy="3616031"/>
+          </a:xfrm>
+          <a:prstGeom prst="rect">
+            <a:avLst/>
+          </a:prstGeom>
+        </p:spPr>
+      </p:pic>
     </p:spTree>
     <p:extLst>
       <p:ext uri="{BB962C8B-B14F-4D97-AF65-F5344CB8AC3E}">
-        <p14:creationId xmlns:p14="http://schemas.microsoft.com/office/powerpoint/2010/main" val="3815123622"/>
+        <p14:creationId xmlns:p14="http://schemas.microsoft.com/office/powerpoint/2010/main" val="3273986713"/>
       </p:ext>
     </p:extLst>
   </p:cSld>
@@ -6018,7 +6041,7 @@
           <p:cNvPr id="2" name="Inhaltsplatzhalter 1">
             <a:extLst>
               <a:ext uri="{FF2B5EF4-FFF2-40B4-BE49-F238E27FC236}">
-                <a16:creationId xmlns:a16="http://schemas.microsoft.com/office/drawing/2014/main" id="{002BA65F-1EFC-48C1-9C31-D228E1A6EE9B}"/>
+                <a16:creationId xmlns:a16="http://schemas.microsoft.com/office/drawing/2014/main" id="{65A8FDFA-9158-4F5B-B217-58F4813EA1D4}"/>
               </a:ext>
             </a:extLst>
           </p:cNvPr>
@@ -6043,7 +6066,7 @@
           <p:cNvPr id="3" name="Foliennummernplatzhalter 2">
             <a:extLst>
               <a:ext uri="{FF2B5EF4-FFF2-40B4-BE49-F238E27FC236}">
-                <a16:creationId xmlns:a16="http://schemas.microsoft.com/office/drawing/2014/main" id="{EE12B332-6480-47FC-9A50-7AAC660ABDFE}"/>
+                <a16:creationId xmlns:a16="http://schemas.microsoft.com/office/drawing/2014/main" id="{3A92B2AE-FD91-476E-A0BA-A33507D415F7}"/>
               </a:ext>
             </a:extLst>
           </p:cNvPr>
@@ -6072,7 +6095,7 @@
           <p:cNvPr id="4" name="Titel 3">
             <a:extLst>
               <a:ext uri="{FF2B5EF4-FFF2-40B4-BE49-F238E27FC236}">
-                <a16:creationId xmlns:a16="http://schemas.microsoft.com/office/drawing/2014/main" id="{2F91CB94-F68A-4FA8-99D3-7863D572BF1F}"/>
+                <a16:creationId xmlns:a16="http://schemas.microsoft.com/office/drawing/2014/main" id="{1CEDDF61-A407-4902-8BFD-CC56DD364054}"/>
               </a:ext>
             </a:extLst>
           </p:cNvPr>
@@ -6090,7 +6113,7 @@
           <a:p>
             <a:r>
               <a:rPr lang="de-DE" dirty="0"/>
-              <a:t>Quellen</a:t>
+              <a:t>Fazit</a:t>
             </a:r>
           </a:p>
         </p:txBody>
@@ -6098,7 +6121,7 @@
     </p:spTree>
     <p:extLst>
       <p:ext uri="{BB962C8B-B14F-4D97-AF65-F5344CB8AC3E}">
-        <p14:creationId xmlns:p14="http://schemas.microsoft.com/office/powerpoint/2010/main" val="1145009430"/>
+        <p14:creationId xmlns:p14="http://schemas.microsoft.com/office/powerpoint/2010/main" val="3815123622"/>
       </p:ext>
     </p:extLst>
   </p:cSld>
@@ -6322,6 +6345,118 @@
     <p:extLst>
       <p:ext uri="{BB962C8B-B14F-4D97-AF65-F5344CB8AC3E}">
         <p14:creationId xmlns:p14="http://schemas.microsoft.com/office/powerpoint/2010/main" val="2801504829"/>
+      </p:ext>
+    </p:extLst>
+  </p:cSld>
+  <p:clrMapOvr>
+    <a:masterClrMapping/>
+  </p:clrMapOvr>
+</p:sld>
+</file>
+
+<file path=ppt/slides/slide20.xml><?xml version="1.0" encoding="utf-8"?>
+<p:sld xmlns:a="http://schemas.openxmlformats.org/drawingml/2006/main" xmlns:r="http://schemas.openxmlformats.org/officeDocument/2006/relationships" xmlns:p="http://schemas.openxmlformats.org/presentationml/2006/main">
+  <p:cSld>
+    <p:spTree>
+      <p:nvGrpSpPr>
+        <p:cNvPr id="1" name=""/>
+        <p:cNvGrpSpPr/>
+        <p:nvPr/>
+      </p:nvGrpSpPr>
+      <p:grpSpPr>
+        <a:xfrm>
+          <a:off x="0" y="0"/>
+          <a:ext cx="0" cy="0"/>
+          <a:chOff x="0" y="0"/>
+          <a:chExt cx="0" cy="0"/>
+        </a:xfrm>
+      </p:grpSpPr>
+      <p:sp>
+        <p:nvSpPr>
+          <p:cNvPr id="2" name="Inhaltsplatzhalter 1">
+            <a:extLst>
+              <a:ext uri="{FF2B5EF4-FFF2-40B4-BE49-F238E27FC236}">
+                <a16:creationId xmlns:a16="http://schemas.microsoft.com/office/drawing/2014/main" id="{002BA65F-1EFC-48C1-9C31-D228E1A6EE9B}"/>
+              </a:ext>
+            </a:extLst>
+          </p:cNvPr>
+          <p:cNvSpPr>
+            <a:spLocks noGrp="1"/>
+          </p:cNvSpPr>
+          <p:nvPr>
+            <p:ph idx="1"/>
+          </p:nvPr>
+        </p:nvSpPr>
+        <p:spPr/>
+        <p:txBody>
+          <a:bodyPr/>
+          <a:lstStyle/>
+          <a:p>
+            <a:endParaRPr lang="de-DE"/>
+          </a:p>
+        </p:txBody>
+      </p:sp>
+      <p:sp>
+        <p:nvSpPr>
+          <p:cNvPr id="3" name="Foliennummernplatzhalter 2">
+            <a:extLst>
+              <a:ext uri="{FF2B5EF4-FFF2-40B4-BE49-F238E27FC236}">
+                <a16:creationId xmlns:a16="http://schemas.microsoft.com/office/drawing/2014/main" id="{EE12B332-6480-47FC-9A50-7AAC660ABDFE}"/>
+              </a:ext>
+            </a:extLst>
+          </p:cNvPr>
+          <p:cNvSpPr>
+            <a:spLocks noGrp="1"/>
+          </p:cNvSpPr>
+          <p:nvPr>
+            <p:ph type="sldNum" sz="quarter" idx="12"/>
+          </p:nvPr>
+        </p:nvSpPr>
+        <p:spPr/>
+        <p:txBody>
+          <a:bodyPr/>
+          <a:lstStyle/>
+          <a:p>
+            <a:fld id="{29AD3987-26BA-49DC-BA24-72731371DC9F}" type="slidenum">
+              <a:rPr lang="de-DE" smtClean="0"/>
+              <a:t>20</a:t>
+            </a:fld>
+            <a:endParaRPr lang="de-DE" dirty="0"/>
+          </a:p>
+        </p:txBody>
+      </p:sp>
+      <p:sp>
+        <p:nvSpPr>
+          <p:cNvPr id="4" name="Titel 3">
+            <a:extLst>
+              <a:ext uri="{FF2B5EF4-FFF2-40B4-BE49-F238E27FC236}">
+                <a16:creationId xmlns:a16="http://schemas.microsoft.com/office/drawing/2014/main" id="{2F91CB94-F68A-4FA8-99D3-7863D572BF1F}"/>
+              </a:ext>
+            </a:extLst>
+          </p:cNvPr>
+          <p:cNvSpPr>
+            <a:spLocks noGrp="1"/>
+          </p:cNvSpPr>
+          <p:nvPr>
+            <p:ph type="title"/>
+          </p:nvPr>
+        </p:nvSpPr>
+        <p:spPr/>
+        <p:txBody>
+          <a:bodyPr/>
+          <a:lstStyle/>
+          <a:p>
+            <a:r>
+              <a:rPr lang="de-DE" dirty="0"/>
+              <a:t>Quellen</a:t>
+            </a:r>
+          </a:p>
+        </p:txBody>
+      </p:sp>
+    </p:spTree>
+    <p:extLst>
+      <p:ext uri="{BB962C8B-B14F-4D97-AF65-F5344CB8AC3E}">
+        <p14:creationId xmlns:p14="http://schemas.microsoft.com/office/powerpoint/2010/main" val="1145009430"/>
       </p:ext>
     </p:extLst>
   </p:cSld>

</xml_diff>

<commit_message>
Vortrag: Motivation und Idee mit Bild ergänzt. Gliederung rausgelöscht.
</commit_message>
<xml_diff>
--- a/Dokumente/Vortrag/Wahrnehmungsorientiertes_Volumen-Rendering.pptx
+++ b/Dokumente/Vortrag/Wahrnehmungsorientiertes_Volumen-Rendering.pptx
@@ -5,30 +5,29 @@
     <p:sldMasterId id="2147483648" r:id="rId1"/>
   </p:sldMasterIdLst>
   <p:notesMasterIdLst>
-    <p:notesMasterId r:id="rId23"/>
+    <p:notesMasterId r:id="rId22"/>
   </p:notesMasterIdLst>
   <p:sldIdLst>
     <p:sldId id="259" r:id="rId2"/>
     <p:sldId id="257" r:id="rId3"/>
-    <p:sldId id="260" r:id="rId4"/>
-    <p:sldId id="261" r:id="rId5"/>
-    <p:sldId id="262" r:id="rId6"/>
-    <p:sldId id="263" r:id="rId7"/>
-    <p:sldId id="272" r:id="rId8"/>
-    <p:sldId id="264" r:id="rId9"/>
-    <p:sldId id="274" r:id="rId10"/>
-    <p:sldId id="265" r:id="rId11"/>
-    <p:sldId id="266" r:id="rId12"/>
-    <p:sldId id="275" r:id="rId13"/>
-    <p:sldId id="276" r:id="rId14"/>
-    <p:sldId id="267" r:id="rId15"/>
-    <p:sldId id="268" r:id="rId16"/>
-    <p:sldId id="277" r:id="rId17"/>
-    <p:sldId id="279" r:id="rId18"/>
-    <p:sldId id="269" r:id="rId19"/>
-    <p:sldId id="278" r:id="rId20"/>
-    <p:sldId id="270" r:id="rId21"/>
-    <p:sldId id="271" r:id="rId22"/>
+    <p:sldId id="261" r:id="rId4"/>
+    <p:sldId id="262" r:id="rId5"/>
+    <p:sldId id="263" r:id="rId6"/>
+    <p:sldId id="272" r:id="rId7"/>
+    <p:sldId id="264" r:id="rId8"/>
+    <p:sldId id="274" r:id="rId9"/>
+    <p:sldId id="265" r:id="rId10"/>
+    <p:sldId id="266" r:id="rId11"/>
+    <p:sldId id="275" r:id="rId12"/>
+    <p:sldId id="276" r:id="rId13"/>
+    <p:sldId id="267" r:id="rId14"/>
+    <p:sldId id="268" r:id="rId15"/>
+    <p:sldId id="277" r:id="rId16"/>
+    <p:sldId id="279" r:id="rId17"/>
+    <p:sldId id="269" r:id="rId18"/>
+    <p:sldId id="278" r:id="rId19"/>
+    <p:sldId id="270" r:id="rId20"/>
+    <p:sldId id="271" r:id="rId21"/>
   </p:sldIdLst>
   <p:sldSz cx="9144000" cy="5143500" type="screen16x9"/>
   <p:notesSz cx="6858000" cy="9144000"/>
@@ -242,7 +241,7 @@
           <a:p>
             <a:fld id="{3D100699-F170-47EF-8601-8ACFF448602A}" type="datetimeFigureOut">
               <a:rPr lang="de-DE" smtClean="0"/>
-              <a:t>08.11.2018</a:t>
+              <a:t>09.11.2018</a:t>
             </a:fld>
             <a:endParaRPr lang="de-DE"/>
           </a:p>
@@ -639,25 +638,22 @@
           <a:p>
             <a:r>
               <a:rPr lang="de-DE" dirty="0"/>
-              <a:t>GPU Architektur:</a:t>
-            </a:r>
-          </a:p>
-          <a:p>
-            <a:r>
-              <a:rPr lang="de-DE" dirty="0"/>
-              <a:t>-- Warum beschäftige ich mich damit? </a:t>
+              <a:t>Ein Work-Item berechnet einen Strahl.</a:t>
+            </a:r>
+          </a:p>
+          <a:p>
+            <a:r>
+              <a:rPr lang="de-DE" dirty="0"/>
+              <a:t>Bei einer Auflösung mit einem Strahl pro Pixel kann als </a:t>
             </a:r>
             <a:r>
               <a:rPr lang="de-DE" dirty="0" err="1"/>
-              <a:t>OpenCL</a:t>
-            </a:r>
-            <a:r>
-              <a:rPr lang="de-DE" dirty="0"/>
-              <a:t>, Work-Items, Work-Groups, Ausführungsmodell (Threads, Thread-Blocks)</a:t>
-            </a:r>
-          </a:p>
-          <a:p>
-            <a:endParaRPr lang="de-DE" dirty="0"/>
+              <a:t>NDRange</a:t>
+            </a:r>
+            <a:r>
+              <a:rPr lang="de-DE" dirty="0"/>
+              <a:t> die Bilddimension genommen werden mit Breite und Höhe (Tiefe z = 1).</a:t>
+            </a:r>
           </a:p>
         </p:txBody>
       </p:sp>
@@ -687,7 +683,7 @@
     </p:spTree>
     <p:extLst>
       <p:ext uri="{BB962C8B-B14F-4D97-AF65-F5344CB8AC3E}">
-        <p14:creationId xmlns:p14="http://schemas.microsoft.com/office/powerpoint/2010/main" val="3385818242"/>
+        <p14:creationId xmlns:p14="http://schemas.microsoft.com/office/powerpoint/2010/main" val="2307871628"/>
       </p:ext>
     </p:extLst>
   </p:cSld>
@@ -743,21 +739,21 @@
           <a:p>
             <a:r>
               <a:rPr lang="de-DE" dirty="0"/>
-              <a:t>Ein Work-Item berechnet einen Strahl.</a:t>
-            </a:r>
-          </a:p>
-          <a:p>
-            <a:r>
-              <a:rPr lang="de-DE" dirty="0"/>
-              <a:t>Bei einer Auflösung mit einem Strahl pro Pixel kann als </a:t>
+              <a:t>Entwurf:</a:t>
+            </a:r>
+          </a:p>
+          <a:p>
+            <a:r>
+              <a:rPr lang="de-DE" dirty="0"/>
+              <a:t>-- Ausgangprojekt </a:t>
             </a:r>
             <a:r>
               <a:rPr lang="de-DE" dirty="0" err="1"/>
-              <a:t>NDRange</a:t>
-            </a:r>
-            <a:r>
-              <a:rPr lang="de-DE" dirty="0"/>
-              <a:t> die Bilddimension genommen werden mit Breite und Höhe (Tiefe z = 1).</a:t>
+              <a:t>Raycaster</a:t>
+            </a:r>
+            <a:r>
+              <a:rPr lang="de-DE" dirty="0"/>
+              <a:t>, Simulieren der Blickposition, Reduzierung der Abtastrate im Objekt- und Bildbereich</a:t>
             </a:r>
           </a:p>
         </p:txBody>
@@ -779,7 +775,7 @@
           <a:p>
             <a:fld id="{6F4F2A7C-E896-4C15-99D8-2B5BC94A4F36}" type="slidenum">
               <a:rPr lang="de-DE" smtClean="0"/>
-              <a:t>12</a:t>
+              <a:t>13</a:t>
             </a:fld>
             <a:endParaRPr lang="de-DE"/>
           </a:p>
@@ -788,7 +784,7 @@
     </p:spTree>
     <p:extLst>
       <p:ext uri="{BB962C8B-B14F-4D97-AF65-F5344CB8AC3E}">
-        <p14:creationId xmlns:p14="http://schemas.microsoft.com/office/powerpoint/2010/main" val="2307871628"/>
+        <p14:creationId xmlns:p14="http://schemas.microsoft.com/office/powerpoint/2010/main" val="3834442345"/>
       </p:ext>
     </p:extLst>
   </p:cSld>
@@ -842,24 +838,7 @@
           <a:bodyPr/>
           <a:lstStyle/>
           <a:p>
-            <a:r>
-              <a:rPr lang="de-DE" dirty="0"/>
-              <a:t>Entwurf:</a:t>
-            </a:r>
-          </a:p>
-          <a:p>
-            <a:r>
-              <a:rPr lang="de-DE" dirty="0"/>
-              <a:t>-- Ausgangprojekt </a:t>
-            </a:r>
-            <a:r>
-              <a:rPr lang="de-DE" dirty="0" err="1"/>
-              <a:t>Raycaster</a:t>
-            </a:r>
-            <a:r>
-              <a:rPr lang="de-DE" dirty="0"/>
-              <a:t>, Simulieren der Blickposition, Reduzierung der Abtastrate im Objekt- und Bildbereich</a:t>
-            </a:r>
+            <a:endParaRPr lang="de-DE" dirty="0"/>
           </a:p>
         </p:txBody>
       </p:sp>
@@ -889,7 +868,7 @@
     </p:spTree>
     <p:extLst>
       <p:ext uri="{BB962C8B-B14F-4D97-AF65-F5344CB8AC3E}">
-        <p14:creationId xmlns:p14="http://schemas.microsoft.com/office/powerpoint/2010/main" val="3834442345"/>
+        <p14:creationId xmlns:p14="http://schemas.microsoft.com/office/powerpoint/2010/main" val="1983490928"/>
       </p:ext>
     </p:extLst>
   </p:cSld>
@@ -943,6 +922,26 @@
           <a:bodyPr/>
           <a:lstStyle/>
           <a:p>
+            <a:r>
+              <a:rPr lang="de-DE" dirty="0"/>
+              <a:t>Ergebnisse:</a:t>
+            </a:r>
+          </a:p>
+          <a:p>
+            <a:r>
+              <a:rPr lang="de-DE" dirty="0"/>
+              <a:t>-- Sammeln von Messwerten, Bilder/Videos, </a:t>
+            </a:r>
+            <a:r>
+              <a:rPr lang="de-DE" dirty="0" err="1"/>
+              <a:t>Performanzwerte</a:t>
+            </a:r>
+            <a:r>
+              <a:rPr lang="de-DE" dirty="0"/>
+              <a:t>, Vergleich, Diskussion</a:t>
+            </a:r>
+          </a:p>
+          <a:p>
             <a:endParaRPr lang="de-DE" dirty="0"/>
           </a:p>
         </p:txBody>
@@ -964,7 +963,7 @@
           <a:p>
             <a:fld id="{6F4F2A7C-E896-4C15-99D8-2B5BC94A4F36}" type="slidenum">
               <a:rPr lang="de-DE" smtClean="0"/>
-              <a:t>15</a:t>
+              <a:t>17</a:t>
             </a:fld>
             <a:endParaRPr lang="de-DE"/>
           </a:p>
@@ -973,7 +972,7 @@
     </p:spTree>
     <p:extLst>
       <p:ext uri="{BB962C8B-B14F-4D97-AF65-F5344CB8AC3E}">
-        <p14:creationId xmlns:p14="http://schemas.microsoft.com/office/powerpoint/2010/main" val="1983490928"/>
+        <p14:creationId xmlns:p14="http://schemas.microsoft.com/office/powerpoint/2010/main" val="2812053294"/>
       </p:ext>
     </p:extLst>
   </p:cSld>
@@ -1027,6 +1026,21 @@
           <a:bodyPr/>
           <a:lstStyle/>
           <a:p>
+            <a:r>
+              <a:rPr lang="de-DE" dirty="0"/>
+              <a:t>Ausblick u.a. das </a:t>
+            </a:r>
+            <a:r>
+              <a:rPr lang="de-DE" dirty="0" err="1"/>
+              <a:t>paper</a:t>
+            </a:r>
+            <a:endParaRPr lang="de-DE" dirty="0"/>
+          </a:p>
+          <a:p>
+            <a:r>
+              <a:rPr lang="de-DE" dirty="0" err="1"/>
+              <a:t>Gaussfilterbild</a:t>
+            </a:r>
             <a:endParaRPr lang="de-DE" dirty="0"/>
           </a:p>
         </p:txBody>
@@ -1048,106 +1062,7 @@
           <a:p>
             <a:fld id="{6F4F2A7C-E896-4C15-99D8-2B5BC94A4F36}" type="slidenum">
               <a:rPr lang="de-DE" smtClean="0"/>
-              <a:t>18</a:t>
-            </a:fld>
-            <a:endParaRPr lang="de-DE"/>
-          </a:p>
-        </p:txBody>
-      </p:sp>
-    </p:spTree>
-    <p:extLst>
-      <p:ext uri="{BB962C8B-B14F-4D97-AF65-F5344CB8AC3E}">
-        <p14:creationId xmlns:p14="http://schemas.microsoft.com/office/powerpoint/2010/main" val="2812053294"/>
-      </p:ext>
-    </p:extLst>
-  </p:cSld>
-  <p:clrMapOvr>
-    <a:masterClrMapping/>
-  </p:clrMapOvr>
-</p:notes>
-</file>
-
-<file path=ppt/notesSlides/notesSlide15.xml><?xml version="1.0" encoding="utf-8"?>
-<p:notes xmlns:a="http://schemas.openxmlformats.org/drawingml/2006/main" xmlns:r="http://schemas.openxmlformats.org/officeDocument/2006/relationships" xmlns:p="http://schemas.openxmlformats.org/presentationml/2006/main">
-  <p:cSld>
-    <p:spTree>
-      <p:nvGrpSpPr>
-        <p:cNvPr id="1" name=""/>
-        <p:cNvGrpSpPr/>
-        <p:nvPr/>
-      </p:nvGrpSpPr>
-      <p:grpSpPr>
-        <a:xfrm>
-          <a:off x="0" y="0"/>
-          <a:ext cx="0" cy="0"/>
-          <a:chOff x="0" y="0"/>
-          <a:chExt cx="0" cy="0"/>
-        </a:xfrm>
-      </p:grpSpPr>
-      <p:sp>
-        <p:nvSpPr>
-          <p:cNvPr id="2" name="Folienbildplatzhalter 1"/>
-          <p:cNvSpPr>
-            <a:spLocks noGrp="1" noRot="1" noChangeAspect="1"/>
-          </p:cNvSpPr>
-          <p:nvPr>
-            <p:ph type="sldImg"/>
-          </p:nvPr>
-        </p:nvSpPr>
-        <p:spPr/>
-      </p:sp>
-      <p:sp>
-        <p:nvSpPr>
-          <p:cNvPr id="3" name="Notizenplatzhalter 2"/>
-          <p:cNvSpPr>
-            <a:spLocks noGrp="1"/>
-          </p:cNvSpPr>
-          <p:nvPr>
-            <p:ph type="body" idx="1"/>
-          </p:nvPr>
-        </p:nvSpPr>
-        <p:spPr/>
-        <p:txBody>
-          <a:bodyPr/>
-          <a:lstStyle/>
-          <a:p>
-            <a:r>
-              <a:rPr lang="de-DE" dirty="0"/>
-              <a:t>Ausblick u.a. das </a:t>
-            </a:r>
-            <a:r>
-              <a:rPr lang="de-DE" dirty="0" err="1"/>
-              <a:t>paper</a:t>
-            </a:r>
-            <a:endParaRPr lang="de-DE" dirty="0"/>
-          </a:p>
-          <a:p>
-            <a:r>
-              <a:rPr lang="de-DE" dirty="0" err="1"/>
-              <a:t>Gaussfilterbild</a:t>
-            </a:r>
-            <a:endParaRPr lang="de-DE" dirty="0"/>
-          </a:p>
-        </p:txBody>
-      </p:sp>
-      <p:sp>
-        <p:nvSpPr>
-          <p:cNvPr id="4" name="Foliennummernplatzhalter 3"/>
-          <p:cNvSpPr>
-            <a:spLocks noGrp="1"/>
-          </p:cNvSpPr>
-          <p:nvPr>
-            <p:ph type="sldNum" sz="quarter" idx="5"/>
-          </p:nvPr>
-        </p:nvSpPr>
-        <p:spPr/>
-        <p:txBody>
-          <a:bodyPr/>
-          <a:lstStyle/>
-          <a:p>
-            <a:fld id="{6F4F2A7C-E896-4C15-99D8-2B5BC94A4F36}" type="slidenum">
-              <a:rPr lang="de-DE" smtClean="0"/>
-              <a:t>20</a:t>
+              <a:t>19</a:t>
             </a:fld>
             <a:endParaRPr lang="de-DE"/>
           </a:p>
@@ -1392,242 +1307,69 @@
           <a:p>
             <a:r>
               <a:rPr lang="de-DE" dirty="0"/>
-              <a:t>Motivation:</a:t>
-            </a:r>
-          </a:p>
-          <a:p>
-            <a:r>
-              <a:rPr lang="de-DE" dirty="0"/>
-              <a:t>-- Probleme der technischen Entwicklungen der Pixelanzahl, Probleme des Volumenrenderings, Lösungsansatz untersuchen mit Hauptaspekt Performanz (Es gibt Datenbasierte Methoden wie EES und </a:t>
+              <a:t>Einleitung:</a:t>
+            </a:r>
+          </a:p>
+          <a:p>
+            <a:r>
+              <a:rPr lang="de-DE" dirty="0"/>
+              <a:t>-- Eigenschaften des MWS, Verwendung eines Eyetrackers, Reduzierung der Bildqualität im peripheren Bereich, Kurzfassung der Ergebnisse</a:t>
+            </a:r>
+          </a:p>
+          <a:p>
+            <a:endParaRPr lang="de-DE" dirty="0"/>
+          </a:p>
+          <a:p>
+            <a:r>
+              <a:rPr lang="de-DE" dirty="0"/>
+              <a:t>Bild: https://liqianghncn.wordpress.com/2011/08/10/vision-system/</a:t>
+            </a:r>
+          </a:p>
+          <a:p>
+            <a:endParaRPr lang="de-DE" dirty="0"/>
+          </a:p>
+          <a:p>
+            <a:r>
+              <a:rPr lang="de-DE" dirty="0"/>
+              <a:t>Der Mensch sieht nur in einem kleinen zentralen Bereich des Sichtfeldes scharf. Dieser wird Fovea genannt. Mit zunehmenden Winkel zur Fovea nimmt die Sehschärfe stark ab, dieser Bereich ist der periphere Bereich.</a:t>
+            </a:r>
+          </a:p>
+          <a:p>
+            <a:r>
+              <a:rPr lang="de-DE" dirty="0"/>
+              <a:t>Diese Eigenschaft wird sich im wahrnehmungsorientierten Volumen-Rendering, entsprechend auch in dieser Arbeit, zu Nutze gemacht.</a:t>
+            </a:r>
+          </a:p>
+          <a:p>
+            <a:r>
+              <a:rPr lang="de-DE" dirty="0"/>
+              <a:t>Dafür wird mit Hilfe eines Eyetrackers die Blickposition des Betrachters auf dem Bildschirm erfasst und der </a:t>
             </a:r>
             <a:r>
               <a:rPr lang="de-DE" dirty="0" err="1"/>
-              <a:t>early</a:t>
-            </a:r>
-            <a:r>
-              <a:rPr lang="de-DE" dirty="0"/>
-              <a:t> </a:t>
-            </a:r>
-            <a:r>
-              <a:rPr lang="de-DE" dirty="0" err="1"/>
-              <a:t>ray</a:t>
-            </a:r>
-            <a:r>
-              <a:rPr lang="de-DE" dirty="0"/>
-              <a:t> </a:t>
-            </a:r>
-            <a:r>
-              <a:rPr lang="de-DE" dirty="0" err="1"/>
-              <a:t>termination</a:t>
-            </a:r>
-            <a:r>
-              <a:rPr lang="de-DE" dirty="0"/>
-              <a:t> aber diese sind schon stark </a:t>
-            </a:r>
-            <a:r>
-              <a:rPr lang="de-DE" dirty="0" err="1"/>
-              <a:t>ausgereitzt</a:t>
-            </a:r>
-            <a:r>
-              <a:rPr lang="de-DE" dirty="0"/>
-              <a:t>)</a:t>
-            </a:r>
-          </a:p>
-          <a:p>
-            <a:endParaRPr lang="de-DE" dirty="0"/>
-          </a:p>
-          <a:p>
-            <a:r>
-              <a:rPr lang="de-DE" dirty="0"/>
-              <a:t>Einleitung:</a:t>
-            </a:r>
-          </a:p>
-          <a:p>
-            <a:r>
-              <a:rPr lang="de-DE" dirty="0"/>
-              <a:t>-- Eigenschaften des MWS, Verwendung eines Eyetrackers, Reduzierung der Bildqualität im peripheren Bereich, Kurzfassung der Ergebnisse</a:t>
-            </a:r>
-          </a:p>
-          <a:p>
-            <a:endParaRPr lang="de-DE" dirty="0"/>
-          </a:p>
-          <a:p>
-            <a:r>
-              <a:rPr lang="de-DE" dirty="0"/>
-              <a:t>Verwandte Arbeiten:</a:t>
-            </a:r>
-          </a:p>
-          <a:p>
-            <a:r>
-              <a:rPr lang="de-DE" dirty="0"/>
-              <a:t>-- Wie haben es die anderen gemacht, was gab es schon, wie möchte ich mich abgrenzen bzw. wo ist der Unterschied in meiner Implementierung</a:t>
-            </a:r>
-          </a:p>
-          <a:p>
-            <a:endParaRPr lang="de-DE" dirty="0"/>
-          </a:p>
-          <a:p>
-            <a:r>
-              <a:rPr lang="de-DE" dirty="0"/>
-              <a:t>Sehapparat:</a:t>
-            </a:r>
-          </a:p>
-          <a:p>
-            <a:r>
-              <a:rPr lang="de-DE" dirty="0"/>
-              <a:t>-- Stark gekürzt die wichtigsten Eigenschaften des Sehapparates mit u.U. einem Beispielbild</a:t>
-            </a:r>
-          </a:p>
-          <a:p>
-            <a:endParaRPr lang="de-DE" dirty="0"/>
-          </a:p>
-          <a:p>
-            <a:r>
-              <a:rPr lang="de-DE" dirty="0"/>
-              <a:t>Volumenrendering und Transferfunktion:</a:t>
-            </a:r>
-          </a:p>
-          <a:p>
-            <a:r>
-              <a:rPr lang="de-DE" dirty="0"/>
-              <a:t>-- Kurz wie funktioniert das Ganze, 3D Volumen mit </a:t>
-            </a:r>
-            <a:r>
-              <a:rPr lang="de-DE" dirty="0" err="1"/>
-              <a:t>Voxel</a:t>
-            </a:r>
-            <a:r>
-              <a:rPr lang="de-DE" dirty="0"/>
-              <a:t>, Abtasten von Strahlen, Berechnen der Farbwerte</a:t>
-            </a:r>
-          </a:p>
-          <a:p>
-            <a:endParaRPr lang="de-DE" dirty="0"/>
-          </a:p>
-          <a:p>
-            <a:r>
-              <a:rPr lang="de-DE" dirty="0"/>
-              <a:t>Eyetracking:</a:t>
-            </a:r>
-          </a:p>
-          <a:p>
-            <a:r>
-              <a:rPr lang="de-DE" dirty="0"/>
-              <a:t>-- Was es ist, wie es funktioniert, welches Gerät habe ich verwendet?</a:t>
-            </a:r>
-          </a:p>
-          <a:p>
-            <a:endParaRPr lang="de-DE" dirty="0"/>
-          </a:p>
-          <a:p>
-            <a:r>
-              <a:rPr lang="de-DE" dirty="0"/>
-              <a:t>GPU Architektur:</a:t>
-            </a:r>
-          </a:p>
-          <a:p>
-            <a:r>
-              <a:rPr lang="de-DE" dirty="0"/>
-              <a:t>-- Warum beschäftige ich mich damit? </a:t>
-            </a:r>
-            <a:r>
-              <a:rPr lang="de-DE" dirty="0" err="1"/>
-              <a:t>OpenCL</a:t>
-            </a:r>
-            <a:r>
-              <a:rPr lang="de-DE" dirty="0"/>
-              <a:t>, Work-Items, Work-Groups, Ausführungsmodell (Threads, Thread-Blocks)</a:t>
-            </a:r>
-          </a:p>
-          <a:p>
-            <a:endParaRPr lang="de-DE" dirty="0"/>
-          </a:p>
-          <a:p>
-            <a:r>
-              <a:rPr lang="de-DE" dirty="0"/>
-              <a:t>Entwurf:</a:t>
-            </a:r>
-          </a:p>
-          <a:p>
-            <a:r>
-              <a:rPr lang="de-DE" dirty="0"/>
-              <a:t>-- Ausgangprojekt </a:t>
-            </a:r>
-            <a:r>
-              <a:rPr lang="de-DE" dirty="0" err="1"/>
-              <a:t>Raycaster</a:t>
-            </a:r>
-            <a:r>
-              <a:rPr lang="de-DE" dirty="0"/>
-              <a:t>, Simulieren der Blickposition, Reduzierung der Abtastrate im Objekt- und Bildbereich</a:t>
-            </a:r>
-          </a:p>
-          <a:p>
-            <a:endParaRPr lang="de-DE" dirty="0"/>
-          </a:p>
-          <a:p>
-            <a:r>
-              <a:rPr lang="de-DE" dirty="0"/>
-              <a:t>Implementierung:</a:t>
-            </a:r>
-          </a:p>
-          <a:p>
-            <a:r>
-              <a:rPr lang="de-DE" dirty="0"/>
-              <a:t>-- Umsetzung des Entwurfs, Reduzierung der Abtastrate im Objektraum, Erster Ansatz zur Reduzierung der Abtastrate im Bildraum, Zweiter Ansatz zu Reduzierung der Abtastrate im Bildraum</a:t>
-            </a:r>
-          </a:p>
-          <a:p>
-            <a:endParaRPr lang="de-DE" dirty="0"/>
-          </a:p>
-          <a:p>
-            <a:r>
-              <a:rPr lang="de-DE" dirty="0"/>
-              <a:t>Ergebnisse:</a:t>
-            </a:r>
-          </a:p>
-          <a:p>
-            <a:r>
-              <a:rPr lang="de-DE" dirty="0"/>
-              <a:t>-- Sammeln von Messwerten, Bilder/Videos, </a:t>
-            </a:r>
-            <a:r>
-              <a:rPr lang="de-DE" dirty="0" err="1"/>
-              <a:t>Performanzwerte</a:t>
-            </a:r>
-            <a:r>
-              <a:rPr lang="de-DE" dirty="0"/>
-              <a:t>, Vergleich, Diskussion</a:t>
-            </a:r>
-          </a:p>
-          <a:p>
-            <a:endParaRPr lang="de-DE" dirty="0"/>
-          </a:p>
-          <a:p>
-            <a:r>
-              <a:rPr lang="de-DE" dirty="0"/>
-              <a:t>Fazit:</a:t>
-            </a:r>
-          </a:p>
-          <a:p>
-            <a:r>
-              <a:rPr lang="de-DE" dirty="0"/>
-              <a:t>-- Fazit, Ausblick</a:t>
-            </a:r>
-          </a:p>
-          <a:p>
-            <a:endParaRPr lang="de-DE" dirty="0"/>
-          </a:p>
-          <a:p>
-            <a:r>
-              <a:rPr lang="de-DE" dirty="0"/>
-              <a:t>Quellen:</a:t>
-            </a:r>
-          </a:p>
-          <a:p>
-            <a:r>
-              <a:rPr lang="de-DE" dirty="0"/>
-              <a:t>-- </a:t>
+              <a:t>Volumenrenderinganwendung</a:t>
+            </a:r>
+            <a:r>
+              <a:rPr lang="de-DE" dirty="0"/>
+              <a:t> zur Verfügung gestellt.</a:t>
+            </a:r>
+          </a:p>
+          <a:p>
+            <a:r>
+              <a:rPr lang="de-DE" dirty="0"/>
+              <a:t>Beim Volumenrendering werden Strahlen ausgehend von einer virtuellen Kamera ausgesendet und schrittweise abgetastet.</a:t>
+            </a:r>
+          </a:p>
+          <a:p>
+            <a:r>
+              <a:rPr lang="de-DE" dirty="0"/>
+              <a:t>Abhängig von der Blickposition wird versucht die Bildqualität im peripheren Bereich zu senken indem in diesem Bereich die Anzahl der Strahlen und die Abtastfrequenz von ihnen gesenkt wird. Aufgrund der Limitierungen des visuellen Wahrnehmungssystem soll dies möglich sein, ohne dass der Betrachter die Änderung störend wahrnimmt und für diesen trotzdem der Schein eines gleichmäßig hochaufgelösten Bildes erzeugt wird.</a:t>
+            </a:r>
+          </a:p>
+          <a:p>
+            <a:r>
+              <a:rPr lang="de-DE" dirty="0"/>
+              <a:t>Die Messwerte meiner Implementierungen werden zeigen, dass dies ganz gut funktioniert und sich die Berechnungsdauer circa halbiert beziehungsweise die Framerate ohne große Beeinträchtigungen der Bildqualität verdoppelt.</a:t>
             </a:r>
           </a:p>
         </p:txBody>
@@ -1658,7 +1400,7 @@
     </p:spTree>
     <p:extLst>
       <p:ext uri="{BB962C8B-B14F-4D97-AF65-F5344CB8AC3E}">
-        <p14:creationId xmlns:p14="http://schemas.microsoft.com/office/powerpoint/2010/main" val="1498479848"/>
+        <p14:creationId xmlns:p14="http://schemas.microsoft.com/office/powerpoint/2010/main" val="3087141175"/>
       </p:ext>
     </p:extLst>
   </p:cSld>
@@ -1714,13 +1456,13 @@
           <a:p>
             <a:r>
               <a:rPr lang="de-DE" dirty="0"/>
-              <a:t>Einleitung:</a:t>
-            </a:r>
-          </a:p>
-          <a:p>
-            <a:r>
-              <a:rPr lang="de-DE" dirty="0"/>
-              <a:t>-- Eigenschaften des MWS, Verwendung eines Eyetrackers, Reduzierung der Bildqualität im peripheren Bereich, Kurzfassung der Ergebnisse</a:t>
+              <a:t>Verwandte Arbeiten:</a:t>
+            </a:r>
+          </a:p>
+          <a:p>
+            <a:r>
+              <a:rPr lang="de-DE" dirty="0"/>
+              <a:t>-- Wie haben es die anderen gemacht, was gab es schon, wie möchte ich mich abgrenzen bzw. wo ist der Unterschied in meiner Implementierung</a:t>
             </a:r>
           </a:p>
           <a:p>
@@ -1729,45 +1471,73 @@
           <a:p>
             <a:r>
               <a:rPr lang="de-DE" dirty="0"/>
-              <a:t>Der Mensch sieht nur in einem kleinen zentralen Bereich des Sichtfeldes scharf. Dieser wird Fovea genannt. Mit zunehmenden Winkel zur Fovea nimmt die Sehschärfe stark ab, dieser Bereich ist der periphere Bereich.</a:t>
-            </a:r>
-          </a:p>
-          <a:p>
-            <a:r>
-              <a:rPr lang="de-DE" dirty="0"/>
-              <a:t>Diese Eigenschaft wird sich im wahrnehmungsorientierten Volumen-Rendering, entsprechend auch in dieser Arbeit, zu Nutze gemacht.</a:t>
-            </a:r>
-          </a:p>
-          <a:p>
-            <a:r>
-              <a:rPr lang="de-DE" dirty="0"/>
-              <a:t>Dafür wird mit Hilfe eines Eyetrackers die Blickposition des Betrachters auf dem Bildschirm erfasst und der </a:t>
+              <a:t>Abgrenzung:</a:t>
+            </a:r>
+          </a:p>
+          <a:p>
+            <a:r>
+              <a:rPr lang="de-DE" dirty="0"/>
+              <a:t>Im Prinzip zwei Methoden entworfen, beide reduzieren die Abtastrate im Bild- und Objektraum und beide übernehmen Ansätze dieser Arbeiten. </a:t>
+            </a:r>
+          </a:p>
+          <a:p>
+            <a:r>
+              <a:rPr lang="de-DE" dirty="0"/>
+              <a:t>Die erste Methode resultiert in nur zwei unterschiedlichen Auflösungen wie bei Marc </a:t>
             </a:r>
             <a:r>
               <a:rPr lang="de-DE" dirty="0" err="1"/>
-              <a:t>Volumenrenderinganwendung</a:t>
-            </a:r>
-            <a:r>
-              <a:rPr lang="de-DE" dirty="0"/>
-              <a:t> zur Verfügung gestellt.</a:t>
-            </a:r>
-          </a:p>
-          <a:p>
-            <a:r>
-              <a:rPr lang="de-DE" dirty="0"/>
-              <a:t>Beim Volumenrendering werden Strahlen ausgehend von einer virtuellen Kamera ausgesendet und schrittweise abgetastet.</a:t>
-            </a:r>
-          </a:p>
-          <a:p>
-            <a:r>
-              <a:rPr lang="de-DE" dirty="0"/>
-              <a:t>Abhängig von der Blickposition wird versucht die Bildqualität im peripheren Bereich zu senken indem in diesem Bereich die Anzahl der Strahlen und die Abtastfrequenz von ihnen gesenkt wird. Aufgrund der Limitierungen des visuellen Wahrnehmungssystem soll dies möglich sein, ohne dass der Betrachter die Änderung störend wahrnimmt und für diesen trotzdem der Schein eines gleichmäßig hochaufgelösten Bildes erzeugt wird.</a:t>
-            </a:r>
-          </a:p>
-          <a:p>
-            <a:r>
-              <a:rPr lang="de-DE" dirty="0"/>
-              <a:t>Die Messwerte meiner Implementierungen werden zeigen, dass dies ganz gut funktioniert und sich die Berechnungsdauer circa halbiert beziehungsweise die Framerate ohne große Beeinträchtigungen der Bildqualität verdoppelt.</a:t>
+              <a:t>Levoy</a:t>
+            </a:r>
+            <a:r>
+              <a:rPr lang="de-DE" dirty="0"/>
+              <a:t> und Ross Whitaker aber diese werden wie bei Guenter et. Al. Statt in einem </a:t>
+            </a:r>
+            <a:r>
+              <a:rPr lang="de-DE" dirty="0" err="1"/>
+              <a:t>Renderdurchlauf</a:t>
+            </a:r>
+            <a:r>
+              <a:rPr lang="de-DE" dirty="0"/>
+              <a:t> in zwei unterschiedlichen berechnet und anschließend zusammengesetzt. Außerdem ist anders als bei Marc </a:t>
+            </a:r>
+            <a:r>
+              <a:rPr lang="de-DE" dirty="0" err="1"/>
+              <a:t>Levoy</a:t>
+            </a:r>
+            <a:r>
+              <a:rPr lang="de-DE" dirty="0"/>
+              <a:t> und Ross Whitaker dies hier auf einer GPU implementiert.</a:t>
+            </a:r>
+          </a:p>
+          <a:p>
+            <a:r>
+              <a:rPr lang="de-DE" dirty="0"/>
+              <a:t>Die zweite Methode resultiert in drei unterschiedlichen Auflösungen, wie bei Guenter et. Al., jedoch werden diese hier in einem einzigen </a:t>
+            </a:r>
+            <a:r>
+              <a:rPr lang="de-DE" dirty="0" err="1"/>
+              <a:t>Renderdurchlauf</a:t>
+            </a:r>
+            <a:r>
+              <a:rPr lang="de-DE" dirty="0"/>
+              <a:t> berechnet und anschließend in einem weiteren </a:t>
+            </a:r>
+            <a:r>
+              <a:rPr lang="de-DE" dirty="0" err="1"/>
+              <a:t>Renderdurchlauf</a:t>
+            </a:r>
+            <a:r>
+              <a:rPr lang="de-DE" dirty="0"/>
+              <a:t> interpoliert. Außerdem wird, anders als bei Guenter et. Al., die Berechnung des Bildes durch einen </a:t>
+            </a:r>
+            <a:r>
+              <a:rPr lang="de-DE" dirty="0" err="1"/>
+              <a:t>Raycast</a:t>
+            </a:r>
+            <a:r>
+              <a:rPr lang="de-DE" dirty="0"/>
+              <a:t> und nicht durch eine Rasterisierung umgesetzt.</a:t>
             </a:r>
           </a:p>
         </p:txBody>
@@ -1798,7 +1568,7 @@
     </p:spTree>
     <p:extLst>
       <p:ext uri="{BB962C8B-B14F-4D97-AF65-F5344CB8AC3E}">
-        <p14:creationId xmlns:p14="http://schemas.microsoft.com/office/powerpoint/2010/main" val="3087141175"/>
+        <p14:creationId xmlns:p14="http://schemas.microsoft.com/office/powerpoint/2010/main" val="581991105"/>
       </p:ext>
     </p:extLst>
   </p:cSld>
@@ -1854,13 +1624,13 @@
           <a:p>
             <a:r>
               <a:rPr lang="de-DE" dirty="0"/>
-              <a:t>Verwandte Arbeiten:</a:t>
-            </a:r>
-          </a:p>
-          <a:p>
-            <a:r>
-              <a:rPr lang="de-DE" dirty="0"/>
-              <a:t>-- Wie haben es die anderen gemacht, was gab es schon, wie möchte ich mich abgrenzen bzw. wo ist der Unterschied in meiner Implementierung</a:t>
+              <a:t>Sehapparat:</a:t>
+            </a:r>
+          </a:p>
+          <a:p>
+            <a:r>
+              <a:rPr lang="de-DE" dirty="0"/>
+              <a:t>-- Stark gekürzt die wichtigsten Eigenschaften des Sehapparates mit u.U. einem Beispielbild</a:t>
             </a:r>
           </a:p>
           <a:p>
@@ -1869,73 +1639,38 @@
           <a:p>
             <a:r>
               <a:rPr lang="de-DE" dirty="0"/>
-              <a:t>Abgrenzung:</a:t>
-            </a:r>
-          </a:p>
-          <a:p>
-            <a:r>
-              <a:rPr lang="de-DE" dirty="0"/>
-              <a:t>Im Prinzip zwei Methoden entworfen, beide reduzieren die Abtastrate im Bild- und Objektraum und beide übernehmen Ansätze dieser Arbeiten. </a:t>
-            </a:r>
-          </a:p>
-          <a:p>
-            <a:r>
-              <a:rPr lang="de-DE" dirty="0"/>
-              <a:t>Die erste Methode resultiert in nur zwei unterschiedlichen Auflösungen wie bei Marc </a:t>
+              <a:t>Wie erwähnt ist die Sehschärfe auf der Retina ungleich verteilt und nur einem kleinen, zentralen Bereich maximal.</a:t>
+            </a:r>
+          </a:p>
+          <a:p>
+            <a:endParaRPr lang="de-DE" dirty="0"/>
+          </a:p>
+          <a:p>
+            <a:r>
+              <a:rPr lang="de-DE" dirty="0"/>
+              <a:t>Fovea ca. 5,2 °, </a:t>
             </a:r>
             <a:r>
               <a:rPr lang="de-DE" dirty="0" err="1"/>
-              <a:t>Levoy</a:t>
-            </a:r>
-            <a:r>
-              <a:rPr lang="de-DE" dirty="0"/>
-              <a:t> und Ross Whitaker aber diese werden wie bei Guenter et. Al. Statt in einem </a:t>
+              <a:t>Parafovea</a:t>
+            </a:r>
+            <a:r>
+              <a:rPr lang="de-DE" dirty="0"/>
+              <a:t> ca. 5,2 ° - 9 °, </a:t>
             </a:r>
             <a:r>
               <a:rPr lang="de-DE" dirty="0" err="1"/>
-              <a:t>Renderdurchlauf</a:t>
-            </a:r>
-            <a:r>
-              <a:rPr lang="de-DE" dirty="0"/>
-              <a:t> in zwei unterschiedlichen berechnet und anschließend zusammengesetzt. Außerdem ist anders als bei Marc </a:t>
-            </a:r>
-            <a:r>
-              <a:rPr lang="de-DE" dirty="0" err="1"/>
-              <a:t>Levoy</a:t>
-            </a:r>
-            <a:r>
-              <a:rPr lang="de-DE" dirty="0"/>
-              <a:t> und Ross Whitaker dies hier auf einer GPU implementiert.</a:t>
-            </a:r>
-          </a:p>
-          <a:p>
-            <a:r>
-              <a:rPr lang="de-DE" dirty="0"/>
-              <a:t>Die zweite Methode resultiert in drei unterschiedlichen Auflösungen, wie bei Guenter et. Al., jedoch werden diese hier in einem einzigen </a:t>
-            </a:r>
-            <a:r>
-              <a:rPr lang="de-DE" dirty="0" err="1"/>
-              <a:t>Renderdurchlauf</a:t>
-            </a:r>
-            <a:r>
-              <a:rPr lang="de-DE" dirty="0"/>
-              <a:t> berechnet und anschließend in einem weiteren </a:t>
-            </a:r>
-            <a:r>
-              <a:rPr lang="de-DE" dirty="0" err="1"/>
-              <a:t>Renderdurchlauf</a:t>
-            </a:r>
-            <a:r>
-              <a:rPr lang="de-DE" dirty="0"/>
-              <a:t> interpoliert. Außerdem wird, anders als bei Guenter et. Al., die Berechnung des Bildes durch einen </a:t>
-            </a:r>
-            <a:r>
-              <a:rPr lang="de-DE" dirty="0" err="1"/>
-              <a:t>Raycast</a:t>
-            </a:r>
-            <a:r>
-              <a:rPr lang="de-DE" dirty="0"/>
-              <a:t> und nicht durch eine Rasterisierung umgesetzt.</a:t>
+              <a:t>Perifovea</a:t>
+            </a:r>
+            <a:r>
+              <a:rPr lang="de-DE" dirty="0"/>
+              <a:t> ca. 9 °- 17 °.</a:t>
+            </a:r>
+          </a:p>
+          <a:p>
+            <a:r>
+              <a:rPr lang="de-DE" dirty="0"/>
+              <a:t>Peripheres Sehen &gt; 17 °</a:t>
             </a:r>
           </a:p>
         </p:txBody>
@@ -1966,7 +1701,7 @@
     </p:spTree>
     <p:extLst>
       <p:ext uri="{BB962C8B-B14F-4D97-AF65-F5344CB8AC3E}">
-        <p14:creationId xmlns:p14="http://schemas.microsoft.com/office/powerpoint/2010/main" val="581991105"/>
+        <p14:creationId xmlns:p14="http://schemas.microsoft.com/office/powerpoint/2010/main" val="2863301471"/>
       </p:ext>
     </p:extLst>
   </p:cSld>
@@ -2022,54 +1757,29 @@
           <a:p>
             <a:r>
               <a:rPr lang="de-DE" dirty="0"/>
-              <a:t>Sehapparat:</a:t>
-            </a:r>
-          </a:p>
-          <a:p>
-            <a:r>
-              <a:rPr lang="de-DE" dirty="0"/>
-              <a:t>-- Stark gekürzt die wichtigsten Eigenschaften des Sehapparates mit u.U. einem Beispielbild</a:t>
+              <a:t>Sakkade bis zu 900 ° / s</a:t>
+            </a:r>
+          </a:p>
+          <a:p>
+            <a:r>
+              <a:rPr lang="de-DE" dirty="0"/>
+              <a:t>Räumlicher Abstand zwischen Fixationen ca. 7 °</a:t>
+            </a:r>
+          </a:p>
+          <a:p>
+            <a:r>
+              <a:rPr lang="de-DE" dirty="0"/>
+              <a:t>Während einer Fixation gibt es trotzdem kleine Tremor-Bewegungen, die Fixationsstelle scannen</a:t>
+            </a:r>
+          </a:p>
+          <a:p>
+            <a:r>
+              <a:rPr lang="de-DE" dirty="0"/>
+              <a:t>Interessant, da zu wissen ob gerade Fixation oder Sakkade auch für das Berechnen des Bildes vorteilhaft sein kann.</a:t>
             </a:r>
           </a:p>
           <a:p>
             <a:endParaRPr lang="de-DE" dirty="0"/>
-          </a:p>
-          <a:p>
-            <a:r>
-              <a:rPr lang="de-DE" dirty="0"/>
-              <a:t>Wie erwähnt ist die Sehschärfe auf der Retina ungleich verteilt und nur einem kleinen, zentralen Bereich maximal.</a:t>
-            </a:r>
-          </a:p>
-          <a:p>
-            <a:endParaRPr lang="de-DE" dirty="0"/>
-          </a:p>
-          <a:p>
-            <a:r>
-              <a:rPr lang="de-DE" dirty="0"/>
-              <a:t>Fovea ca. 5,2 °, </a:t>
-            </a:r>
-            <a:r>
-              <a:rPr lang="de-DE" dirty="0" err="1"/>
-              <a:t>Parafovea</a:t>
-            </a:r>
-            <a:r>
-              <a:rPr lang="de-DE" dirty="0"/>
-              <a:t> ca. 5,2 ° - 9 °, </a:t>
-            </a:r>
-            <a:r>
-              <a:rPr lang="de-DE" dirty="0" err="1"/>
-              <a:t>Perifovea</a:t>
-            </a:r>
-            <a:r>
-              <a:rPr lang="de-DE" dirty="0"/>
-              <a:t> ca. 9 °- 17 °.</a:t>
-            </a:r>
-          </a:p>
-          <a:p>
-            <a:r>
-              <a:rPr lang="de-DE" dirty="0"/>
-              <a:t>Peripheres Sehen &gt; 17 °</a:t>
-            </a:r>
           </a:p>
         </p:txBody>
       </p:sp>
@@ -2099,7 +1809,7 @@
     </p:spTree>
     <p:extLst>
       <p:ext uri="{BB962C8B-B14F-4D97-AF65-F5344CB8AC3E}">
-        <p14:creationId xmlns:p14="http://schemas.microsoft.com/office/powerpoint/2010/main" val="2863301471"/>
+        <p14:creationId xmlns:p14="http://schemas.microsoft.com/office/powerpoint/2010/main" val="692395006"/>
       </p:ext>
     </p:extLst>
   </p:cSld>
@@ -2155,25 +1865,21 @@
           <a:p>
             <a:r>
               <a:rPr lang="de-DE" dirty="0"/>
-              <a:t>Sakkade bis zu 900 ° / s</a:t>
-            </a:r>
-          </a:p>
-          <a:p>
-            <a:r>
-              <a:rPr lang="de-DE" dirty="0"/>
-              <a:t>Räumlicher Abstand zwischen Fixationen ca. 7 °</a:t>
-            </a:r>
-          </a:p>
-          <a:p>
-            <a:r>
-              <a:rPr lang="de-DE" dirty="0"/>
-              <a:t>Während einer Fixation gibt es trotzdem kleine Tremor-Bewegungen, die Fixationsstelle scannen</a:t>
-            </a:r>
-          </a:p>
-          <a:p>
-            <a:r>
-              <a:rPr lang="de-DE" dirty="0"/>
-              <a:t>Interessant, da zu wissen ob gerade Fixation oder Sakkade auch für das Berechnen des Bildes vorteilhaft sein kann.</a:t>
+              <a:t>Volumenrendering und Transferfunktion:</a:t>
+            </a:r>
+          </a:p>
+          <a:p>
+            <a:r>
+              <a:rPr lang="de-DE" dirty="0"/>
+              <a:t>-- Kurz wie funktioniert das Ganze, 3D Volumen mit </a:t>
+            </a:r>
+            <a:r>
+              <a:rPr lang="de-DE" dirty="0" err="1"/>
+              <a:t>Voxel</a:t>
+            </a:r>
+            <a:r>
+              <a:rPr lang="de-DE" dirty="0"/>
+              <a:t>, Abtasten von Strahlen, Berechnen der Farbwerte</a:t>
             </a:r>
           </a:p>
           <a:p>
@@ -2207,7 +1913,7 @@
     </p:spTree>
     <p:extLst>
       <p:ext uri="{BB962C8B-B14F-4D97-AF65-F5344CB8AC3E}">
-        <p14:creationId xmlns:p14="http://schemas.microsoft.com/office/powerpoint/2010/main" val="692395006"/>
+        <p14:creationId xmlns:p14="http://schemas.microsoft.com/office/powerpoint/2010/main" val="2224000810"/>
       </p:ext>
     </p:extLst>
   </p:cSld>
@@ -2263,21 +1969,28 @@
           <a:p>
             <a:r>
               <a:rPr lang="de-DE" dirty="0"/>
-              <a:t>Volumenrendering und Transferfunktion:</a:t>
-            </a:r>
-          </a:p>
-          <a:p>
-            <a:r>
-              <a:rPr lang="de-DE" dirty="0"/>
-              <a:t>-- Kurz wie funktioniert das Ganze, 3D Volumen mit </a:t>
-            </a:r>
-            <a:r>
-              <a:rPr lang="de-DE" dirty="0" err="1"/>
-              <a:t>Voxel</a:t>
-            </a:r>
-            <a:r>
-              <a:rPr lang="de-DE" dirty="0"/>
-              <a:t>, Abtasten von Strahlen, Berechnen der Farbwerte</a:t>
+              <a:t>Eyetracking:</a:t>
+            </a:r>
+          </a:p>
+          <a:p>
+            <a:r>
+              <a:rPr lang="de-DE" dirty="0"/>
+              <a:t>-- Was es ist, wie es funktioniert, welches Gerät habe ich verwendet?</a:t>
+            </a:r>
+          </a:p>
+          <a:p>
+            <a:endParaRPr lang="de-DE" dirty="0"/>
+          </a:p>
+          <a:p>
+            <a:r>
+              <a:rPr lang="de-DE" dirty="0"/>
+              <a:t>Bild1: https://www.tobiipro.com/imagevault/publishedmedia/wtj5bngwymxv5372umt4/Tobii_Pro_Spectrum_Hero_Shot_3_1.png</a:t>
+            </a:r>
+          </a:p>
+          <a:p>
+            <a:r>
+              <a:rPr lang="de-DE" dirty="0"/>
+              <a:t>Bild2: http://www.tobiidynavox.de/wp-content/uploads/2014/01/tobiidynavox-eyetracking-reflections-1920x1080px.gif</a:t>
             </a:r>
           </a:p>
           <a:p>
@@ -2302,7 +2015,7 @@
           <a:p>
             <a:fld id="{6F4F2A7C-E896-4C15-99D8-2B5BC94A4F36}" type="slidenum">
               <a:rPr lang="de-DE" smtClean="0"/>
-              <a:t>8</a:t>
+              <a:t>9</a:t>
             </a:fld>
             <a:endParaRPr lang="de-DE"/>
           </a:p>
@@ -2311,7 +2024,7 @@
     </p:spTree>
     <p:extLst>
       <p:ext uri="{BB962C8B-B14F-4D97-AF65-F5344CB8AC3E}">
-        <p14:creationId xmlns:p14="http://schemas.microsoft.com/office/powerpoint/2010/main" val="2224000810"/>
+        <p14:creationId xmlns:p14="http://schemas.microsoft.com/office/powerpoint/2010/main" val="2198411781"/>
       </p:ext>
     </p:extLst>
   </p:cSld>
@@ -2367,28 +2080,21 @@
           <a:p>
             <a:r>
               <a:rPr lang="de-DE" dirty="0"/>
-              <a:t>Eyetracking:</a:t>
-            </a:r>
-          </a:p>
-          <a:p>
-            <a:r>
-              <a:rPr lang="de-DE" dirty="0"/>
-              <a:t>-- Was es ist, wie es funktioniert, welches Gerät habe ich verwendet?</a:t>
-            </a:r>
-          </a:p>
-          <a:p>
-            <a:endParaRPr lang="de-DE" dirty="0"/>
-          </a:p>
-          <a:p>
-            <a:r>
-              <a:rPr lang="de-DE" dirty="0"/>
-              <a:t>Bild1: https://www.tobiipro.com/imagevault/publishedmedia/wtj5bngwymxv5372umt4/Tobii_Pro_Spectrum_Hero_Shot_3_1.png</a:t>
-            </a:r>
-          </a:p>
-          <a:p>
-            <a:r>
-              <a:rPr lang="de-DE" dirty="0"/>
-              <a:t>Bild2: http://www.tobiidynavox.de/wp-content/uploads/2014/01/tobiidynavox-eyetracking-reflections-1920x1080px.gif</a:t>
+              <a:t>GPU Architektur:</a:t>
+            </a:r>
+          </a:p>
+          <a:p>
+            <a:r>
+              <a:rPr lang="de-DE" dirty="0"/>
+              <a:t>-- Warum beschäftige ich mich damit? </a:t>
+            </a:r>
+            <a:r>
+              <a:rPr lang="de-DE" dirty="0" err="1"/>
+              <a:t>OpenCL</a:t>
+            </a:r>
+            <a:r>
+              <a:rPr lang="de-DE" dirty="0"/>
+              <a:t>, Work-Items, Work-Groups, Ausführungsmodell (Threads, Thread-Blocks)</a:t>
             </a:r>
           </a:p>
           <a:p>
@@ -2422,7 +2128,7 @@
     </p:spTree>
     <p:extLst>
       <p:ext uri="{BB962C8B-B14F-4D97-AF65-F5344CB8AC3E}">
-        <p14:creationId xmlns:p14="http://schemas.microsoft.com/office/powerpoint/2010/main" val="2198411781"/>
+        <p14:creationId xmlns:p14="http://schemas.microsoft.com/office/powerpoint/2010/main" val="3385818242"/>
       </p:ext>
     </p:extLst>
   </p:cSld>
@@ -4565,262 +4271,6 @@
           <p:cNvPr id="2" name="Inhaltsplatzhalter 1">
             <a:extLst>
               <a:ext uri="{FF2B5EF4-FFF2-40B4-BE49-F238E27FC236}">
-                <a16:creationId xmlns:a16="http://schemas.microsoft.com/office/drawing/2014/main" id="{C62841FF-ED95-410A-A44C-4CD3F18EDF65}"/>
-              </a:ext>
-            </a:extLst>
-          </p:cNvPr>
-          <p:cNvSpPr>
-            <a:spLocks noGrp="1"/>
-          </p:cNvSpPr>
-          <p:nvPr>
-            <p:ph idx="1"/>
-          </p:nvPr>
-        </p:nvSpPr>
-        <p:spPr/>
-        <p:txBody>
-          <a:bodyPr/>
-          <a:lstStyle/>
-          <a:p>
-            <a:r>
-              <a:rPr lang="de-DE" dirty="0"/>
-              <a:t>Informationen über Blickposition und –verlauf</a:t>
-            </a:r>
-          </a:p>
-          <a:p>
-            <a:r>
-              <a:rPr lang="de-DE" dirty="0"/>
-              <a:t>Augenposition in 3D und auf dem Bildschirm</a:t>
-            </a:r>
-          </a:p>
-          <a:p>
-            <a:r>
-              <a:rPr lang="de-DE" dirty="0" err="1"/>
-              <a:t>Tobii</a:t>
-            </a:r>
-            <a:r>
-              <a:rPr lang="de-DE" dirty="0"/>
-              <a:t> Pro </a:t>
-            </a:r>
-            <a:r>
-              <a:rPr lang="de-DE" dirty="0" err="1"/>
-              <a:t>Spectrum</a:t>
-            </a:r>
-            <a:r>
-              <a:rPr lang="de-DE" dirty="0"/>
-              <a:t> Eyetracker</a:t>
-            </a:r>
-          </a:p>
-          <a:p>
-            <a:pPr lvl="1"/>
-            <a:r>
-              <a:rPr lang="de-DE" dirty="0"/>
-              <a:t>1200 Hz</a:t>
-            </a:r>
-          </a:p>
-          <a:p>
-            <a:endParaRPr lang="de-DE" dirty="0"/>
-          </a:p>
-        </p:txBody>
-      </p:sp>
-      <p:sp>
-        <p:nvSpPr>
-          <p:cNvPr id="3" name="Foliennummernplatzhalter 2">
-            <a:extLst>
-              <a:ext uri="{FF2B5EF4-FFF2-40B4-BE49-F238E27FC236}">
-                <a16:creationId xmlns:a16="http://schemas.microsoft.com/office/drawing/2014/main" id="{603903D2-F9DC-4D39-B875-B0D05A83EBC9}"/>
-              </a:ext>
-            </a:extLst>
-          </p:cNvPr>
-          <p:cNvSpPr>
-            <a:spLocks noGrp="1"/>
-          </p:cNvSpPr>
-          <p:nvPr>
-            <p:ph type="sldNum" sz="quarter" idx="12"/>
-          </p:nvPr>
-        </p:nvSpPr>
-        <p:spPr/>
-        <p:txBody>
-          <a:bodyPr/>
-          <a:lstStyle/>
-          <a:p>
-            <a:fld id="{29AD3987-26BA-49DC-BA24-72731371DC9F}" type="slidenum">
-              <a:rPr lang="de-DE" smtClean="0"/>
-              <a:t>10</a:t>
-            </a:fld>
-            <a:endParaRPr lang="de-DE" dirty="0"/>
-          </a:p>
-        </p:txBody>
-      </p:sp>
-      <p:sp>
-        <p:nvSpPr>
-          <p:cNvPr id="4" name="Titel 3">
-            <a:extLst>
-              <a:ext uri="{FF2B5EF4-FFF2-40B4-BE49-F238E27FC236}">
-                <a16:creationId xmlns:a16="http://schemas.microsoft.com/office/drawing/2014/main" id="{967B9506-C4D3-48E3-83E9-BC865F3F5D31}"/>
-              </a:ext>
-            </a:extLst>
-          </p:cNvPr>
-          <p:cNvSpPr>
-            <a:spLocks noGrp="1"/>
-          </p:cNvSpPr>
-          <p:nvPr>
-            <p:ph type="title"/>
-          </p:nvPr>
-        </p:nvSpPr>
-        <p:spPr/>
-        <p:txBody>
-          <a:bodyPr/>
-          <a:lstStyle/>
-          <a:p>
-            <a:r>
-              <a:rPr lang="de-DE" dirty="0"/>
-              <a:t>Eyetracking</a:t>
-            </a:r>
-          </a:p>
-        </p:txBody>
-      </p:sp>
-      <p:pic>
-        <p:nvPicPr>
-          <p:cNvPr id="6" name="Grafik 5">
-            <a:extLst>
-              <a:ext uri="{FF2B5EF4-FFF2-40B4-BE49-F238E27FC236}">
-                <a16:creationId xmlns:a16="http://schemas.microsoft.com/office/drawing/2014/main" id="{12E546CC-A99D-4E2B-BB8B-BC70ECA926F1}"/>
-              </a:ext>
-            </a:extLst>
-          </p:cNvPr>
-          <p:cNvPicPr>
-            <a:picLocks noChangeAspect="1"/>
-          </p:cNvPicPr>
-          <p:nvPr/>
-        </p:nvPicPr>
-        <p:blipFill rotWithShape="1">
-          <a:blip r:embed="rId3" cstate="print">
-            <a:extLst>
-              <a:ext uri="{28A0092B-C50C-407E-A947-70E740481C1C}">
-                <a14:useLocalDpi xmlns:a14="http://schemas.microsoft.com/office/drawing/2010/main" val="0"/>
-              </a:ext>
-            </a:extLst>
-          </a:blip>
-          <a:srcRect l="36219" t="2551" r="36219" b="2551"/>
-          <a:stretch/>
-        </p:blipFill>
-        <p:spPr>
-          <a:xfrm>
-            <a:off x="6080212" y="333363"/>
-            <a:ext cx="1789656" cy="2054991"/>
-          </a:xfrm>
-          <a:prstGeom prst="rect">
-            <a:avLst/>
-          </a:prstGeom>
-        </p:spPr>
-      </p:pic>
-      <p:pic>
-        <p:nvPicPr>
-          <p:cNvPr id="9" name="Grafik 8">
-            <a:extLst>
-              <a:ext uri="{FF2B5EF4-FFF2-40B4-BE49-F238E27FC236}">
-                <a16:creationId xmlns:a16="http://schemas.microsoft.com/office/drawing/2014/main" id="{3643476E-66C6-4A2D-BAE6-00252FCFDDC4}"/>
-              </a:ext>
-            </a:extLst>
-          </p:cNvPr>
-          <p:cNvPicPr>
-            <a:picLocks noChangeAspect="1"/>
-          </p:cNvPicPr>
-          <p:nvPr/>
-        </p:nvPicPr>
-        <p:blipFill>
-          <a:blip r:embed="rId4" cstate="print">
-            <a:extLst>
-              <a:ext uri="{28A0092B-C50C-407E-A947-70E740481C1C}">
-                <a14:useLocalDpi xmlns:a14="http://schemas.microsoft.com/office/drawing/2010/main" val="0"/>
-              </a:ext>
-            </a:extLst>
-          </a:blip>
-          <a:stretch>
-            <a:fillRect/>
-          </a:stretch>
-        </p:blipFill>
-        <p:spPr>
-          <a:xfrm>
-            <a:off x="755576" y="2897845"/>
-            <a:ext cx="2879466" cy="1619699"/>
-          </a:xfrm>
-          <a:prstGeom prst="rect">
-            <a:avLst/>
-          </a:prstGeom>
-        </p:spPr>
-      </p:pic>
-      <p:pic>
-        <p:nvPicPr>
-          <p:cNvPr id="11" name="Grafik 10">
-            <a:extLst>
-              <a:ext uri="{FF2B5EF4-FFF2-40B4-BE49-F238E27FC236}">
-                <a16:creationId xmlns:a16="http://schemas.microsoft.com/office/drawing/2014/main" id="{BD30F8EE-801F-41F2-B1EA-BC20237AA6F4}"/>
-              </a:ext>
-            </a:extLst>
-          </p:cNvPr>
-          <p:cNvPicPr>
-            <a:picLocks noChangeAspect="1"/>
-          </p:cNvPicPr>
-          <p:nvPr/>
-        </p:nvPicPr>
-        <p:blipFill>
-          <a:blip r:embed="rId5" cstate="print">
-            <a:extLst>
-              <a:ext uri="{28A0092B-C50C-407E-A947-70E740481C1C}">
-                <a14:useLocalDpi xmlns:a14="http://schemas.microsoft.com/office/drawing/2010/main" val="0"/>
-              </a:ext>
-            </a:extLst>
-          </a:blip>
-          <a:stretch>
-            <a:fillRect/>
-          </a:stretch>
-        </p:blipFill>
-        <p:spPr>
-          <a:xfrm>
-            <a:off x="4283968" y="2500307"/>
-            <a:ext cx="3585900" cy="2285689"/>
-          </a:xfrm>
-          <a:prstGeom prst="rect">
-            <a:avLst/>
-          </a:prstGeom>
-        </p:spPr>
-      </p:pic>
-    </p:spTree>
-    <p:extLst>
-      <p:ext uri="{BB962C8B-B14F-4D97-AF65-F5344CB8AC3E}">
-        <p14:creationId xmlns:p14="http://schemas.microsoft.com/office/powerpoint/2010/main" val="1763769228"/>
-      </p:ext>
-    </p:extLst>
-  </p:cSld>
-  <p:clrMapOvr>
-    <a:masterClrMapping/>
-  </p:clrMapOvr>
-</p:sld>
-</file>
-
-<file path=ppt/slides/slide11.xml><?xml version="1.0" encoding="utf-8"?>
-<p:sld xmlns:a="http://schemas.openxmlformats.org/drawingml/2006/main" xmlns:r="http://schemas.openxmlformats.org/officeDocument/2006/relationships" xmlns:p="http://schemas.openxmlformats.org/presentationml/2006/main">
-  <p:cSld>
-    <p:spTree>
-      <p:nvGrpSpPr>
-        <p:cNvPr id="1" name=""/>
-        <p:cNvGrpSpPr/>
-        <p:nvPr/>
-      </p:nvGrpSpPr>
-      <p:grpSpPr>
-        <a:xfrm>
-          <a:off x="0" y="0"/>
-          <a:ext cx="0" cy="0"/>
-          <a:chOff x="0" y="0"/>
-          <a:chExt cx="0" cy="0"/>
-        </a:xfrm>
-      </p:grpSpPr>
-      <p:sp>
-        <p:nvSpPr>
-          <p:cNvPr id="2" name="Inhaltsplatzhalter 1">
-            <a:extLst>
-              <a:ext uri="{FF2B5EF4-FFF2-40B4-BE49-F238E27FC236}">
                 <a16:creationId xmlns:a16="http://schemas.microsoft.com/office/drawing/2014/main" id="{2BFC54A6-CF1E-4705-BBE0-0F5AF5BE1FA3}"/>
               </a:ext>
             </a:extLst>
@@ -4902,7 +4352,7 @@
           <a:p>
             <a:fld id="{29AD3987-26BA-49DC-BA24-72731371DC9F}" type="slidenum">
               <a:rPr lang="de-DE" smtClean="0"/>
-              <a:t>11</a:t>
+              <a:t>10</a:t>
             </a:fld>
             <a:endParaRPr lang="de-DE" dirty="0"/>
           </a:p>
@@ -4985,7 +4435,7 @@
 </p:sld>
 </file>
 
-<file path=ppt/slides/slide12.xml><?xml version="1.0" encoding="utf-8"?>
+<file path=ppt/slides/slide11.xml><?xml version="1.0" encoding="utf-8"?>
 <p:sld xmlns:a="http://schemas.openxmlformats.org/drawingml/2006/main" xmlns:r="http://schemas.openxmlformats.org/officeDocument/2006/relationships" xmlns:p="http://schemas.openxmlformats.org/presentationml/2006/main">
   <p:cSld>
     <p:spTree>
@@ -5060,7 +4510,7 @@
           <a:p>
             <a:fld id="{29AD3987-26BA-49DC-BA24-72731371DC9F}" type="slidenum">
               <a:rPr lang="de-DE" smtClean="0"/>
-              <a:t>12</a:t>
+              <a:t>11</a:t>
             </a:fld>
             <a:endParaRPr lang="de-DE" dirty="0"/>
           </a:p>
@@ -5143,7 +4593,7 @@
 </p:sld>
 </file>
 
-<file path=ppt/slides/slide13.xml><?xml version="1.0" encoding="utf-8"?>
+<file path=ppt/slides/slide12.xml><?xml version="1.0" encoding="utf-8"?>
 <p:sld xmlns:a="http://schemas.openxmlformats.org/drawingml/2006/main" xmlns:r="http://schemas.openxmlformats.org/officeDocument/2006/relationships" xmlns:p="http://schemas.openxmlformats.org/presentationml/2006/main">
   <p:cSld>
     <p:spTree>
@@ -5270,7 +4720,7 @@
           <a:p>
             <a:fld id="{29AD3987-26BA-49DC-BA24-72731371DC9F}" type="slidenum">
               <a:rPr lang="de-DE" smtClean="0"/>
-              <a:t>13</a:t>
+              <a:t>12</a:t>
             </a:fld>
             <a:endParaRPr lang="de-DE" dirty="0"/>
           </a:p>
@@ -5343,6 +4793,191 @@
     <p:extLst>
       <p:ext uri="{BB962C8B-B14F-4D97-AF65-F5344CB8AC3E}">
         <p14:creationId xmlns:p14="http://schemas.microsoft.com/office/powerpoint/2010/main" val="1071932652"/>
+      </p:ext>
+    </p:extLst>
+  </p:cSld>
+  <p:clrMapOvr>
+    <a:masterClrMapping/>
+  </p:clrMapOvr>
+</p:sld>
+</file>
+
+<file path=ppt/slides/slide13.xml><?xml version="1.0" encoding="utf-8"?>
+<p:sld xmlns:a="http://schemas.openxmlformats.org/drawingml/2006/main" xmlns:r="http://schemas.openxmlformats.org/officeDocument/2006/relationships" xmlns:p="http://schemas.openxmlformats.org/presentationml/2006/main">
+  <p:cSld>
+    <p:spTree>
+      <p:nvGrpSpPr>
+        <p:cNvPr id="1" name=""/>
+        <p:cNvGrpSpPr/>
+        <p:nvPr/>
+      </p:nvGrpSpPr>
+      <p:grpSpPr>
+        <a:xfrm>
+          <a:off x="0" y="0"/>
+          <a:ext cx="0" cy="0"/>
+          <a:chOff x="0" y="0"/>
+          <a:chExt cx="0" cy="0"/>
+        </a:xfrm>
+      </p:grpSpPr>
+      <p:sp>
+        <p:nvSpPr>
+          <p:cNvPr id="2" name="Inhaltsplatzhalter 1">
+            <a:extLst>
+              <a:ext uri="{FF2B5EF4-FFF2-40B4-BE49-F238E27FC236}">
+                <a16:creationId xmlns:a16="http://schemas.microsoft.com/office/drawing/2014/main" id="{2196B620-9307-4A32-8E0F-A79CD82C6141}"/>
+              </a:ext>
+            </a:extLst>
+          </p:cNvPr>
+          <p:cNvSpPr>
+            <a:spLocks noGrp="1"/>
+          </p:cNvSpPr>
+          <p:nvPr>
+            <p:ph idx="1"/>
+          </p:nvPr>
+        </p:nvSpPr>
+        <p:spPr/>
+        <p:txBody>
+          <a:bodyPr>
+            <a:normAutofit lnSpcReduction="10000"/>
+          </a:bodyPr>
+          <a:lstStyle/>
+          <a:p>
+            <a:r>
+              <a:rPr lang="de-DE" dirty="0"/>
+              <a:t>Simulation der Blickposition durch die Maus</a:t>
+            </a:r>
+          </a:p>
+          <a:p>
+            <a:r>
+              <a:rPr lang="de-DE" dirty="0"/>
+              <a:t>Reduzierung der Abtastrate im peripheren Bereich</a:t>
+            </a:r>
+          </a:p>
+          <a:p>
+            <a:pPr lvl="1"/>
+            <a:r>
+              <a:rPr lang="de-DE" dirty="0"/>
+              <a:t>Objektraum</a:t>
+            </a:r>
+          </a:p>
+          <a:p>
+            <a:pPr lvl="1"/>
+            <a:r>
+              <a:rPr lang="de-DE" dirty="0"/>
+              <a:t>Bildraum</a:t>
+            </a:r>
+          </a:p>
+          <a:p>
+            <a:r>
+              <a:rPr lang="de-DE" dirty="0"/>
+              <a:t>Methode 1:</a:t>
+            </a:r>
+          </a:p>
+          <a:p>
+            <a:pPr lvl="1"/>
+            <a:r>
+              <a:rPr lang="de-DE" dirty="0"/>
+              <a:t>Zwei </a:t>
+            </a:r>
+            <a:r>
+              <a:rPr lang="de-DE" dirty="0" err="1"/>
+              <a:t>Raycasts</a:t>
+            </a:r>
+            <a:endParaRPr lang="de-DE" dirty="0"/>
+          </a:p>
+          <a:p>
+            <a:pPr lvl="1"/>
+            <a:r>
+              <a:rPr lang="de-DE" dirty="0"/>
+              <a:t>Zusammenfügen der Bilder</a:t>
+            </a:r>
+          </a:p>
+          <a:p>
+            <a:r>
+              <a:rPr lang="de-DE" dirty="0"/>
+              <a:t>Methode 2:</a:t>
+            </a:r>
+          </a:p>
+          <a:p>
+            <a:pPr lvl="1"/>
+            <a:r>
+              <a:rPr lang="de-DE" dirty="0"/>
+              <a:t>Index Mapping</a:t>
+            </a:r>
+          </a:p>
+          <a:p>
+            <a:pPr lvl="1"/>
+            <a:r>
+              <a:rPr lang="de-DE" dirty="0"/>
+              <a:t>Bilineare Interpolation</a:t>
+            </a:r>
+          </a:p>
+          <a:p>
+            <a:endParaRPr lang="de-DE" dirty="0"/>
+          </a:p>
+        </p:txBody>
+      </p:sp>
+      <p:sp>
+        <p:nvSpPr>
+          <p:cNvPr id="3" name="Foliennummernplatzhalter 2">
+            <a:extLst>
+              <a:ext uri="{FF2B5EF4-FFF2-40B4-BE49-F238E27FC236}">
+                <a16:creationId xmlns:a16="http://schemas.microsoft.com/office/drawing/2014/main" id="{81704736-F46B-49C0-9EFA-AA28A087FC33}"/>
+              </a:ext>
+            </a:extLst>
+          </p:cNvPr>
+          <p:cNvSpPr>
+            <a:spLocks noGrp="1"/>
+          </p:cNvSpPr>
+          <p:nvPr>
+            <p:ph type="sldNum" sz="quarter" idx="12"/>
+          </p:nvPr>
+        </p:nvSpPr>
+        <p:spPr/>
+        <p:txBody>
+          <a:bodyPr/>
+          <a:lstStyle/>
+          <a:p>
+            <a:fld id="{29AD3987-26BA-49DC-BA24-72731371DC9F}" type="slidenum">
+              <a:rPr lang="de-DE" smtClean="0"/>
+              <a:t>13</a:t>
+            </a:fld>
+            <a:endParaRPr lang="de-DE" dirty="0"/>
+          </a:p>
+        </p:txBody>
+      </p:sp>
+      <p:sp>
+        <p:nvSpPr>
+          <p:cNvPr id="4" name="Titel 3">
+            <a:extLst>
+              <a:ext uri="{FF2B5EF4-FFF2-40B4-BE49-F238E27FC236}">
+                <a16:creationId xmlns:a16="http://schemas.microsoft.com/office/drawing/2014/main" id="{76FB193F-48F1-49DB-BECE-D330734D424E}"/>
+              </a:ext>
+            </a:extLst>
+          </p:cNvPr>
+          <p:cNvSpPr>
+            <a:spLocks noGrp="1"/>
+          </p:cNvSpPr>
+          <p:nvPr>
+            <p:ph type="title"/>
+          </p:nvPr>
+        </p:nvSpPr>
+        <p:spPr/>
+        <p:txBody>
+          <a:bodyPr/>
+          <a:lstStyle/>
+          <a:p>
+            <a:r>
+              <a:rPr lang="de-DE" dirty="0"/>
+              <a:t>Entwurf</a:t>
+            </a:r>
+          </a:p>
+        </p:txBody>
+      </p:sp>
+    </p:spTree>
+    <p:extLst>
+      <p:ext uri="{BB962C8B-B14F-4D97-AF65-F5344CB8AC3E}">
+        <p14:creationId xmlns:p14="http://schemas.microsoft.com/office/powerpoint/2010/main" val="2764741092"/>
       </p:ext>
     </p:extLst>
   </p:cSld>
@@ -5371,108 +5006,10 @@
       </p:grpSpPr>
       <p:sp>
         <p:nvSpPr>
-          <p:cNvPr id="2" name="Inhaltsplatzhalter 1">
+          <p:cNvPr id="3" name="Foliennummernplatzhalter 2">
             <a:extLst>
               <a:ext uri="{FF2B5EF4-FFF2-40B4-BE49-F238E27FC236}">
-                <a16:creationId xmlns:a16="http://schemas.microsoft.com/office/drawing/2014/main" id="{2196B620-9307-4A32-8E0F-A79CD82C6141}"/>
-              </a:ext>
-            </a:extLst>
-          </p:cNvPr>
-          <p:cNvSpPr>
-            <a:spLocks noGrp="1"/>
-          </p:cNvSpPr>
-          <p:nvPr>
-            <p:ph idx="1"/>
-          </p:nvPr>
-        </p:nvSpPr>
-        <p:spPr/>
-        <p:txBody>
-          <a:bodyPr>
-            <a:normAutofit lnSpcReduction="10000"/>
-          </a:bodyPr>
-          <a:lstStyle/>
-          <a:p>
-            <a:r>
-              <a:rPr lang="de-DE" dirty="0"/>
-              <a:t>Simulation der Blickposition durch die Maus</a:t>
-            </a:r>
-          </a:p>
-          <a:p>
-            <a:r>
-              <a:rPr lang="de-DE" dirty="0"/>
-              <a:t>Reduzierung der Abtastrate im peripheren Bereich</a:t>
-            </a:r>
-          </a:p>
-          <a:p>
-            <a:pPr lvl="1"/>
-            <a:r>
-              <a:rPr lang="de-DE" dirty="0"/>
-              <a:t>Objektraum</a:t>
-            </a:r>
-          </a:p>
-          <a:p>
-            <a:pPr lvl="1"/>
-            <a:r>
-              <a:rPr lang="de-DE" dirty="0"/>
-              <a:t>Bildraum</a:t>
-            </a:r>
-          </a:p>
-          <a:p>
-            <a:r>
-              <a:rPr lang="de-DE" dirty="0"/>
-              <a:t>Methode 1:</a:t>
-            </a:r>
-          </a:p>
-          <a:p>
-            <a:pPr lvl="1"/>
-            <a:r>
-              <a:rPr lang="de-DE" dirty="0"/>
-              <a:t>Zwei </a:t>
-            </a:r>
-            <a:r>
-              <a:rPr lang="de-DE" dirty="0" err="1"/>
-              <a:t>Raycasts</a:t>
-            </a:r>
-            <a:endParaRPr lang="de-DE" dirty="0"/>
-          </a:p>
-          <a:p>
-            <a:pPr lvl="1"/>
-            <a:r>
-              <a:rPr lang="de-DE" dirty="0"/>
-              <a:t>Zusammenfügen der Bilder</a:t>
-            </a:r>
-          </a:p>
-          <a:p>
-            <a:r>
-              <a:rPr lang="de-DE" dirty="0"/>
-              <a:t>Methode 2:</a:t>
-            </a:r>
-          </a:p>
-          <a:p>
-            <a:pPr lvl="1"/>
-            <a:r>
-              <a:rPr lang="de-DE" dirty="0"/>
-              <a:t>Index Mapping</a:t>
-            </a:r>
-          </a:p>
-          <a:p>
-            <a:pPr lvl="1"/>
-            <a:r>
-              <a:rPr lang="de-DE" dirty="0"/>
-              <a:t>Bilineare Interpolation</a:t>
-            </a:r>
-          </a:p>
-          <a:p>
-            <a:endParaRPr lang="de-DE" dirty="0"/>
-          </a:p>
-        </p:txBody>
-      </p:sp>
-      <p:sp>
-        <p:nvSpPr>
-          <p:cNvPr id="3" name="Foliennummernplatzhalter 2">
-            <a:extLst>
-              <a:ext uri="{FF2B5EF4-FFF2-40B4-BE49-F238E27FC236}">
-                <a16:creationId xmlns:a16="http://schemas.microsoft.com/office/drawing/2014/main" id="{81704736-F46B-49C0-9EFA-AA28A087FC33}"/>
+                <a16:creationId xmlns:a16="http://schemas.microsoft.com/office/drawing/2014/main" id="{FC907AE8-75FA-4153-8576-FAD37DFF097F}"/>
               </a:ext>
             </a:extLst>
           </p:cNvPr>
@@ -5491,93 +5028,6 @@
             <a:fld id="{29AD3987-26BA-49DC-BA24-72731371DC9F}" type="slidenum">
               <a:rPr lang="de-DE" smtClean="0"/>
               <a:t>14</a:t>
-            </a:fld>
-            <a:endParaRPr lang="de-DE" dirty="0"/>
-          </a:p>
-        </p:txBody>
-      </p:sp>
-      <p:sp>
-        <p:nvSpPr>
-          <p:cNvPr id="4" name="Titel 3">
-            <a:extLst>
-              <a:ext uri="{FF2B5EF4-FFF2-40B4-BE49-F238E27FC236}">
-                <a16:creationId xmlns:a16="http://schemas.microsoft.com/office/drawing/2014/main" id="{76FB193F-48F1-49DB-BECE-D330734D424E}"/>
-              </a:ext>
-            </a:extLst>
-          </p:cNvPr>
-          <p:cNvSpPr>
-            <a:spLocks noGrp="1"/>
-          </p:cNvSpPr>
-          <p:nvPr>
-            <p:ph type="title"/>
-          </p:nvPr>
-        </p:nvSpPr>
-        <p:spPr/>
-        <p:txBody>
-          <a:bodyPr/>
-          <a:lstStyle/>
-          <a:p>
-            <a:r>
-              <a:rPr lang="de-DE" dirty="0"/>
-              <a:t>Entwurf</a:t>
-            </a:r>
-          </a:p>
-        </p:txBody>
-      </p:sp>
-    </p:spTree>
-    <p:extLst>
-      <p:ext uri="{BB962C8B-B14F-4D97-AF65-F5344CB8AC3E}">
-        <p14:creationId xmlns:p14="http://schemas.microsoft.com/office/powerpoint/2010/main" val="2764741092"/>
-      </p:ext>
-    </p:extLst>
-  </p:cSld>
-  <p:clrMapOvr>
-    <a:masterClrMapping/>
-  </p:clrMapOvr>
-</p:sld>
-</file>
-
-<file path=ppt/slides/slide15.xml><?xml version="1.0" encoding="utf-8"?>
-<p:sld xmlns:a="http://schemas.openxmlformats.org/drawingml/2006/main" xmlns:r="http://schemas.openxmlformats.org/officeDocument/2006/relationships" xmlns:p="http://schemas.openxmlformats.org/presentationml/2006/main">
-  <p:cSld>
-    <p:spTree>
-      <p:nvGrpSpPr>
-        <p:cNvPr id="1" name=""/>
-        <p:cNvGrpSpPr/>
-        <p:nvPr/>
-      </p:nvGrpSpPr>
-      <p:grpSpPr>
-        <a:xfrm>
-          <a:off x="0" y="0"/>
-          <a:ext cx="0" cy="0"/>
-          <a:chOff x="0" y="0"/>
-          <a:chExt cx="0" cy="0"/>
-        </a:xfrm>
-      </p:grpSpPr>
-      <p:sp>
-        <p:nvSpPr>
-          <p:cNvPr id="3" name="Foliennummernplatzhalter 2">
-            <a:extLst>
-              <a:ext uri="{FF2B5EF4-FFF2-40B4-BE49-F238E27FC236}">
-                <a16:creationId xmlns:a16="http://schemas.microsoft.com/office/drawing/2014/main" id="{FC907AE8-75FA-4153-8576-FAD37DFF097F}"/>
-              </a:ext>
-            </a:extLst>
-          </p:cNvPr>
-          <p:cNvSpPr>
-            <a:spLocks noGrp="1"/>
-          </p:cNvSpPr>
-          <p:nvPr>
-            <p:ph type="sldNum" sz="quarter" idx="12"/>
-          </p:nvPr>
-        </p:nvSpPr>
-        <p:spPr/>
-        <p:txBody>
-          <a:bodyPr/>
-          <a:lstStyle/>
-          <a:p>
-            <a:fld id="{29AD3987-26BA-49DC-BA24-72731371DC9F}" type="slidenum">
-              <a:rPr lang="de-DE" smtClean="0"/>
-              <a:t>15</a:t>
             </a:fld>
             <a:endParaRPr lang="de-DE" dirty="0"/>
           </a:p>
@@ -5696,7 +5146,7 @@
 </p:sld>
 </file>
 
-<file path=ppt/slides/slide16.xml><?xml version="1.0" encoding="utf-8"?>
+<file path=ppt/slides/slide15.xml><?xml version="1.0" encoding="utf-8"?>
 <p:sld xmlns:a="http://schemas.openxmlformats.org/drawingml/2006/main" xmlns:r="http://schemas.openxmlformats.org/officeDocument/2006/relationships" xmlns:p="http://schemas.openxmlformats.org/presentationml/2006/main">
   <p:cSld>
     <p:spTree>
@@ -5736,7 +5186,7 @@
           <a:p>
             <a:fld id="{29AD3987-26BA-49DC-BA24-72731371DC9F}" type="slidenum">
               <a:rPr lang="de-DE" smtClean="0"/>
-              <a:t>16</a:t>
+              <a:t>15</a:t>
             </a:fld>
             <a:endParaRPr lang="de-DE" dirty="0"/>
           </a:p>
@@ -5881,6 +5331,118 @@
     <p:extLst>
       <p:ext uri="{BB962C8B-B14F-4D97-AF65-F5344CB8AC3E}">
         <p14:creationId xmlns:p14="http://schemas.microsoft.com/office/powerpoint/2010/main" val="2161052520"/>
+      </p:ext>
+    </p:extLst>
+  </p:cSld>
+  <p:clrMapOvr>
+    <a:masterClrMapping/>
+  </p:clrMapOvr>
+</p:sld>
+</file>
+
+<file path=ppt/slides/slide16.xml><?xml version="1.0" encoding="utf-8"?>
+<p:sld xmlns:a="http://schemas.openxmlformats.org/drawingml/2006/main" xmlns:r="http://schemas.openxmlformats.org/officeDocument/2006/relationships" xmlns:p="http://schemas.openxmlformats.org/presentationml/2006/main">
+  <p:cSld>
+    <p:spTree>
+      <p:nvGrpSpPr>
+        <p:cNvPr id="1" name=""/>
+        <p:cNvGrpSpPr/>
+        <p:nvPr/>
+      </p:nvGrpSpPr>
+      <p:grpSpPr>
+        <a:xfrm>
+          <a:off x="0" y="0"/>
+          <a:ext cx="0" cy="0"/>
+          <a:chOff x="0" y="0"/>
+          <a:chExt cx="0" cy="0"/>
+        </a:xfrm>
+      </p:grpSpPr>
+      <p:sp>
+        <p:nvSpPr>
+          <p:cNvPr id="2" name="Inhaltsplatzhalter 1">
+            <a:extLst>
+              <a:ext uri="{FF2B5EF4-FFF2-40B4-BE49-F238E27FC236}">
+                <a16:creationId xmlns:a16="http://schemas.microsoft.com/office/drawing/2014/main" id="{D085E8EF-DA4C-4D5D-82B1-33486C8EB248}"/>
+              </a:ext>
+            </a:extLst>
+          </p:cNvPr>
+          <p:cNvSpPr>
+            <a:spLocks noGrp="1"/>
+          </p:cNvSpPr>
+          <p:nvPr>
+            <p:ph idx="1"/>
+          </p:nvPr>
+        </p:nvSpPr>
+        <p:spPr/>
+        <p:txBody>
+          <a:bodyPr/>
+          <a:lstStyle/>
+          <a:p>
+            <a:endParaRPr lang="de-DE"/>
+          </a:p>
+        </p:txBody>
+      </p:sp>
+      <p:sp>
+        <p:nvSpPr>
+          <p:cNvPr id="3" name="Foliennummernplatzhalter 2">
+            <a:extLst>
+              <a:ext uri="{FF2B5EF4-FFF2-40B4-BE49-F238E27FC236}">
+                <a16:creationId xmlns:a16="http://schemas.microsoft.com/office/drawing/2014/main" id="{89BD4092-489C-498B-A2A8-399EDCDACAEE}"/>
+              </a:ext>
+            </a:extLst>
+          </p:cNvPr>
+          <p:cNvSpPr>
+            <a:spLocks noGrp="1"/>
+          </p:cNvSpPr>
+          <p:nvPr>
+            <p:ph type="sldNum" sz="quarter" idx="12"/>
+          </p:nvPr>
+        </p:nvSpPr>
+        <p:spPr/>
+        <p:txBody>
+          <a:bodyPr/>
+          <a:lstStyle/>
+          <a:p>
+            <a:fld id="{29AD3987-26BA-49DC-BA24-72731371DC9F}" type="slidenum">
+              <a:rPr lang="de-DE" smtClean="0"/>
+              <a:t>16</a:t>
+            </a:fld>
+            <a:endParaRPr lang="de-DE" dirty="0"/>
+          </a:p>
+        </p:txBody>
+      </p:sp>
+      <p:sp>
+        <p:nvSpPr>
+          <p:cNvPr id="4" name="Titel 3">
+            <a:extLst>
+              <a:ext uri="{FF2B5EF4-FFF2-40B4-BE49-F238E27FC236}">
+                <a16:creationId xmlns:a16="http://schemas.microsoft.com/office/drawing/2014/main" id="{2426994F-F454-4E9F-BE04-254D47DBF028}"/>
+              </a:ext>
+            </a:extLst>
+          </p:cNvPr>
+          <p:cNvSpPr>
+            <a:spLocks noGrp="1"/>
+          </p:cNvSpPr>
+          <p:nvPr>
+            <p:ph type="title"/>
+          </p:nvPr>
+        </p:nvSpPr>
+        <p:spPr/>
+        <p:txBody>
+          <a:bodyPr/>
+          <a:lstStyle/>
+          <a:p>
+            <a:r>
+              <a:rPr lang="de-DE" dirty="0"/>
+              <a:t>Video h.264</a:t>
+            </a:r>
+          </a:p>
+        </p:txBody>
+      </p:sp>
+    </p:spTree>
+    <p:extLst>
+      <p:ext uri="{BB962C8B-B14F-4D97-AF65-F5344CB8AC3E}">
+        <p14:creationId xmlns:p14="http://schemas.microsoft.com/office/powerpoint/2010/main" val="2991516518"/>
       </p:ext>
     </p:extLst>
   </p:cSld>
@@ -5909,35 +5471,10 @@
       </p:grpSpPr>
       <p:sp>
         <p:nvSpPr>
-          <p:cNvPr id="2" name="Inhaltsplatzhalter 1">
+          <p:cNvPr id="3" name="Foliennummernplatzhalter 2">
             <a:extLst>
               <a:ext uri="{FF2B5EF4-FFF2-40B4-BE49-F238E27FC236}">
-                <a16:creationId xmlns:a16="http://schemas.microsoft.com/office/drawing/2014/main" id="{D085E8EF-DA4C-4D5D-82B1-33486C8EB248}"/>
-              </a:ext>
-            </a:extLst>
-          </p:cNvPr>
-          <p:cNvSpPr>
-            <a:spLocks noGrp="1"/>
-          </p:cNvSpPr>
-          <p:nvPr>
-            <p:ph idx="1"/>
-          </p:nvPr>
-        </p:nvSpPr>
-        <p:spPr/>
-        <p:txBody>
-          <a:bodyPr/>
-          <a:lstStyle/>
-          <a:p>
-            <a:endParaRPr lang="de-DE"/>
-          </a:p>
-        </p:txBody>
-      </p:sp>
-      <p:sp>
-        <p:nvSpPr>
-          <p:cNvPr id="3" name="Foliennummernplatzhalter 2">
-            <a:extLst>
-              <a:ext uri="{FF2B5EF4-FFF2-40B4-BE49-F238E27FC236}">
-                <a16:creationId xmlns:a16="http://schemas.microsoft.com/office/drawing/2014/main" id="{89BD4092-489C-498B-A2A8-399EDCDACAEE}"/>
+                <a16:creationId xmlns:a16="http://schemas.microsoft.com/office/drawing/2014/main" id="{075C3468-4FAE-4482-A6B1-80A1C1D916C8}"/>
               </a:ext>
             </a:extLst>
           </p:cNvPr>
@@ -5956,93 +5493,6 @@
             <a:fld id="{29AD3987-26BA-49DC-BA24-72731371DC9F}" type="slidenum">
               <a:rPr lang="de-DE" smtClean="0"/>
               <a:t>17</a:t>
-            </a:fld>
-            <a:endParaRPr lang="de-DE" dirty="0"/>
-          </a:p>
-        </p:txBody>
-      </p:sp>
-      <p:sp>
-        <p:nvSpPr>
-          <p:cNvPr id="4" name="Titel 3">
-            <a:extLst>
-              <a:ext uri="{FF2B5EF4-FFF2-40B4-BE49-F238E27FC236}">
-                <a16:creationId xmlns:a16="http://schemas.microsoft.com/office/drawing/2014/main" id="{2426994F-F454-4E9F-BE04-254D47DBF028}"/>
-              </a:ext>
-            </a:extLst>
-          </p:cNvPr>
-          <p:cNvSpPr>
-            <a:spLocks noGrp="1"/>
-          </p:cNvSpPr>
-          <p:nvPr>
-            <p:ph type="title"/>
-          </p:nvPr>
-        </p:nvSpPr>
-        <p:spPr/>
-        <p:txBody>
-          <a:bodyPr/>
-          <a:lstStyle/>
-          <a:p>
-            <a:r>
-              <a:rPr lang="de-DE" dirty="0"/>
-              <a:t>Video h.264</a:t>
-            </a:r>
-          </a:p>
-        </p:txBody>
-      </p:sp>
-    </p:spTree>
-    <p:extLst>
-      <p:ext uri="{BB962C8B-B14F-4D97-AF65-F5344CB8AC3E}">
-        <p14:creationId xmlns:p14="http://schemas.microsoft.com/office/powerpoint/2010/main" val="2991516518"/>
-      </p:ext>
-    </p:extLst>
-  </p:cSld>
-  <p:clrMapOvr>
-    <a:masterClrMapping/>
-  </p:clrMapOvr>
-</p:sld>
-</file>
-
-<file path=ppt/slides/slide18.xml><?xml version="1.0" encoding="utf-8"?>
-<p:sld xmlns:a="http://schemas.openxmlformats.org/drawingml/2006/main" xmlns:r="http://schemas.openxmlformats.org/officeDocument/2006/relationships" xmlns:p="http://schemas.openxmlformats.org/presentationml/2006/main">
-  <p:cSld>
-    <p:spTree>
-      <p:nvGrpSpPr>
-        <p:cNvPr id="1" name=""/>
-        <p:cNvGrpSpPr/>
-        <p:nvPr/>
-      </p:nvGrpSpPr>
-      <p:grpSpPr>
-        <a:xfrm>
-          <a:off x="0" y="0"/>
-          <a:ext cx="0" cy="0"/>
-          <a:chOff x="0" y="0"/>
-          <a:chExt cx="0" cy="0"/>
-        </a:xfrm>
-      </p:grpSpPr>
-      <p:sp>
-        <p:nvSpPr>
-          <p:cNvPr id="3" name="Foliennummernplatzhalter 2">
-            <a:extLst>
-              <a:ext uri="{FF2B5EF4-FFF2-40B4-BE49-F238E27FC236}">
-                <a16:creationId xmlns:a16="http://schemas.microsoft.com/office/drawing/2014/main" id="{075C3468-4FAE-4482-A6B1-80A1C1D916C8}"/>
-              </a:ext>
-            </a:extLst>
-          </p:cNvPr>
-          <p:cNvSpPr>
-            <a:spLocks noGrp="1"/>
-          </p:cNvSpPr>
-          <p:nvPr>
-            <p:ph type="sldNum" sz="quarter" idx="12"/>
-          </p:nvPr>
-        </p:nvSpPr>
-        <p:spPr/>
-        <p:txBody>
-          <a:bodyPr/>
-          <a:lstStyle/>
-          <a:p>
-            <a:fld id="{29AD3987-26BA-49DC-BA24-72731371DC9F}" type="slidenum">
-              <a:rPr lang="de-DE" smtClean="0"/>
-              <a:t>18</a:t>
             </a:fld>
             <a:endParaRPr lang="de-DE" dirty="0"/>
           </a:p>
@@ -6126,7 +5576,7 @@
 </p:sld>
 </file>
 
-<file path=ppt/slides/slide19.xml><?xml version="1.0" encoding="utf-8"?>
+<file path=ppt/slides/slide18.xml><?xml version="1.0" encoding="utf-8"?>
 <p:sld xmlns:a="http://schemas.openxmlformats.org/drawingml/2006/main" xmlns:r="http://schemas.openxmlformats.org/officeDocument/2006/relationships" xmlns:p="http://schemas.openxmlformats.org/presentationml/2006/main">
   <p:cSld>
     <p:spTree>
@@ -6166,7 +5616,7 @@
           <a:p>
             <a:fld id="{29AD3987-26BA-49DC-BA24-72731371DC9F}" type="slidenum">
               <a:rPr lang="de-DE" smtClean="0"/>
-              <a:t>19</a:t>
+              <a:t>18</a:t>
             </a:fld>
             <a:endParaRPr lang="de-DE" dirty="0"/>
           </a:p>
@@ -6221,6 +5671,118 @@
 </p:sld>
 </file>
 
+<file path=ppt/slides/slide19.xml><?xml version="1.0" encoding="utf-8"?>
+<p:sld xmlns:a="http://schemas.openxmlformats.org/drawingml/2006/main" xmlns:r="http://schemas.openxmlformats.org/officeDocument/2006/relationships" xmlns:p="http://schemas.openxmlformats.org/presentationml/2006/main">
+  <p:cSld>
+    <p:spTree>
+      <p:nvGrpSpPr>
+        <p:cNvPr id="1" name=""/>
+        <p:cNvGrpSpPr/>
+        <p:nvPr/>
+      </p:nvGrpSpPr>
+      <p:grpSpPr>
+        <a:xfrm>
+          <a:off x="0" y="0"/>
+          <a:ext cx="0" cy="0"/>
+          <a:chOff x="0" y="0"/>
+          <a:chExt cx="0" cy="0"/>
+        </a:xfrm>
+      </p:grpSpPr>
+      <p:sp>
+        <p:nvSpPr>
+          <p:cNvPr id="2" name="Inhaltsplatzhalter 1">
+            <a:extLst>
+              <a:ext uri="{FF2B5EF4-FFF2-40B4-BE49-F238E27FC236}">
+                <a16:creationId xmlns:a16="http://schemas.microsoft.com/office/drawing/2014/main" id="{65A8FDFA-9158-4F5B-B217-58F4813EA1D4}"/>
+              </a:ext>
+            </a:extLst>
+          </p:cNvPr>
+          <p:cNvSpPr>
+            <a:spLocks noGrp="1"/>
+          </p:cNvSpPr>
+          <p:nvPr>
+            <p:ph idx="1"/>
+          </p:nvPr>
+        </p:nvSpPr>
+        <p:spPr/>
+        <p:txBody>
+          <a:bodyPr/>
+          <a:lstStyle/>
+          <a:p>
+            <a:endParaRPr lang="de-DE" dirty="0"/>
+          </a:p>
+        </p:txBody>
+      </p:sp>
+      <p:sp>
+        <p:nvSpPr>
+          <p:cNvPr id="3" name="Foliennummernplatzhalter 2">
+            <a:extLst>
+              <a:ext uri="{FF2B5EF4-FFF2-40B4-BE49-F238E27FC236}">
+                <a16:creationId xmlns:a16="http://schemas.microsoft.com/office/drawing/2014/main" id="{3A92B2AE-FD91-476E-A0BA-A33507D415F7}"/>
+              </a:ext>
+            </a:extLst>
+          </p:cNvPr>
+          <p:cNvSpPr>
+            <a:spLocks noGrp="1"/>
+          </p:cNvSpPr>
+          <p:nvPr>
+            <p:ph type="sldNum" sz="quarter" idx="12"/>
+          </p:nvPr>
+        </p:nvSpPr>
+        <p:spPr/>
+        <p:txBody>
+          <a:bodyPr/>
+          <a:lstStyle/>
+          <a:p>
+            <a:fld id="{29AD3987-26BA-49DC-BA24-72731371DC9F}" type="slidenum">
+              <a:rPr lang="de-DE" smtClean="0"/>
+              <a:t>19</a:t>
+            </a:fld>
+            <a:endParaRPr lang="de-DE" dirty="0"/>
+          </a:p>
+        </p:txBody>
+      </p:sp>
+      <p:sp>
+        <p:nvSpPr>
+          <p:cNvPr id="4" name="Titel 3">
+            <a:extLst>
+              <a:ext uri="{FF2B5EF4-FFF2-40B4-BE49-F238E27FC236}">
+                <a16:creationId xmlns:a16="http://schemas.microsoft.com/office/drawing/2014/main" id="{1CEDDF61-A407-4902-8BFD-CC56DD364054}"/>
+              </a:ext>
+            </a:extLst>
+          </p:cNvPr>
+          <p:cNvSpPr>
+            <a:spLocks noGrp="1"/>
+          </p:cNvSpPr>
+          <p:nvPr>
+            <p:ph type="title"/>
+          </p:nvPr>
+        </p:nvSpPr>
+        <p:spPr/>
+        <p:txBody>
+          <a:bodyPr/>
+          <a:lstStyle/>
+          <a:p>
+            <a:r>
+              <a:rPr lang="de-DE" dirty="0"/>
+              <a:t>Fazit &amp; Ausblick</a:t>
+            </a:r>
+          </a:p>
+        </p:txBody>
+      </p:sp>
+    </p:spTree>
+    <p:extLst>
+      <p:ext uri="{BB962C8B-B14F-4D97-AF65-F5344CB8AC3E}">
+        <p14:creationId xmlns:p14="http://schemas.microsoft.com/office/powerpoint/2010/main" val="3815123622"/>
+      </p:ext>
+    </p:extLst>
+  </p:cSld>
+  <p:clrMapOvr>
+    <a:masterClrMapping/>
+  </p:clrMapOvr>
+</p:sld>
+</file>
+
 <file path=ppt/slides/slide2.xml><?xml version="1.0" encoding="utf-8"?>
 <p:sld xmlns:a="http://schemas.openxmlformats.org/drawingml/2006/main" xmlns:r="http://schemas.openxmlformats.org/officeDocument/2006/relationships" xmlns:p="http://schemas.openxmlformats.org/presentationml/2006/main">
   <p:cSld>
@@ -6238,6 +5800,42 @@
           <a:chExt cx="0" cy="0"/>
         </a:xfrm>
       </p:grpSpPr>
+      <p:pic>
+        <p:nvPicPr>
+          <p:cNvPr id="7" name="Grafik 6">
+            <a:extLst>
+              <a:ext uri="{FF2B5EF4-FFF2-40B4-BE49-F238E27FC236}">
+                <a16:creationId xmlns:a16="http://schemas.microsoft.com/office/drawing/2014/main" id="{3EC1FDC5-7EB6-452F-BA0B-03C1EF781EA1}"/>
+              </a:ext>
+            </a:extLst>
+          </p:cNvPr>
+          <p:cNvPicPr>
+            <a:picLocks noChangeAspect="1"/>
+          </p:cNvPicPr>
+          <p:nvPr/>
+        </p:nvPicPr>
+        <p:blipFill>
+          <a:blip r:embed="rId3" cstate="print">
+            <a:extLst>
+              <a:ext uri="{28A0092B-C50C-407E-A947-70E740481C1C}">
+                <a14:useLocalDpi xmlns:a14="http://schemas.microsoft.com/office/drawing/2010/main" val="0"/>
+              </a:ext>
+            </a:extLst>
+          </a:blip>
+          <a:stretch>
+            <a:fillRect/>
+          </a:stretch>
+        </p:blipFill>
+        <p:spPr>
+          <a:xfrm>
+            <a:off x="4427984" y="843558"/>
+            <a:ext cx="4680520" cy="2701175"/>
+          </a:xfrm>
+          <a:prstGeom prst="rect">
+            <a:avLst/>
+          </a:prstGeom>
+        </p:spPr>
+      </p:pic>
       <p:sp>
         <p:nvSpPr>
           <p:cNvPr id="2" name="Content Placeholder 1"/>
@@ -6294,6 +5892,9 @@
               <a:rPr lang="en-US" dirty="0"/>
               <a:t>, Field-of-View, </a:t>
             </a:r>
+            <a:br>
+              <a:rPr lang="en-US" dirty="0"/>
+            </a:br>
             <a:r>
               <a:rPr lang="en-US" dirty="0" err="1"/>
               <a:t>stereoskopische</a:t>
@@ -6428,44 +6029,6 @@
               <a:rPr lang="en-US" dirty="0"/>
               <a:t>Motivation</a:t>
             </a:r>
-          </a:p>
-        </p:txBody>
-      </p:sp>
-      <p:sp>
-        <p:nvSpPr>
-          <p:cNvPr id="5" name="Textfeld 4">
-            <a:extLst>
-              <a:ext uri="{FF2B5EF4-FFF2-40B4-BE49-F238E27FC236}">
-                <a16:creationId xmlns:a16="http://schemas.microsoft.com/office/drawing/2014/main" id="{28AE2170-223B-46C7-B1BB-0F91CFDD3C01}"/>
-              </a:ext>
-            </a:extLst>
-          </p:cNvPr>
-          <p:cNvSpPr txBox="1"/>
-          <p:nvPr/>
-        </p:nvSpPr>
-        <p:spPr>
-          <a:xfrm>
-            <a:off x="6588224" y="2579421"/>
-            <a:ext cx="2411942" cy="646331"/>
-          </a:xfrm>
-          <a:prstGeom prst="rect">
-            <a:avLst/>
-          </a:prstGeom>
-          <a:noFill/>
-        </p:spPr>
-        <p:txBody>
-          <a:bodyPr wrap="none" rtlCol="0">
-            <a:spAutoFit/>
-          </a:bodyPr>
-          <a:lstStyle/>
-          <a:p>
-            <a:r>
-              <a:rPr lang="de-DE" dirty="0"/>
-              <a:t>TODO: Bild / Volumen</a:t>
-            </a:r>
-          </a:p>
-          <a:p>
-            <a:endParaRPr lang="de-DE" dirty="0"/>
           </a:p>
         </p:txBody>
       </p:sp>
@@ -6504,7 +6067,7 @@
           <p:cNvPr id="2" name="Inhaltsplatzhalter 1">
             <a:extLst>
               <a:ext uri="{FF2B5EF4-FFF2-40B4-BE49-F238E27FC236}">
-                <a16:creationId xmlns:a16="http://schemas.microsoft.com/office/drawing/2014/main" id="{65A8FDFA-9158-4F5B-B217-58F4813EA1D4}"/>
+                <a16:creationId xmlns:a16="http://schemas.microsoft.com/office/drawing/2014/main" id="{002BA65F-1EFC-48C1-9C31-D228E1A6EE9B}"/>
               </a:ext>
             </a:extLst>
           </p:cNvPr>
@@ -6520,7 +6083,7 @@
           <a:bodyPr/>
           <a:lstStyle/>
           <a:p>
-            <a:endParaRPr lang="de-DE" dirty="0"/>
+            <a:endParaRPr lang="de-DE"/>
           </a:p>
         </p:txBody>
       </p:sp>
@@ -6529,7 +6092,7 @@
           <p:cNvPr id="3" name="Foliennummernplatzhalter 2">
             <a:extLst>
               <a:ext uri="{FF2B5EF4-FFF2-40B4-BE49-F238E27FC236}">
-                <a16:creationId xmlns:a16="http://schemas.microsoft.com/office/drawing/2014/main" id="{3A92B2AE-FD91-476E-A0BA-A33507D415F7}"/>
+                <a16:creationId xmlns:a16="http://schemas.microsoft.com/office/drawing/2014/main" id="{EE12B332-6480-47FC-9A50-7AAC660ABDFE}"/>
               </a:ext>
             </a:extLst>
           </p:cNvPr>
@@ -6548,118 +6111,6 @@
             <a:fld id="{29AD3987-26BA-49DC-BA24-72731371DC9F}" type="slidenum">
               <a:rPr lang="de-DE" smtClean="0"/>
               <a:t>20</a:t>
-            </a:fld>
-            <a:endParaRPr lang="de-DE" dirty="0"/>
-          </a:p>
-        </p:txBody>
-      </p:sp>
-      <p:sp>
-        <p:nvSpPr>
-          <p:cNvPr id="4" name="Titel 3">
-            <a:extLst>
-              <a:ext uri="{FF2B5EF4-FFF2-40B4-BE49-F238E27FC236}">
-                <a16:creationId xmlns:a16="http://schemas.microsoft.com/office/drawing/2014/main" id="{1CEDDF61-A407-4902-8BFD-CC56DD364054}"/>
-              </a:ext>
-            </a:extLst>
-          </p:cNvPr>
-          <p:cNvSpPr>
-            <a:spLocks noGrp="1"/>
-          </p:cNvSpPr>
-          <p:nvPr>
-            <p:ph type="title"/>
-          </p:nvPr>
-        </p:nvSpPr>
-        <p:spPr/>
-        <p:txBody>
-          <a:bodyPr/>
-          <a:lstStyle/>
-          <a:p>
-            <a:r>
-              <a:rPr lang="de-DE" dirty="0"/>
-              <a:t>Fazit &amp; Ausblick</a:t>
-            </a:r>
-          </a:p>
-        </p:txBody>
-      </p:sp>
-    </p:spTree>
-    <p:extLst>
-      <p:ext uri="{BB962C8B-B14F-4D97-AF65-F5344CB8AC3E}">
-        <p14:creationId xmlns:p14="http://schemas.microsoft.com/office/powerpoint/2010/main" val="3815123622"/>
-      </p:ext>
-    </p:extLst>
-  </p:cSld>
-  <p:clrMapOvr>
-    <a:masterClrMapping/>
-  </p:clrMapOvr>
-</p:sld>
-</file>
-
-<file path=ppt/slides/slide21.xml><?xml version="1.0" encoding="utf-8"?>
-<p:sld xmlns:a="http://schemas.openxmlformats.org/drawingml/2006/main" xmlns:r="http://schemas.openxmlformats.org/officeDocument/2006/relationships" xmlns:p="http://schemas.openxmlformats.org/presentationml/2006/main">
-  <p:cSld>
-    <p:spTree>
-      <p:nvGrpSpPr>
-        <p:cNvPr id="1" name=""/>
-        <p:cNvGrpSpPr/>
-        <p:nvPr/>
-      </p:nvGrpSpPr>
-      <p:grpSpPr>
-        <a:xfrm>
-          <a:off x="0" y="0"/>
-          <a:ext cx="0" cy="0"/>
-          <a:chOff x="0" y="0"/>
-          <a:chExt cx="0" cy="0"/>
-        </a:xfrm>
-      </p:grpSpPr>
-      <p:sp>
-        <p:nvSpPr>
-          <p:cNvPr id="2" name="Inhaltsplatzhalter 1">
-            <a:extLst>
-              <a:ext uri="{FF2B5EF4-FFF2-40B4-BE49-F238E27FC236}">
-                <a16:creationId xmlns:a16="http://schemas.microsoft.com/office/drawing/2014/main" id="{002BA65F-1EFC-48C1-9C31-D228E1A6EE9B}"/>
-              </a:ext>
-            </a:extLst>
-          </p:cNvPr>
-          <p:cNvSpPr>
-            <a:spLocks noGrp="1"/>
-          </p:cNvSpPr>
-          <p:nvPr>
-            <p:ph idx="1"/>
-          </p:nvPr>
-        </p:nvSpPr>
-        <p:spPr/>
-        <p:txBody>
-          <a:bodyPr/>
-          <a:lstStyle/>
-          <a:p>
-            <a:endParaRPr lang="de-DE"/>
-          </a:p>
-        </p:txBody>
-      </p:sp>
-      <p:sp>
-        <p:nvSpPr>
-          <p:cNvPr id="3" name="Foliennummernplatzhalter 2">
-            <a:extLst>
-              <a:ext uri="{FF2B5EF4-FFF2-40B4-BE49-F238E27FC236}">
-                <a16:creationId xmlns:a16="http://schemas.microsoft.com/office/drawing/2014/main" id="{EE12B332-6480-47FC-9A50-7AAC660ABDFE}"/>
-              </a:ext>
-            </a:extLst>
-          </p:cNvPr>
-          <p:cNvSpPr>
-            <a:spLocks noGrp="1"/>
-          </p:cNvSpPr>
-          <p:nvPr>
-            <p:ph type="sldNum" sz="quarter" idx="12"/>
-          </p:nvPr>
-        </p:nvSpPr>
-        <p:spPr/>
-        <p:txBody>
-          <a:bodyPr/>
-          <a:lstStyle/>
-          <a:p>
-            <a:fld id="{29AD3987-26BA-49DC-BA24-72731371DC9F}" type="slidenum">
-              <a:rPr lang="de-DE" smtClean="0"/>
-              <a:t>21</a:t>
             </a:fld>
             <a:endParaRPr lang="de-DE" dirty="0"/>
           </a:p>
@@ -6728,7 +6179,7 @@
           <p:cNvPr id="2" name="Inhaltsplatzhalter 1">
             <a:extLst>
               <a:ext uri="{FF2B5EF4-FFF2-40B4-BE49-F238E27FC236}">
-                <a16:creationId xmlns:a16="http://schemas.microsoft.com/office/drawing/2014/main" id="{C25D2311-E958-426D-B2CB-E36DF3372EA3}"/>
+                <a16:creationId xmlns:a16="http://schemas.microsoft.com/office/drawing/2014/main" id="{DB6B3D34-50BA-4BB6-8FEC-9E58C9FB4B26}"/>
               </a:ext>
             </a:extLst>
           </p:cNvPr>
@@ -6741,95 +6192,62 @@
         </p:nvSpPr>
         <p:spPr/>
         <p:txBody>
-          <a:bodyPr>
-            <a:normAutofit fontScale="92500" lnSpcReduction="20000"/>
-          </a:bodyPr>
-          <a:lstStyle/>
-          <a:p>
-            <a:r>
-              <a:rPr lang="de-DE" dirty="0">
-                <a:solidFill>
-                  <a:schemeClr val="bg1">
-                    <a:lumMod val="75000"/>
-                  </a:schemeClr>
-                </a:solidFill>
-              </a:rPr>
-              <a:t>Motivation</a:t>
-            </a:r>
-          </a:p>
-          <a:p>
-            <a:r>
-              <a:rPr lang="de-DE" dirty="0"/>
-              <a:t>Einleitung</a:t>
-            </a:r>
-          </a:p>
-          <a:p>
-            <a:r>
-              <a:rPr lang="de-DE" dirty="0"/>
-              <a:t>Grundlagen</a:t>
+          <a:bodyPr/>
+          <a:lstStyle/>
+          <a:p>
+            <a:r>
+              <a:rPr lang="de-DE" dirty="0" err="1"/>
+              <a:t>Foveales</a:t>
+            </a:r>
+            <a:r>
+              <a:rPr lang="de-DE" dirty="0"/>
+              <a:t>- und peripheres Sehen</a:t>
+            </a:r>
+          </a:p>
+          <a:p>
+            <a:r>
+              <a:rPr lang="de-DE" dirty="0"/>
+              <a:t>Erfassen der Blickposition</a:t>
             </a:r>
           </a:p>
           <a:p>
             <a:pPr lvl="1"/>
             <a:r>
               <a:rPr lang="de-DE" dirty="0"/>
-              <a:t>Verwandte Arbeiten</a:t>
+              <a:t>Eyetracker</a:t>
+            </a:r>
+          </a:p>
+          <a:p>
+            <a:r>
+              <a:rPr lang="de-DE" dirty="0"/>
+              <a:t>Volumenrendering</a:t>
+            </a:r>
+          </a:p>
+          <a:p>
+            <a:r>
+              <a:rPr lang="de-DE" dirty="0"/>
+              <a:t>Senken der Bildqualität im peripheren Bereich</a:t>
             </a:r>
           </a:p>
           <a:p>
             <a:pPr lvl="1"/>
             <a:r>
               <a:rPr lang="de-DE" dirty="0"/>
-              <a:t>Sehapparat</a:t>
+              <a:t>Bildraum</a:t>
             </a:r>
           </a:p>
           <a:p>
             <a:pPr lvl="1"/>
             <a:r>
               <a:rPr lang="de-DE" dirty="0"/>
-              <a:t>Volumenrendering und Transferfunktion</a:t>
-            </a:r>
-          </a:p>
-          <a:p>
-            <a:pPr lvl="1"/>
-            <a:r>
-              <a:rPr lang="de-DE" dirty="0"/>
-              <a:t>Eyetracking</a:t>
-            </a:r>
-          </a:p>
-          <a:p>
-            <a:pPr lvl="1"/>
-            <a:r>
-              <a:rPr lang="de-DE" dirty="0"/>
-              <a:t>GPU Architektur</a:t>
-            </a:r>
-          </a:p>
-          <a:p>
-            <a:r>
-              <a:rPr lang="de-DE" dirty="0"/>
-              <a:t>Entwurf</a:t>
-            </a:r>
-          </a:p>
-          <a:p>
-            <a:r>
-              <a:rPr lang="de-DE" dirty="0"/>
-              <a:t>Implementierung</a:t>
-            </a:r>
-          </a:p>
-          <a:p>
-            <a:r>
-              <a:rPr lang="de-DE" dirty="0"/>
-              <a:t>Ergebnisse</a:t>
-            </a:r>
-          </a:p>
-          <a:p>
-            <a:r>
-              <a:rPr lang="de-DE" dirty="0"/>
-              <a:t>Fazit</a:t>
-            </a:r>
-          </a:p>
-          <a:p>
-            <a:endParaRPr lang="de-DE" dirty="0"/>
+              <a:t>Objektraum</a:t>
+            </a:r>
+          </a:p>
+          <a:p>
+            <a:r>
+              <a:rPr lang="de-DE" dirty="0"/>
+              <a:t>Resultat: Halbierte Berechnungsdauer</a:t>
+            </a:r>
           </a:p>
         </p:txBody>
       </p:sp>
@@ -6838,7 +6256,7 @@
           <p:cNvPr id="3" name="Foliennummernplatzhalter 2">
             <a:extLst>
               <a:ext uri="{FF2B5EF4-FFF2-40B4-BE49-F238E27FC236}">
-                <a16:creationId xmlns:a16="http://schemas.microsoft.com/office/drawing/2014/main" id="{6E2E4B39-F528-45F7-AEFD-68586BCB522E}"/>
+                <a16:creationId xmlns:a16="http://schemas.microsoft.com/office/drawing/2014/main" id="{7B881CCC-5A80-421F-BED5-6D0F02A89A55}"/>
               </a:ext>
             </a:extLst>
           </p:cNvPr>
@@ -6867,7 +6285,7 @@
           <p:cNvPr id="4" name="Titel 3">
             <a:extLst>
               <a:ext uri="{FF2B5EF4-FFF2-40B4-BE49-F238E27FC236}">
-                <a16:creationId xmlns:a16="http://schemas.microsoft.com/office/drawing/2014/main" id="{C0C37577-423D-407C-A55E-04F0085A6083}"/>
+                <a16:creationId xmlns:a16="http://schemas.microsoft.com/office/drawing/2014/main" id="{82801AF4-5AB0-483C-919A-E6E46D4882F9}"/>
               </a:ext>
             </a:extLst>
           </p:cNvPr>
@@ -6885,53 +6303,51 @@
           <a:p>
             <a:r>
               <a:rPr lang="de-DE" dirty="0"/>
-              <a:t>Gliederung</a:t>
-            </a:r>
-          </a:p>
-        </p:txBody>
-      </p:sp>
-      <p:sp>
-        <p:nvSpPr>
-          <p:cNvPr id="5" name="Textfeld 4">
+              <a:t>Idee</a:t>
+            </a:r>
+          </a:p>
+        </p:txBody>
+      </p:sp>
+      <p:pic>
+        <p:nvPicPr>
+          <p:cNvPr id="7" name="Grafik 6">
             <a:extLst>
               <a:ext uri="{FF2B5EF4-FFF2-40B4-BE49-F238E27FC236}">
-                <a16:creationId xmlns:a16="http://schemas.microsoft.com/office/drawing/2014/main" id="{42EE7285-46D9-4AE7-B80A-EAAF56E38714}"/>
+                <a16:creationId xmlns:a16="http://schemas.microsoft.com/office/drawing/2014/main" id="{773519FE-26DF-4B72-808A-7D9E22E8E69F}"/>
               </a:ext>
             </a:extLst>
           </p:cNvPr>
-          <p:cNvSpPr txBox="1"/>
+          <p:cNvPicPr>
+            <a:picLocks noChangeAspect="1"/>
+          </p:cNvPicPr>
           <p:nvPr/>
-        </p:nvSpPr>
+        </p:nvPicPr>
+        <p:blipFill>
+          <a:blip r:embed="rId3">
+            <a:extLst>
+              <a:ext uri="{28A0092B-C50C-407E-A947-70E740481C1C}">
+                <a14:useLocalDpi xmlns:a14="http://schemas.microsoft.com/office/drawing/2010/main" val="0"/>
+              </a:ext>
+            </a:extLst>
+          </a:blip>
+          <a:stretch>
+            <a:fillRect/>
+          </a:stretch>
+        </p:blipFill>
         <p:spPr>
           <a:xfrm>
-            <a:off x="6084168" y="2571750"/>
-            <a:ext cx="2176430" cy="646331"/>
+            <a:off x="5004048" y="123478"/>
+            <a:ext cx="3747911" cy="2533588"/>
           </a:xfrm>
           <a:prstGeom prst="rect">
             <a:avLst/>
           </a:prstGeom>
-          <a:noFill/>
         </p:spPr>
-        <p:txBody>
-          <a:bodyPr wrap="none" rtlCol="0">
-            <a:spAutoFit/>
-          </a:bodyPr>
-          <a:lstStyle/>
-          <a:p>
-            <a:r>
-              <a:rPr lang="de-DE" dirty="0"/>
-              <a:t>TODO: Rauslöschen</a:t>
-            </a:r>
-          </a:p>
-          <a:p>
-            <a:endParaRPr lang="de-DE" dirty="0"/>
-          </a:p>
-        </p:txBody>
-      </p:sp>
+      </p:pic>
     </p:spTree>
     <p:extLst>
       <p:ext uri="{BB962C8B-B14F-4D97-AF65-F5344CB8AC3E}">
-        <p14:creationId xmlns:p14="http://schemas.microsoft.com/office/powerpoint/2010/main" val="2077271034"/>
+        <p14:creationId xmlns:p14="http://schemas.microsoft.com/office/powerpoint/2010/main" val="230950608"/>
       </p:ext>
     </p:extLst>
   </p:cSld>
@@ -6963,7 +6379,7 @@
           <p:cNvPr id="2" name="Inhaltsplatzhalter 1">
             <a:extLst>
               <a:ext uri="{FF2B5EF4-FFF2-40B4-BE49-F238E27FC236}">
-                <a16:creationId xmlns:a16="http://schemas.microsoft.com/office/drawing/2014/main" id="{DB6B3D34-50BA-4BB6-8FEC-9E58C9FB4B26}"/>
+                <a16:creationId xmlns:a16="http://schemas.microsoft.com/office/drawing/2014/main" id="{29A63108-FAC2-4666-9DD5-69210B3791AB}"/>
               </a:ext>
             </a:extLst>
           </p:cNvPr>
@@ -6976,61 +6392,97 @@
         </p:nvSpPr>
         <p:spPr/>
         <p:txBody>
-          <a:bodyPr/>
-          <a:lstStyle/>
-          <a:p>
+          <a:bodyPr>
+            <a:normAutofit lnSpcReduction="10000"/>
+          </a:bodyPr>
+          <a:lstStyle/>
+          <a:p>
+            <a:r>
+              <a:rPr lang="de-DE" dirty="0"/>
+              <a:t>Marc </a:t>
+            </a:r>
             <a:r>
               <a:rPr lang="de-DE" dirty="0" err="1"/>
-              <a:t>Foveales</a:t>
-            </a:r>
-            <a:r>
-              <a:rPr lang="de-DE" dirty="0"/>
-              <a:t>- und peripheres Sehen</a:t>
-            </a:r>
-          </a:p>
-          <a:p>
-            <a:r>
-              <a:rPr lang="de-DE" dirty="0"/>
-              <a:t>Erfassen der Blickposition</a:t>
+              <a:t>Levoy</a:t>
+            </a:r>
+            <a:r>
+              <a:rPr lang="de-DE" dirty="0"/>
+              <a:t> und Ross Whitaker</a:t>
             </a:r>
           </a:p>
           <a:p>
             <a:pPr lvl="1"/>
             <a:r>
               <a:rPr lang="de-DE" dirty="0"/>
-              <a:t>Eyetracker</a:t>
-            </a:r>
-          </a:p>
-          <a:p>
-            <a:r>
-              <a:rPr lang="de-DE" dirty="0"/>
-              <a:t>Volumenrendering</a:t>
-            </a:r>
-          </a:p>
-          <a:p>
-            <a:r>
-              <a:rPr lang="de-DE" dirty="0"/>
-              <a:t>Senken der Bildqualität im peripheren Bereich</a:t>
+              <a:t>Wahrnehmungsorientiertes Echtzeit-Volumen-Rendering</a:t>
             </a:r>
           </a:p>
           <a:p>
             <a:pPr lvl="1"/>
             <a:r>
               <a:rPr lang="de-DE" dirty="0"/>
-              <a:t>Bildraum</a:t>
-            </a:r>
+              <a:t>Pixel-Planes 5 </a:t>
+            </a:r>
+            <a:r>
+              <a:rPr lang="de-DE" dirty="0" err="1"/>
+              <a:t>rendering</a:t>
+            </a:r>
+            <a:r>
+              <a:rPr lang="de-DE" dirty="0"/>
+              <a:t> </a:t>
+            </a:r>
+            <a:r>
+              <a:rPr lang="de-DE" dirty="0" err="1"/>
+              <a:t>engine</a:t>
+            </a:r>
+            <a:endParaRPr lang="de-DE" dirty="0"/>
           </a:p>
           <a:p>
             <a:pPr lvl="1"/>
             <a:r>
               <a:rPr lang="de-DE" dirty="0"/>
-              <a:t>Objektraum</a:t>
-            </a:r>
-          </a:p>
-          <a:p>
-            <a:r>
-              <a:rPr lang="de-DE" dirty="0"/>
-              <a:t>Resultat: Halbierte Berechnungsdauer</a:t>
+              <a:t>Reduzierung der Abtastrate in Bild- und Objektraum</a:t>
+            </a:r>
+          </a:p>
+          <a:p>
+            <a:pPr lvl="1"/>
+            <a:r>
+              <a:rPr lang="de-DE" dirty="0"/>
+              <a:t>Reduzierter Berechnungsaufwand vom Faktor fünf</a:t>
+            </a:r>
+          </a:p>
+          <a:p>
+            <a:r>
+              <a:rPr lang="de-DE" dirty="0"/>
+              <a:t>Guenter et al.</a:t>
+            </a:r>
+          </a:p>
+          <a:p>
+            <a:pPr lvl="1"/>
+            <a:r>
+              <a:rPr lang="de-DE" dirty="0"/>
+              <a:t>Wahrnehmungsorientierte Rasterisierung</a:t>
+            </a:r>
+          </a:p>
+          <a:p>
+            <a:pPr lvl="1"/>
+            <a:r>
+              <a:rPr lang="de-DE" dirty="0"/>
+              <a:t>Zusammensetzung des Bildes aus drei Teilbildern unterschiedlicher Auflösungen</a:t>
+            </a:r>
+          </a:p>
+          <a:p>
+            <a:pPr lvl="1"/>
+            <a:r>
+              <a:rPr lang="de-DE" dirty="0"/>
+              <a:t>Berechnung auf einer GPU</a:t>
+            </a:r>
+          </a:p>
+          <a:p>
+            <a:pPr lvl="1"/>
+            <a:r>
+              <a:rPr lang="de-DE" dirty="0"/>
+              <a:t>Reduzierter Berechnungsaufwand vom Faktor fünf bis sechs</a:t>
             </a:r>
           </a:p>
         </p:txBody>
@@ -7040,7 +6492,7 @@
           <p:cNvPr id="3" name="Foliennummernplatzhalter 2">
             <a:extLst>
               <a:ext uri="{FF2B5EF4-FFF2-40B4-BE49-F238E27FC236}">
-                <a16:creationId xmlns:a16="http://schemas.microsoft.com/office/drawing/2014/main" id="{7B881CCC-5A80-421F-BED5-6D0F02A89A55}"/>
+                <a16:creationId xmlns:a16="http://schemas.microsoft.com/office/drawing/2014/main" id="{86170DCA-A5C4-4910-8EA8-9EDF6826DE9A}"/>
               </a:ext>
             </a:extLst>
           </p:cNvPr>
@@ -7069,7 +6521,7 @@
           <p:cNvPr id="4" name="Titel 3">
             <a:extLst>
               <a:ext uri="{FF2B5EF4-FFF2-40B4-BE49-F238E27FC236}">
-                <a16:creationId xmlns:a16="http://schemas.microsoft.com/office/drawing/2014/main" id="{82801AF4-5AB0-483C-919A-E6E46D4882F9}"/>
+                <a16:creationId xmlns:a16="http://schemas.microsoft.com/office/drawing/2014/main" id="{71E495D1-3095-46E9-A3B6-C767C8F884C0}"/>
               </a:ext>
             </a:extLst>
           </p:cNvPr>
@@ -7087,7 +6539,7 @@
           <a:p>
             <a:r>
               <a:rPr lang="de-DE" dirty="0"/>
-              <a:t>Idee</a:t>
+              <a:t>Verwandte Arbeiten</a:t>
             </a:r>
           </a:p>
         </p:txBody>
@@ -7097,7 +6549,7 @@
           <p:cNvPr id="5" name="Textfeld 4">
             <a:extLst>
               <a:ext uri="{FF2B5EF4-FFF2-40B4-BE49-F238E27FC236}">
-                <a16:creationId xmlns:a16="http://schemas.microsoft.com/office/drawing/2014/main" id="{560471F3-97BA-446C-B119-C26016720790}"/>
+                <a16:creationId xmlns:a16="http://schemas.microsoft.com/office/drawing/2014/main" id="{88F66C8A-8238-4B32-85AF-8C7B315CD1E8}"/>
               </a:ext>
             </a:extLst>
           </p:cNvPr>
@@ -7106,8 +6558,8 @@
         </p:nvSpPr>
         <p:spPr>
           <a:xfrm>
-            <a:off x="7092280" y="2931790"/>
-            <a:ext cx="1299587" cy="646331"/>
+            <a:off x="5940152" y="699542"/>
+            <a:ext cx="1945982" cy="369332"/>
           </a:xfrm>
           <a:prstGeom prst="rect">
             <a:avLst/>
@@ -7121,9 +6573,66 @@
           <a:lstStyle/>
           <a:p>
             <a:r>
-              <a:rPr lang="de-DE" dirty="0"/>
-              <a:t>TODO: Bild</a:t>
-            </a:r>
+              <a:rPr lang="de-DE"/>
+              <a:t>TODO: Jahreszahl</a:t>
+            </a:r>
+            <a:endParaRPr lang="de-DE" dirty="0"/>
+          </a:p>
+        </p:txBody>
+      </p:sp>
+      <p:sp>
+        <p:nvSpPr>
+          <p:cNvPr id="6" name="Textfeld 5">
+            <a:extLst>
+              <a:ext uri="{FF2B5EF4-FFF2-40B4-BE49-F238E27FC236}">
+                <a16:creationId xmlns:a16="http://schemas.microsoft.com/office/drawing/2014/main" id="{D8D9DA0F-8024-435F-A187-9EE47F434828}"/>
+              </a:ext>
+            </a:extLst>
+          </p:cNvPr>
+          <p:cNvSpPr txBox="1"/>
+          <p:nvPr/>
+        </p:nvSpPr>
+        <p:spPr>
+          <a:xfrm>
+            <a:off x="6500719" y="3806633"/>
+            <a:ext cx="2074222" cy="646331"/>
+          </a:xfrm>
+          <a:prstGeom prst="rect">
+            <a:avLst/>
+          </a:prstGeom>
+          <a:noFill/>
+        </p:spPr>
+        <p:txBody>
+          <a:bodyPr wrap="none" rtlCol="0">
+            <a:spAutoFit/>
+          </a:bodyPr>
+          <a:lstStyle/>
+          <a:p>
+            <a:r>
+              <a:rPr lang="de-DE" dirty="0"/>
+              <a:t>TODO: </a:t>
+            </a:r>
+            <a:r>
+              <a:rPr lang="de-DE" dirty="0" err="1"/>
+              <a:t>Lvl</a:t>
+            </a:r>
+            <a:r>
+              <a:rPr lang="de-DE" dirty="0"/>
+              <a:t> </a:t>
+            </a:r>
+            <a:r>
+              <a:rPr lang="de-DE" dirty="0" err="1"/>
+              <a:t>of</a:t>
+            </a:r>
+            <a:r>
+              <a:rPr lang="de-DE" dirty="0"/>
+              <a:t> </a:t>
+            </a:r>
+            <a:r>
+              <a:rPr lang="de-DE" dirty="0" err="1"/>
+              <a:t>detail</a:t>
+            </a:r>
+            <a:endParaRPr lang="de-DE" dirty="0"/>
           </a:p>
           <a:p>
             <a:endParaRPr lang="de-DE" dirty="0"/>
@@ -7133,7 +6642,7 @@
     </p:spTree>
     <p:extLst>
       <p:ext uri="{BB962C8B-B14F-4D97-AF65-F5344CB8AC3E}">
-        <p14:creationId xmlns:p14="http://schemas.microsoft.com/office/powerpoint/2010/main" val="230950608"/>
+        <p14:creationId xmlns:p14="http://schemas.microsoft.com/office/powerpoint/2010/main" val="4245088915"/>
       </p:ext>
     </p:extLst>
   </p:cSld>
@@ -7160,12 +6669,48 @@
           <a:chExt cx="0" cy="0"/>
         </a:xfrm>
       </p:grpSpPr>
+      <p:pic>
+        <p:nvPicPr>
+          <p:cNvPr id="6" name="Grafik 5">
+            <a:extLst>
+              <a:ext uri="{FF2B5EF4-FFF2-40B4-BE49-F238E27FC236}">
+                <a16:creationId xmlns:a16="http://schemas.microsoft.com/office/drawing/2014/main" id="{4469C369-49E9-461A-BAFF-8891E6308A5C}"/>
+              </a:ext>
+            </a:extLst>
+          </p:cNvPr>
+          <p:cNvPicPr>
+            <a:picLocks noChangeAspect="1"/>
+          </p:cNvPicPr>
+          <p:nvPr/>
+        </p:nvPicPr>
+        <p:blipFill>
+          <a:blip r:embed="rId3">
+            <a:extLst>
+              <a:ext uri="{28A0092B-C50C-407E-A947-70E740481C1C}">
+                <a14:useLocalDpi xmlns:a14="http://schemas.microsoft.com/office/drawing/2010/main" val="0"/>
+              </a:ext>
+            </a:extLst>
+          </a:blip>
+          <a:stretch>
+            <a:fillRect/>
+          </a:stretch>
+        </p:blipFill>
+        <p:spPr>
+          <a:xfrm>
+            <a:off x="4569533" y="171451"/>
+            <a:ext cx="4104456" cy="2657851"/>
+          </a:xfrm>
+          <a:prstGeom prst="rect">
+            <a:avLst/>
+          </a:prstGeom>
+        </p:spPr>
+      </p:pic>
       <p:sp>
         <p:nvSpPr>
           <p:cNvPr id="2" name="Inhaltsplatzhalter 1">
             <a:extLst>
               <a:ext uri="{FF2B5EF4-FFF2-40B4-BE49-F238E27FC236}">
-                <a16:creationId xmlns:a16="http://schemas.microsoft.com/office/drawing/2014/main" id="{29A63108-FAC2-4666-9DD5-69210B3791AB}"/>
+                <a16:creationId xmlns:a16="http://schemas.microsoft.com/office/drawing/2014/main" id="{03E2F95A-FF5F-4A94-AF44-F40BFD7C73DF}"/>
               </a:ext>
             </a:extLst>
           </p:cNvPr>
@@ -7178,99 +6723,55 @@
         </p:nvSpPr>
         <p:spPr/>
         <p:txBody>
-          <a:bodyPr>
-            <a:normAutofit lnSpcReduction="10000"/>
-          </a:bodyPr>
-          <a:lstStyle/>
-          <a:p>
-            <a:r>
-              <a:rPr lang="de-DE" dirty="0"/>
-              <a:t>Marc </a:t>
+          <a:bodyPr/>
+          <a:lstStyle/>
+          <a:p>
+            <a:r>
+              <a:rPr lang="de-DE" dirty="0"/>
+              <a:t>Visuelle Reize über das gesamte</a:t>
+            </a:r>
+            <a:br>
+              <a:rPr lang="de-DE" dirty="0"/>
+            </a:br>
+            <a:r>
+              <a:rPr lang="de-DE" dirty="0"/>
+              <a:t>Sehfeld</a:t>
+            </a:r>
+          </a:p>
+          <a:p>
+            <a:r>
+              <a:rPr lang="de-DE" dirty="0"/>
+              <a:t>Zwei Typen von </a:t>
             </a:r>
             <a:r>
               <a:rPr lang="de-DE" dirty="0" err="1"/>
-              <a:t>Levoy</a:t>
-            </a:r>
-            <a:r>
-              <a:rPr lang="de-DE" dirty="0"/>
-              <a:t> und Ross Whitaker</a:t>
-            </a:r>
+              <a:t>Photorezeptoren</a:t>
+            </a:r>
+            <a:endParaRPr lang="de-DE" dirty="0"/>
           </a:p>
           <a:p>
             <a:pPr lvl="1"/>
             <a:r>
               <a:rPr lang="de-DE" dirty="0"/>
-              <a:t>Wahrnehmungsorientiertes Echtzeit-Volumen-Rendering</a:t>
+              <a:t>(L- / M- / S-) Zapfen</a:t>
             </a:r>
           </a:p>
           <a:p>
             <a:pPr lvl="1"/>
             <a:r>
               <a:rPr lang="de-DE" dirty="0"/>
-              <a:t>Pixel-Planes 5 </a:t>
-            </a:r>
-            <a:r>
-              <a:rPr lang="de-DE" dirty="0" err="1"/>
-              <a:t>rendering</a:t>
-            </a:r>
-            <a:r>
-              <a:rPr lang="de-DE" dirty="0"/>
-              <a:t> </a:t>
-            </a:r>
-            <a:r>
-              <a:rPr lang="de-DE" dirty="0" err="1"/>
-              <a:t>engine</a:t>
-            </a:r>
+              <a:t>Stäbchen</a:t>
+            </a:r>
+          </a:p>
+          <a:p>
+            <a:r>
+              <a:rPr lang="de-DE" dirty="0"/>
+              <a:t>Stark abnehmende Sehschärfe nach außen hin</a:t>
+            </a:r>
+          </a:p>
+          <a:p>
             <a:endParaRPr lang="de-DE" dirty="0"/>
           </a:p>
-          <a:p>
-            <a:pPr lvl="1"/>
-            <a:r>
-              <a:rPr lang="de-DE" dirty="0"/>
-              <a:t>Reduzierung der Abtastrate in Bild- und Objektraum</a:t>
-            </a:r>
-          </a:p>
-          <a:p>
-            <a:pPr lvl="1"/>
-            <a:r>
-              <a:rPr lang="de-DE" dirty="0"/>
-              <a:t>Reduzierter Berechnungsaufwand vom Faktor fünf</a:t>
-            </a:r>
-          </a:p>
-          <a:p>
-            <a:r>
-              <a:rPr lang="de-DE" dirty="0"/>
-              <a:t>Guenter et al.</a:t>
-            </a:r>
-          </a:p>
-          <a:p>
-            <a:pPr lvl="1"/>
-            <a:r>
-              <a:rPr lang="de-DE" dirty="0"/>
-              <a:t>Wahrnehmungsorientierte Rasterisierung</a:t>
-            </a:r>
-          </a:p>
-          <a:p>
-            <a:pPr lvl="1"/>
-            <a:r>
-              <a:rPr lang="de-DE" dirty="0"/>
-              <a:t>Zusammensetzung des Bildes aus drei Teilbildern unterschiedlicher Auflösungen</a:t>
-            </a:r>
-          </a:p>
-          <a:p>
-            <a:pPr lvl="1"/>
-            <a:r>
-              <a:rPr lang="de-DE" dirty="0"/>
-              <a:t>Berechnung auf einer GPU</a:t>
-            </a:r>
-          </a:p>
-          <a:p>
-            <a:pPr lvl="1"/>
-            <a:r>
-              <a:rPr lang="de-DE" dirty="0"/>
-              <a:t>Reduzierter Berechnungsaufwand vom Faktor fünf bis sechs</a:t>
-            </a:r>
-          </a:p>
         </p:txBody>
       </p:sp>
       <p:sp>
@@ -7278,7 +6779,7 @@
           <p:cNvPr id="3" name="Foliennummernplatzhalter 2">
             <a:extLst>
               <a:ext uri="{FF2B5EF4-FFF2-40B4-BE49-F238E27FC236}">
-                <a16:creationId xmlns:a16="http://schemas.microsoft.com/office/drawing/2014/main" id="{86170DCA-A5C4-4910-8EA8-9EDF6826DE9A}"/>
+                <a16:creationId xmlns:a16="http://schemas.microsoft.com/office/drawing/2014/main" id="{F60E4C9B-6954-4091-BC19-C372021C00B5}"/>
               </a:ext>
             </a:extLst>
           </p:cNvPr>
@@ -7307,7 +6808,7 @@
           <p:cNvPr id="4" name="Titel 3">
             <a:extLst>
               <a:ext uri="{FF2B5EF4-FFF2-40B4-BE49-F238E27FC236}">
-                <a16:creationId xmlns:a16="http://schemas.microsoft.com/office/drawing/2014/main" id="{71E495D1-3095-46E9-A3B6-C767C8F884C0}"/>
+                <a16:creationId xmlns:a16="http://schemas.microsoft.com/office/drawing/2014/main" id="{AA74E259-D814-4B7E-B84C-89BAB4A9A3D9}"/>
               </a:ext>
             </a:extLst>
           </p:cNvPr>
@@ -7325,110 +6826,15 @@
           <a:p>
             <a:r>
               <a:rPr lang="de-DE" dirty="0"/>
-              <a:t>Verwandte Arbeiten</a:t>
-            </a:r>
-          </a:p>
-        </p:txBody>
-      </p:sp>
-      <p:sp>
-        <p:nvSpPr>
-          <p:cNvPr id="5" name="Textfeld 4">
-            <a:extLst>
-              <a:ext uri="{FF2B5EF4-FFF2-40B4-BE49-F238E27FC236}">
-                <a16:creationId xmlns:a16="http://schemas.microsoft.com/office/drawing/2014/main" id="{88F66C8A-8238-4B32-85AF-8C7B315CD1E8}"/>
-              </a:ext>
-            </a:extLst>
-          </p:cNvPr>
-          <p:cNvSpPr txBox="1"/>
-          <p:nvPr/>
-        </p:nvSpPr>
-        <p:spPr>
-          <a:xfrm>
-            <a:off x="5940152" y="699542"/>
-            <a:ext cx="1945982" cy="369332"/>
-          </a:xfrm>
-          <a:prstGeom prst="rect">
-            <a:avLst/>
-          </a:prstGeom>
-          <a:noFill/>
-        </p:spPr>
-        <p:txBody>
-          <a:bodyPr wrap="none" rtlCol="0">
-            <a:spAutoFit/>
-          </a:bodyPr>
-          <a:lstStyle/>
-          <a:p>
-            <a:r>
-              <a:rPr lang="de-DE"/>
-              <a:t>TODO: Jahreszahl</a:t>
-            </a:r>
-            <a:endParaRPr lang="de-DE" dirty="0"/>
-          </a:p>
-        </p:txBody>
-      </p:sp>
-      <p:sp>
-        <p:nvSpPr>
-          <p:cNvPr id="6" name="Textfeld 5">
-            <a:extLst>
-              <a:ext uri="{FF2B5EF4-FFF2-40B4-BE49-F238E27FC236}">
-                <a16:creationId xmlns:a16="http://schemas.microsoft.com/office/drawing/2014/main" id="{D8D9DA0F-8024-435F-A187-9EE47F434828}"/>
-              </a:ext>
-            </a:extLst>
-          </p:cNvPr>
-          <p:cNvSpPr txBox="1"/>
-          <p:nvPr/>
-        </p:nvSpPr>
-        <p:spPr>
-          <a:xfrm>
-            <a:off x="6500719" y="3806633"/>
-            <a:ext cx="2074222" cy="646331"/>
-          </a:xfrm>
-          <a:prstGeom prst="rect">
-            <a:avLst/>
-          </a:prstGeom>
-          <a:noFill/>
-        </p:spPr>
-        <p:txBody>
-          <a:bodyPr wrap="none" rtlCol="0">
-            <a:spAutoFit/>
-          </a:bodyPr>
-          <a:lstStyle/>
-          <a:p>
-            <a:r>
-              <a:rPr lang="de-DE" dirty="0"/>
-              <a:t>TODO: </a:t>
-            </a:r>
-            <a:r>
-              <a:rPr lang="de-DE" dirty="0" err="1"/>
-              <a:t>Lvl</a:t>
-            </a:r>
-            <a:r>
-              <a:rPr lang="de-DE" dirty="0"/>
-              <a:t> </a:t>
-            </a:r>
-            <a:r>
-              <a:rPr lang="de-DE" dirty="0" err="1"/>
-              <a:t>of</a:t>
-            </a:r>
-            <a:r>
-              <a:rPr lang="de-DE" dirty="0"/>
-              <a:t> </a:t>
-            </a:r>
-            <a:r>
-              <a:rPr lang="de-DE" dirty="0" err="1"/>
-              <a:t>detail</a:t>
-            </a:r>
-            <a:endParaRPr lang="de-DE" dirty="0"/>
-          </a:p>
-          <a:p>
-            <a:endParaRPr lang="de-DE" dirty="0"/>
+              <a:t>Sehapparat</a:t>
+            </a:r>
           </a:p>
         </p:txBody>
       </p:sp>
     </p:spTree>
     <p:extLst>
       <p:ext uri="{BB962C8B-B14F-4D97-AF65-F5344CB8AC3E}">
-        <p14:creationId xmlns:p14="http://schemas.microsoft.com/office/powerpoint/2010/main" val="4245088915"/>
+        <p14:creationId xmlns:p14="http://schemas.microsoft.com/office/powerpoint/2010/main" val="3126165385"/>
       </p:ext>
     </p:extLst>
   </p:cSld>
@@ -7457,10 +6863,10 @@
       </p:grpSpPr>
       <p:pic>
         <p:nvPicPr>
-          <p:cNvPr id="6" name="Grafik 5">
+          <p:cNvPr id="8" name="Grafik 7">
             <a:extLst>
               <a:ext uri="{FF2B5EF4-FFF2-40B4-BE49-F238E27FC236}">
-                <a16:creationId xmlns:a16="http://schemas.microsoft.com/office/drawing/2014/main" id="{4469C369-49E9-461A-BAFF-8891E6308A5C}"/>
+                <a16:creationId xmlns:a16="http://schemas.microsoft.com/office/drawing/2014/main" id="{865958EF-3179-4FCA-8B10-E64DB842EFCD}"/>
               </a:ext>
             </a:extLst>
           </p:cNvPr>
@@ -7483,8 +6889,8 @@
         </p:blipFill>
         <p:spPr>
           <a:xfrm>
-            <a:off x="4569533" y="171451"/>
-            <a:ext cx="4104456" cy="2657851"/>
+            <a:off x="3897465" y="493278"/>
+            <a:ext cx="4571429" cy="2571429"/>
           </a:xfrm>
           <a:prstGeom prst="rect">
             <a:avLst/>
@@ -7496,7 +6902,7 @@
           <p:cNvPr id="2" name="Inhaltsplatzhalter 1">
             <a:extLst>
               <a:ext uri="{FF2B5EF4-FFF2-40B4-BE49-F238E27FC236}">
-                <a16:creationId xmlns:a16="http://schemas.microsoft.com/office/drawing/2014/main" id="{03E2F95A-FF5F-4A94-AF44-F40BFD7C73DF}"/>
+                <a16:creationId xmlns:a16="http://schemas.microsoft.com/office/drawing/2014/main" id="{601F37B6-425C-4752-A762-D0805FBE3952}"/>
               </a:ext>
             </a:extLst>
           </p:cNvPr>
@@ -7507,56 +6913,83 @@
             <p:ph idx="1"/>
           </p:nvPr>
         </p:nvSpPr>
-        <p:spPr/>
-        <p:txBody>
-          <a:bodyPr/>
-          <a:lstStyle/>
-          <a:p>
-            <a:r>
-              <a:rPr lang="de-DE" dirty="0"/>
-              <a:t>Visuelle Reize über das gesamte</a:t>
-            </a:r>
-            <a:br>
-              <a:rPr lang="de-DE" dirty="0"/>
-            </a:br>
-            <a:r>
-              <a:rPr lang="de-DE" dirty="0"/>
-              <a:t>Sehfeld</a:t>
-            </a:r>
-          </a:p>
-          <a:p>
-            <a:r>
-              <a:rPr lang="de-DE" dirty="0"/>
-              <a:t>Zwei Typen von </a:t>
+        <p:spPr>
+          <a:xfrm>
+            <a:off x="251520" y="1202574"/>
+            <a:ext cx="8640960" cy="3400026"/>
+          </a:xfrm>
+        </p:spPr>
+        <p:txBody>
+          <a:bodyPr/>
+          <a:lstStyle/>
+          <a:p>
+            <a:r>
+              <a:rPr lang="de-DE" dirty="0"/>
+              <a:t>Wichtige Augenbewegungen</a:t>
+            </a:r>
+          </a:p>
+          <a:p>
+            <a:pPr lvl="1"/>
+            <a:r>
+              <a:rPr lang="de-DE" dirty="0"/>
+              <a:t>Fixation</a:t>
+            </a:r>
+          </a:p>
+          <a:p>
+            <a:pPr lvl="1"/>
+            <a:r>
+              <a:rPr lang="de-DE" dirty="0"/>
+              <a:t>Sakkade</a:t>
+            </a:r>
+          </a:p>
+          <a:p>
+            <a:r>
+              <a:rPr lang="de-DE" dirty="0"/>
+              <a:t>Fixation</a:t>
+            </a:r>
+          </a:p>
+          <a:p>
+            <a:pPr lvl="1"/>
+            <a:r>
+              <a:rPr lang="de-DE" dirty="0"/>
+              <a:t>Tritt zwischen Sakkaden auf, dauert ca. 100 </a:t>
             </a:r>
             <a:r>
               <a:rPr lang="de-DE" dirty="0" err="1"/>
-              <a:t>Photorezeptoren</a:t>
-            </a:r>
-            <a:endParaRPr lang="de-DE" dirty="0"/>
+              <a:t>ms</a:t>
+            </a:r>
+            <a:r>
+              <a:rPr lang="de-DE" dirty="0"/>
+              <a:t> – 1.5 s</a:t>
+            </a:r>
+          </a:p>
+          <a:p>
+            <a:r>
+              <a:rPr lang="de-DE" dirty="0"/>
+              <a:t>Sakkade</a:t>
+            </a:r>
           </a:p>
           <a:p>
             <a:pPr lvl="1"/>
             <a:r>
               <a:rPr lang="de-DE" dirty="0"/>
-              <a:t>(L- / M- / S-) Zapfen</a:t>
+              <a:t>Schnelle Springen zwischen Objekten von Interesse (</a:t>
+            </a:r>
+            <a:r>
+              <a:rPr lang="de-DE" dirty="0" err="1"/>
+              <a:t>OvI</a:t>
+            </a:r>
+            <a:r>
+              <a:rPr lang="de-DE" dirty="0"/>
+              <a:t>)</a:t>
             </a:r>
           </a:p>
           <a:p>
             <a:pPr lvl="1"/>
             <a:r>
               <a:rPr lang="de-DE" dirty="0"/>
-              <a:t>Stäbchen</a:t>
-            </a:r>
-          </a:p>
-          <a:p>
-            <a:r>
-              <a:rPr lang="de-DE" dirty="0"/>
-              <a:t>Stark abnehmende Sehschärfe nach außen hin</a:t>
-            </a:r>
-          </a:p>
-          <a:p>
-            <a:endParaRPr lang="de-DE" dirty="0"/>
+              <a:t>Ca. 2 bis 3 Sakkaden pro Sekunde</a:t>
+            </a:r>
           </a:p>
         </p:txBody>
       </p:sp>
@@ -7565,7 +6998,7 @@
           <p:cNvPr id="3" name="Foliennummernplatzhalter 2">
             <a:extLst>
               <a:ext uri="{FF2B5EF4-FFF2-40B4-BE49-F238E27FC236}">
-                <a16:creationId xmlns:a16="http://schemas.microsoft.com/office/drawing/2014/main" id="{F60E4C9B-6954-4091-BC19-C372021C00B5}"/>
+                <a16:creationId xmlns:a16="http://schemas.microsoft.com/office/drawing/2014/main" id="{5262D57D-AD8A-4A3C-8AD8-199751C9401F}"/>
               </a:ext>
             </a:extLst>
           </p:cNvPr>
@@ -7594,7 +7027,7 @@
           <p:cNvPr id="4" name="Titel 3">
             <a:extLst>
               <a:ext uri="{FF2B5EF4-FFF2-40B4-BE49-F238E27FC236}">
-                <a16:creationId xmlns:a16="http://schemas.microsoft.com/office/drawing/2014/main" id="{AA74E259-D814-4B7E-B84C-89BAB4A9A3D9}"/>
+                <a16:creationId xmlns:a16="http://schemas.microsoft.com/office/drawing/2014/main" id="{98479CE4-904E-4549-9861-E9F407130B51}"/>
               </a:ext>
             </a:extLst>
           </p:cNvPr>
@@ -7614,13 +7047,53 @@
               <a:rPr lang="de-DE" dirty="0"/>
               <a:t>Sehapparat</a:t>
             </a:r>
+          </a:p>
+        </p:txBody>
+      </p:sp>
+      <p:sp>
+        <p:nvSpPr>
+          <p:cNvPr id="5" name="Textfeld 4">
+            <a:extLst>
+              <a:ext uri="{FF2B5EF4-FFF2-40B4-BE49-F238E27FC236}">
+                <a16:creationId xmlns:a16="http://schemas.microsoft.com/office/drawing/2014/main" id="{E083EE23-CEDF-4C93-9079-364DE38770A5}"/>
+              </a:ext>
+            </a:extLst>
+          </p:cNvPr>
+          <p:cNvSpPr txBox="1"/>
+          <p:nvPr/>
+        </p:nvSpPr>
+        <p:spPr>
+          <a:xfrm>
+            <a:off x="4572000" y="3962620"/>
+            <a:ext cx="3755836" cy="369332"/>
+          </a:xfrm>
+          <a:prstGeom prst="rect">
+            <a:avLst/>
+          </a:prstGeom>
+          <a:noFill/>
+        </p:spPr>
+        <p:txBody>
+          <a:bodyPr wrap="none" rtlCol="0">
+            <a:spAutoFit/>
+          </a:bodyPr>
+          <a:lstStyle/>
+          <a:p>
+            <a:r>
+              <a:rPr lang="de-DE" dirty="0"/>
+              <a:t>TODO: Mit vorheriger Folie </a:t>
+            </a:r>
+            <a:r>
+              <a:rPr lang="de-DE" dirty="0" err="1"/>
+              <a:t>mergen</a:t>
+            </a:r>
+            <a:endParaRPr lang="de-DE" dirty="0"/>
           </a:p>
         </p:txBody>
       </p:sp>
     </p:spTree>
     <p:extLst>
       <p:ext uri="{BB962C8B-B14F-4D97-AF65-F5344CB8AC3E}">
-        <p14:creationId xmlns:p14="http://schemas.microsoft.com/office/powerpoint/2010/main" val="3126165385"/>
+        <p14:creationId xmlns:p14="http://schemas.microsoft.com/office/powerpoint/2010/main" val="1428651626"/>
       </p:ext>
     </p:extLst>
   </p:cSld>
@@ -7652,7 +7125,7 @@
           <p:cNvPr id="8" name="Grafik 7">
             <a:extLst>
               <a:ext uri="{FF2B5EF4-FFF2-40B4-BE49-F238E27FC236}">
-                <a16:creationId xmlns:a16="http://schemas.microsoft.com/office/drawing/2014/main" id="{865958EF-3179-4FCA-8B10-E64DB842EFCD}"/>
+                <a16:creationId xmlns:a16="http://schemas.microsoft.com/office/drawing/2014/main" id="{308FDB43-4A79-4A31-B41C-894ACC0E1EB9}"/>
               </a:ext>
             </a:extLst>
           </p:cNvPr>
@@ -7675,20 +7148,56 @@
         </p:blipFill>
         <p:spPr>
           <a:xfrm>
-            <a:off x="3897465" y="493278"/>
-            <a:ext cx="4571429" cy="2571429"/>
+            <a:off x="1331640" y="2302017"/>
+            <a:ext cx="2448272" cy="1807554"/>
           </a:xfrm>
           <a:prstGeom prst="rect">
             <a:avLst/>
           </a:prstGeom>
         </p:spPr>
       </p:pic>
+      <p:pic>
+        <p:nvPicPr>
+          <p:cNvPr id="6" name="Grafik 5">
+            <a:extLst>
+              <a:ext uri="{FF2B5EF4-FFF2-40B4-BE49-F238E27FC236}">
+                <a16:creationId xmlns:a16="http://schemas.microsoft.com/office/drawing/2014/main" id="{C10856B3-6AF0-478D-945A-1B6EF23EA8BC}"/>
+              </a:ext>
+            </a:extLst>
+          </p:cNvPr>
+          <p:cNvPicPr>
+            <a:picLocks noChangeAspect="1"/>
+          </p:cNvPicPr>
+          <p:nvPr/>
+        </p:nvPicPr>
+        <p:blipFill>
+          <a:blip r:embed="rId4">
+            <a:extLst>
+              <a:ext uri="{28A0092B-C50C-407E-A947-70E740481C1C}">
+                <a14:useLocalDpi xmlns:a14="http://schemas.microsoft.com/office/drawing/2010/main" val="0"/>
+              </a:ext>
+            </a:extLst>
+          </a:blip>
+          <a:stretch>
+            <a:fillRect/>
+          </a:stretch>
+        </p:blipFill>
+        <p:spPr>
+          <a:xfrm>
+            <a:off x="4421924" y="2427734"/>
+            <a:ext cx="3115906" cy="1347779"/>
+          </a:xfrm>
+          <a:prstGeom prst="rect">
+            <a:avLst/>
+          </a:prstGeom>
+        </p:spPr>
+      </p:pic>
       <p:sp>
         <p:nvSpPr>
           <p:cNvPr id="2" name="Inhaltsplatzhalter 1">
             <a:extLst>
               <a:ext uri="{FF2B5EF4-FFF2-40B4-BE49-F238E27FC236}">
-                <a16:creationId xmlns:a16="http://schemas.microsoft.com/office/drawing/2014/main" id="{601F37B6-425C-4752-A762-D0805FBE3952}"/>
+                <a16:creationId xmlns:a16="http://schemas.microsoft.com/office/drawing/2014/main" id="{47164020-CF31-4443-BFA4-7E8994FA03FF}"/>
               </a:ext>
             </a:extLst>
           </p:cNvPr>
@@ -7711,70 +7220,49 @@
           <a:p>
             <a:r>
               <a:rPr lang="de-DE" dirty="0"/>
-              <a:t>Wichtige Augenbewegungen</a:t>
+              <a:t>Dreidimensionales Bild</a:t>
+            </a:r>
+          </a:p>
+          <a:p>
+            <a:r>
+              <a:rPr lang="de-DE" dirty="0"/>
+              <a:t>Bestehend aus </a:t>
+            </a:r>
+            <a:r>
+              <a:rPr lang="de-DE" dirty="0" err="1"/>
+              <a:t>Voxel</a:t>
+            </a:r>
+            <a:r>
+              <a:rPr lang="de-DE" dirty="0"/>
+              <a:t> (statt Texel in 2D)</a:t>
             </a:r>
           </a:p>
           <a:p>
             <a:pPr lvl="1"/>
             <a:r>
               <a:rPr lang="de-DE" dirty="0"/>
-              <a:t>Fixation</a:t>
-            </a:r>
-          </a:p>
-          <a:p>
-            <a:pPr lvl="1"/>
-            <a:r>
-              <a:rPr lang="de-DE" dirty="0"/>
-              <a:t>Sakkade</a:t>
-            </a:r>
-          </a:p>
-          <a:p>
-            <a:r>
-              <a:rPr lang="de-DE" dirty="0"/>
-              <a:t>Fixation</a:t>
-            </a:r>
-          </a:p>
-          <a:p>
-            <a:pPr lvl="1"/>
-            <a:r>
-              <a:rPr lang="de-DE" dirty="0"/>
-              <a:t>Tritt zwischen Sakkaden auf, dauert ca. 100 </a:t>
-            </a:r>
-            <a:r>
-              <a:rPr lang="de-DE" dirty="0" err="1"/>
-              <a:t>ms</a:t>
-            </a:r>
-            <a:r>
-              <a:rPr lang="de-DE" dirty="0"/>
-              <a:t> – 1.5 s</a:t>
-            </a:r>
-          </a:p>
-          <a:p>
-            <a:r>
-              <a:rPr lang="de-DE" dirty="0"/>
-              <a:t>Sakkade</a:t>
-            </a:r>
-          </a:p>
-          <a:p>
-            <a:pPr lvl="1"/>
-            <a:r>
-              <a:rPr lang="de-DE" dirty="0"/>
-              <a:t>Schnelle Springen zwischen Objekten von Interesse (</a:t>
-            </a:r>
-            <a:r>
-              <a:rPr lang="de-DE" dirty="0" err="1"/>
-              <a:t>OvI</a:t>
-            </a:r>
-            <a:r>
-              <a:rPr lang="de-DE" dirty="0"/>
-              <a:t>)</a:t>
-            </a:r>
-          </a:p>
-          <a:p>
-            <a:pPr lvl="1"/>
-            <a:r>
-              <a:rPr lang="de-DE" dirty="0"/>
-              <a:t>Ca. 2 bis 3 Sakkaden pro Sekunde</a:t>
+              <a:t>Position, Ausdehnung, Dichte</a:t>
+            </a:r>
+          </a:p>
+          <a:p>
+            <a:endParaRPr lang="de-DE" dirty="0"/>
+          </a:p>
+          <a:p>
+            <a:endParaRPr lang="de-DE" dirty="0"/>
+          </a:p>
+          <a:p>
+            <a:endParaRPr lang="de-DE" dirty="0"/>
+          </a:p>
+          <a:p>
+            <a:endParaRPr lang="de-DE" dirty="0"/>
+          </a:p>
+          <a:p>
+            <a:endParaRPr lang="de-DE" dirty="0"/>
+          </a:p>
+          <a:p>
+            <a:r>
+              <a:rPr lang="de-DE" dirty="0"/>
+              <a:t>Transferfunktion bildet Dichtewerte auf Farbwerte ab</a:t>
             </a:r>
           </a:p>
         </p:txBody>
@@ -7784,7 +7272,7 @@
           <p:cNvPr id="3" name="Foliennummernplatzhalter 2">
             <a:extLst>
               <a:ext uri="{FF2B5EF4-FFF2-40B4-BE49-F238E27FC236}">
-                <a16:creationId xmlns:a16="http://schemas.microsoft.com/office/drawing/2014/main" id="{5262D57D-AD8A-4A3C-8AD8-199751C9401F}"/>
+                <a16:creationId xmlns:a16="http://schemas.microsoft.com/office/drawing/2014/main" id="{E1A60B08-78DE-4BA8-AC5F-B538049B5A74}"/>
               </a:ext>
             </a:extLst>
           </p:cNvPr>
@@ -7813,7 +7301,7 @@
           <p:cNvPr id="4" name="Titel 3">
             <a:extLst>
               <a:ext uri="{FF2B5EF4-FFF2-40B4-BE49-F238E27FC236}">
-                <a16:creationId xmlns:a16="http://schemas.microsoft.com/office/drawing/2014/main" id="{98479CE4-904E-4549-9861-E9F407130B51}"/>
+                <a16:creationId xmlns:a16="http://schemas.microsoft.com/office/drawing/2014/main" id="{AFCEDDE0-A366-4AC4-AF13-47343CE70889}"/>
               </a:ext>
             </a:extLst>
           </p:cNvPr>
@@ -7831,55 +7319,15 @@
           <a:p>
             <a:r>
               <a:rPr lang="de-DE" dirty="0"/>
-              <a:t>Sehapparat</a:t>
-            </a:r>
-          </a:p>
-        </p:txBody>
-      </p:sp>
-      <p:sp>
-        <p:nvSpPr>
-          <p:cNvPr id="5" name="Textfeld 4">
-            <a:extLst>
-              <a:ext uri="{FF2B5EF4-FFF2-40B4-BE49-F238E27FC236}">
-                <a16:creationId xmlns:a16="http://schemas.microsoft.com/office/drawing/2014/main" id="{E083EE23-CEDF-4C93-9079-364DE38770A5}"/>
-              </a:ext>
-            </a:extLst>
-          </p:cNvPr>
-          <p:cNvSpPr txBox="1"/>
-          <p:nvPr/>
-        </p:nvSpPr>
-        <p:spPr>
-          <a:xfrm>
-            <a:off x="4572000" y="3962620"/>
-            <a:ext cx="3755836" cy="369332"/>
-          </a:xfrm>
-          <a:prstGeom prst="rect">
-            <a:avLst/>
-          </a:prstGeom>
-          <a:noFill/>
-        </p:spPr>
-        <p:txBody>
-          <a:bodyPr wrap="none" rtlCol="0">
-            <a:spAutoFit/>
-          </a:bodyPr>
-          <a:lstStyle/>
-          <a:p>
-            <a:r>
-              <a:rPr lang="de-DE" dirty="0"/>
-              <a:t>TODO: Mit vorheriger Folie </a:t>
-            </a:r>
-            <a:r>
-              <a:rPr lang="de-DE" dirty="0" err="1"/>
-              <a:t>mergen</a:t>
-            </a:r>
-            <a:endParaRPr lang="de-DE" dirty="0"/>
+              <a:t>Volumenrendering</a:t>
+            </a:r>
           </a:p>
         </p:txBody>
       </p:sp>
     </p:spTree>
     <p:extLst>
       <p:ext uri="{BB962C8B-B14F-4D97-AF65-F5344CB8AC3E}">
-        <p14:creationId xmlns:p14="http://schemas.microsoft.com/office/powerpoint/2010/main" val="1428651626"/>
+        <p14:creationId xmlns:p14="http://schemas.microsoft.com/office/powerpoint/2010/main" val="773763030"/>
       </p:ext>
     </p:extLst>
   </p:cSld>
@@ -7906,12 +7354,97 @@
           <a:chExt cx="0" cy="0"/>
         </a:xfrm>
       </p:grpSpPr>
+      <p:sp>
+        <p:nvSpPr>
+          <p:cNvPr id="2" name="Inhaltsplatzhalter 1">
+            <a:extLst>
+              <a:ext uri="{FF2B5EF4-FFF2-40B4-BE49-F238E27FC236}">
+                <a16:creationId xmlns:a16="http://schemas.microsoft.com/office/drawing/2014/main" id="{92287F96-52E6-4087-ADAD-DA48F5DD37E8}"/>
+              </a:ext>
+            </a:extLst>
+          </p:cNvPr>
+          <p:cNvSpPr>
+            <a:spLocks noGrp="1"/>
+          </p:cNvSpPr>
+          <p:nvPr>
+            <p:ph idx="1"/>
+          </p:nvPr>
+        </p:nvSpPr>
+        <p:spPr/>
+        <p:txBody>
+          <a:bodyPr/>
+          <a:lstStyle/>
+          <a:p>
+            <a:r>
+              <a:rPr lang="de-DE" dirty="0"/>
+              <a:t>Unterschiedliche Transferfunktionen machen unterschiedliche Informationen des Volumens sichtbar</a:t>
+            </a:r>
+          </a:p>
+        </p:txBody>
+      </p:sp>
+      <p:sp>
+        <p:nvSpPr>
+          <p:cNvPr id="3" name="Foliennummernplatzhalter 2">
+            <a:extLst>
+              <a:ext uri="{FF2B5EF4-FFF2-40B4-BE49-F238E27FC236}">
+                <a16:creationId xmlns:a16="http://schemas.microsoft.com/office/drawing/2014/main" id="{4CAF63B8-3ECE-493C-9B79-1A5292EEF70A}"/>
+              </a:ext>
+            </a:extLst>
+          </p:cNvPr>
+          <p:cNvSpPr>
+            <a:spLocks noGrp="1"/>
+          </p:cNvSpPr>
+          <p:nvPr>
+            <p:ph type="sldNum" sz="quarter" idx="12"/>
+          </p:nvPr>
+        </p:nvSpPr>
+        <p:spPr/>
+        <p:txBody>
+          <a:bodyPr/>
+          <a:lstStyle/>
+          <a:p>
+            <a:fld id="{29AD3987-26BA-49DC-BA24-72731371DC9F}" type="slidenum">
+              <a:rPr lang="de-DE" smtClean="0"/>
+              <a:t>8</a:t>
+            </a:fld>
+            <a:endParaRPr lang="de-DE" dirty="0"/>
+          </a:p>
+        </p:txBody>
+      </p:sp>
+      <p:sp>
+        <p:nvSpPr>
+          <p:cNvPr id="4" name="Titel 3">
+            <a:extLst>
+              <a:ext uri="{FF2B5EF4-FFF2-40B4-BE49-F238E27FC236}">
+                <a16:creationId xmlns:a16="http://schemas.microsoft.com/office/drawing/2014/main" id="{9BB500FE-8952-45BE-A881-234A47F4B50E}"/>
+              </a:ext>
+            </a:extLst>
+          </p:cNvPr>
+          <p:cNvSpPr>
+            <a:spLocks noGrp="1"/>
+          </p:cNvSpPr>
+          <p:nvPr>
+            <p:ph type="title"/>
+          </p:nvPr>
+        </p:nvSpPr>
+        <p:spPr/>
+        <p:txBody>
+          <a:bodyPr/>
+          <a:lstStyle/>
+          <a:p>
+            <a:r>
+              <a:rPr lang="de-DE" dirty="0"/>
+              <a:t>Volumenrendering</a:t>
+            </a:r>
+          </a:p>
+        </p:txBody>
+      </p:sp>
       <p:pic>
         <p:nvPicPr>
-          <p:cNvPr id="8" name="Grafik 7">
+          <p:cNvPr id="5" name="Grafik 4">
             <a:extLst>
               <a:ext uri="{FF2B5EF4-FFF2-40B4-BE49-F238E27FC236}">
-                <a16:creationId xmlns:a16="http://schemas.microsoft.com/office/drawing/2014/main" id="{308FDB43-4A79-4A31-B41C-894ACC0E1EB9}"/>
+                <a16:creationId xmlns:a16="http://schemas.microsoft.com/office/drawing/2014/main" id="{3F3082C0-CA5E-4F25-96B4-7EC98ECADB5D}"/>
               </a:ext>
             </a:extLst>
           </p:cNvPr>
@@ -7920,22 +7453,21 @@
           </p:cNvPicPr>
           <p:nvPr/>
         </p:nvPicPr>
-        <p:blipFill>
-          <a:blip r:embed="rId3">
+        <p:blipFill rotWithShape="1">
+          <a:blip r:embed="rId2" cstate="print">
             <a:extLst>
               <a:ext uri="{28A0092B-C50C-407E-A947-70E740481C1C}">
                 <a14:useLocalDpi xmlns:a14="http://schemas.microsoft.com/office/drawing/2010/main" val="0"/>
               </a:ext>
             </a:extLst>
           </a:blip>
-          <a:stretch>
-            <a:fillRect/>
-          </a:stretch>
+          <a:srcRect l="11911" t="-4498" r="24708" b="2148"/>
+          <a:stretch/>
         </p:blipFill>
         <p:spPr>
           <a:xfrm>
-            <a:off x="1331640" y="2302017"/>
-            <a:ext cx="2448272" cy="1807554"/>
+            <a:off x="971600" y="1793264"/>
+            <a:ext cx="3240360" cy="3019834"/>
           </a:xfrm>
           <a:prstGeom prst="rect">
             <a:avLst/>
@@ -7947,7 +7479,7 @@
           <p:cNvPr id="6" name="Grafik 5">
             <a:extLst>
               <a:ext uri="{FF2B5EF4-FFF2-40B4-BE49-F238E27FC236}">
-                <a16:creationId xmlns:a16="http://schemas.microsoft.com/office/drawing/2014/main" id="{C10856B3-6AF0-478D-945A-1B6EF23EA8BC}"/>
+                <a16:creationId xmlns:a16="http://schemas.microsoft.com/office/drawing/2014/main" id="{615A0C70-4517-4417-9203-44398BDF654F}"/>
               </a:ext>
             </a:extLst>
           </p:cNvPr>
@@ -7956,22 +7488,21 @@
           </p:cNvPicPr>
           <p:nvPr/>
         </p:nvPicPr>
-        <p:blipFill>
-          <a:blip r:embed="rId4">
+        <p:blipFill rotWithShape="1">
+          <a:blip r:embed="rId3" cstate="print">
             <a:extLst>
               <a:ext uri="{28A0092B-C50C-407E-A947-70E740481C1C}">
                 <a14:useLocalDpi xmlns:a14="http://schemas.microsoft.com/office/drawing/2010/main" val="0"/>
               </a:ext>
             </a:extLst>
           </a:blip>
-          <a:stretch>
-            <a:fillRect/>
-          </a:stretch>
+          <a:srcRect l="16901" t="2673" r="19718"/>
+          <a:stretch/>
         </p:blipFill>
         <p:spPr>
           <a:xfrm>
-            <a:off x="4421924" y="2427734"/>
-            <a:ext cx="3115906" cy="1347779"/>
+            <a:off x="5038369" y="1941410"/>
+            <a:ext cx="3240360" cy="2871688"/>
           </a:xfrm>
           <a:prstGeom prst="rect">
             <a:avLst/>
@@ -7980,140 +7511,72 @@
       </p:pic>
       <p:sp>
         <p:nvSpPr>
-          <p:cNvPr id="2" name="Inhaltsplatzhalter 1">
+          <p:cNvPr id="7" name="Textfeld 6">
             <a:extLst>
               <a:ext uri="{FF2B5EF4-FFF2-40B4-BE49-F238E27FC236}">
-                <a16:creationId xmlns:a16="http://schemas.microsoft.com/office/drawing/2014/main" id="{47164020-CF31-4443-BFA4-7E8994FA03FF}"/>
+                <a16:creationId xmlns:a16="http://schemas.microsoft.com/office/drawing/2014/main" id="{E6122153-11F3-4D94-922C-6498122D542F}"/>
               </a:ext>
             </a:extLst>
           </p:cNvPr>
-          <p:cNvSpPr>
-            <a:spLocks noGrp="1"/>
-          </p:cNvSpPr>
-          <p:nvPr>
-            <p:ph idx="1"/>
-          </p:nvPr>
+          <p:cNvSpPr txBox="1"/>
+          <p:nvPr/>
         </p:nvSpPr>
         <p:spPr>
           <a:xfrm>
-            <a:off x="251520" y="1202574"/>
-            <a:ext cx="8640960" cy="3400026"/>
+            <a:off x="4792623" y="1913018"/>
+            <a:ext cx="4113242" cy="923330"/>
           </a:xfrm>
+          <a:prstGeom prst="rect">
+            <a:avLst/>
+          </a:prstGeom>
+          <a:noFill/>
         </p:spPr>
         <p:txBody>
-          <a:bodyPr/>
-          <a:lstStyle/>
-          <a:p>
-            <a:r>
-              <a:rPr lang="de-DE" dirty="0"/>
-              <a:t>Dreidimensionales Bild</a:t>
-            </a:r>
-          </a:p>
-          <a:p>
-            <a:r>
-              <a:rPr lang="de-DE" dirty="0"/>
-              <a:t>Bestehend aus </a:t>
-            </a:r>
+          <a:bodyPr wrap="none" rtlCol="0">
+            <a:spAutoFit/>
+          </a:bodyPr>
+          <a:lstStyle/>
+          <a:p>
             <a:r>
               <a:rPr lang="de-DE" dirty="0" err="1"/>
-              <a:t>Voxel</a:t>
-            </a:r>
-            <a:r>
-              <a:rPr lang="de-DE" dirty="0"/>
-              <a:t> (statt Texel in 2D)</a:t>
-            </a:r>
-          </a:p>
-          <a:p>
-            <a:pPr lvl="1"/>
-            <a:r>
-              <a:rPr lang="de-DE" dirty="0"/>
-              <a:t>Position, Ausdehnung, Dichte</a:t>
+              <a:t>Pre</a:t>
+            </a:r>
+            <a:r>
+              <a:rPr lang="de-DE" dirty="0"/>
+              <a:t>- vs. </a:t>
+            </a:r>
+            <a:r>
+              <a:rPr lang="de-DE" dirty="0" err="1"/>
+              <a:t>Postclassification</a:t>
+            </a:r>
+            <a:r>
+              <a:rPr lang="de-DE" dirty="0"/>
+              <a:t>.</a:t>
+            </a:r>
+          </a:p>
+          <a:p>
+            <a:r>
+              <a:rPr lang="de-DE" dirty="0"/>
+              <a:t>Hier: </a:t>
+            </a:r>
+            <a:r>
+              <a:rPr lang="de-DE" dirty="0" err="1"/>
+              <a:t>pre-classification</a:t>
+            </a:r>
+            <a:r>
+              <a:rPr lang="de-DE" dirty="0"/>
+              <a:t> (eig. Schlechter)</a:t>
             </a:r>
           </a:p>
           <a:p>
             <a:endParaRPr lang="de-DE" dirty="0"/>
-          </a:p>
-          <a:p>
-            <a:endParaRPr lang="de-DE" dirty="0"/>
-          </a:p>
-          <a:p>
-            <a:endParaRPr lang="de-DE" dirty="0"/>
-          </a:p>
-          <a:p>
-            <a:endParaRPr lang="de-DE" dirty="0"/>
-          </a:p>
-          <a:p>
-            <a:endParaRPr lang="de-DE" dirty="0"/>
-          </a:p>
-          <a:p>
-            <a:r>
-              <a:rPr lang="de-DE" dirty="0"/>
-              <a:t>Transferfunktion bildet Dichtewerte auf Farbwerte ab</a:t>
-            </a:r>
-          </a:p>
-        </p:txBody>
-      </p:sp>
-      <p:sp>
-        <p:nvSpPr>
-          <p:cNvPr id="3" name="Foliennummernplatzhalter 2">
-            <a:extLst>
-              <a:ext uri="{FF2B5EF4-FFF2-40B4-BE49-F238E27FC236}">
-                <a16:creationId xmlns:a16="http://schemas.microsoft.com/office/drawing/2014/main" id="{E1A60B08-78DE-4BA8-AC5F-B538049B5A74}"/>
-              </a:ext>
-            </a:extLst>
-          </p:cNvPr>
-          <p:cNvSpPr>
-            <a:spLocks noGrp="1"/>
-          </p:cNvSpPr>
-          <p:nvPr>
-            <p:ph type="sldNum" sz="quarter" idx="12"/>
-          </p:nvPr>
-        </p:nvSpPr>
-        <p:spPr/>
-        <p:txBody>
-          <a:bodyPr/>
-          <a:lstStyle/>
-          <a:p>
-            <a:fld id="{29AD3987-26BA-49DC-BA24-72731371DC9F}" type="slidenum">
-              <a:rPr lang="de-DE" smtClean="0"/>
-              <a:t>8</a:t>
-            </a:fld>
-            <a:endParaRPr lang="de-DE" dirty="0"/>
-          </a:p>
-        </p:txBody>
-      </p:sp>
-      <p:sp>
-        <p:nvSpPr>
-          <p:cNvPr id="4" name="Titel 3">
-            <a:extLst>
-              <a:ext uri="{FF2B5EF4-FFF2-40B4-BE49-F238E27FC236}">
-                <a16:creationId xmlns:a16="http://schemas.microsoft.com/office/drawing/2014/main" id="{AFCEDDE0-A366-4AC4-AF13-47343CE70889}"/>
-              </a:ext>
-            </a:extLst>
-          </p:cNvPr>
-          <p:cNvSpPr>
-            <a:spLocks noGrp="1"/>
-          </p:cNvSpPr>
-          <p:nvPr>
-            <p:ph type="title"/>
-          </p:nvPr>
-        </p:nvSpPr>
-        <p:spPr/>
-        <p:txBody>
-          <a:bodyPr/>
-          <a:lstStyle/>
-          <a:p>
-            <a:r>
-              <a:rPr lang="de-DE" dirty="0"/>
-              <a:t>Volumenrendering</a:t>
-            </a:r>
           </a:p>
         </p:txBody>
       </p:sp>
     </p:spTree>
     <p:extLst>
       <p:ext uri="{BB962C8B-B14F-4D97-AF65-F5344CB8AC3E}">
-        <p14:creationId xmlns:p14="http://schemas.microsoft.com/office/powerpoint/2010/main" val="773763030"/>
+        <p14:creationId xmlns:p14="http://schemas.microsoft.com/office/powerpoint/2010/main" val="3273524817"/>
       </p:ext>
     </p:extLst>
   </p:cSld>
@@ -8145,7 +7608,7 @@
           <p:cNvPr id="2" name="Inhaltsplatzhalter 1">
             <a:extLst>
               <a:ext uri="{FF2B5EF4-FFF2-40B4-BE49-F238E27FC236}">
-                <a16:creationId xmlns:a16="http://schemas.microsoft.com/office/drawing/2014/main" id="{92287F96-52E6-4087-ADAD-DA48F5DD37E8}"/>
+                <a16:creationId xmlns:a16="http://schemas.microsoft.com/office/drawing/2014/main" id="{C62841FF-ED95-410A-A44C-4CD3F18EDF65}"/>
               </a:ext>
             </a:extLst>
           </p:cNvPr>
@@ -8163,8 +7626,42 @@
           <a:p>
             <a:r>
               <a:rPr lang="de-DE" dirty="0"/>
-              <a:t>Unterschiedliche Transferfunktionen machen unterschiedliche Informationen des Volumens sichtbar</a:t>
-            </a:r>
+              <a:t>Informationen über Blickposition und –verlauf</a:t>
+            </a:r>
+          </a:p>
+          <a:p>
+            <a:r>
+              <a:rPr lang="de-DE" dirty="0"/>
+              <a:t>Augenposition in 3D und auf dem Bildschirm</a:t>
+            </a:r>
+          </a:p>
+          <a:p>
+            <a:r>
+              <a:rPr lang="de-DE" dirty="0" err="1"/>
+              <a:t>Tobii</a:t>
+            </a:r>
+            <a:r>
+              <a:rPr lang="de-DE" dirty="0"/>
+              <a:t> Pro </a:t>
+            </a:r>
+            <a:r>
+              <a:rPr lang="de-DE" dirty="0" err="1"/>
+              <a:t>Spectrum</a:t>
+            </a:r>
+            <a:r>
+              <a:rPr lang="de-DE" dirty="0"/>
+              <a:t> Eyetracker</a:t>
+            </a:r>
+          </a:p>
+          <a:p>
+            <a:pPr lvl="1"/>
+            <a:r>
+              <a:rPr lang="de-DE" dirty="0"/>
+              <a:t>1200 Hz</a:t>
+            </a:r>
+          </a:p>
+          <a:p>
+            <a:endParaRPr lang="de-DE" dirty="0"/>
           </a:p>
         </p:txBody>
       </p:sp>
@@ -8173,7 +7670,7 @@
           <p:cNvPr id="3" name="Foliennummernplatzhalter 2">
             <a:extLst>
               <a:ext uri="{FF2B5EF4-FFF2-40B4-BE49-F238E27FC236}">
-                <a16:creationId xmlns:a16="http://schemas.microsoft.com/office/drawing/2014/main" id="{4CAF63B8-3ECE-493C-9B79-1A5292EEF70A}"/>
+                <a16:creationId xmlns:a16="http://schemas.microsoft.com/office/drawing/2014/main" id="{603903D2-F9DC-4D39-B875-B0D05A83EBC9}"/>
               </a:ext>
             </a:extLst>
           </p:cNvPr>
@@ -8202,7 +7699,7 @@
           <p:cNvPr id="4" name="Titel 3">
             <a:extLst>
               <a:ext uri="{FF2B5EF4-FFF2-40B4-BE49-F238E27FC236}">
-                <a16:creationId xmlns:a16="http://schemas.microsoft.com/office/drawing/2014/main" id="{9BB500FE-8952-45BE-A881-234A47F4B50E}"/>
+                <a16:creationId xmlns:a16="http://schemas.microsoft.com/office/drawing/2014/main" id="{967B9506-C4D3-48E3-83E9-BC865F3F5D31}"/>
               </a:ext>
             </a:extLst>
           </p:cNvPr>
@@ -8220,17 +7717,17 @@
           <a:p>
             <a:r>
               <a:rPr lang="de-DE" dirty="0"/>
-              <a:t>Volumenrendering</a:t>
+              <a:t>Eyetracking</a:t>
             </a:r>
           </a:p>
         </p:txBody>
       </p:sp>
       <p:pic>
         <p:nvPicPr>
-          <p:cNvPr id="5" name="Grafik 4">
+          <p:cNvPr id="6" name="Grafik 5">
             <a:extLst>
               <a:ext uri="{FF2B5EF4-FFF2-40B4-BE49-F238E27FC236}">
-                <a16:creationId xmlns:a16="http://schemas.microsoft.com/office/drawing/2014/main" id="{3F3082C0-CA5E-4F25-96B4-7EC98ECADB5D}"/>
+                <a16:creationId xmlns:a16="http://schemas.microsoft.com/office/drawing/2014/main" id="{12E546CC-A99D-4E2B-BB8B-BC70ECA926F1}"/>
               </a:ext>
             </a:extLst>
           </p:cNvPr>
@@ -8240,20 +7737,20 @@
           <p:nvPr/>
         </p:nvPicPr>
         <p:blipFill rotWithShape="1">
-          <a:blip r:embed="rId2" cstate="print">
+          <a:blip r:embed="rId3" cstate="print">
             <a:extLst>
               <a:ext uri="{28A0092B-C50C-407E-A947-70E740481C1C}">
                 <a14:useLocalDpi xmlns:a14="http://schemas.microsoft.com/office/drawing/2010/main" val="0"/>
               </a:ext>
             </a:extLst>
           </a:blip>
-          <a:srcRect l="11911" t="-4498" r="24708" b="2148"/>
+          <a:srcRect l="36219" t="2551" r="36219" b="2551"/>
           <a:stretch/>
         </p:blipFill>
         <p:spPr>
           <a:xfrm>
-            <a:off x="971600" y="1793264"/>
-            <a:ext cx="3240360" cy="3019834"/>
+            <a:off x="6080212" y="333363"/>
+            <a:ext cx="1789656" cy="2054991"/>
           </a:xfrm>
           <a:prstGeom prst="rect">
             <a:avLst/>
@@ -8262,10 +7759,10 @@
       </p:pic>
       <p:pic>
         <p:nvPicPr>
-          <p:cNvPr id="6" name="Grafik 5">
+          <p:cNvPr id="9" name="Grafik 8">
             <a:extLst>
               <a:ext uri="{FF2B5EF4-FFF2-40B4-BE49-F238E27FC236}">
-                <a16:creationId xmlns:a16="http://schemas.microsoft.com/office/drawing/2014/main" id="{615A0C70-4517-4417-9203-44398BDF654F}"/>
+                <a16:creationId xmlns:a16="http://schemas.microsoft.com/office/drawing/2014/main" id="{3643476E-66C6-4A2D-BAE6-00252FCFDDC4}"/>
               </a:ext>
             </a:extLst>
           </p:cNvPr>
@@ -8274,95 +7771,68 @@
           </p:cNvPicPr>
           <p:nvPr/>
         </p:nvPicPr>
-        <p:blipFill rotWithShape="1">
-          <a:blip r:embed="rId3" cstate="print">
+        <p:blipFill>
+          <a:blip r:embed="rId4" cstate="print">
             <a:extLst>
               <a:ext uri="{28A0092B-C50C-407E-A947-70E740481C1C}">
                 <a14:useLocalDpi xmlns:a14="http://schemas.microsoft.com/office/drawing/2010/main" val="0"/>
               </a:ext>
             </a:extLst>
           </a:blip>
-          <a:srcRect l="16901" t="2673" r="19718"/>
-          <a:stretch/>
+          <a:stretch>
+            <a:fillRect/>
+          </a:stretch>
         </p:blipFill>
         <p:spPr>
           <a:xfrm>
-            <a:off x="5038369" y="1941410"/>
-            <a:ext cx="3240360" cy="2871688"/>
+            <a:off x="755576" y="2897845"/>
+            <a:ext cx="2879466" cy="1619699"/>
           </a:xfrm>
           <a:prstGeom prst="rect">
             <a:avLst/>
           </a:prstGeom>
         </p:spPr>
       </p:pic>
-      <p:sp>
-        <p:nvSpPr>
-          <p:cNvPr id="7" name="Textfeld 6">
+      <p:pic>
+        <p:nvPicPr>
+          <p:cNvPr id="11" name="Grafik 10">
             <a:extLst>
               <a:ext uri="{FF2B5EF4-FFF2-40B4-BE49-F238E27FC236}">
-                <a16:creationId xmlns:a16="http://schemas.microsoft.com/office/drawing/2014/main" id="{E6122153-11F3-4D94-922C-6498122D542F}"/>
+                <a16:creationId xmlns:a16="http://schemas.microsoft.com/office/drawing/2014/main" id="{BD30F8EE-801F-41F2-B1EA-BC20237AA6F4}"/>
               </a:ext>
             </a:extLst>
           </p:cNvPr>
-          <p:cNvSpPr txBox="1"/>
+          <p:cNvPicPr>
+            <a:picLocks noChangeAspect="1"/>
+          </p:cNvPicPr>
           <p:nvPr/>
-        </p:nvSpPr>
+        </p:nvPicPr>
+        <p:blipFill>
+          <a:blip r:embed="rId5" cstate="print">
+            <a:extLst>
+              <a:ext uri="{28A0092B-C50C-407E-A947-70E740481C1C}">
+                <a14:useLocalDpi xmlns:a14="http://schemas.microsoft.com/office/drawing/2010/main" val="0"/>
+              </a:ext>
+            </a:extLst>
+          </a:blip>
+          <a:stretch>
+            <a:fillRect/>
+          </a:stretch>
+        </p:blipFill>
         <p:spPr>
           <a:xfrm>
-            <a:off x="4792623" y="1913018"/>
-            <a:ext cx="4113242" cy="923330"/>
+            <a:off x="4283968" y="2500307"/>
+            <a:ext cx="3585900" cy="2285689"/>
           </a:xfrm>
           <a:prstGeom prst="rect">
             <a:avLst/>
           </a:prstGeom>
-          <a:noFill/>
         </p:spPr>
-        <p:txBody>
-          <a:bodyPr wrap="none" rtlCol="0">
-            <a:spAutoFit/>
-          </a:bodyPr>
-          <a:lstStyle/>
-          <a:p>
-            <a:r>
-              <a:rPr lang="de-DE" dirty="0" err="1"/>
-              <a:t>Pre</a:t>
-            </a:r>
-            <a:r>
-              <a:rPr lang="de-DE" dirty="0"/>
-              <a:t>- vs. </a:t>
-            </a:r>
-            <a:r>
-              <a:rPr lang="de-DE" dirty="0" err="1"/>
-              <a:t>Postclassification</a:t>
-            </a:r>
-            <a:r>
-              <a:rPr lang="de-DE" dirty="0"/>
-              <a:t>.</a:t>
-            </a:r>
-          </a:p>
-          <a:p>
-            <a:r>
-              <a:rPr lang="de-DE" dirty="0"/>
-              <a:t>Hier: </a:t>
-            </a:r>
-            <a:r>
-              <a:rPr lang="de-DE" dirty="0" err="1"/>
-              <a:t>pre-classification</a:t>
-            </a:r>
-            <a:r>
-              <a:rPr lang="de-DE" dirty="0"/>
-              <a:t> (eig. Schlechter)</a:t>
-            </a:r>
-          </a:p>
-          <a:p>
-            <a:endParaRPr lang="de-DE" dirty="0"/>
-          </a:p>
-        </p:txBody>
-      </p:sp>
+      </p:pic>
     </p:spTree>
     <p:extLst>
       <p:ext uri="{BB962C8B-B14F-4D97-AF65-F5344CB8AC3E}">
-        <p14:creationId xmlns:p14="http://schemas.microsoft.com/office/powerpoint/2010/main" val="3273524817"/>
+        <p14:creationId xmlns:p14="http://schemas.microsoft.com/office/powerpoint/2010/main" val="1763769228"/>
       </p:ext>
     </p:extLst>
   </p:cSld>

</xml_diff>

<commit_message>
Vortrag: Verwandte Arbeiten angepasst und mit Bildern ergänzt.
</commit_message>
<xml_diff>
--- a/Dokumente/Vortrag/Wahrnehmungsorientiertes_Volumen-Rendering.pptx
+++ b/Dokumente/Vortrag/Wahrnehmungsorientiertes_Volumen-Rendering.pptx
@@ -6393,7 +6393,7 @@
         <p:spPr/>
         <p:txBody>
           <a:bodyPr>
-            <a:normAutofit lnSpcReduction="10000"/>
+            <a:normAutofit fontScale="92500" lnSpcReduction="20000"/>
           </a:bodyPr>
           <a:lstStyle/>
           <a:p>
@@ -6407,14 +6407,21 @@
             </a:r>
             <a:r>
               <a:rPr lang="de-DE" dirty="0"/>
-              <a:t> und Ross Whitaker</a:t>
+              <a:t> und Ross Whitaker, 1989</a:t>
             </a:r>
           </a:p>
           <a:p>
             <a:pPr lvl="1"/>
             <a:r>
               <a:rPr lang="de-DE" dirty="0"/>
-              <a:t>Wahrnehmungsorientiertes Echtzeit-Volumen-Rendering</a:t>
+              <a:t>Wahrnehmungsorientiertes </a:t>
+            </a:r>
+            <a:br>
+              <a:rPr lang="de-DE" dirty="0"/>
+            </a:br>
+            <a:r>
+              <a:rPr lang="de-DE" dirty="0"/>
+              <a:t>Echtzeit-Volumen-Rendering</a:t>
             </a:r>
           </a:p>
           <a:p>
@@ -6441,20 +6448,20 @@
             <a:pPr lvl="1"/>
             <a:r>
               <a:rPr lang="de-DE" dirty="0"/>
-              <a:t>Reduzierung der Abtastrate in Bild- und Objektraum</a:t>
+              <a:t>Reduzierung in Bild- und Objektraum</a:t>
             </a:r>
           </a:p>
           <a:p>
             <a:pPr lvl="1"/>
             <a:r>
               <a:rPr lang="de-DE" dirty="0"/>
-              <a:t>Reduzierter Berechnungsaufwand vom Faktor fünf</a:t>
-            </a:r>
-          </a:p>
-          <a:p>
-            <a:r>
-              <a:rPr lang="de-DE" dirty="0"/>
-              <a:t>Guenter et al.</a:t>
+              <a:t>Faktor fünf</a:t>
+            </a:r>
+          </a:p>
+          <a:p>
+            <a:r>
+              <a:rPr lang="de-DE" dirty="0"/>
+              <a:t>Guenter et al., 2012</a:t>
             </a:r>
           </a:p>
           <a:p>
@@ -6468,21 +6475,35 @@
             <a:pPr lvl="1"/>
             <a:r>
               <a:rPr lang="de-DE" dirty="0"/>
-              <a:t>Zusammensetzung des Bildes aus drei Teilbildern unterschiedlicher Auflösungen</a:t>
+              <a:t>Zusammensetzung aus 3 Teilbildern </a:t>
+            </a:r>
+          </a:p>
+          <a:p>
+            <a:pPr lvl="2"/>
+            <a:r>
+              <a:rPr lang="de-DE" dirty="0"/>
+              <a:t>unterschiedliche Auflösungen </a:t>
+            </a:r>
+            <a:br>
+              <a:rPr lang="de-DE" dirty="0"/>
+            </a:br>
+            <a:r>
+              <a:rPr lang="de-DE" dirty="0"/>
+              <a:t>und geometrischen Detailgraden</a:t>
             </a:r>
           </a:p>
           <a:p>
             <a:pPr lvl="1"/>
             <a:r>
               <a:rPr lang="de-DE" dirty="0"/>
-              <a:t>Berechnung auf einer GPU</a:t>
+              <a:t>GPU</a:t>
             </a:r>
           </a:p>
           <a:p>
             <a:pPr lvl="1"/>
             <a:r>
               <a:rPr lang="de-DE" dirty="0"/>
-              <a:t>Reduzierter Berechnungsaufwand vom Faktor fünf bis sechs</a:t>
+              <a:t>Faktor fünf bis sechs</a:t>
             </a:r>
           </a:p>
         </p:txBody>
@@ -6544,101 +6565,72 @@
           </a:p>
         </p:txBody>
       </p:sp>
-      <p:sp>
-        <p:nvSpPr>
-          <p:cNvPr id="5" name="Textfeld 4">
+      <p:pic>
+        <p:nvPicPr>
+          <p:cNvPr id="7" name="Grafik 6">
             <a:extLst>
               <a:ext uri="{FF2B5EF4-FFF2-40B4-BE49-F238E27FC236}">
-                <a16:creationId xmlns:a16="http://schemas.microsoft.com/office/drawing/2014/main" id="{88F66C8A-8238-4B32-85AF-8C7B315CD1E8}"/>
+                <a16:creationId xmlns:a16="http://schemas.microsoft.com/office/drawing/2014/main" id="{11CB185C-D70C-4933-88EE-97E0A463F707}"/>
               </a:ext>
             </a:extLst>
           </p:cNvPr>
-          <p:cNvSpPr txBox="1"/>
+          <p:cNvPicPr>
+            <a:picLocks noChangeAspect="1"/>
+          </p:cNvPicPr>
           <p:nvPr/>
-        </p:nvSpPr>
+        </p:nvPicPr>
+        <p:blipFill>
+          <a:blip r:embed="rId3"/>
+          <a:stretch>
+            <a:fillRect/>
+          </a:stretch>
+        </p:blipFill>
         <p:spPr>
           <a:xfrm>
-            <a:off x="5940152" y="699542"/>
-            <a:ext cx="1945982" cy="369332"/>
+            <a:off x="5490052" y="234218"/>
+            <a:ext cx="3061655" cy="2388248"/>
           </a:xfrm>
           <a:prstGeom prst="rect">
             <a:avLst/>
           </a:prstGeom>
-          <a:noFill/>
         </p:spPr>
-        <p:txBody>
-          <a:bodyPr wrap="none" rtlCol="0">
-            <a:spAutoFit/>
-          </a:bodyPr>
-          <a:lstStyle/>
-          <a:p>
-            <a:r>
-              <a:rPr lang="de-DE"/>
-              <a:t>TODO: Jahreszahl</a:t>
-            </a:r>
-            <a:endParaRPr lang="de-DE" dirty="0"/>
-          </a:p>
-        </p:txBody>
-      </p:sp>
-      <p:sp>
-        <p:nvSpPr>
-          <p:cNvPr id="6" name="Textfeld 5">
+      </p:pic>
+      <p:pic>
+        <p:nvPicPr>
+          <p:cNvPr id="9" name="Grafik 8">
             <a:extLst>
               <a:ext uri="{FF2B5EF4-FFF2-40B4-BE49-F238E27FC236}">
-                <a16:creationId xmlns:a16="http://schemas.microsoft.com/office/drawing/2014/main" id="{D8D9DA0F-8024-435F-A187-9EE47F434828}"/>
+                <a16:creationId xmlns:a16="http://schemas.microsoft.com/office/drawing/2014/main" id="{37700C20-56BB-4FC8-B5F3-3717490FCF40}"/>
               </a:ext>
             </a:extLst>
           </p:cNvPr>
-          <p:cNvSpPr txBox="1"/>
+          <p:cNvPicPr>
+            <a:picLocks noChangeAspect="1"/>
+          </p:cNvPicPr>
           <p:nvPr/>
-        </p:nvSpPr>
+        </p:nvPicPr>
+        <p:blipFill>
+          <a:blip r:embed="rId4">
+            <a:extLst>
+              <a:ext uri="{28A0092B-C50C-407E-A947-70E740481C1C}">
+                <a14:useLocalDpi xmlns:a14="http://schemas.microsoft.com/office/drawing/2010/main" val="0"/>
+              </a:ext>
+            </a:extLst>
+          </a:blip>
+          <a:stretch>
+            <a:fillRect/>
+          </a:stretch>
+        </p:blipFill>
         <p:spPr>
           <a:xfrm>
-            <a:off x="6500719" y="3806633"/>
-            <a:ext cx="2074222" cy="646331"/>
+            <a:off x="5508104" y="2549564"/>
+            <a:ext cx="3043603" cy="2396704"/>
           </a:xfrm>
           <a:prstGeom prst="rect">
             <a:avLst/>
           </a:prstGeom>
-          <a:noFill/>
         </p:spPr>
-        <p:txBody>
-          <a:bodyPr wrap="none" rtlCol="0">
-            <a:spAutoFit/>
-          </a:bodyPr>
-          <a:lstStyle/>
-          <a:p>
-            <a:r>
-              <a:rPr lang="de-DE" dirty="0"/>
-              <a:t>TODO: </a:t>
-            </a:r>
-            <a:r>
-              <a:rPr lang="de-DE" dirty="0" err="1"/>
-              <a:t>Lvl</a:t>
-            </a:r>
-            <a:r>
-              <a:rPr lang="de-DE" dirty="0"/>
-              <a:t> </a:t>
-            </a:r>
-            <a:r>
-              <a:rPr lang="de-DE" dirty="0" err="1"/>
-              <a:t>of</a:t>
-            </a:r>
-            <a:r>
-              <a:rPr lang="de-DE" dirty="0"/>
-              <a:t> </a:t>
-            </a:r>
-            <a:r>
-              <a:rPr lang="de-DE" dirty="0" err="1"/>
-              <a:t>detail</a:t>
-            </a:r>
-            <a:endParaRPr lang="de-DE" dirty="0"/>
-          </a:p>
-          <a:p>
-            <a:endParaRPr lang="de-DE" dirty="0"/>
-          </a:p>
-        </p:txBody>
-      </p:sp>
+      </p:pic>
     </p:spTree>
     <p:extLst>
       <p:ext uri="{BB962C8B-B14F-4D97-AF65-F5344CB8AC3E}">

</xml_diff>

<commit_message>
Vortrag: Sehapparat angepasst, Eyetracking Folie nach vorne verschoben.
</commit_message>
<xml_diff>
--- a/Dokumente/Vortrag/Wahrnehmungsorientiertes_Volumen-Rendering.pptx
+++ b/Dokumente/Vortrag/Wahrnehmungsorientiertes_Volumen-Rendering.pptx
@@ -5,7 +5,7 @@
     <p:sldMasterId id="2147483648" r:id="rId1"/>
   </p:sldMasterIdLst>
   <p:notesMasterIdLst>
-    <p:notesMasterId r:id="rId22"/>
+    <p:notesMasterId r:id="rId21"/>
   </p:notesMasterIdLst>
   <p:sldIdLst>
     <p:sldId id="259" r:id="rId2"/>
@@ -13,21 +13,20 @@
     <p:sldId id="261" r:id="rId4"/>
     <p:sldId id="262" r:id="rId5"/>
     <p:sldId id="263" r:id="rId6"/>
-    <p:sldId id="272" r:id="rId7"/>
+    <p:sldId id="265" r:id="rId7"/>
     <p:sldId id="264" r:id="rId8"/>
     <p:sldId id="274" r:id="rId9"/>
-    <p:sldId id="265" r:id="rId10"/>
-    <p:sldId id="266" r:id="rId11"/>
-    <p:sldId id="275" r:id="rId12"/>
-    <p:sldId id="276" r:id="rId13"/>
-    <p:sldId id="267" r:id="rId14"/>
-    <p:sldId id="268" r:id="rId15"/>
-    <p:sldId id="277" r:id="rId16"/>
-    <p:sldId id="279" r:id="rId17"/>
-    <p:sldId id="269" r:id="rId18"/>
-    <p:sldId id="278" r:id="rId19"/>
-    <p:sldId id="270" r:id="rId20"/>
-    <p:sldId id="271" r:id="rId21"/>
+    <p:sldId id="266" r:id="rId10"/>
+    <p:sldId id="275" r:id="rId11"/>
+    <p:sldId id="276" r:id="rId12"/>
+    <p:sldId id="267" r:id="rId13"/>
+    <p:sldId id="268" r:id="rId14"/>
+    <p:sldId id="277" r:id="rId15"/>
+    <p:sldId id="279" r:id="rId16"/>
+    <p:sldId id="269" r:id="rId17"/>
+    <p:sldId id="278" r:id="rId18"/>
+    <p:sldId id="270" r:id="rId19"/>
+    <p:sldId id="271" r:id="rId20"/>
   </p:sldIdLst>
   <p:sldSz cx="9144000" cy="5143500" type="screen16x9"/>
   <p:notesSz cx="6858000" cy="9144000"/>
@@ -638,21 +637,21 @@
           <a:p>
             <a:r>
               <a:rPr lang="de-DE" dirty="0"/>
-              <a:t>Ein Work-Item berechnet einen Strahl.</a:t>
-            </a:r>
-          </a:p>
-          <a:p>
-            <a:r>
-              <a:rPr lang="de-DE" dirty="0"/>
-              <a:t>Bei einer Auflösung mit einem Strahl pro Pixel kann als </a:t>
+              <a:t>Entwurf:</a:t>
+            </a:r>
+          </a:p>
+          <a:p>
+            <a:r>
+              <a:rPr lang="de-DE" dirty="0"/>
+              <a:t>-- Ausgangprojekt </a:t>
             </a:r>
             <a:r>
               <a:rPr lang="de-DE" dirty="0" err="1"/>
-              <a:t>NDRange</a:t>
-            </a:r>
-            <a:r>
-              <a:rPr lang="de-DE" dirty="0"/>
-              <a:t> die Bilddimension genommen werden mit Breite und Höhe (Tiefe z = 1).</a:t>
+              <a:t>Raycaster</a:t>
+            </a:r>
+            <a:r>
+              <a:rPr lang="de-DE" dirty="0"/>
+              <a:t>, Simulieren der Blickposition, Reduzierung der Abtastrate im Objekt- und Bildbereich</a:t>
             </a:r>
           </a:p>
         </p:txBody>
@@ -674,7 +673,7 @@
           <a:p>
             <a:fld id="{6F4F2A7C-E896-4C15-99D8-2B5BC94A4F36}" type="slidenum">
               <a:rPr lang="de-DE" smtClean="0"/>
-              <a:t>11</a:t>
+              <a:t>12</a:t>
             </a:fld>
             <a:endParaRPr lang="de-DE"/>
           </a:p>
@@ -683,7 +682,7 @@
     </p:spTree>
     <p:extLst>
       <p:ext uri="{BB962C8B-B14F-4D97-AF65-F5344CB8AC3E}">
-        <p14:creationId xmlns:p14="http://schemas.microsoft.com/office/powerpoint/2010/main" val="2307871628"/>
+        <p14:creationId xmlns:p14="http://schemas.microsoft.com/office/powerpoint/2010/main" val="3834442345"/>
       </p:ext>
     </p:extLst>
   </p:cSld>
@@ -737,24 +736,7 @@
           <a:bodyPr/>
           <a:lstStyle/>
           <a:p>
-            <a:r>
-              <a:rPr lang="de-DE" dirty="0"/>
-              <a:t>Entwurf:</a:t>
-            </a:r>
-          </a:p>
-          <a:p>
-            <a:r>
-              <a:rPr lang="de-DE" dirty="0"/>
-              <a:t>-- Ausgangprojekt </a:t>
-            </a:r>
-            <a:r>
-              <a:rPr lang="de-DE" dirty="0" err="1"/>
-              <a:t>Raycaster</a:t>
-            </a:r>
-            <a:r>
-              <a:rPr lang="de-DE" dirty="0"/>
-              <a:t>, Simulieren der Blickposition, Reduzierung der Abtastrate im Objekt- und Bildbereich</a:t>
-            </a:r>
+            <a:endParaRPr lang="de-DE" dirty="0"/>
           </a:p>
         </p:txBody>
       </p:sp>
@@ -784,7 +766,7 @@
     </p:spTree>
     <p:extLst>
       <p:ext uri="{BB962C8B-B14F-4D97-AF65-F5344CB8AC3E}">
-        <p14:creationId xmlns:p14="http://schemas.microsoft.com/office/powerpoint/2010/main" val="3834442345"/>
+        <p14:creationId xmlns:p14="http://schemas.microsoft.com/office/powerpoint/2010/main" val="1983490928"/>
       </p:ext>
     </p:extLst>
   </p:cSld>
@@ -838,6 +820,26 @@
           <a:bodyPr/>
           <a:lstStyle/>
           <a:p>
+            <a:r>
+              <a:rPr lang="de-DE" dirty="0"/>
+              <a:t>Ergebnisse:</a:t>
+            </a:r>
+          </a:p>
+          <a:p>
+            <a:r>
+              <a:rPr lang="de-DE" dirty="0"/>
+              <a:t>-- Sammeln von Messwerten, Bilder/Videos, </a:t>
+            </a:r>
+            <a:r>
+              <a:rPr lang="de-DE" dirty="0" err="1"/>
+              <a:t>Performanzwerte</a:t>
+            </a:r>
+            <a:r>
+              <a:rPr lang="de-DE" dirty="0"/>
+              <a:t>, Vergleich, Diskussion</a:t>
+            </a:r>
+          </a:p>
+          <a:p>
             <a:endParaRPr lang="de-DE" dirty="0"/>
           </a:p>
         </p:txBody>
@@ -859,7 +861,7 @@
           <a:p>
             <a:fld id="{6F4F2A7C-E896-4C15-99D8-2B5BC94A4F36}" type="slidenum">
               <a:rPr lang="de-DE" smtClean="0"/>
-              <a:t>14</a:t>
+              <a:t>16</a:t>
             </a:fld>
             <a:endParaRPr lang="de-DE"/>
           </a:p>
@@ -868,7 +870,7 @@
     </p:spTree>
     <p:extLst>
       <p:ext uri="{BB962C8B-B14F-4D97-AF65-F5344CB8AC3E}">
-        <p14:creationId xmlns:p14="http://schemas.microsoft.com/office/powerpoint/2010/main" val="1983490928"/>
+        <p14:creationId xmlns:p14="http://schemas.microsoft.com/office/powerpoint/2010/main" val="2812053294"/>
       </p:ext>
     </p:extLst>
   </p:cSld>
@@ -924,24 +926,19 @@
           <a:p>
             <a:r>
               <a:rPr lang="de-DE" dirty="0"/>
-              <a:t>Ergebnisse:</a:t>
-            </a:r>
-          </a:p>
-          <a:p>
-            <a:r>
-              <a:rPr lang="de-DE" dirty="0"/>
-              <a:t>-- Sammeln von Messwerten, Bilder/Videos, </a:t>
+              <a:t>Ausblick u.a. das </a:t>
             </a:r>
             <a:r>
               <a:rPr lang="de-DE" dirty="0" err="1"/>
-              <a:t>Performanzwerte</a:t>
-            </a:r>
-            <a:r>
-              <a:rPr lang="de-DE" dirty="0"/>
-              <a:t>, Vergleich, Diskussion</a:t>
-            </a:r>
-          </a:p>
-          <a:p>
+              <a:t>paper</a:t>
+            </a:r>
+            <a:endParaRPr lang="de-DE" dirty="0"/>
+          </a:p>
+          <a:p>
+            <a:r>
+              <a:rPr lang="de-DE" dirty="0" err="1"/>
+              <a:t>Gaussfilterbild</a:t>
+            </a:r>
             <a:endParaRPr lang="de-DE" dirty="0"/>
           </a:p>
         </p:txBody>
@@ -963,106 +960,7 @@
           <a:p>
             <a:fld id="{6F4F2A7C-E896-4C15-99D8-2B5BC94A4F36}" type="slidenum">
               <a:rPr lang="de-DE" smtClean="0"/>
-              <a:t>17</a:t>
-            </a:fld>
-            <a:endParaRPr lang="de-DE"/>
-          </a:p>
-        </p:txBody>
-      </p:sp>
-    </p:spTree>
-    <p:extLst>
-      <p:ext uri="{BB962C8B-B14F-4D97-AF65-F5344CB8AC3E}">
-        <p14:creationId xmlns:p14="http://schemas.microsoft.com/office/powerpoint/2010/main" val="2812053294"/>
-      </p:ext>
-    </p:extLst>
-  </p:cSld>
-  <p:clrMapOvr>
-    <a:masterClrMapping/>
-  </p:clrMapOvr>
-</p:notes>
-</file>
-
-<file path=ppt/notesSlides/notesSlide14.xml><?xml version="1.0" encoding="utf-8"?>
-<p:notes xmlns:a="http://schemas.openxmlformats.org/drawingml/2006/main" xmlns:r="http://schemas.openxmlformats.org/officeDocument/2006/relationships" xmlns:p="http://schemas.openxmlformats.org/presentationml/2006/main">
-  <p:cSld>
-    <p:spTree>
-      <p:nvGrpSpPr>
-        <p:cNvPr id="1" name=""/>
-        <p:cNvGrpSpPr/>
-        <p:nvPr/>
-      </p:nvGrpSpPr>
-      <p:grpSpPr>
-        <a:xfrm>
-          <a:off x="0" y="0"/>
-          <a:ext cx="0" cy="0"/>
-          <a:chOff x="0" y="0"/>
-          <a:chExt cx="0" cy="0"/>
-        </a:xfrm>
-      </p:grpSpPr>
-      <p:sp>
-        <p:nvSpPr>
-          <p:cNvPr id="2" name="Folienbildplatzhalter 1"/>
-          <p:cNvSpPr>
-            <a:spLocks noGrp="1" noRot="1" noChangeAspect="1"/>
-          </p:cNvSpPr>
-          <p:nvPr>
-            <p:ph type="sldImg"/>
-          </p:nvPr>
-        </p:nvSpPr>
-        <p:spPr/>
-      </p:sp>
-      <p:sp>
-        <p:nvSpPr>
-          <p:cNvPr id="3" name="Notizenplatzhalter 2"/>
-          <p:cNvSpPr>
-            <a:spLocks noGrp="1"/>
-          </p:cNvSpPr>
-          <p:nvPr>
-            <p:ph type="body" idx="1"/>
-          </p:nvPr>
-        </p:nvSpPr>
-        <p:spPr/>
-        <p:txBody>
-          <a:bodyPr/>
-          <a:lstStyle/>
-          <a:p>
-            <a:r>
-              <a:rPr lang="de-DE" dirty="0"/>
-              <a:t>Ausblick u.a. das </a:t>
-            </a:r>
-            <a:r>
-              <a:rPr lang="de-DE" dirty="0" err="1"/>
-              <a:t>paper</a:t>
-            </a:r>
-            <a:endParaRPr lang="de-DE" dirty="0"/>
-          </a:p>
-          <a:p>
-            <a:r>
-              <a:rPr lang="de-DE" dirty="0" err="1"/>
-              <a:t>Gaussfilterbild</a:t>
-            </a:r>
-            <a:endParaRPr lang="de-DE" dirty="0"/>
-          </a:p>
-        </p:txBody>
-      </p:sp>
-      <p:sp>
-        <p:nvSpPr>
-          <p:cNvPr id="4" name="Foliennummernplatzhalter 3"/>
-          <p:cNvSpPr>
-            <a:spLocks noGrp="1"/>
-          </p:cNvSpPr>
-          <p:nvPr>
-            <p:ph type="sldNum" sz="quarter" idx="5"/>
-          </p:nvPr>
-        </p:nvSpPr>
-        <p:spPr/>
-        <p:txBody>
-          <a:bodyPr/>
-          <a:lstStyle/>
-          <a:p>
-            <a:fld id="{6F4F2A7C-E896-4C15-99D8-2B5BC94A4F36}" type="slidenum">
-              <a:rPr lang="de-DE" smtClean="0"/>
-              <a:t>19</a:t>
+              <a:t>18</a:t>
             </a:fld>
             <a:endParaRPr lang="de-DE"/>
           </a:p>
@@ -1673,6 +1571,39 @@
               <a:t>Peripheres Sehen &gt; 17 °</a:t>
             </a:r>
           </a:p>
+          <a:p>
+            <a:endParaRPr lang="de-DE" dirty="0"/>
+          </a:p>
+          <a:p>
+            <a:r>
+              <a:rPr lang="de-DE" dirty="0"/>
+              <a:t>Sakkade bis zu 900 ° / s</a:t>
+            </a:r>
+          </a:p>
+          <a:p>
+            <a:r>
+              <a:rPr lang="de-DE" dirty="0"/>
+              <a:t>Räumlicher Abstand zwischen Fixationen ca. 7 °</a:t>
+            </a:r>
+          </a:p>
+          <a:p>
+            <a:r>
+              <a:rPr lang="de-DE" dirty="0"/>
+              <a:t>Während einer Fixation gibt es trotzdem kleine Tremor-Bewegungen, die Fixationsstelle scannen</a:t>
+            </a:r>
+          </a:p>
+          <a:p>
+            <a:r>
+              <a:rPr lang="de-DE" dirty="0"/>
+              <a:t>Interessant, da zu wissen ob gerade Fixation oder Sakkade auch für das Berechnen des Bildes vorteilhaft sein kann.</a:t>
+            </a:r>
+          </a:p>
+          <a:p>
+            <a:r>
+              <a:rPr lang="de-DE" dirty="0"/>
+              <a:t>-&gt; wichtig, dass Eyetracker schnell genug ist (geringe Latenz und hohe Abtastrate) um die Augenbewegungen schnell genug zu erfassen</a:t>
+            </a:r>
+          </a:p>
         </p:txBody>
       </p:sp>
       <p:sp>
@@ -1757,29 +1688,44 @@
           <a:p>
             <a:r>
               <a:rPr lang="de-DE" dirty="0"/>
-              <a:t>Sakkade bis zu 900 ° / s</a:t>
-            </a:r>
-          </a:p>
-          <a:p>
-            <a:r>
-              <a:rPr lang="de-DE" dirty="0"/>
-              <a:t>Räumlicher Abstand zwischen Fixationen ca. 7 °</a:t>
-            </a:r>
-          </a:p>
-          <a:p>
-            <a:r>
-              <a:rPr lang="de-DE" dirty="0"/>
-              <a:t>Während einer Fixation gibt es trotzdem kleine Tremor-Bewegungen, die Fixationsstelle scannen</a:t>
-            </a:r>
-          </a:p>
-          <a:p>
-            <a:r>
-              <a:rPr lang="de-DE" dirty="0"/>
-              <a:t>Interessant, da zu wissen ob gerade Fixation oder Sakkade auch für das Berechnen des Bildes vorteilhaft sein kann.</a:t>
+              <a:t>Eyetracking:</a:t>
+            </a:r>
+          </a:p>
+          <a:p>
+            <a:r>
+              <a:rPr lang="de-DE" dirty="0"/>
+              <a:t>-- Was es ist, wie es funktioniert, welches Gerät habe ich verwendet?</a:t>
             </a:r>
           </a:p>
           <a:p>
             <a:endParaRPr lang="de-DE" dirty="0"/>
+          </a:p>
+          <a:p>
+            <a:r>
+              <a:rPr lang="de-DE" dirty="0"/>
+              <a:t>Bild1: https://www.tobiipro.com/imagevault/publishedmedia/wtj5bngwymxv5372umt4/Tobii_Pro_Spectrum_Hero_Shot_3_1.png</a:t>
+            </a:r>
+          </a:p>
+          <a:p>
+            <a:r>
+              <a:rPr lang="de-DE" dirty="0"/>
+              <a:t>Bild2: http://www.tobiidynavox.de/wp-content/uploads/2014/01/tobiidynavox-eyetracking-reflections-1920x1080px.gif</a:t>
+            </a:r>
+          </a:p>
+          <a:p>
+            <a:endParaRPr lang="de-DE" dirty="0"/>
+          </a:p>
+          <a:p>
+            <a:r>
+              <a:rPr lang="de-DE" dirty="0"/>
+              <a:t>Liefert Daten über die Blickposition auf dem Bildschirm und die Augenposition im Raum.</a:t>
+            </a:r>
+          </a:p>
+          <a:p>
+            <a:r>
+              <a:rPr lang="de-DE" dirty="0"/>
+              <a:t>Wenn Distanz zum Bildschirm größer -&gt; Fovea größer (hab ich nicht gemacht aber könnte man machen)</a:t>
+            </a:r>
           </a:p>
         </p:txBody>
       </p:sp>
@@ -1809,7 +1755,7 @@
     </p:spTree>
     <p:extLst>
       <p:ext uri="{BB962C8B-B14F-4D97-AF65-F5344CB8AC3E}">
-        <p14:creationId xmlns:p14="http://schemas.microsoft.com/office/powerpoint/2010/main" val="692395006"/>
+        <p14:creationId xmlns:p14="http://schemas.microsoft.com/office/powerpoint/2010/main" val="2198411781"/>
       </p:ext>
     </p:extLst>
   </p:cSld>
@@ -1969,28 +1915,21 @@
           <a:p>
             <a:r>
               <a:rPr lang="de-DE" dirty="0"/>
-              <a:t>Eyetracking:</a:t>
-            </a:r>
-          </a:p>
-          <a:p>
-            <a:r>
-              <a:rPr lang="de-DE" dirty="0"/>
-              <a:t>-- Was es ist, wie es funktioniert, welches Gerät habe ich verwendet?</a:t>
-            </a:r>
-          </a:p>
-          <a:p>
-            <a:endParaRPr lang="de-DE" dirty="0"/>
-          </a:p>
-          <a:p>
-            <a:r>
-              <a:rPr lang="de-DE" dirty="0"/>
-              <a:t>Bild1: https://www.tobiipro.com/imagevault/publishedmedia/wtj5bngwymxv5372umt4/Tobii_Pro_Spectrum_Hero_Shot_3_1.png</a:t>
-            </a:r>
-          </a:p>
-          <a:p>
-            <a:r>
-              <a:rPr lang="de-DE" dirty="0"/>
-              <a:t>Bild2: http://www.tobiidynavox.de/wp-content/uploads/2014/01/tobiidynavox-eyetracking-reflections-1920x1080px.gif</a:t>
+              <a:t>GPU Architektur:</a:t>
+            </a:r>
+          </a:p>
+          <a:p>
+            <a:r>
+              <a:rPr lang="de-DE" dirty="0"/>
+              <a:t>-- Warum beschäftige ich mich damit? </a:t>
+            </a:r>
+            <a:r>
+              <a:rPr lang="de-DE" dirty="0" err="1"/>
+              <a:t>OpenCL</a:t>
+            </a:r>
+            <a:r>
+              <a:rPr lang="de-DE" dirty="0"/>
+              <a:t>, Work-Items, Work-Groups, Ausführungsmodell (Threads, Thread-Blocks)</a:t>
             </a:r>
           </a:p>
           <a:p>
@@ -2024,7 +1963,7 @@
     </p:spTree>
     <p:extLst>
       <p:ext uri="{BB962C8B-B14F-4D97-AF65-F5344CB8AC3E}">
-        <p14:creationId xmlns:p14="http://schemas.microsoft.com/office/powerpoint/2010/main" val="2198411781"/>
+        <p14:creationId xmlns:p14="http://schemas.microsoft.com/office/powerpoint/2010/main" val="3385818242"/>
       </p:ext>
     </p:extLst>
   </p:cSld>
@@ -2080,25 +2019,22 @@
           <a:p>
             <a:r>
               <a:rPr lang="de-DE" dirty="0"/>
-              <a:t>GPU Architektur:</a:t>
-            </a:r>
-          </a:p>
-          <a:p>
-            <a:r>
-              <a:rPr lang="de-DE" dirty="0"/>
-              <a:t>-- Warum beschäftige ich mich damit? </a:t>
+              <a:t>Ein Work-Item berechnet einen Strahl.</a:t>
+            </a:r>
+          </a:p>
+          <a:p>
+            <a:r>
+              <a:rPr lang="de-DE" dirty="0"/>
+              <a:t>Bei einer Auflösung mit einem Strahl pro Pixel kann als </a:t>
             </a:r>
             <a:r>
               <a:rPr lang="de-DE" dirty="0" err="1"/>
-              <a:t>OpenCL</a:t>
-            </a:r>
-            <a:r>
-              <a:rPr lang="de-DE" dirty="0"/>
-              <a:t>, Work-Items, Work-Groups, Ausführungsmodell (Threads, Thread-Blocks)</a:t>
-            </a:r>
-          </a:p>
-          <a:p>
-            <a:endParaRPr lang="de-DE" dirty="0"/>
+              <a:t>NDRange</a:t>
+            </a:r>
+            <a:r>
+              <a:rPr lang="de-DE" dirty="0"/>
+              <a:t> die Bilddimension genommen werden mit Breite und Höhe (Tiefe z = 1).</a:t>
+            </a:r>
           </a:p>
         </p:txBody>
       </p:sp>
@@ -2128,7 +2064,7 @@
     </p:spTree>
     <p:extLst>
       <p:ext uri="{BB962C8B-B14F-4D97-AF65-F5344CB8AC3E}">
-        <p14:creationId xmlns:p14="http://schemas.microsoft.com/office/powerpoint/2010/main" val="3385818242"/>
+        <p14:creationId xmlns:p14="http://schemas.microsoft.com/office/powerpoint/2010/main" val="2307871628"/>
       </p:ext>
     </p:extLst>
   </p:cSld>
@@ -4271,7 +4207,7 @@
           <p:cNvPr id="2" name="Inhaltsplatzhalter 1">
             <a:extLst>
               <a:ext uri="{FF2B5EF4-FFF2-40B4-BE49-F238E27FC236}">
-                <a16:creationId xmlns:a16="http://schemas.microsoft.com/office/drawing/2014/main" id="{2BFC54A6-CF1E-4705-BBE0-0F5AF5BE1FA3}"/>
+                <a16:creationId xmlns:a16="http://schemas.microsoft.com/office/drawing/2014/main" id="{F4836894-3CA2-4AF5-BD82-BDC9EE081C6B}"/>
               </a:ext>
             </a:extLst>
           </p:cNvPr>
@@ -4289,43 +4225,15 @@
           <a:p>
             <a:r>
               <a:rPr lang="de-DE" dirty="0"/>
-              <a:t>Hoch parallel</a:t>
+              <a:t>Unterteilung des Problems in (unabhängige) Teilprobleme</a:t>
             </a:r>
           </a:p>
           <a:p>
             <a:pPr lvl="1"/>
             <a:r>
               <a:rPr lang="de-DE" dirty="0"/>
-              <a:t>Strahlen können unabhängig voneinander verfolgt werden</a:t>
-            </a:r>
-          </a:p>
-          <a:p>
-            <a:r>
-              <a:rPr lang="de-DE" dirty="0"/>
-              <a:t>Programmierbar (General Purpose </a:t>
-            </a:r>
-            <a:r>
-              <a:rPr lang="de-DE" dirty="0" err="1"/>
-              <a:t>Computation</a:t>
-            </a:r>
-            <a:r>
-              <a:rPr lang="de-DE" dirty="0"/>
-              <a:t> on GPU (GPGPU))</a:t>
-            </a:r>
-          </a:p>
-          <a:p>
-            <a:pPr lvl="1"/>
-            <a:r>
-              <a:rPr lang="de-DE" dirty="0" err="1"/>
-              <a:t>OpenCL</a:t>
-            </a:r>
-            <a:endParaRPr lang="de-DE" dirty="0"/>
-          </a:p>
-          <a:p>
-            <a:pPr marL="0" indent="0">
-              <a:buNone/>
-            </a:pPr>
-            <a:endParaRPr lang="de-DE" dirty="0"/>
+              <a:t>Teilprobleme werden (parallel) von Work-Items berechnet</a:t>
+            </a:r>
           </a:p>
         </p:txBody>
       </p:sp>
@@ -4334,7 +4242,7 @@
           <p:cNvPr id="3" name="Foliennummernplatzhalter 2">
             <a:extLst>
               <a:ext uri="{FF2B5EF4-FFF2-40B4-BE49-F238E27FC236}">
-                <a16:creationId xmlns:a16="http://schemas.microsoft.com/office/drawing/2014/main" id="{C68930AE-E0C2-4512-88F5-C8FB2408B8A7}"/>
+                <a16:creationId xmlns:a16="http://schemas.microsoft.com/office/drawing/2014/main" id="{5B709438-26A9-4385-BA8A-641816833063}"/>
               </a:ext>
             </a:extLst>
           </p:cNvPr>
@@ -4353,164 +4261,6 @@
             <a:fld id="{29AD3987-26BA-49DC-BA24-72731371DC9F}" type="slidenum">
               <a:rPr lang="de-DE" smtClean="0"/>
               <a:t>10</a:t>
-            </a:fld>
-            <a:endParaRPr lang="de-DE" dirty="0"/>
-          </a:p>
-        </p:txBody>
-      </p:sp>
-      <p:sp>
-        <p:nvSpPr>
-          <p:cNvPr id="4" name="Titel 3">
-            <a:extLst>
-              <a:ext uri="{FF2B5EF4-FFF2-40B4-BE49-F238E27FC236}">
-                <a16:creationId xmlns:a16="http://schemas.microsoft.com/office/drawing/2014/main" id="{8E1DF498-9417-4C18-AE3C-AD5C3FECA02A}"/>
-              </a:ext>
-            </a:extLst>
-          </p:cNvPr>
-          <p:cNvSpPr>
-            <a:spLocks noGrp="1"/>
-          </p:cNvSpPr>
-          <p:nvPr>
-            <p:ph type="title"/>
-          </p:nvPr>
-        </p:nvSpPr>
-        <p:spPr/>
-        <p:txBody>
-          <a:bodyPr/>
-          <a:lstStyle/>
-          <a:p>
-            <a:r>
-              <a:rPr lang="de-DE" dirty="0"/>
-              <a:t>GPU Architektur</a:t>
-            </a:r>
-          </a:p>
-        </p:txBody>
-      </p:sp>
-      <p:pic>
-        <p:nvPicPr>
-          <p:cNvPr id="6" name="Grafik 5">
-            <a:extLst>
-              <a:ext uri="{FF2B5EF4-FFF2-40B4-BE49-F238E27FC236}">
-                <a16:creationId xmlns:a16="http://schemas.microsoft.com/office/drawing/2014/main" id="{AA132576-CFEF-4A97-B41A-C44527DEF4F1}"/>
-              </a:ext>
-            </a:extLst>
-          </p:cNvPr>
-          <p:cNvPicPr>
-            <a:picLocks noChangeAspect="1"/>
-          </p:cNvPicPr>
-          <p:nvPr/>
-        </p:nvPicPr>
-        <p:blipFill>
-          <a:blip r:embed="rId3">
-            <a:extLst>
-              <a:ext uri="{28A0092B-C50C-407E-A947-70E740481C1C}">
-                <a14:useLocalDpi xmlns:a14="http://schemas.microsoft.com/office/drawing/2010/main" val="0"/>
-              </a:ext>
-            </a:extLst>
-          </a:blip>
-          <a:stretch>
-            <a:fillRect/>
-          </a:stretch>
-        </p:blipFill>
-        <p:spPr>
-          <a:xfrm>
-            <a:off x="2443426" y="2662925"/>
-            <a:ext cx="4257148" cy="1939675"/>
-          </a:xfrm>
-          <a:prstGeom prst="rect">
-            <a:avLst/>
-          </a:prstGeom>
-        </p:spPr>
-      </p:pic>
-    </p:spTree>
-    <p:extLst>
-      <p:ext uri="{BB962C8B-B14F-4D97-AF65-F5344CB8AC3E}">
-        <p14:creationId xmlns:p14="http://schemas.microsoft.com/office/powerpoint/2010/main" val="3045631903"/>
-      </p:ext>
-    </p:extLst>
-  </p:cSld>
-  <p:clrMapOvr>
-    <a:masterClrMapping/>
-  </p:clrMapOvr>
-</p:sld>
-</file>
-
-<file path=ppt/slides/slide11.xml><?xml version="1.0" encoding="utf-8"?>
-<p:sld xmlns:a="http://schemas.openxmlformats.org/drawingml/2006/main" xmlns:r="http://schemas.openxmlformats.org/officeDocument/2006/relationships" xmlns:p="http://schemas.openxmlformats.org/presentationml/2006/main">
-  <p:cSld>
-    <p:spTree>
-      <p:nvGrpSpPr>
-        <p:cNvPr id="1" name=""/>
-        <p:cNvGrpSpPr/>
-        <p:nvPr/>
-      </p:nvGrpSpPr>
-      <p:grpSpPr>
-        <a:xfrm>
-          <a:off x="0" y="0"/>
-          <a:ext cx="0" cy="0"/>
-          <a:chOff x="0" y="0"/>
-          <a:chExt cx="0" cy="0"/>
-        </a:xfrm>
-      </p:grpSpPr>
-      <p:sp>
-        <p:nvSpPr>
-          <p:cNvPr id="2" name="Inhaltsplatzhalter 1">
-            <a:extLst>
-              <a:ext uri="{FF2B5EF4-FFF2-40B4-BE49-F238E27FC236}">
-                <a16:creationId xmlns:a16="http://schemas.microsoft.com/office/drawing/2014/main" id="{F4836894-3CA2-4AF5-BD82-BDC9EE081C6B}"/>
-              </a:ext>
-            </a:extLst>
-          </p:cNvPr>
-          <p:cNvSpPr>
-            <a:spLocks noGrp="1"/>
-          </p:cNvSpPr>
-          <p:nvPr>
-            <p:ph idx="1"/>
-          </p:nvPr>
-        </p:nvSpPr>
-        <p:spPr/>
-        <p:txBody>
-          <a:bodyPr/>
-          <a:lstStyle/>
-          <a:p>
-            <a:r>
-              <a:rPr lang="de-DE" dirty="0"/>
-              <a:t>Unterteilung des Problems in (unabhängige) Teilprobleme</a:t>
-            </a:r>
-          </a:p>
-          <a:p>
-            <a:pPr lvl="1"/>
-            <a:r>
-              <a:rPr lang="de-DE" dirty="0"/>
-              <a:t>Teilprobleme werden (parallel) von Work-Items berechnet</a:t>
-            </a:r>
-          </a:p>
-        </p:txBody>
-      </p:sp>
-      <p:sp>
-        <p:nvSpPr>
-          <p:cNvPr id="3" name="Foliennummernplatzhalter 2">
-            <a:extLst>
-              <a:ext uri="{FF2B5EF4-FFF2-40B4-BE49-F238E27FC236}">
-                <a16:creationId xmlns:a16="http://schemas.microsoft.com/office/drawing/2014/main" id="{5B709438-26A9-4385-BA8A-641816833063}"/>
-              </a:ext>
-            </a:extLst>
-          </p:cNvPr>
-          <p:cNvSpPr>
-            <a:spLocks noGrp="1"/>
-          </p:cNvSpPr>
-          <p:nvPr>
-            <p:ph type="sldNum" sz="quarter" idx="12"/>
-          </p:nvPr>
-        </p:nvSpPr>
-        <p:spPr/>
-        <p:txBody>
-          <a:bodyPr/>
-          <a:lstStyle/>
-          <a:p>
-            <a:fld id="{29AD3987-26BA-49DC-BA24-72731371DC9F}" type="slidenum">
-              <a:rPr lang="de-DE" smtClean="0"/>
-              <a:t>11</a:t>
             </a:fld>
             <a:endParaRPr lang="de-DE" dirty="0"/>
           </a:p>
@@ -4593,7 +4343,7 @@
 </p:sld>
 </file>
 
-<file path=ppt/slides/slide12.xml><?xml version="1.0" encoding="utf-8"?>
+<file path=ppt/slides/slide11.xml><?xml version="1.0" encoding="utf-8"?>
 <p:sld xmlns:a="http://schemas.openxmlformats.org/drawingml/2006/main" xmlns:r="http://schemas.openxmlformats.org/officeDocument/2006/relationships" xmlns:p="http://schemas.openxmlformats.org/presentationml/2006/main">
   <p:cSld>
     <p:spTree>
@@ -4720,7 +4470,7 @@
           <a:p>
             <a:fld id="{29AD3987-26BA-49DC-BA24-72731371DC9F}" type="slidenum">
               <a:rPr lang="de-DE" smtClean="0"/>
-              <a:t>12</a:t>
+              <a:t>11</a:t>
             </a:fld>
             <a:endParaRPr lang="de-DE" dirty="0"/>
           </a:p>
@@ -4793,6 +4543,191 @@
     <p:extLst>
       <p:ext uri="{BB962C8B-B14F-4D97-AF65-F5344CB8AC3E}">
         <p14:creationId xmlns:p14="http://schemas.microsoft.com/office/powerpoint/2010/main" val="1071932652"/>
+      </p:ext>
+    </p:extLst>
+  </p:cSld>
+  <p:clrMapOvr>
+    <a:masterClrMapping/>
+  </p:clrMapOvr>
+</p:sld>
+</file>
+
+<file path=ppt/slides/slide12.xml><?xml version="1.0" encoding="utf-8"?>
+<p:sld xmlns:a="http://schemas.openxmlformats.org/drawingml/2006/main" xmlns:r="http://schemas.openxmlformats.org/officeDocument/2006/relationships" xmlns:p="http://schemas.openxmlformats.org/presentationml/2006/main">
+  <p:cSld>
+    <p:spTree>
+      <p:nvGrpSpPr>
+        <p:cNvPr id="1" name=""/>
+        <p:cNvGrpSpPr/>
+        <p:nvPr/>
+      </p:nvGrpSpPr>
+      <p:grpSpPr>
+        <a:xfrm>
+          <a:off x="0" y="0"/>
+          <a:ext cx="0" cy="0"/>
+          <a:chOff x="0" y="0"/>
+          <a:chExt cx="0" cy="0"/>
+        </a:xfrm>
+      </p:grpSpPr>
+      <p:sp>
+        <p:nvSpPr>
+          <p:cNvPr id="2" name="Inhaltsplatzhalter 1">
+            <a:extLst>
+              <a:ext uri="{FF2B5EF4-FFF2-40B4-BE49-F238E27FC236}">
+                <a16:creationId xmlns:a16="http://schemas.microsoft.com/office/drawing/2014/main" id="{2196B620-9307-4A32-8E0F-A79CD82C6141}"/>
+              </a:ext>
+            </a:extLst>
+          </p:cNvPr>
+          <p:cNvSpPr>
+            <a:spLocks noGrp="1"/>
+          </p:cNvSpPr>
+          <p:nvPr>
+            <p:ph idx="1"/>
+          </p:nvPr>
+        </p:nvSpPr>
+        <p:spPr/>
+        <p:txBody>
+          <a:bodyPr>
+            <a:normAutofit lnSpcReduction="10000"/>
+          </a:bodyPr>
+          <a:lstStyle/>
+          <a:p>
+            <a:r>
+              <a:rPr lang="de-DE" dirty="0"/>
+              <a:t>Simulation der Blickposition durch die Maus</a:t>
+            </a:r>
+          </a:p>
+          <a:p>
+            <a:r>
+              <a:rPr lang="de-DE" dirty="0"/>
+              <a:t>Reduzierung der Abtastrate im peripheren Bereich</a:t>
+            </a:r>
+          </a:p>
+          <a:p>
+            <a:pPr lvl="1"/>
+            <a:r>
+              <a:rPr lang="de-DE" dirty="0"/>
+              <a:t>Objektraum</a:t>
+            </a:r>
+          </a:p>
+          <a:p>
+            <a:pPr lvl="1"/>
+            <a:r>
+              <a:rPr lang="de-DE" dirty="0"/>
+              <a:t>Bildraum</a:t>
+            </a:r>
+          </a:p>
+          <a:p>
+            <a:r>
+              <a:rPr lang="de-DE" dirty="0"/>
+              <a:t>Methode 1:</a:t>
+            </a:r>
+          </a:p>
+          <a:p>
+            <a:pPr lvl="1"/>
+            <a:r>
+              <a:rPr lang="de-DE" dirty="0"/>
+              <a:t>Zwei </a:t>
+            </a:r>
+            <a:r>
+              <a:rPr lang="de-DE" dirty="0" err="1"/>
+              <a:t>Raycasts</a:t>
+            </a:r>
+            <a:endParaRPr lang="de-DE" dirty="0"/>
+          </a:p>
+          <a:p>
+            <a:pPr lvl="1"/>
+            <a:r>
+              <a:rPr lang="de-DE" dirty="0"/>
+              <a:t>Zusammenfügen der Bilder</a:t>
+            </a:r>
+          </a:p>
+          <a:p>
+            <a:r>
+              <a:rPr lang="de-DE" dirty="0"/>
+              <a:t>Methode 2:</a:t>
+            </a:r>
+          </a:p>
+          <a:p>
+            <a:pPr lvl="1"/>
+            <a:r>
+              <a:rPr lang="de-DE" dirty="0"/>
+              <a:t>Index Mapping</a:t>
+            </a:r>
+          </a:p>
+          <a:p>
+            <a:pPr lvl="1"/>
+            <a:r>
+              <a:rPr lang="de-DE" dirty="0"/>
+              <a:t>Bilineare Interpolation</a:t>
+            </a:r>
+          </a:p>
+          <a:p>
+            <a:endParaRPr lang="de-DE" dirty="0"/>
+          </a:p>
+        </p:txBody>
+      </p:sp>
+      <p:sp>
+        <p:nvSpPr>
+          <p:cNvPr id="3" name="Foliennummernplatzhalter 2">
+            <a:extLst>
+              <a:ext uri="{FF2B5EF4-FFF2-40B4-BE49-F238E27FC236}">
+                <a16:creationId xmlns:a16="http://schemas.microsoft.com/office/drawing/2014/main" id="{81704736-F46B-49C0-9EFA-AA28A087FC33}"/>
+              </a:ext>
+            </a:extLst>
+          </p:cNvPr>
+          <p:cNvSpPr>
+            <a:spLocks noGrp="1"/>
+          </p:cNvSpPr>
+          <p:nvPr>
+            <p:ph type="sldNum" sz="quarter" idx="12"/>
+          </p:nvPr>
+        </p:nvSpPr>
+        <p:spPr/>
+        <p:txBody>
+          <a:bodyPr/>
+          <a:lstStyle/>
+          <a:p>
+            <a:fld id="{29AD3987-26BA-49DC-BA24-72731371DC9F}" type="slidenum">
+              <a:rPr lang="de-DE" smtClean="0"/>
+              <a:t>12</a:t>
+            </a:fld>
+            <a:endParaRPr lang="de-DE" dirty="0"/>
+          </a:p>
+        </p:txBody>
+      </p:sp>
+      <p:sp>
+        <p:nvSpPr>
+          <p:cNvPr id="4" name="Titel 3">
+            <a:extLst>
+              <a:ext uri="{FF2B5EF4-FFF2-40B4-BE49-F238E27FC236}">
+                <a16:creationId xmlns:a16="http://schemas.microsoft.com/office/drawing/2014/main" id="{76FB193F-48F1-49DB-BECE-D330734D424E}"/>
+              </a:ext>
+            </a:extLst>
+          </p:cNvPr>
+          <p:cNvSpPr>
+            <a:spLocks noGrp="1"/>
+          </p:cNvSpPr>
+          <p:nvPr>
+            <p:ph type="title"/>
+          </p:nvPr>
+        </p:nvSpPr>
+        <p:spPr/>
+        <p:txBody>
+          <a:bodyPr/>
+          <a:lstStyle/>
+          <a:p>
+            <a:r>
+              <a:rPr lang="de-DE" dirty="0"/>
+              <a:t>Entwurf</a:t>
+            </a:r>
+          </a:p>
+        </p:txBody>
+      </p:sp>
+    </p:spTree>
+    <p:extLst>
+      <p:ext uri="{BB962C8B-B14F-4D97-AF65-F5344CB8AC3E}">
+        <p14:creationId xmlns:p14="http://schemas.microsoft.com/office/powerpoint/2010/main" val="2764741092"/>
       </p:ext>
     </p:extLst>
   </p:cSld>
@@ -4821,108 +4756,10 @@
       </p:grpSpPr>
       <p:sp>
         <p:nvSpPr>
-          <p:cNvPr id="2" name="Inhaltsplatzhalter 1">
+          <p:cNvPr id="3" name="Foliennummernplatzhalter 2">
             <a:extLst>
               <a:ext uri="{FF2B5EF4-FFF2-40B4-BE49-F238E27FC236}">
-                <a16:creationId xmlns:a16="http://schemas.microsoft.com/office/drawing/2014/main" id="{2196B620-9307-4A32-8E0F-A79CD82C6141}"/>
-              </a:ext>
-            </a:extLst>
-          </p:cNvPr>
-          <p:cNvSpPr>
-            <a:spLocks noGrp="1"/>
-          </p:cNvSpPr>
-          <p:nvPr>
-            <p:ph idx="1"/>
-          </p:nvPr>
-        </p:nvSpPr>
-        <p:spPr/>
-        <p:txBody>
-          <a:bodyPr>
-            <a:normAutofit lnSpcReduction="10000"/>
-          </a:bodyPr>
-          <a:lstStyle/>
-          <a:p>
-            <a:r>
-              <a:rPr lang="de-DE" dirty="0"/>
-              <a:t>Simulation der Blickposition durch die Maus</a:t>
-            </a:r>
-          </a:p>
-          <a:p>
-            <a:r>
-              <a:rPr lang="de-DE" dirty="0"/>
-              <a:t>Reduzierung der Abtastrate im peripheren Bereich</a:t>
-            </a:r>
-          </a:p>
-          <a:p>
-            <a:pPr lvl="1"/>
-            <a:r>
-              <a:rPr lang="de-DE" dirty="0"/>
-              <a:t>Objektraum</a:t>
-            </a:r>
-          </a:p>
-          <a:p>
-            <a:pPr lvl="1"/>
-            <a:r>
-              <a:rPr lang="de-DE" dirty="0"/>
-              <a:t>Bildraum</a:t>
-            </a:r>
-          </a:p>
-          <a:p>
-            <a:r>
-              <a:rPr lang="de-DE" dirty="0"/>
-              <a:t>Methode 1:</a:t>
-            </a:r>
-          </a:p>
-          <a:p>
-            <a:pPr lvl="1"/>
-            <a:r>
-              <a:rPr lang="de-DE" dirty="0"/>
-              <a:t>Zwei </a:t>
-            </a:r>
-            <a:r>
-              <a:rPr lang="de-DE" dirty="0" err="1"/>
-              <a:t>Raycasts</a:t>
-            </a:r>
-            <a:endParaRPr lang="de-DE" dirty="0"/>
-          </a:p>
-          <a:p>
-            <a:pPr lvl="1"/>
-            <a:r>
-              <a:rPr lang="de-DE" dirty="0"/>
-              <a:t>Zusammenfügen der Bilder</a:t>
-            </a:r>
-          </a:p>
-          <a:p>
-            <a:r>
-              <a:rPr lang="de-DE" dirty="0"/>
-              <a:t>Methode 2:</a:t>
-            </a:r>
-          </a:p>
-          <a:p>
-            <a:pPr lvl="1"/>
-            <a:r>
-              <a:rPr lang="de-DE" dirty="0"/>
-              <a:t>Index Mapping</a:t>
-            </a:r>
-          </a:p>
-          <a:p>
-            <a:pPr lvl="1"/>
-            <a:r>
-              <a:rPr lang="de-DE" dirty="0"/>
-              <a:t>Bilineare Interpolation</a:t>
-            </a:r>
-          </a:p>
-          <a:p>
-            <a:endParaRPr lang="de-DE" dirty="0"/>
-          </a:p>
-        </p:txBody>
-      </p:sp>
-      <p:sp>
-        <p:nvSpPr>
-          <p:cNvPr id="3" name="Foliennummernplatzhalter 2">
-            <a:extLst>
-              <a:ext uri="{FF2B5EF4-FFF2-40B4-BE49-F238E27FC236}">
-                <a16:creationId xmlns:a16="http://schemas.microsoft.com/office/drawing/2014/main" id="{81704736-F46B-49C0-9EFA-AA28A087FC33}"/>
+                <a16:creationId xmlns:a16="http://schemas.microsoft.com/office/drawing/2014/main" id="{FC907AE8-75FA-4153-8576-FAD37DFF097F}"/>
               </a:ext>
             </a:extLst>
           </p:cNvPr>
@@ -4941,93 +4778,6 @@
             <a:fld id="{29AD3987-26BA-49DC-BA24-72731371DC9F}" type="slidenum">
               <a:rPr lang="de-DE" smtClean="0"/>
               <a:t>13</a:t>
-            </a:fld>
-            <a:endParaRPr lang="de-DE" dirty="0"/>
-          </a:p>
-        </p:txBody>
-      </p:sp>
-      <p:sp>
-        <p:nvSpPr>
-          <p:cNvPr id="4" name="Titel 3">
-            <a:extLst>
-              <a:ext uri="{FF2B5EF4-FFF2-40B4-BE49-F238E27FC236}">
-                <a16:creationId xmlns:a16="http://schemas.microsoft.com/office/drawing/2014/main" id="{76FB193F-48F1-49DB-BECE-D330734D424E}"/>
-              </a:ext>
-            </a:extLst>
-          </p:cNvPr>
-          <p:cNvSpPr>
-            <a:spLocks noGrp="1"/>
-          </p:cNvSpPr>
-          <p:nvPr>
-            <p:ph type="title"/>
-          </p:nvPr>
-        </p:nvSpPr>
-        <p:spPr/>
-        <p:txBody>
-          <a:bodyPr/>
-          <a:lstStyle/>
-          <a:p>
-            <a:r>
-              <a:rPr lang="de-DE" dirty="0"/>
-              <a:t>Entwurf</a:t>
-            </a:r>
-          </a:p>
-        </p:txBody>
-      </p:sp>
-    </p:spTree>
-    <p:extLst>
-      <p:ext uri="{BB962C8B-B14F-4D97-AF65-F5344CB8AC3E}">
-        <p14:creationId xmlns:p14="http://schemas.microsoft.com/office/powerpoint/2010/main" val="2764741092"/>
-      </p:ext>
-    </p:extLst>
-  </p:cSld>
-  <p:clrMapOvr>
-    <a:masterClrMapping/>
-  </p:clrMapOvr>
-</p:sld>
-</file>
-
-<file path=ppt/slides/slide14.xml><?xml version="1.0" encoding="utf-8"?>
-<p:sld xmlns:a="http://schemas.openxmlformats.org/drawingml/2006/main" xmlns:r="http://schemas.openxmlformats.org/officeDocument/2006/relationships" xmlns:p="http://schemas.openxmlformats.org/presentationml/2006/main">
-  <p:cSld>
-    <p:spTree>
-      <p:nvGrpSpPr>
-        <p:cNvPr id="1" name=""/>
-        <p:cNvGrpSpPr/>
-        <p:nvPr/>
-      </p:nvGrpSpPr>
-      <p:grpSpPr>
-        <a:xfrm>
-          <a:off x="0" y="0"/>
-          <a:ext cx="0" cy="0"/>
-          <a:chOff x="0" y="0"/>
-          <a:chExt cx="0" cy="0"/>
-        </a:xfrm>
-      </p:grpSpPr>
-      <p:sp>
-        <p:nvSpPr>
-          <p:cNvPr id="3" name="Foliennummernplatzhalter 2">
-            <a:extLst>
-              <a:ext uri="{FF2B5EF4-FFF2-40B4-BE49-F238E27FC236}">
-                <a16:creationId xmlns:a16="http://schemas.microsoft.com/office/drawing/2014/main" id="{FC907AE8-75FA-4153-8576-FAD37DFF097F}"/>
-              </a:ext>
-            </a:extLst>
-          </p:cNvPr>
-          <p:cNvSpPr>
-            <a:spLocks noGrp="1"/>
-          </p:cNvSpPr>
-          <p:nvPr>
-            <p:ph type="sldNum" sz="quarter" idx="12"/>
-          </p:nvPr>
-        </p:nvSpPr>
-        <p:spPr/>
-        <p:txBody>
-          <a:bodyPr/>
-          <a:lstStyle/>
-          <a:p>
-            <a:fld id="{29AD3987-26BA-49DC-BA24-72731371DC9F}" type="slidenum">
-              <a:rPr lang="de-DE" smtClean="0"/>
-              <a:t>14</a:t>
             </a:fld>
             <a:endParaRPr lang="de-DE" dirty="0"/>
           </a:p>
@@ -5146,7 +4896,7 @@
 </p:sld>
 </file>
 
-<file path=ppt/slides/slide15.xml><?xml version="1.0" encoding="utf-8"?>
+<file path=ppt/slides/slide14.xml><?xml version="1.0" encoding="utf-8"?>
 <p:sld xmlns:a="http://schemas.openxmlformats.org/drawingml/2006/main" xmlns:r="http://schemas.openxmlformats.org/officeDocument/2006/relationships" xmlns:p="http://schemas.openxmlformats.org/presentationml/2006/main">
   <p:cSld>
     <p:spTree>
@@ -5186,7 +4936,7 @@
           <a:p>
             <a:fld id="{29AD3987-26BA-49DC-BA24-72731371DC9F}" type="slidenum">
               <a:rPr lang="de-DE" smtClean="0"/>
-              <a:t>15</a:t>
+              <a:t>14</a:t>
             </a:fld>
             <a:endParaRPr lang="de-DE" dirty="0"/>
           </a:p>
@@ -5331,6 +5081,118 @@
     <p:extLst>
       <p:ext uri="{BB962C8B-B14F-4D97-AF65-F5344CB8AC3E}">
         <p14:creationId xmlns:p14="http://schemas.microsoft.com/office/powerpoint/2010/main" val="2161052520"/>
+      </p:ext>
+    </p:extLst>
+  </p:cSld>
+  <p:clrMapOvr>
+    <a:masterClrMapping/>
+  </p:clrMapOvr>
+</p:sld>
+</file>
+
+<file path=ppt/slides/slide15.xml><?xml version="1.0" encoding="utf-8"?>
+<p:sld xmlns:a="http://schemas.openxmlformats.org/drawingml/2006/main" xmlns:r="http://schemas.openxmlformats.org/officeDocument/2006/relationships" xmlns:p="http://schemas.openxmlformats.org/presentationml/2006/main">
+  <p:cSld>
+    <p:spTree>
+      <p:nvGrpSpPr>
+        <p:cNvPr id="1" name=""/>
+        <p:cNvGrpSpPr/>
+        <p:nvPr/>
+      </p:nvGrpSpPr>
+      <p:grpSpPr>
+        <a:xfrm>
+          <a:off x="0" y="0"/>
+          <a:ext cx="0" cy="0"/>
+          <a:chOff x="0" y="0"/>
+          <a:chExt cx="0" cy="0"/>
+        </a:xfrm>
+      </p:grpSpPr>
+      <p:sp>
+        <p:nvSpPr>
+          <p:cNvPr id="2" name="Inhaltsplatzhalter 1">
+            <a:extLst>
+              <a:ext uri="{FF2B5EF4-FFF2-40B4-BE49-F238E27FC236}">
+                <a16:creationId xmlns:a16="http://schemas.microsoft.com/office/drawing/2014/main" id="{D085E8EF-DA4C-4D5D-82B1-33486C8EB248}"/>
+              </a:ext>
+            </a:extLst>
+          </p:cNvPr>
+          <p:cNvSpPr>
+            <a:spLocks noGrp="1"/>
+          </p:cNvSpPr>
+          <p:nvPr>
+            <p:ph idx="1"/>
+          </p:nvPr>
+        </p:nvSpPr>
+        <p:spPr/>
+        <p:txBody>
+          <a:bodyPr/>
+          <a:lstStyle/>
+          <a:p>
+            <a:endParaRPr lang="de-DE"/>
+          </a:p>
+        </p:txBody>
+      </p:sp>
+      <p:sp>
+        <p:nvSpPr>
+          <p:cNvPr id="3" name="Foliennummernplatzhalter 2">
+            <a:extLst>
+              <a:ext uri="{FF2B5EF4-FFF2-40B4-BE49-F238E27FC236}">
+                <a16:creationId xmlns:a16="http://schemas.microsoft.com/office/drawing/2014/main" id="{89BD4092-489C-498B-A2A8-399EDCDACAEE}"/>
+              </a:ext>
+            </a:extLst>
+          </p:cNvPr>
+          <p:cNvSpPr>
+            <a:spLocks noGrp="1"/>
+          </p:cNvSpPr>
+          <p:nvPr>
+            <p:ph type="sldNum" sz="quarter" idx="12"/>
+          </p:nvPr>
+        </p:nvSpPr>
+        <p:spPr/>
+        <p:txBody>
+          <a:bodyPr/>
+          <a:lstStyle/>
+          <a:p>
+            <a:fld id="{29AD3987-26BA-49DC-BA24-72731371DC9F}" type="slidenum">
+              <a:rPr lang="de-DE" smtClean="0"/>
+              <a:t>15</a:t>
+            </a:fld>
+            <a:endParaRPr lang="de-DE" dirty="0"/>
+          </a:p>
+        </p:txBody>
+      </p:sp>
+      <p:sp>
+        <p:nvSpPr>
+          <p:cNvPr id="4" name="Titel 3">
+            <a:extLst>
+              <a:ext uri="{FF2B5EF4-FFF2-40B4-BE49-F238E27FC236}">
+                <a16:creationId xmlns:a16="http://schemas.microsoft.com/office/drawing/2014/main" id="{2426994F-F454-4E9F-BE04-254D47DBF028}"/>
+              </a:ext>
+            </a:extLst>
+          </p:cNvPr>
+          <p:cNvSpPr>
+            <a:spLocks noGrp="1"/>
+          </p:cNvSpPr>
+          <p:nvPr>
+            <p:ph type="title"/>
+          </p:nvPr>
+        </p:nvSpPr>
+        <p:spPr/>
+        <p:txBody>
+          <a:bodyPr/>
+          <a:lstStyle/>
+          <a:p>
+            <a:r>
+              <a:rPr lang="de-DE" dirty="0"/>
+              <a:t>Video h.264</a:t>
+            </a:r>
+          </a:p>
+        </p:txBody>
+      </p:sp>
+    </p:spTree>
+    <p:extLst>
+      <p:ext uri="{BB962C8B-B14F-4D97-AF65-F5344CB8AC3E}">
+        <p14:creationId xmlns:p14="http://schemas.microsoft.com/office/powerpoint/2010/main" val="2991516518"/>
       </p:ext>
     </p:extLst>
   </p:cSld>
@@ -5359,35 +5221,10 @@
       </p:grpSpPr>
       <p:sp>
         <p:nvSpPr>
-          <p:cNvPr id="2" name="Inhaltsplatzhalter 1">
+          <p:cNvPr id="3" name="Foliennummernplatzhalter 2">
             <a:extLst>
               <a:ext uri="{FF2B5EF4-FFF2-40B4-BE49-F238E27FC236}">
-                <a16:creationId xmlns:a16="http://schemas.microsoft.com/office/drawing/2014/main" id="{D085E8EF-DA4C-4D5D-82B1-33486C8EB248}"/>
-              </a:ext>
-            </a:extLst>
-          </p:cNvPr>
-          <p:cNvSpPr>
-            <a:spLocks noGrp="1"/>
-          </p:cNvSpPr>
-          <p:nvPr>
-            <p:ph idx="1"/>
-          </p:nvPr>
-        </p:nvSpPr>
-        <p:spPr/>
-        <p:txBody>
-          <a:bodyPr/>
-          <a:lstStyle/>
-          <a:p>
-            <a:endParaRPr lang="de-DE"/>
-          </a:p>
-        </p:txBody>
-      </p:sp>
-      <p:sp>
-        <p:nvSpPr>
-          <p:cNvPr id="3" name="Foliennummernplatzhalter 2">
-            <a:extLst>
-              <a:ext uri="{FF2B5EF4-FFF2-40B4-BE49-F238E27FC236}">
-                <a16:creationId xmlns:a16="http://schemas.microsoft.com/office/drawing/2014/main" id="{89BD4092-489C-498B-A2A8-399EDCDACAEE}"/>
+                <a16:creationId xmlns:a16="http://schemas.microsoft.com/office/drawing/2014/main" id="{075C3468-4FAE-4482-A6B1-80A1C1D916C8}"/>
               </a:ext>
             </a:extLst>
           </p:cNvPr>
@@ -5406,93 +5243,6 @@
             <a:fld id="{29AD3987-26BA-49DC-BA24-72731371DC9F}" type="slidenum">
               <a:rPr lang="de-DE" smtClean="0"/>
               <a:t>16</a:t>
-            </a:fld>
-            <a:endParaRPr lang="de-DE" dirty="0"/>
-          </a:p>
-        </p:txBody>
-      </p:sp>
-      <p:sp>
-        <p:nvSpPr>
-          <p:cNvPr id="4" name="Titel 3">
-            <a:extLst>
-              <a:ext uri="{FF2B5EF4-FFF2-40B4-BE49-F238E27FC236}">
-                <a16:creationId xmlns:a16="http://schemas.microsoft.com/office/drawing/2014/main" id="{2426994F-F454-4E9F-BE04-254D47DBF028}"/>
-              </a:ext>
-            </a:extLst>
-          </p:cNvPr>
-          <p:cNvSpPr>
-            <a:spLocks noGrp="1"/>
-          </p:cNvSpPr>
-          <p:nvPr>
-            <p:ph type="title"/>
-          </p:nvPr>
-        </p:nvSpPr>
-        <p:spPr/>
-        <p:txBody>
-          <a:bodyPr/>
-          <a:lstStyle/>
-          <a:p>
-            <a:r>
-              <a:rPr lang="de-DE" dirty="0"/>
-              <a:t>Video h.264</a:t>
-            </a:r>
-          </a:p>
-        </p:txBody>
-      </p:sp>
-    </p:spTree>
-    <p:extLst>
-      <p:ext uri="{BB962C8B-B14F-4D97-AF65-F5344CB8AC3E}">
-        <p14:creationId xmlns:p14="http://schemas.microsoft.com/office/powerpoint/2010/main" val="2991516518"/>
-      </p:ext>
-    </p:extLst>
-  </p:cSld>
-  <p:clrMapOvr>
-    <a:masterClrMapping/>
-  </p:clrMapOvr>
-</p:sld>
-</file>
-
-<file path=ppt/slides/slide17.xml><?xml version="1.0" encoding="utf-8"?>
-<p:sld xmlns:a="http://schemas.openxmlformats.org/drawingml/2006/main" xmlns:r="http://schemas.openxmlformats.org/officeDocument/2006/relationships" xmlns:p="http://schemas.openxmlformats.org/presentationml/2006/main">
-  <p:cSld>
-    <p:spTree>
-      <p:nvGrpSpPr>
-        <p:cNvPr id="1" name=""/>
-        <p:cNvGrpSpPr/>
-        <p:nvPr/>
-      </p:nvGrpSpPr>
-      <p:grpSpPr>
-        <a:xfrm>
-          <a:off x="0" y="0"/>
-          <a:ext cx="0" cy="0"/>
-          <a:chOff x="0" y="0"/>
-          <a:chExt cx="0" cy="0"/>
-        </a:xfrm>
-      </p:grpSpPr>
-      <p:sp>
-        <p:nvSpPr>
-          <p:cNvPr id="3" name="Foliennummernplatzhalter 2">
-            <a:extLst>
-              <a:ext uri="{FF2B5EF4-FFF2-40B4-BE49-F238E27FC236}">
-                <a16:creationId xmlns:a16="http://schemas.microsoft.com/office/drawing/2014/main" id="{075C3468-4FAE-4482-A6B1-80A1C1D916C8}"/>
-              </a:ext>
-            </a:extLst>
-          </p:cNvPr>
-          <p:cNvSpPr>
-            <a:spLocks noGrp="1"/>
-          </p:cNvSpPr>
-          <p:nvPr>
-            <p:ph type="sldNum" sz="quarter" idx="12"/>
-          </p:nvPr>
-        </p:nvSpPr>
-        <p:spPr/>
-        <p:txBody>
-          <a:bodyPr/>
-          <a:lstStyle/>
-          <a:p>
-            <a:fld id="{29AD3987-26BA-49DC-BA24-72731371DC9F}" type="slidenum">
-              <a:rPr lang="de-DE" smtClean="0"/>
-              <a:t>17</a:t>
             </a:fld>
             <a:endParaRPr lang="de-DE" dirty="0"/>
           </a:p>
@@ -5576,7 +5326,7 @@
 </p:sld>
 </file>
 
-<file path=ppt/slides/slide18.xml><?xml version="1.0" encoding="utf-8"?>
+<file path=ppt/slides/slide17.xml><?xml version="1.0" encoding="utf-8"?>
 <p:sld xmlns:a="http://schemas.openxmlformats.org/drawingml/2006/main" xmlns:r="http://schemas.openxmlformats.org/officeDocument/2006/relationships" xmlns:p="http://schemas.openxmlformats.org/presentationml/2006/main">
   <p:cSld>
     <p:spTree>
@@ -5616,7 +5366,7 @@
           <a:p>
             <a:fld id="{29AD3987-26BA-49DC-BA24-72731371DC9F}" type="slidenum">
               <a:rPr lang="de-DE" smtClean="0"/>
-              <a:t>18</a:t>
+              <a:t>17</a:t>
             </a:fld>
             <a:endParaRPr lang="de-DE" dirty="0"/>
           </a:p>
@@ -5671,6 +5421,118 @@
 </p:sld>
 </file>
 
+<file path=ppt/slides/slide18.xml><?xml version="1.0" encoding="utf-8"?>
+<p:sld xmlns:a="http://schemas.openxmlformats.org/drawingml/2006/main" xmlns:r="http://schemas.openxmlformats.org/officeDocument/2006/relationships" xmlns:p="http://schemas.openxmlformats.org/presentationml/2006/main">
+  <p:cSld>
+    <p:spTree>
+      <p:nvGrpSpPr>
+        <p:cNvPr id="1" name=""/>
+        <p:cNvGrpSpPr/>
+        <p:nvPr/>
+      </p:nvGrpSpPr>
+      <p:grpSpPr>
+        <a:xfrm>
+          <a:off x="0" y="0"/>
+          <a:ext cx="0" cy="0"/>
+          <a:chOff x="0" y="0"/>
+          <a:chExt cx="0" cy="0"/>
+        </a:xfrm>
+      </p:grpSpPr>
+      <p:sp>
+        <p:nvSpPr>
+          <p:cNvPr id="2" name="Inhaltsplatzhalter 1">
+            <a:extLst>
+              <a:ext uri="{FF2B5EF4-FFF2-40B4-BE49-F238E27FC236}">
+                <a16:creationId xmlns:a16="http://schemas.microsoft.com/office/drawing/2014/main" id="{65A8FDFA-9158-4F5B-B217-58F4813EA1D4}"/>
+              </a:ext>
+            </a:extLst>
+          </p:cNvPr>
+          <p:cNvSpPr>
+            <a:spLocks noGrp="1"/>
+          </p:cNvSpPr>
+          <p:nvPr>
+            <p:ph idx="1"/>
+          </p:nvPr>
+        </p:nvSpPr>
+        <p:spPr/>
+        <p:txBody>
+          <a:bodyPr/>
+          <a:lstStyle/>
+          <a:p>
+            <a:endParaRPr lang="de-DE" dirty="0"/>
+          </a:p>
+        </p:txBody>
+      </p:sp>
+      <p:sp>
+        <p:nvSpPr>
+          <p:cNvPr id="3" name="Foliennummernplatzhalter 2">
+            <a:extLst>
+              <a:ext uri="{FF2B5EF4-FFF2-40B4-BE49-F238E27FC236}">
+                <a16:creationId xmlns:a16="http://schemas.microsoft.com/office/drawing/2014/main" id="{3A92B2AE-FD91-476E-A0BA-A33507D415F7}"/>
+              </a:ext>
+            </a:extLst>
+          </p:cNvPr>
+          <p:cNvSpPr>
+            <a:spLocks noGrp="1"/>
+          </p:cNvSpPr>
+          <p:nvPr>
+            <p:ph type="sldNum" sz="quarter" idx="12"/>
+          </p:nvPr>
+        </p:nvSpPr>
+        <p:spPr/>
+        <p:txBody>
+          <a:bodyPr/>
+          <a:lstStyle/>
+          <a:p>
+            <a:fld id="{29AD3987-26BA-49DC-BA24-72731371DC9F}" type="slidenum">
+              <a:rPr lang="de-DE" smtClean="0"/>
+              <a:t>18</a:t>
+            </a:fld>
+            <a:endParaRPr lang="de-DE" dirty="0"/>
+          </a:p>
+        </p:txBody>
+      </p:sp>
+      <p:sp>
+        <p:nvSpPr>
+          <p:cNvPr id="4" name="Titel 3">
+            <a:extLst>
+              <a:ext uri="{FF2B5EF4-FFF2-40B4-BE49-F238E27FC236}">
+                <a16:creationId xmlns:a16="http://schemas.microsoft.com/office/drawing/2014/main" id="{1CEDDF61-A407-4902-8BFD-CC56DD364054}"/>
+              </a:ext>
+            </a:extLst>
+          </p:cNvPr>
+          <p:cNvSpPr>
+            <a:spLocks noGrp="1"/>
+          </p:cNvSpPr>
+          <p:nvPr>
+            <p:ph type="title"/>
+          </p:nvPr>
+        </p:nvSpPr>
+        <p:spPr/>
+        <p:txBody>
+          <a:bodyPr/>
+          <a:lstStyle/>
+          <a:p>
+            <a:r>
+              <a:rPr lang="de-DE" dirty="0"/>
+              <a:t>Fazit &amp; Ausblick</a:t>
+            </a:r>
+          </a:p>
+        </p:txBody>
+      </p:sp>
+    </p:spTree>
+    <p:extLst>
+      <p:ext uri="{BB962C8B-B14F-4D97-AF65-F5344CB8AC3E}">
+        <p14:creationId xmlns:p14="http://schemas.microsoft.com/office/powerpoint/2010/main" val="3815123622"/>
+      </p:ext>
+    </p:extLst>
+  </p:cSld>
+  <p:clrMapOvr>
+    <a:masterClrMapping/>
+  </p:clrMapOvr>
+</p:sld>
+</file>
+
 <file path=ppt/slides/slide19.xml><?xml version="1.0" encoding="utf-8"?>
 <p:sld xmlns:a="http://schemas.openxmlformats.org/drawingml/2006/main" xmlns:r="http://schemas.openxmlformats.org/officeDocument/2006/relationships" xmlns:p="http://schemas.openxmlformats.org/presentationml/2006/main">
   <p:cSld>
@@ -5693,7 +5555,7 @@
           <p:cNvPr id="2" name="Inhaltsplatzhalter 1">
             <a:extLst>
               <a:ext uri="{FF2B5EF4-FFF2-40B4-BE49-F238E27FC236}">
-                <a16:creationId xmlns:a16="http://schemas.microsoft.com/office/drawing/2014/main" id="{65A8FDFA-9158-4F5B-B217-58F4813EA1D4}"/>
+                <a16:creationId xmlns:a16="http://schemas.microsoft.com/office/drawing/2014/main" id="{002BA65F-1EFC-48C1-9C31-D228E1A6EE9B}"/>
               </a:ext>
             </a:extLst>
           </p:cNvPr>
@@ -5709,7 +5571,7 @@
           <a:bodyPr/>
           <a:lstStyle/>
           <a:p>
-            <a:endParaRPr lang="de-DE" dirty="0"/>
+            <a:endParaRPr lang="de-DE"/>
           </a:p>
         </p:txBody>
       </p:sp>
@@ -5718,7 +5580,7 @@
           <p:cNvPr id="3" name="Foliennummernplatzhalter 2">
             <a:extLst>
               <a:ext uri="{FF2B5EF4-FFF2-40B4-BE49-F238E27FC236}">
-                <a16:creationId xmlns:a16="http://schemas.microsoft.com/office/drawing/2014/main" id="{3A92B2AE-FD91-476E-A0BA-A33507D415F7}"/>
+                <a16:creationId xmlns:a16="http://schemas.microsoft.com/office/drawing/2014/main" id="{EE12B332-6480-47FC-9A50-7AAC660ABDFE}"/>
               </a:ext>
             </a:extLst>
           </p:cNvPr>
@@ -5747,7 +5609,7 @@
           <p:cNvPr id="4" name="Titel 3">
             <a:extLst>
               <a:ext uri="{FF2B5EF4-FFF2-40B4-BE49-F238E27FC236}">
-                <a16:creationId xmlns:a16="http://schemas.microsoft.com/office/drawing/2014/main" id="{1CEDDF61-A407-4902-8BFD-CC56DD364054}"/>
+                <a16:creationId xmlns:a16="http://schemas.microsoft.com/office/drawing/2014/main" id="{2F91CB94-F68A-4FA8-99D3-7863D572BF1F}"/>
               </a:ext>
             </a:extLst>
           </p:cNvPr>
@@ -5765,7 +5627,7 @@
           <a:p>
             <a:r>
               <a:rPr lang="de-DE" dirty="0"/>
-              <a:t>Fazit &amp; Ausblick</a:t>
+              <a:t>Quellen</a:t>
             </a:r>
           </a:p>
         </p:txBody>
@@ -5773,7 +5635,7 @@
     </p:spTree>
     <p:extLst>
       <p:ext uri="{BB962C8B-B14F-4D97-AF65-F5344CB8AC3E}">
-        <p14:creationId xmlns:p14="http://schemas.microsoft.com/office/powerpoint/2010/main" val="3815123622"/>
+        <p14:creationId xmlns:p14="http://schemas.microsoft.com/office/powerpoint/2010/main" val="1145009430"/>
       </p:ext>
     </p:extLst>
   </p:cSld>
@@ -6036,118 +5898,6 @@
     <p:extLst>
       <p:ext uri="{BB962C8B-B14F-4D97-AF65-F5344CB8AC3E}">
         <p14:creationId xmlns:p14="http://schemas.microsoft.com/office/powerpoint/2010/main" val="2801504829"/>
-      </p:ext>
-    </p:extLst>
-  </p:cSld>
-  <p:clrMapOvr>
-    <a:masterClrMapping/>
-  </p:clrMapOvr>
-</p:sld>
-</file>
-
-<file path=ppt/slides/slide20.xml><?xml version="1.0" encoding="utf-8"?>
-<p:sld xmlns:a="http://schemas.openxmlformats.org/drawingml/2006/main" xmlns:r="http://schemas.openxmlformats.org/officeDocument/2006/relationships" xmlns:p="http://schemas.openxmlformats.org/presentationml/2006/main">
-  <p:cSld>
-    <p:spTree>
-      <p:nvGrpSpPr>
-        <p:cNvPr id="1" name=""/>
-        <p:cNvGrpSpPr/>
-        <p:nvPr/>
-      </p:nvGrpSpPr>
-      <p:grpSpPr>
-        <a:xfrm>
-          <a:off x="0" y="0"/>
-          <a:ext cx="0" cy="0"/>
-          <a:chOff x="0" y="0"/>
-          <a:chExt cx="0" cy="0"/>
-        </a:xfrm>
-      </p:grpSpPr>
-      <p:sp>
-        <p:nvSpPr>
-          <p:cNvPr id="2" name="Inhaltsplatzhalter 1">
-            <a:extLst>
-              <a:ext uri="{FF2B5EF4-FFF2-40B4-BE49-F238E27FC236}">
-                <a16:creationId xmlns:a16="http://schemas.microsoft.com/office/drawing/2014/main" id="{002BA65F-1EFC-48C1-9C31-D228E1A6EE9B}"/>
-              </a:ext>
-            </a:extLst>
-          </p:cNvPr>
-          <p:cNvSpPr>
-            <a:spLocks noGrp="1"/>
-          </p:cNvSpPr>
-          <p:nvPr>
-            <p:ph idx="1"/>
-          </p:nvPr>
-        </p:nvSpPr>
-        <p:spPr/>
-        <p:txBody>
-          <a:bodyPr/>
-          <a:lstStyle/>
-          <a:p>
-            <a:endParaRPr lang="de-DE"/>
-          </a:p>
-        </p:txBody>
-      </p:sp>
-      <p:sp>
-        <p:nvSpPr>
-          <p:cNvPr id="3" name="Foliennummernplatzhalter 2">
-            <a:extLst>
-              <a:ext uri="{FF2B5EF4-FFF2-40B4-BE49-F238E27FC236}">
-                <a16:creationId xmlns:a16="http://schemas.microsoft.com/office/drawing/2014/main" id="{EE12B332-6480-47FC-9A50-7AAC660ABDFE}"/>
-              </a:ext>
-            </a:extLst>
-          </p:cNvPr>
-          <p:cNvSpPr>
-            <a:spLocks noGrp="1"/>
-          </p:cNvSpPr>
-          <p:nvPr>
-            <p:ph type="sldNum" sz="quarter" idx="12"/>
-          </p:nvPr>
-        </p:nvSpPr>
-        <p:spPr/>
-        <p:txBody>
-          <a:bodyPr/>
-          <a:lstStyle/>
-          <a:p>
-            <a:fld id="{29AD3987-26BA-49DC-BA24-72731371DC9F}" type="slidenum">
-              <a:rPr lang="de-DE" smtClean="0"/>
-              <a:t>20</a:t>
-            </a:fld>
-            <a:endParaRPr lang="de-DE" dirty="0"/>
-          </a:p>
-        </p:txBody>
-      </p:sp>
-      <p:sp>
-        <p:nvSpPr>
-          <p:cNvPr id="4" name="Titel 3">
-            <a:extLst>
-              <a:ext uri="{FF2B5EF4-FFF2-40B4-BE49-F238E27FC236}">
-                <a16:creationId xmlns:a16="http://schemas.microsoft.com/office/drawing/2014/main" id="{2F91CB94-F68A-4FA8-99D3-7863D572BF1F}"/>
-              </a:ext>
-            </a:extLst>
-          </p:cNvPr>
-          <p:cNvSpPr>
-            <a:spLocks noGrp="1"/>
-          </p:cNvSpPr>
-          <p:nvPr>
-            <p:ph type="title"/>
-          </p:nvPr>
-        </p:nvSpPr>
-        <p:spPr/>
-        <p:txBody>
-          <a:bodyPr/>
-          <a:lstStyle/>
-          <a:p>
-            <a:r>
-              <a:rPr lang="de-DE" dirty="0"/>
-              <a:t>Quellen</a:t>
-            </a:r>
-          </a:p>
-        </p:txBody>
-      </p:sp>
-    </p:spTree>
-    <p:extLst>
-      <p:ext uri="{BB962C8B-B14F-4D97-AF65-F5344CB8AC3E}">
-        <p14:creationId xmlns:p14="http://schemas.microsoft.com/office/powerpoint/2010/main" val="1145009430"/>
       </p:ext>
     </p:extLst>
   </p:cSld>
@@ -6475,6 +6225,13 @@
             <a:pPr lvl="1"/>
             <a:r>
               <a:rPr lang="de-DE" dirty="0"/>
+              <a:t>GPU</a:t>
+            </a:r>
+          </a:p>
+          <a:p>
+            <a:pPr lvl="1"/>
+            <a:r>
+              <a:rPr lang="de-DE" dirty="0"/>
               <a:t>Zusammensetzung aus 3 Teilbildern </a:t>
             </a:r>
           </a:p>
@@ -6490,13 +6247,6 @@
             <a:r>
               <a:rPr lang="de-DE" dirty="0"/>
               <a:t>und geometrischen Detailgraden</a:t>
-            </a:r>
-          </a:p>
-          <a:p>
-            <a:pPr lvl="1"/>
-            <a:r>
-              <a:rPr lang="de-DE" dirty="0"/>
-              <a:t>GPU</a:t>
             </a:r>
           </a:p>
           <a:p>
@@ -6663,6 +6413,41 @@
       </p:grpSpPr>
       <p:pic>
         <p:nvPicPr>
+          <p:cNvPr id="8" name="Grafik 7">
+            <a:extLst>
+              <a:ext uri="{FF2B5EF4-FFF2-40B4-BE49-F238E27FC236}">
+                <a16:creationId xmlns:a16="http://schemas.microsoft.com/office/drawing/2014/main" id="{F799DFB4-1438-4FEA-8A1F-BA7F4D089E82}"/>
+              </a:ext>
+            </a:extLst>
+          </p:cNvPr>
+          <p:cNvPicPr>
+            <a:picLocks noChangeAspect="1"/>
+          </p:cNvPicPr>
+          <p:nvPr/>
+        </p:nvPicPr>
+        <p:blipFill rotWithShape="1">
+          <a:blip r:embed="rId3">
+            <a:extLst>
+              <a:ext uri="{28A0092B-C50C-407E-A947-70E740481C1C}">
+                <a14:useLocalDpi xmlns:a14="http://schemas.microsoft.com/office/drawing/2010/main" val="0"/>
+              </a:ext>
+            </a:extLst>
+          </a:blip>
+          <a:srcRect l="13634" t="8262" r="12766" b="8951"/>
+          <a:stretch/>
+        </p:blipFill>
+        <p:spPr>
+          <a:xfrm>
+            <a:off x="5508104" y="2677897"/>
+            <a:ext cx="3384376" cy="2141380"/>
+          </a:xfrm>
+          <a:prstGeom prst="rect">
+            <a:avLst/>
+          </a:prstGeom>
+        </p:spPr>
+      </p:pic>
+      <p:pic>
+        <p:nvPicPr>
           <p:cNvPr id="6" name="Grafik 5">
             <a:extLst>
               <a:ext uri="{FF2B5EF4-FFF2-40B4-BE49-F238E27FC236}">
@@ -6676,7 +6461,7 @@
           <p:nvPr/>
         </p:nvPicPr>
         <p:blipFill>
-          <a:blip r:embed="rId3">
+          <a:blip r:embed="rId4">
             <a:extLst>
               <a:ext uri="{28A0092B-C50C-407E-A947-70E740481C1C}">
                 <a14:useLocalDpi xmlns:a14="http://schemas.microsoft.com/office/drawing/2010/main" val="0"/>
@@ -6689,8 +6474,8 @@
         </p:blipFill>
         <p:spPr>
           <a:xfrm>
-            <a:off x="4569533" y="171451"/>
-            <a:ext cx="4104456" cy="2657851"/>
+            <a:off x="5150531" y="36960"/>
+            <a:ext cx="3741949" cy="2423109"/>
           </a:xfrm>
           <a:prstGeom prst="rect">
             <a:avLst/>
@@ -6715,7 +6500,9 @@
         </p:nvSpPr>
         <p:spPr/>
         <p:txBody>
-          <a:bodyPr/>
+          <a:bodyPr>
+            <a:normAutofit fontScale="92500" lnSpcReduction="20000"/>
+          </a:bodyPr>
           <a:lstStyle/>
           <a:p>
             <a:r>
@@ -6759,6 +6546,55 @@
             <a:r>
               <a:rPr lang="de-DE" dirty="0"/>
               <a:t>Stark abnehmende Sehschärfe nach außen hin</a:t>
+            </a:r>
+          </a:p>
+          <a:p>
+            <a:r>
+              <a:rPr lang="de-DE" dirty="0"/>
+              <a:t>Wichtige Augenbewegungen</a:t>
+            </a:r>
+          </a:p>
+          <a:p>
+            <a:pPr lvl="1"/>
+            <a:r>
+              <a:rPr lang="de-DE" dirty="0"/>
+              <a:t>Sakkade</a:t>
+            </a:r>
+          </a:p>
+          <a:p>
+            <a:pPr lvl="2"/>
+            <a:r>
+              <a:rPr lang="de-DE" dirty="0"/>
+              <a:t>Schnelle Springen zwischen Objekten</a:t>
+            </a:r>
+          </a:p>
+          <a:p>
+            <a:pPr lvl="2"/>
+            <a:r>
+              <a:rPr lang="de-DE" dirty="0"/>
+              <a:t>Ca. 2 bis 3 Sakkaden pro Sekunde</a:t>
+            </a:r>
+          </a:p>
+          <a:p>
+            <a:pPr lvl="1"/>
+            <a:r>
+              <a:rPr lang="de-DE" dirty="0"/>
+              <a:t>Fixation</a:t>
+            </a:r>
+          </a:p>
+          <a:p>
+            <a:pPr lvl="2"/>
+            <a:r>
+              <a:rPr lang="de-DE" dirty="0"/>
+              <a:t>Tritt zwischen Sakkaden auf, ca. 100 </a:t>
+            </a:r>
+            <a:r>
+              <a:rPr lang="de-DE" dirty="0" err="1"/>
+              <a:t>ms</a:t>
+            </a:r>
+            <a:r>
+              <a:rPr lang="de-DE" dirty="0"/>
+              <a:t> – 1.5 s</a:t>
             </a:r>
           </a:p>
           <a:p>
@@ -6853,12 +6689,166 @@
           <a:chExt cx="0" cy="0"/>
         </a:xfrm>
       </p:grpSpPr>
+      <p:sp>
+        <p:nvSpPr>
+          <p:cNvPr id="2" name="Inhaltsplatzhalter 1">
+            <a:extLst>
+              <a:ext uri="{FF2B5EF4-FFF2-40B4-BE49-F238E27FC236}">
+                <a16:creationId xmlns:a16="http://schemas.microsoft.com/office/drawing/2014/main" id="{C62841FF-ED95-410A-A44C-4CD3F18EDF65}"/>
+              </a:ext>
+            </a:extLst>
+          </p:cNvPr>
+          <p:cNvSpPr>
+            <a:spLocks noGrp="1"/>
+          </p:cNvSpPr>
+          <p:nvPr>
+            <p:ph idx="1"/>
+          </p:nvPr>
+        </p:nvSpPr>
+        <p:spPr/>
+        <p:txBody>
+          <a:bodyPr/>
+          <a:lstStyle/>
+          <a:p>
+            <a:r>
+              <a:rPr lang="de-DE" dirty="0"/>
+              <a:t>Informationen über Blickposition und –verlauf</a:t>
+            </a:r>
+          </a:p>
+          <a:p>
+            <a:r>
+              <a:rPr lang="de-DE" dirty="0"/>
+              <a:t>Augenposition in 3D und auf dem Bildschirm</a:t>
+            </a:r>
+          </a:p>
+          <a:p>
+            <a:r>
+              <a:rPr lang="de-DE" dirty="0" err="1"/>
+              <a:t>Tobii</a:t>
+            </a:r>
+            <a:r>
+              <a:rPr lang="de-DE" dirty="0"/>
+              <a:t> Pro </a:t>
+            </a:r>
+            <a:r>
+              <a:rPr lang="de-DE" dirty="0" err="1"/>
+              <a:t>Spectrum</a:t>
+            </a:r>
+            <a:r>
+              <a:rPr lang="de-DE" dirty="0"/>
+              <a:t> Eyetracker</a:t>
+            </a:r>
+          </a:p>
+          <a:p>
+            <a:pPr lvl="1"/>
+            <a:r>
+              <a:rPr lang="de-DE" dirty="0"/>
+              <a:t>1200 Hz</a:t>
+            </a:r>
+          </a:p>
+          <a:p>
+            <a:endParaRPr lang="de-DE" dirty="0"/>
+          </a:p>
+        </p:txBody>
+      </p:sp>
+      <p:sp>
+        <p:nvSpPr>
+          <p:cNvPr id="3" name="Foliennummernplatzhalter 2">
+            <a:extLst>
+              <a:ext uri="{FF2B5EF4-FFF2-40B4-BE49-F238E27FC236}">
+                <a16:creationId xmlns:a16="http://schemas.microsoft.com/office/drawing/2014/main" id="{603903D2-F9DC-4D39-B875-B0D05A83EBC9}"/>
+              </a:ext>
+            </a:extLst>
+          </p:cNvPr>
+          <p:cNvSpPr>
+            <a:spLocks noGrp="1"/>
+          </p:cNvSpPr>
+          <p:nvPr>
+            <p:ph type="sldNum" sz="quarter" idx="12"/>
+          </p:nvPr>
+        </p:nvSpPr>
+        <p:spPr/>
+        <p:txBody>
+          <a:bodyPr/>
+          <a:lstStyle/>
+          <a:p>
+            <a:fld id="{29AD3987-26BA-49DC-BA24-72731371DC9F}" type="slidenum">
+              <a:rPr lang="de-DE" smtClean="0"/>
+              <a:t>6</a:t>
+            </a:fld>
+            <a:endParaRPr lang="de-DE" dirty="0"/>
+          </a:p>
+        </p:txBody>
+      </p:sp>
+      <p:sp>
+        <p:nvSpPr>
+          <p:cNvPr id="4" name="Titel 3">
+            <a:extLst>
+              <a:ext uri="{FF2B5EF4-FFF2-40B4-BE49-F238E27FC236}">
+                <a16:creationId xmlns:a16="http://schemas.microsoft.com/office/drawing/2014/main" id="{967B9506-C4D3-48E3-83E9-BC865F3F5D31}"/>
+              </a:ext>
+            </a:extLst>
+          </p:cNvPr>
+          <p:cNvSpPr>
+            <a:spLocks noGrp="1"/>
+          </p:cNvSpPr>
+          <p:nvPr>
+            <p:ph type="title"/>
+          </p:nvPr>
+        </p:nvSpPr>
+        <p:spPr/>
+        <p:txBody>
+          <a:bodyPr/>
+          <a:lstStyle/>
+          <a:p>
+            <a:r>
+              <a:rPr lang="de-DE" dirty="0"/>
+              <a:t>Eyetracking</a:t>
+            </a:r>
+          </a:p>
+        </p:txBody>
+      </p:sp>
       <p:pic>
         <p:nvPicPr>
-          <p:cNvPr id="8" name="Grafik 7">
+          <p:cNvPr id="6" name="Grafik 5">
             <a:extLst>
               <a:ext uri="{FF2B5EF4-FFF2-40B4-BE49-F238E27FC236}">
-                <a16:creationId xmlns:a16="http://schemas.microsoft.com/office/drawing/2014/main" id="{865958EF-3179-4FCA-8B10-E64DB842EFCD}"/>
+                <a16:creationId xmlns:a16="http://schemas.microsoft.com/office/drawing/2014/main" id="{12E546CC-A99D-4E2B-BB8B-BC70ECA926F1}"/>
+              </a:ext>
+            </a:extLst>
+          </p:cNvPr>
+          <p:cNvPicPr>
+            <a:picLocks noChangeAspect="1"/>
+          </p:cNvPicPr>
+          <p:nvPr/>
+        </p:nvPicPr>
+        <p:blipFill rotWithShape="1">
+          <a:blip r:embed="rId3" cstate="print">
+            <a:extLst>
+              <a:ext uri="{28A0092B-C50C-407E-A947-70E740481C1C}">
+                <a14:useLocalDpi xmlns:a14="http://schemas.microsoft.com/office/drawing/2010/main" val="0"/>
+              </a:ext>
+            </a:extLst>
+          </a:blip>
+          <a:srcRect l="36219" t="2551" r="36219" b="2551"/>
+          <a:stretch/>
+        </p:blipFill>
+        <p:spPr>
+          <a:xfrm>
+            <a:off x="6080212" y="333363"/>
+            <a:ext cx="1789656" cy="2054991"/>
+          </a:xfrm>
+          <a:prstGeom prst="rect">
+            <a:avLst/>
+          </a:prstGeom>
+        </p:spPr>
+      </p:pic>
+      <p:pic>
+        <p:nvPicPr>
+          <p:cNvPr id="9" name="Grafik 8">
+            <a:extLst>
+              <a:ext uri="{FF2B5EF4-FFF2-40B4-BE49-F238E27FC236}">
+                <a16:creationId xmlns:a16="http://schemas.microsoft.com/office/drawing/2014/main" id="{3643476E-66C6-4A2D-BAE6-00252FCFDDC4}"/>
               </a:ext>
             </a:extLst>
           </p:cNvPr>
@@ -6868,7 +6858,7 @@
           <p:nvPr/>
         </p:nvPicPr>
         <p:blipFill>
-          <a:blip r:embed="rId3">
+          <a:blip r:embed="rId4" cstate="print">
             <a:extLst>
               <a:ext uri="{28A0092B-C50C-407E-A947-70E740481C1C}">
                 <a14:useLocalDpi xmlns:a14="http://schemas.microsoft.com/office/drawing/2010/main" val="0"/>
@@ -6881,211 +6871,54 @@
         </p:blipFill>
         <p:spPr>
           <a:xfrm>
-            <a:off x="3897465" y="493278"/>
-            <a:ext cx="4571429" cy="2571429"/>
+            <a:off x="755576" y="2897845"/>
+            <a:ext cx="2879466" cy="1619699"/>
           </a:xfrm>
           <a:prstGeom prst="rect">
             <a:avLst/>
           </a:prstGeom>
         </p:spPr>
       </p:pic>
-      <p:sp>
-        <p:nvSpPr>
-          <p:cNvPr id="2" name="Inhaltsplatzhalter 1">
+      <p:pic>
+        <p:nvPicPr>
+          <p:cNvPr id="11" name="Grafik 10">
             <a:extLst>
               <a:ext uri="{FF2B5EF4-FFF2-40B4-BE49-F238E27FC236}">
-                <a16:creationId xmlns:a16="http://schemas.microsoft.com/office/drawing/2014/main" id="{601F37B6-425C-4752-A762-D0805FBE3952}"/>
+                <a16:creationId xmlns:a16="http://schemas.microsoft.com/office/drawing/2014/main" id="{BD30F8EE-801F-41F2-B1EA-BC20237AA6F4}"/>
               </a:ext>
             </a:extLst>
           </p:cNvPr>
-          <p:cNvSpPr>
-            <a:spLocks noGrp="1"/>
-          </p:cNvSpPr>
-          <p:nvPr>
-            <p:ph idx="1"/>
-          </p:nvPr>
-        </p:nvSpPr>
+          <p:cNvPicPr>
+            <a:picLocks noChangeAspect="1"/>
+          </p:cNvPicPr>
+          <p:nvPr/>
+        </p:nvPicPr>
+        <p:blipFill>
+          <a:blip r:embed="rId5" cstate="print">
+            <a:extLst>
+              <a:ext uri="{28A0092B-C50C-407E-A947-70E740481C1C}">
+                <a14:useLocalDpi xmlns:a14="http://schemas.microsoft.com/office/drawing/2010/main" val="0"/>
+              </a:ext>
+            </a:extLst>
+          </a:blip>
+          <a:stretch>
+            <a:fillRect/>
+          </a:stretch>
+        </p:blipFill>
         <p:spPr>
           <a:xfrm>
-            <a:off x="251520" y="1202574"/>
-            <a:ext cx="8640960" cy="3400026"/>
-          </a:xfrm>
-        </p:spPr>
-        <p:txBody>
-          <a:bodyPr/>
-          <a:lstStyle/>
-          <a:p>
-            <a:r>
-              <a:rPr lang="de-DE" dirty="0"/>
-              <a:t>Wichtige Augenbewegungen</a:t>
-            </a:r>
-          </a:p>
-          <a:p>
-            <a:pPr lvl="1"/>
-            <a:r>
-              <a:rPr lang="de-DE" dirty="0"/>
-              <a:t>Fixation</a:t>
-            </a:r>
-          </a:p>
-          <a:p>
-            <a:pPr lvl="1"/>
-            <a:r>
-              <a:rPr lang="de-DE" dirty="0"/>
-              <a:t>Sakkade</a:t>
-            </a:r>
-          </a:p>
-          <a:p>
-            <a:r>
-              <a:rPr lang="de-DE" dirty="0"/>
-              <a:t>Fixation</a:t>
-            </a:r>
-          </a:p>
-          <a:p>
-            <a:pPr lvl="1"/>
-            <a:r>
-              <a:rPr lang="de-DE" dirty="0"/>
-              <a:t>Tritt zwischen Sakkaden auf, dauert ca. 100 </a:t>
-            </a:r>
-            <a:r>
-              <a:rPr lang="de-DE" dirty="0" err="1"/>
-              <a:t>ms</a:t>
-            </a:r>
-            <a:r>
-              <a:rPr lang="de-DE" dirty="0"/>
-              <a:t> – 1.5 s</a:t>
-            </a:r>
-          </a:p>
-          <a:p>
-            <a:r>
-              <a:rPr lang="de-DE" dirty="0"/>
-              <a:t>Sakkade</a:t>
-            </a:r>
-          </a:p>
-          <a:p>
-            <a:pPr lvl="1"/>
-            <a:r>
-              <a:rPr lang="de-DE" dirty="0"/>
-              <a:t>Schnelle Springen zwischen Objekten von Interesse (</a:t>
-            </a:r>
-            <a:r>
-              <a:rPr lang="de-DE" dirty="0" err="1"/>
-              <a:t>OvI</a:t>
-            </a:r>
-            <a:r>
-              <a:rPr lang="de-DE" dirty="0"/>
-              <a:t>)</a:t>
-            </a:r>
-          </a:p>
-          <a:p>
-            <a:pPr lvl="1"/>
-            <a:r>
-              <a:rPr lang="de-DE" dirty="0"/>
-              <a:t>Ca. 2 bis 3 Sakkaden pro Sekunde</a:t>
-            </a:r>
-          </a:p>
-        </p:txBody>
-      </p:sp>
-      <p:sp>
-        <p:nvSpPr>
-          <p:cNvPr id="3" name="Foliennummernplatzhalter 2">
-            <a:extLst>
-              <a:ext uri="{FF2B5EF4-FFF2-40B4-BE49-F238E27FC236}">
-                <a16:creationId xmlns:a16="http://schemas.microsoft.com/office/drawing/2014/main" id="{5262D57D-AD8A-4A3C-8AD8-199751C9401F}"/>
-              </a:ext>
-            </a:extLst>
-          </p:cNvPr>
-          <p:cNvSpPr>
-            <a:spLocks noGrp="1"/>
-          </p:cNvSpPr>
-          <p:nvPr>
-            <p:ph type="sldNum" sz="quarter" idx="12"/>
-          </p:nvPr>
-        </p:nvSpPr>
-        <p:spPr/>
-        <p:txBody>
-          <a:bodyPr/>
-          <a:lstStyle/>
-          <a:p>
-            <a:fld id="{29AD3987-26BA-49DC-BA24-72731371DC9F}" type="slidenum">
-              <a:rPr lang="de-DE" smtClean="0"/>
-              <a:t>6</a:t>
-            </a:fld>
-            <a:endParaRPr lang="de-DE" dirty="0"/>
-          </a:p>
-        </p:txBody>
-      </p:sp>
-      <p:sp>
-        <p:nvSpPr>
-          <p:cNvPr id="4" name="Titel 3">
-            <a:extLst>
-              <a:ext uri="{FF2B5EF4-FFF2-40B4-BE49-F238E27FC236}">
-                <a16:creationId xmlns:a16="http://schemas.microsoft.com/office/drawing/2014/main" id="{98479CE4-904E-4549-9861-E9F407130B51}"/>
-              </a:ext>
-            </a:extLst>
-          </p:cNvPr>
-          <p:cNvSpPr>
-            <a:spLocks noGrp="1"/>
-          </p:cNvSpPr>
-          <p:nvPr>
-            <p:ph type="title"/>
-          </p:nvPr>
-        </p:nvSpPr>
-        <p:spPr/>
-        <p:txBody>
-          <a:bodyPr/>
-          <a:lstStyle/>
-          <a:p>
-            <a:r>
-              <a:rPr lang="de-DE" dirty="0"/>
-              <a:t>Sehapparat</a:t>
-            </a:r>
-          </a:p>
-        </p:txBody>
-      </p:sp>
-      <p:sp>
-        <p:nvSpPr>
-          <p:cNvPr id="5" name="Textfeld 4">
-            <a:extLst>
-              <a:ext uri="{FF2B5EF4-FFF2-40B4-BE49-F238E27FC236}">
-                <a16:creationId xmlns:a16="http://schemas.microsoft.com/office/drawing/2014/main" id="{E083EE23-CEDF-4C93-9079-364DE38770A5}"/>
-              </a:ext>
-            </a:extLst>
-          </p:cNvPr>
-          <p:cNvSpPr txBox="1"/>
-          <p:nvPr/>
-        </p:nvSpPr>
-        <p:spPr>
-          <a:xfrm>
-            <a:off x="4572000" y="3962620"/>
-            <a:ext cx="3755836" cy="369332"/>
+            <a:off x="4283968" y="2500307"/>
+            <a:ext cx="3585900" cy="2285689"/>
           </a:xfrm>
           <a:prstGeom prst="rect">
             <a:avLst/>
           </a:prstGeom>
-          <a:noFill/>
         </p:spPr>
-        <p:txBody>
-          <a:bodyPr wrap="none" rtlCol="0">
-            <a:spAutoFit/>
-          </a:bodyPr>
-          <a:lstStyle/>
-          <a:p>
-            <a:r>
-              <a:rPr lang="de-DE" dirty="0"/>
-              <a:t>TODO: Mit vorheriger Folie </a:t>
-            </a:r>
-            <a:r>
-              <a:rPr lang="de-DE" dirty="0" err="1"/>
-              <a:t>mergen</a:t>
-            </a:r>
-            <a:endParaRPr lang="de-DE" dirty="0"/>
-          </a:p>
-        </p:txBody>
-      </p:sp>
+      </p:pic>
     </p:spTree>
     <p:extLst>
       <p:ext uri="{BB962C8B-B14F-4D97-AF65-F5344CB8AC3E}">
-        <p14:creationId xmlns:p14="http://schemas.microsoft.com/office/powerpoint/2010/main" val="1428651626"/>
+        <p14:creationId xmlns:p14="http://schemas.microsoft.com/office/powerpoint/2010/main" val="1763769228"/>
       </p:ext>
     </p:extLst>
   </p:cSld>
@@ -7600,7 +7433,7 @@
           <p:cNvPr id="2" name="Inhaltsplatzhalter 1">
             <a:extLst>
               <a:ext uri="{FF2B5EF4-FFF2-40B4-BE49-F238E27FC236}">
-                <a16:creationId xmlns:a16="http://schemas.microsoft.com/office/drawing/2014/main" id="{C62841FF-ED95-410A-A44C-4CD3F18EDF65}"/>
+                <a16:creationId xmlns:a16="http://schemas.microsoft.com/office/drawing/2014/main" id="{2BFC54A6-CF1E-4705-BBE0-0F5AF5BE1FA3}"/>
               </a:ext>
             </a:extLst>
           </p:cNvPr>
@@ -7618,43 +7451,44 @@
           <a:p>
             <a:r>
               <a:rPr lang="de-DE" dirty="0"/>
-              <a:t>Informationen über Blickposition und –verlauf</a:t>
-            </a:r>
-          </a:p>
-          <a:p>
-            <a:r>
-              <a:rPr lang="de-DE" dirty="0"/>
-              <a:t>Augenposition in 3D und auf dem Bildschirm</a:t>
-            </a:r>
-          </a:p>
-          <a:p>
+              <a:t>Hoch parallel</a:t>
+            </a:r>
+          </a:p>
+          <a:p>
+            <a:pPr lvl="1"/>
+            <a:r>
+              <a:rPr lang="de-DE" dirty="0"/>
+              <a:t>Strahlen können unabhängig voneinander verfolgt werden</a:t>
+            </a:r>
+          </a:p>
+          <a:p>
+            <a:r>
+              <a:rPr lang="de-DE" dirty="0"/>
+              <a:t>Programmierbar (General Purpose </a:t>
+            </a:r>
             <a:r>
               <a:rPr lang="de-DE" dirty="0" err="1"/>
-              <a:t>Tobii</a:t>
-            </a:r>
-            <a:r>
-              <a:rPr lang="de-DE" dirty="0"/>
-              <a:t> Pro </a:t>
-            </a:r>
+              <a:t>Computation</a:t>
+            </a:r>
+            <a:r>
+              <a:rPr lang="de-DE" dirty="0"/>
+              <a:t> on GPU (GPGPU))</a:t>
+            </a:r>
+          </a:p>
+          <a:p>
+            <a:pPr lvl="1"/>
             <a:r>
               <a:rPr lang="de-DE" dirty="0" err="1"/>
-              <a:t>Spectrum</a:t>
-            </a:r>
-            <a:r>
-              <a:rPr lang="de-DE" dirty="0"/>
-              <a:t> Eyetracker</a:t>
-            </a:r>
-          </a:p>
-          <a:p>
-            <a:pPr lvl="1"/>
-            <a:r>
-              <a:rPr lang="de-DE" dirty="0"/>
-              <a:t>1200 Hz</a:t>
-            </a:r>
-          </a:p>
-          <a:p>
+              <a:t>OpenCL</a:t>
+            </a:r>
             <a:endParaRPr lang="de-DE" dirty="0"/>
           </a:p>
+          <a:p>
+            <a:pPr marL="0" indent="0">
+              <a:buNone/>
+            </a:pPr>
+            <a:endParaRPr lang="de-DE" dirty="0"/>
+          </a:p>
         </p:txBody>
       </p:sp>
       <p:sp>
@@ -7662,7 +7496,7 @@
           <p:cNvPr id="3" name="Foliennummernplatzhalter 2">
             <a:extLst>
               <a:ext uri="{FF2B5EF4-FFF2-40B4-BE49-F238E27FC236}">
-                <a16:creationId xmlns:a16="http://schemas.microsoft.com/office/drawing/2014/main" id="{603903D2-F9DC-4D39-B875-B0D05A83EBC9}"/>
+                <a16:creationId xmlns:a16="http://schemas.microsoft.com/office/drawing/2014/main" id="{C68930AE-E0C2-4512-88F5-C8FB2408B8A7}"/>
               </a:ext>
             </a:extLst>
           </p:cNvPr>
@@ -7691,7 +7525,7 @@
           <p:cNvPr id="4" name="Titel 3">
             <a:extLst>
               <a:ext uri="{FF2B5EF4-FFF2-40B4-BE49-F238E27FC236}">
-                <a16:creationId xmlns:a16="http://schemas.microsoft.com/office/drawing/2014/main" id="{967B9506-C4D3-48E3-83E9-BC865F3F5D31}"/>
+                <a16:creationId xmlns:a16="http://schemas.microsoft.com/office/drawing/2014/main" id="{8E1DF498-9417-4C18-AE3C-AD5C3FECA02A}"/>
               </a:ext>
             </a:extLst>
           </p:cNvPr>
@@ -7709,7 +7543,7 @@
           <a:p>
             <a:r>
               <a:rPr lang="de-DE" dirty="0"/>
-              <a:t>Eyetracking</a:t>
+              <a:t>GPU Architektur</a:t>
             </a:r>
           </a:p>
         </p:txBody>
@@ -7719,42 +7553,7 @@
           <p:cNvPr id="6" name="Grafik 5">
             <a:extLst>
               <a:ext uri="{FF2B5EF4-FFF2-40B4-BE49-F238E27FC236}">
-                <a16:creationId xmlns:a16="http://schemas.microsoft.com/office/drawing/2014/main" id="{12E546CC-A99D-4E2B-BB8B-BC70ECA926F1}"/>
-              </a:ext>
-            </a:extLst>
-          </p:cNvPr>
-          <p:cNvPicPr>
-            <a:picLocks noChangeAspect="1"/>
-          </p:cNvPicPr>
-          <p:nvPr/>
-        </p:nvPicPr>
-        <p:blipFill rotWithShape="1">
-          <a:blip r:embed="rId3" cstate="print">
-            <a:extLst>
-              <a:ext uri="{28A0092B-C50C-407E-A947-70E740481C1C}">
-                <a14:useLocalDpi xmlns:a14="http://schemas.microsoft.com/office/drawing/2010/main" val="0"/>
-              </a:ext>
-            </a:extLst>
-          </a:blip>
-          <a:srcRect l="36219" t="2551" r="36219" b="2551"/>
-          <a:stretch/>
-        </p:blipFill>
-        <p:spPr>
-          <a:xfrm>
-            <a:off x="6080212" y="333363"/>
-            <a:ext cx="1789656" cy="2054991"/>
-          </a:xfrm>
-          <a:prstGeom prst="rect">
-            <a:avLst/>
-          </a:prstGeom>
-        </p:spPr>
-      </p:pic>
-      <p:pic>
-        <p:nvPicPr>
-          <p:cNvPr id="9" name="Grafik 8">
-            <a:extLst>
-              <a:ext uri="{FF2B5EF4-FFF2-40B4-BE49-F238E27FC236}">
-                <a16:creationId xmlns:a16="http://schemas.microsoft.com/office/drawing/2014/main" id="{3643476E-66C6-4A2D-BAE6-00252FCFDDC4}"/>
+                <a16:creationId xmlns:a16="http://schemas.microsoft.com/office/drawing/2014/main" id="{AA132576-CFEF-4A97-B41A-C44527DEF4F1}"/>
               </a:ext>
             </a:extLst>
           </p:cNvPr>
@@ -7764,7 +7563,7 @@
           <p:nvPr/>
         </p:nvPicPr>
         <p:blipFill>
-          <a:blip r:embed="rId4" cstate="print">
+          <a:blip r:embed="rId3">
             <a:extLst>
               <a:ext uri="{28A0092B-C50C-407E-A947-70E740481C1C}">
                 <a14:useLocalDpi xmlns:a14="http://schemas.microsoft.com/office/drawing/2010/main" val="0"/>
@@ -7777,44 +7576,8 @@
         </p:blipFill>
         <p:spPr>
           <a:xfrm>
-            <a:off x="755576" y="2897845"/>
-            <a:ext cx="2879466" cy="1619699"/>
-          </a:xfrm>
-          <a:prstGeom prst="rect">
-            <a:avLst/>
-          </a:prstGeom>
-        </p:spPr>
-      </p:pic>
-      <p:pic>
-        <p:nvPicPr>
-          <p:cNvPr id="11" name="Grafik 10">
-            <a:extLst>
-              <a:ext uri="{FF2B5EF4-FFF2-40B4-BE49-F238E27FC236}">
-                <a16:creationId xmlns:a16="http://schemas.microsoft.com/office/drawing/2014/main" id="{BD30F8EE-801F-41F2-B1EA-BC20237AA6F4}"/>
-              </a:ext>
-            </a:extLst>
-          </p:cNvPr>
-          <p:cNvPicPr>
-            <a:picLocks noChangeAspect="1"/>
-          </p:cNvPicPr>
-          <p:nvPr/>
-        </p:nvPicPr>
-        <p:blipFill>
-          <a:blip r:embed="rId5" cstate="print">
-            <a:extLst>
-              <a:ext uri="{28A0092B-C50C-407E-A947-70E740481C1C}">
-                <a14:useLocalDpi xmlns:a14="http://schemas.microsoft.com/office/drawing/2010/main" val="0"/>
-              </a:ext>
-            </a:extLst>
-          </a:blip>
-          <a:stretch>
-            <a:fillRect/>
-          </a:stretch>
-        </p:blipFill>
-        <p:spPr>
-          <a:xfrm>
-            <a:off x="4283968" y="2500307"/>
-            <a:ext cx="3585900" cy="2285689"/>
+            <a:off x="2443426" y="2662925"/>
+            <a:ext cx="4257148" cy="1939675"/>
           </a:xfrm>
           <a:prstGeom prst="rect">
             <a:avLst/>
@@ -7824,7 +7587,7 @@
     </p:spTree>
     <p:extLst>
       <p:ext uri="{BB962C8B-B14F-4D97-AF65-F5344CB8AC3E}">
-        <p14:creationId xmlns:p14="http://schemas.microsoft.com/office/powerpoint/2010/main" val="1763769228"/>
+        <p14:creationId xmlns:p14="http://schemas.microsoft.com/office/powerpoint/2010/main" val="3045631903"/>
       </p:ext>
     </p:extLst>
   </p:cSld>

</xml_diff>

<commit_message>
Vortrag: Pre- vs. Postclassification in Notizen verschoben.
</commit_message>
<xml_diff>
--- a/Dokumente/Vortrag/Wahrnehmungsorientiertes_Volumen-Rendering.pptx
+++ b/Dokumente/Vortrag/Wahrnehmungsorientiertes_Volumen-Rendering.pptx
@@ -637,21 +637,21 @@
           <a:p>
             <a:r>
               <a:rPr lang="de-DE" dirty="0"/>
-              <a:t>Entwurf:</a:t>
-            </a:r>
-          </a:p>
-          <a:p>
-            <a:r>
-              <a:rPr lang="de-DE" dirty="0"/>
-              <a:t>-- Ausgangprojekt </a:t>
+              <a:t>Ein Work-Item berechnet einen Strahl.</a:t>
+            </a:r>
+          </a:p>
+          <a:p>
+            <a:r>
+              <a:rPr lang="de-DE" dirty="0"/>
+              <a:t>Bei einer Auflösung mit einem Strahl pro Pixel kann als </a:t>
             </a:r>
             <a:r>
               <a:rPr lang="de-DE" dirty="0" err="1"/>
-              <a:t>Raycaster</a:t>
-            </a:r>
-            <a:r>
-              <a:rPr lang="de-DE" dirty="0"/>
-              <a:t>, Simulieren der Blickposition, Reduzierung der Abtastrate im Objekt- und Bildbereich</a:t>
+              <a:t>NDRange</a:t>
+            </a:r>
+            <a:r>
+              <a:rPr lang="de-DE" dirty="0"/>
+              <a:t> die Bilddimension genommen werden mit Breite und Höhe (Tiefe z = 1).</a:t>
             </a:r>
           </a:p>
         </p:txBody>
@@ -673,7 +673,7 @@
           <a:p>
             <a:fld id="{6F4F2A7C-E896-4C15-99D8-2B5BC94A4F36}" type="slidenum">
               <a:rPr lang="de-DE" smtClean="0"/>
-              <a:t>12</a:t>
+              <a:t>10</a:t>
             </a:fld>
             <a:endParaRPr lang="de-DE"/>
           </a:p>
@@ -682,7 +682,7 @@
     </p:spTree>
     <p:extLst>
       <p:ext uri="{BB962C8B-B14F-4D97-AF65-F5344CB8AC3E}">
-        <p14:creationId xmlns:p14="http://schemas.microsoft.com/office/powerpoint/2010/main" val="3834442345"/>
+        <p14:creationId xmlns:p14="http://schemas.microsoft.com/office/powerpoint/2010/main" val="2307871628"/>
       </p:ext>
     </p:extLst>
   </p:cSld>
@@ -736,7 +736,24 @@
           <a:bodyPr/>
           <a:lstStyle/>
           <a:p>
-            <a:endParaRPr lang="de-DE" dirty="0"/>
+            <a:r>
+              <a:rPr lang="de-DE" dirty="0"/>
+              <a:t>Entwurf:</a:t>
+            </a:r>
+          </a:p>
+          <a:p>
+            <a:r>
+              <a:rPr lang="de-DE" dirty="0"/>
+              <a:t>-- Ausgangprojekt </a:t>
+            </a:r>
+            <a:r>
+              <a:rPr lang="de-DE" dirty="0" err="1"/>
+              <a:t>Raycaster</a:t>
+            </a:r>
+            <a:r>
+              <a:rPr lang="de-DE" dirty="0"/>
+              <a:t>, Simulieren der Blickposition, Reduzierung der Abtastrate im Objekt- und Bildbereich</a:t>
+            </a:r>
           </a:p>
         </p:txBody>
       </p:sp>
@@ -757,7 +774,7 @@
           <a:p>
             <a:fld id="{6F4F2A7C-E896-4C15-99D8-2B5BC94A4F36}" type="slidenum">
               <a:rPr lang="de-DE" smtClean="0"/>
-              <a:t>13</a:t>
+              <a:t>12</a:t>
             </a:fld>
             <a:endParaRPr lang="de-DE"/>
           </a:p>
@@ -766,7 +783,7 @@
     </p:spTree>
     <p:extLst>
       <p:ext uri="{BB962C8B-B14F-4D97-AF65-F5344CB8AC3E}">
-        <p14:creationId xmlns:p14="http://schemas.microsoft.com/office/powerpoint/2010/main" val="1983490928"/>
+        <p14:creationId xmlns:p14="http://schemas.microsoft.com/office/powerpoint/2010/main" val="3834442345"/>
       </p:ext>
     </p:extLst>
   </p:cSld>
@@ -820,6 +837,90 @@
           <a:bodyPr/>
           <a:lstStyle/>
           <a:p>
+            <a:endParaRPr lang="de-DE" dirty="0"/>
+          </a:p>
+        </p:txBody>
+      </p:sp>
+      <p:sp>
+        <p:nvSpPr>
+          <p:cNvPr id="4" name="Foliennummernplatzhalter 3"/>
+          <p:cNvSpPr>
+            <a:spLocks noGrp="1"/>
+          </p:cNvSpPr>
+          <p:nvPr>
+            <p:ph type="sldNum" sz="quarter" idx="5"/>
+          </p:nvPr>
+        </p:nvSpPr>
+        <p:spPr/>
+        <p:txBody>
+          <a:bodyPr/>
+          <a:lstStyle/>
+          <a:p>
+            <a:fld id="{6F4F2A7C-E896-4C15-99D8-2B5BC94A4F36}" type="slidenum">
+              <a:rPr lang="de-DE" smtClean="0"/>
+              <a:t>13</a:t>
+            </a:fld>
+            <a:endParaRPr lang="de-DE"/>
+          </a:p>
+        </p:txBody>
+      </p:sp>
+    </p:spTree>
+    <p:extLst>
+      <p:ext uri="{BB962C8B-B14F-4D97-AF65-F5344CB8AC3E}">
+        <p14:creationId xmlns:p14="http://schemas.microsoft.com/office/powerpoint/2010/main" val="1983490928"/>
+      </p:ext>
+    </p:extLst>
+  </p:cSld>
+  <p:clrMapOvr>
+    <a:masterClrMapping/>
+  </p:clrMapOvr>
+</p:notes>
+</file>
+
+<file path=ppt/notesSlides/notesSlide13.xml><?xml version="1.0" encoding="utf-8"?>
+<p:notes xmlns:a="http://schemas.openxmlformats.org/drawingml/2006/main" xmlns:r="http://schemas.openxmlformats.org/officeDocument/2006/relationships" xmlns:p="http://schemas.openxmlformats.org/presentationml/2006/main">
+  <p:cSld>
+    <p:spTree>
+      <p:nvGrpSpPr>
+        <p:cNvPr id="1" name=""/>
+        <p:cNvGrpSpPr/>
+        <p:nvPr/>
+      </p:nvGrpSpPr>
+      <p:grpSpPr>
+        <a:xfrm>
+          <a:off x="0" y="0"/>
+          <a:ext cx="0" cy="0"/>
+          <a:chOff x="0" y="0"/>
+          <a:chExt cx="0" cy="0"/>
+        </a:xfrm>
+      </p:grpSpPr>
+      <p:sp>
+        <p:nvSpPr>
+          <p:cNvPr id="2" name="Folienbildplatzhalter 1"/>
+          <p:cNvSpPr>
+            <a:spLocks noGrp="1" noRot="1" noChangeAspect="1"/>
+          </p:cNvSpPr>
+          <p:nvPr>
+            <p:ph type="sldImg"/>
+          </p:nvPr>
+        </p:nvSpPr>
+        <p:spPr/>
+      </p:sp>
+      <p:sp>
+        <p:nvSpPr>
+          <p:cNvPr id="3" name="Notizenplatzhalter 2"/>
+          <p:cNvSpPr>
+            <a:spLocks noGrp="1"/>
+          </p:cNvSpPr>
+          <p:nvPr>
+            <p:ph type="body" idx="1"/>
+          </p:nvPr>
+        </p:nvSpPr>
+        <p:spPr/>
+        <p:txBody>
+          <a:bodyPr/>
+          <a:lstStyle/>
+          <a:p>
             <a:r>
               <a:rPr lang="de-DE" dirty="0"/>
               <a:t>Ergebnisse:</a:t>
@@ -880,7 +981,7 @@
 </p:notes>
 </file>
 
-<file path=ppt/notesSlides/notesSlide13.xml><?xml version="1.0" encoding="utf-8"?>
+<file path=ppt/notesSlides/notesSlide14.xml><?xml version="1.0" encoding="utf-8"?>
 <p:notes xmlns:a="http://schemas.openxmlformats.org/drawingml/2006/main" xmlns:r="http://schemas.openxmlformats.org/officeDocument/2006/relationships" xmlns:p="http://schemas.openxmlformats.org/presentationml/2006/main">
   <p:cSld>
     <p:spTree>
@@ -1914,22 +2015,34 @@
           <a:lstStyle/>
           <a:p>
             <a:r>
-              <a:rPr lang="de-DE" dirty="0"/>
-              <a:t>GPU Architektur:</a:t>
-            </a:r>
-          </a:p>
-          <a:p>
-            <a:r>
-              <a:rPr lang="de-DE" dirty="0"/>
-              <a:t>-- Warum beschäftige ich mich damit? </a:t>
-            </a:r>
-            <a:r>
               <a:rPr lang="de-DE" dirty="0" err="1"/>
-              <a:t>OpenCL</a:t>
-            </a:r>
-            <a:r>
-              <a:rPr lang="de-DE" dirty="0"/>
-              <a:t>, Work-Items, Work-Groups, Ausführungsmodell (Threads, Thread-Blocks)</a:t>
+              <a:t>Pre</a:t>
+            </a:r>
+            <a:r>
+              <a:rPr lang="de-DE" dirty="0"/>
+              <a:t>- vs. </a:t>
+            </a:r>
+            <a:r>
+              <a:rPr lang="de-DE" dirty="0" err="1"/>
+              <a:t>Postclassification</a:t>
+            </a:r>
+            <a:r>
+              <a:rPr lang="de-DE" dirty="0"/>
+              <a:t>.</a:t>
+            </a:r>
+          </a:p>
+          <a:p>
+            <a:r>
+              <a:rPr lang="de-DE" dirty="0"/>
+              <a:t>Hier: </a:t>
+            </a:r>
+            <a:r>
+              <a:rPr lang="de-DE" dirty="0" err="1"/>
+              <a:t>pre-classification</a:t>
+            </a:r>
+            <a:r>
+              <a:rPr lang="de-DE" dirty="0"/>
+              <a:t> (eig. Schlechter)</a:t>
             </a:r>
           </a:p>
           <a:p>
@@ -1954,7 +2067,7 @@
           <a:p>
             <a:fld id="{6F4F2A7C-E896-4C15-99D8-2B5BC94A4F36}" type="slidenum">
               <a:rPr lang="de-DE" smtClean="0"/>
-              <a:t>9</a:t>
+              <a:t>8</a:t>
             </a:fld>
             <a:endParaRPr lang="de-DE"/>
           </a:p>
@@ -1963,7 +2076,7 @@
     </p:spTree>
     <p:extLst>
       <p:ext uri="{BB962C8B-B14F-4D97-AF65-F5344CB8AC3E}">
-        <p14:creationId xmlns:p14="http://schemas.microsoft.com/office/powerpoint/2010/main" val="3385818242"/>
+        <p14:creationId xmlns:p14="http://schemas.microsoft.com/office/powerpoint/2010/main" val="1373183444"/>
       </p:ext>
     </p:extLst>
   </p:cSld>
@@ -2019,22 +2132,25 @@
           <a:p>
             <a:r>
               <a:rPr lang="de-DE" dirty="0"/>
-              <a:t>Ein Work-Item berechnet einen Strahl.</a:t>
-            </a:r>
-          </a:p>
-          <a:p>
-            <a:r>
-              <a:rPr lang="de-DE" dirty="0"/>
-              <a:t>Bei einer Auflösung mit einem Strahl pro Pixel kann als </a:t>
+              <a:t>GPU Architektur:</a:t>
+            </a:r>
+          </a:p>
+          <a:p>
+            <a:r>
+              <a:rPr lang="de-DE" dirty="0"/>
+              <a:t>-- Warum beschäftige ich mich damit? </a:t>
             </a:r>
             <a:r>
               <a:rPr lang="de-DE" dirty="0" err="1"/>
-              <a:t>NDRange</a:t>
-            </a:r>
-            <a:r>
-              <a:rPr lang="de-DE" dirty="0"/>
-              <a:t> die Bilddimension genommen werden mit Breite und Höhe (Tiefe z = 1).</a:t>
-            </a:r>
+              <a:t>OpenCL</a:t>
+            </a:r>
+            <a:r>
+              <a:rPr lang="de-DE" dirty="0"/>
+              <a:t>, Work-Items, Work-Groups, Ausführungsmodell (Threads, Thread-Blocks)</a:t>
+            </a:r>
+          </a:p>
+          <a:p>
+            <a:endParaRPr lang="de-DE" dirty="0"/>
           </a:p>
         </p:txBody>
       </p:sp>
@@ -2055,7 +2171,7 @@
           <a:p>
             <a:fld id="{6F4F2A7C-E896-4C15-99D8-2B5BC94A4F36}" type="slidenum">
               <a:rPr lang="de-DE" smtClean="0"/>
-              <a:t>10</a:t>
+              <a:t>9</a:t>
             </a:fld>
             <a:endParaRPr lang="de-DE"/>
           </a:p>
@@ -2064,7 +2180,7 @@
     </p:spTree>
     <p:extLst>
       <p:ext uri="{BB962C8B-B14F-4D97-AF65-F5344CB8AC3E}">
-        <p14:creationId xmlns:p14="http://schemas.microsoft.com/office/powerpoint/2010/main" val="2307871628"/>
+        <p14:creationId xmlns:p14="http://schemas.microsoft.com/office/powerpoint/2010/main" val="3385818242"/>
       </p:ext>
     </p:extLst>
   </p:cSld>
@@ -6835,7 +6951,7 @@
         </p:blipFill>
         <p:spPr>
           <a:xfrm>
-            <a:off x="6080212" y="333363"/>
+            <a:off x="6402869" y="228114"/>
             <a:ext cx="1789656" cy="2054991"/>
           </a:xfrm>
           <a:prstGeom prst="rect">
@@ -6907,8 +7023,8 @@
         </p:blipFill>
         <p:spPr>
           <a:xfrm>
-            <a:off x="4283968" y="2500307"/>
-            <a:ext cx="3585900" cy="2285689"/>
+            <a:off x="4139098" y="2388354"/>
+            <a:ext cx="4053427" cy="2583695"/>
           </a:xfrm>
           <a:prstGeom prst="rect">
             <a:avLst/>
@@ -7279,7 +7395,7 @@
           <p:nvPr/>
         </p:nvPicPr>
         <p:blipFill rotWithShape="1">
-          <a:blip r:embed="rId2" cstate="print">
+          <a:blip r:embed="rId3" cstate="print">
             <a:extLst>
               <a:ext uri="{28A0092B-C50C-407E-A947-70E740481C1C}">
                 <a14:useLocalDpi xmlns:a14="http://schemas.microsoft.com/office/drawing/2010/main" val="0"/>
@@ -7314,7 +7430,7 @@
           <p:nvPr/>
         </p:nvPicPr>
         <p:blipFill rotWithShape="1">
-          <a:blip r:embed="rId3" cstate="print">
+          <a:blip r:embed="rId4" cstate="print">
             <a:extLst>
               <a:ext uri="{28A0092B-C50C-407E-A947-70E740481C1C}">
                 <a14:useLocalDpi xmlns:a14="http://schemas.microsoft.com/office/drawing/2010/main" val="0"/>
@@ -7334,70 +7450,6 @@
           </a:prstGeom>
         </p:spPr>
       </p:pic>
-      <p:sp>
-        <p:nvSpPr>
-          <p:cNvPr id="7" name="Textfeld 6">
-            <a:extLst>
-              <a:ext uri="{FF2B5EF4-FFF2-40B4-BE49-F238E27FC236}">
-                <a16:creationId xmlns:a16="http://schemas.microsoft.com/office/drawing/2014/main" id="{E6122153-11F3-4D94-922C-6498122D542F}"/>
-              </a:ext>
-            </a:extLst>
-          </p:cNvPr>
-          <p:cNvSpPr txBox="1"/>
-          <p:nvPr/>
-        </p:nvSpPr>
-        <p:spPr>
-          <a:xfrm>
-            <a:off x="4792623" y="1913018"/>
-            <a:ext cx="4113242" cy="923330"/>
-          </a:xfrm>
-          <a:prstGeom prst="rect">
-            <a:avLst/>
-          </a:prstGeom>
-          <a:noFill/>
-        </p:spPr>
-        <p:txBody>
-          <a:bodyPr wrap="none" rtlCol="0">
-            <a:spAutoFit/>
-          </a:bodyPr>
-          <a:lstStyle/>
-          <a:p>
-            <a:r>
-              <a:rPr lang="de-DE" dirty="0" err="1"/>
-              <a:t>Pre</a:t>
-            </a:r>
-            <a:r>
-              <a:rPr lang="de-DE" dirty="0"/>
-              <a:t>- vs. </a:t>
-            </a:r>
-            <a:r>
-              <a:rPr lang="de-DE" dirty="0" err="1"/>
-              <a:t>Postclassification</a:t>
-            </a:r>
-            <a:r>
-              <a:rPr lang="de-DE" dirty="0"/>
-              <a:t>.</a:t>
-            </a:r>
-          </a:p>
-          <a:p>
-            <a:r>
-              <a:rPr lang="de-DE" dirty="0"/>
-              <a:t>Hier: </a:t>
-            </a:r>
-            <a:r>
-              <a:rPr lang="de-DE" dirty="0" err="1"/>
-              <a:t>pre-classification</a:t>
-            </a:r>
-            <a:r>
-              <a:rPr lang="de-DE" dirty="0"/>
-              <a:t> (eig. Schlechter)</a:t>
-            </a:r>
-          </a:p>
-          <a:p>
-            <a:endParaRPr lang="de-DE" dirty="0"/>
-          </a:p>
-        </p:txBody>
-      </p:sp>
     </p:spTree>
     <p:extLst>
       <p:ext uri="{BB962C8B-B14F-4D97-AF65-F5344CB8AC3E}">

</xml_diff>

<commit_message>
Vortrag: GPU Architektur angepasst.
</commit_message>
<xml_diff>
--- a/Dokumente/Vortrag/Wahrnehmungsorientiertes_Volumen-Rendering.pptx
+++ b/Dokumente/Vortrag/Wahrnehmungsorientiertes_Volumen-Rendering.pptx
@@ -5,7 +5,7 @@
     <p:sldMasterId id="2147483648" r:id="rId1"/>
   </p:sldMasterIdLst>
   <p:notesMasterIdLst>
-    <p:notesMasterId r:id="rId21"/>
+    <p:notesMasterId r:id="rId20"/>
   </p:notesMasterIdLst>
   <p:sldIdLst>
     <p:sldId id="259" r:id="rId2"/>
@@ -16,17 +16,16 @@
     <p:sldId id="265" r:id="rId7"/>
     <p:sldId id="264" r:id="rId8"/>
     <p:sldId id="274" r:id="rId9"/>
-    <p:sldId id="266" r:id="rId10"/>
-    <p:sldId id="275" r:id="rId11"/>
-    <p:sldId id="276" r:id="rId12"/>
-    <p:sldId id="267" r:id="rId13"/>
-    <p:sldId id="268" r:id="rId14"/>
-    <p:sldId id="277" r:id="rId15"/>
-    <p:sldId id="279" r:id="rId16"/>
-    <p:sldId id="269" r:id="rId17"/>
-    <p:sldId id="278" r:id="rId18"/>
-    <p:sldId id="270" r:id="rId19"/>
-    <p:sldId id="271" r:id="rId20"/>
+    <p:sldId id="275" r:id="rId10"/>
+    <p:sldId id="267" r:id="rId11"/>
+    <p:sldId id="268" r:id="rId12"/>
+    <p:sldId id="280" r:id="rId13"/>
+    <p:sldId id="277" r:id="rId14"/>
+    <p:sldId id="279" r:id="rId15"/>
+    <p:sldId id="269" r:id="rId16"/>
+    <p:sldId id="278" r:id="rId17"/>
+    <p:sldId id="270" r:id="rId18"/>
+    <p:sldId id="271" r:id="rId19"/>
   </p:sldIdLst>
   <p:sldSz cx="9144000" cy="5143500" type="screen16x9"/>
   <p:notesSz cx="6858000" cy="9144000"/>
@@ -637,21 +636,21 @@
           <a:p>
             <a:r>
               <a:rPr lang="de-DE" dirty="0"/>
-              <a:t>Ein Work-Item berechnet einen Strahl.</a:t>
-            </a:r>
-          </a:p>
-          <a:p>
-            <a:r>
-              <a:rPr lang="de-DE" dirty="0"/>
-              <a:t>Bei einer Auflösung mit einem Strahl pro Pixel kann als </a:t>
+              <a:t>Entwurf:</a:t>
+            </a:r>
+          </a:p>
+          <a:p>
+            <a:r>
+              <a:rPr lang="de-DE" dirty="0"/>
+              <a:t>-- Ausgangprojekt </a:t>
             </a:r>
             <a:r>
               <a:rPr lang="de-DE" dirty="0" err="1"/>
-              <a:t>NDRange</a:t>
-            </a:r>
-            <a:r>
-              <a:rPr lang="de-DE" dirty="0"/>
-              <a:t> die Bilddimension genommen werden mit Breite und Höhe (Tiefe z = 1).</a:t>
+              <a:t>Raycaster</a:t>
+            </a:r>
+            <a:r>
+              <a:rPr lang="de-DE" dirty="0"/>
+              <a:t>, Simulieren der Blickposition, Reduzierung der Abtastrate im Objekt- und Bildbereich</a:t>
             </a:r>
           </a:p>
         </p:txBody>
@@ -682,7 +681,7 @@
     </p:spTree>
     <p:extLst>
       <p:ext uri="{BB962C8B-B14F-4D97-AF65-F5344CB8AC3E}">
-        <p14:creationId xmlns:p14="http://schemas.microsoft.com/office/powerpoint/2010/main" val="2307871628"/>
+        <p14:creationId xmlns:p14="http://schemas.microsoft.com/office/powerpoint/2010/main" val="3834442345"/>
       </p:ext>
     </p:extLst>
   </p:cSld>
@@ -736,24 +735,7 @@
           <a:bodyPr/>
           <a:lstStyle/>
           <a:p>
-            <a:r>
-              <a:rPr lang="de-DE" dirty="0"/>
-              <a:t>Entwurf:</a:t>
-            </a:r>
-          </a:p>
-          <a:p>
-            <a:r>
-              <a:rPr lang="de-DE" dirty="0"/>
-              <a:t>-- Ausgangprojekt </a:t>
-            </a:r>
-            <a:r>
-              <a:rPr lang="de-DE" dirty="0" err="1"/>
-              <a:t>Raycaster</a:t>
-            </a:r>
-            <a:r>
-              <a:rPr lang="de-DE" dirty="0"/>
-              <a:t>, Simulieren der Blickposition, Reduzierung der Abtastrate im Objekt- und Bildbereich</a:t>
-            </a:r>
+            <a:endParaRPr lang="de-DE" dirty="0"/>
           </a:p>
         </p:txBody>
       </p:sp>
@@ -774,7 +756,7 @@
           <a:p>
             <a:fld id="{6F4F2A7C-E896-4C15-99D8-2B5BC94A4F36}" type="slidenum">
               <a:rPr lang="de-DE" smtClean="0"/>
-              <a:t>12</a:t>
+              <a:t>11</a:t>
             </a:fld>
             <a:endParaRPr lang="de-DE"/>
           </a:p>
@@ -783,7 +765,7 @@
     </p:spTree>
     <p:extLst>
       <p:ext uri="{BB962C8B-B14F-4D97-AF65-F5344CB8AC3E}">
-        <p14:creationId xmlns:p14="http://schemas.microsoft.com/office/powerpoint/2010/main" val="3834442345"/>
+        <p14:creationId xmlns:p14="http://schemas.microsoft.com/office/powerpoint/2010/main" val="1983490928"/>
       </p:ext>
     </p:extLst>
   </p:cSld>
@@ -837,6 +819,26 @@
           <a:bodyPr/>
           <a:lstStyle/>
           <a:p>
+            <a:r>
+              <a:rPr lang="de-DE" dirty="0"/>
+              <a:t>Ergebnisse:</a:t>
+            </a:r>
+          </a:p>
+          <a:p>
+            <a:r>
+              <a:rPr lang="de-DE" dirty="0"/>
+              <a:t>-- Sammeln von Messwerten, Bilder/Videos, </a:t>
+            </a:r>
+            <a:r>
+              <a:rPr lang="de-DE" dirty="0" err="1"/>
+              <a:t>Performanzwerte</a:t>
+            </a:r>
+            <a:r>
+              <a:rPr lang="de-DE" dirty="0"/>
+              <a:t>, Vergleich, Diskussion</a:t>
+            </a:r>
+          </a:p>
+          <a:p>
             <a:endParaRPr lang="de-DE" dirty="0"/>
           </a:p>
         </p:txBody>
@@ -858,7 +860,7 @@
           <a:p>
             <a:fld id="{6F4F2A7C-E896-4C15-99D8-2B5BC94A4F36}" type="slidenum">
               <a:rPr lang="de-DE" smtClean="0"/>
-              <a:t>13</a:t>
+              <a:t>15</a:t>
             </a:fld>
             <a:endParaRPr lang="de-DE"/>
           </a:p>
@@ -867,7 +869,7 @@
     </p:spTree>
     <p:extLst>
       <p:ext uri="{BB962C8B-B14F-4D97-AF65-F5344CB8AC3E}">
-        <p14:creationId xmlns:p14="http://schemas.microsoft.com/office/powerpoint/2010/main" val="1983490928"/>
+        <p14:creationId xmlns:p14="http://schemas.microsoft.com/office/powerpoint/2010/main" val="2812053294"/>
       </p:ext>
     </p:extLst>
   </p:cSld>
@@ -923,24 +925,19 @@
           <a:p>
             <a:r>
               <a:rPr lang="de-DE" dirty="0"/>
-              <a:t>Ergebnisse:</a:t>
-            </a:r>
-          </a:p>
-          <a:p>
-            <a:r>
-              <a:rPr lang="de-DE" dirty="0"/>
-              <a:t>-- Sammeln von Messwerten, Bilder/Videos, </a:t>
+              <a:t>Ausblick u.a. das </a:t>
             </a:r>
             <a:r>
               <a:rPr lang="de-DE" dirty="0" err="1"/>
-              <a:t>Performanzwerte</a:t>
-            </a:r>
-            <a:r>
-              <a:rPr lang="de-DE" dirty="0"/>
-              <a:t>, Vergleich, Diskussion</a:t>
-            </a:r>
-          </a:p>
-          <a:p>
+              <a:t>paper</a:t>
+            </a:r>
+            <a:endParaRPr lang="de-DE" dirty="0"/>
+          </a:p>
+          <a:p>
+            <a:r>
+              <a:rPr lang="de-DE" dirty="0" err="1"/>
+              <a:t>Gaussfilterbild</a:t>
+            </a:r>
             <a:endParaRPr lang="de-DE" dirty="0"/>
           </a:p>
         </p:txBody>
@@ -962,106 +959,7 @@
           <a:p>
             <a:fld id="{6F4F2A7C-E896-4C15-99D8-2B5BC94A4F36}" type="slidenum">
               <a:rPr lang="de-DE" smtClean="0"/>
-              <a:t>16</a:t>
-            </a:fld>
-            <a:endParaRPr lang="de-DE"/>
-          </a:p>
-        </p:txBody>
-      </p:sp>
-    </p:spTree>
-    <p:extLst>
-      <p:ext uri="{BB962C8B-B14F-4D97-AF65-F5344CB8AC3E}">
-        <p14:creationId xmlns:p14="http://schemas.microsoft.com/office/powerpoint/2010/main" val="2812053294"/>
-      </p:ext>
-    </p:extLst>
-  </p:cSld>
-  <p:clrMapOvr>
-    <a:masterClrMapping/>
-  </p:clrMapOvr>
-</p:notes>
-</file>
-
-<file path=ppt/notesSlides/notesSlide14.xml><?xml version="1.0" encoding="utf-8"?>
-<p:notes xmlns:a="http://schemas.openxmlformats.org/drawingml/2006/main" xmlns:r="http://schemas.openxmlformats.org/officeDocument/2006/relationships" xmlns:p="http://schemas.openxmlformats.org/presentationml/2006/main">
-  <p:cSld>
-    <p:spTree>
-      <p:nvGrpSpPr>
-        <p:cNvPr id="1" name=""/>
-        <p:cNvGrpSpPr/>
-        <p:nvPr/>
-      </p:nvGrpSpPr>
-      <p:grpSpPr>
-        <a:xfrm>
-          <a:off x="0" y="0"/>
-          <a:ext cx="0" cy="0"/>
-          <a:chOff x="0" y="0"/>
-          <a:chExt cx="0" cy="0"/>
-        </a:xfrm>
-      </p:grpSpPr>
-      <p:sp>
-        <p:nvSpPr>
-          <p:cNvPr id="2" name="Folienbildplatzhalter 1"/>
-          <p:cNvSpPr>
-            <a:spLocks noGrp="1" noRot="1" noChangeAspect="1"/>
-          </p:cNvSpPr>
-          <p:nvPr>
-            <p:ph type="sldImg"/>
-          </p:nvPr>
-        </p:nvSpPr>
-        <p:spPr/>
-      </p:sp>
-      <p:sp>
-        <p:nvSpPr>
-          <p:cNvPr id="3" name="Notizenplatzhalter 2"/>
-          <p:cNvSpPr>
-            <a:spLocks noGrp="1"/>
-          </p:cNvSpPr>
-          <p:nvPr>
-            <p:ph type="body" idx="1"/>
-          </p:nvPr>
-        </p:nvSpPr>
-        <p:spPr/>
-        <p:txBody>
-          <a:bodyPr/>
-          <a:lstStyle/>
-          <a:p>
-            <a:r>
-              <a:rPr lang="de-DE" dirty="0"/>
-              <a:t>Ausblick u.a. das </a:t>
-            </a:r>
-            <a:r>
-              <a:rPr lang="de-DE" dirty="0" err="1"/>
-              <a:t>paper</a:t>
-            </a:r>
-            <a:endParaRPr lang="de-DE" dirty="0"/>
-          </a:p>
-          <a:p>
-            <a:r>
-              <a:rPr lang="de-DE" dirty="0" err="1"/>
-              <a:t>Gaussfilterbild</a:t>
-            </a:r>
-            <a:endParaRPr lang="de-DE" dirty="0"/>
-          </a:p>
-        </p:txBody>
-      </p:sp>
-      <p:sp>
-        <p:nvSpPr>
-          <p:cNvPr id="4" name="Foliennummernplatzhalter 3"/>
-          <p:cNvSpPr>
-            <a:spLocks noGrp="1"/>
-          </p:cNvSpPr>
-          <p:nvPr>
-            <p:ph type="sldNum" sz="quarter" idx="5"/>
-          </p:nvPr>
-        </p:nvSpPr>
-        <p:spPr/>
-        <p:txBody>
-          <a:bodyPr/>
-          <a:lstStyle/>
-          <a:p>
-            <a:fld id="{6F4F2A7C-E896-4C15-99D8-2B5BC94A4F36}" type="slidenum">
-              <a:rPr lang="de-DE" smtClean="0"/>
-              <a:t>18</a:t>
+              <a:t>17</a:t>
             </a:fld>
             <a:endParaRPr lang="de-DE"/>
           </a:p>
@@ -2152,6 +2050,67 @@
           <a:p>
             <a:endParaRPr lang="de-DE" dirty="0"/>
           </a:p>
+          <a:p>
+            <a:r>
+              <a:rPr lang="de-DE" dirty="0"/>
+              <a:t>Hoch parallel</a:t>
+            </a:r>
+          </a:p>
+          <a:p>
+            <a:pPr lvl="1"/>
+            <a:r>
+              <a:rPr lang="de-DE" dirty="0"/>
+              <a:t>Strahlen können unabhängig voneinander verfolgt werden</a:t>
+            </a:r>
+          </a:p>
+          <a:p>
+            <a:r>
+              <a:rPr lang="de-DE" dirty="0"/>
+              <a:t>Programmierbar (General Purpose </a:t>
+            </a:r>
+            <a:r>
+              <a:rPr lang="de-DE" dirty="0" err="1"/>
+              <a:t>Computation</a:t>
+            </a:r>
+            <a:r>
+              <a:rPr lang="de-DE" dirty="0"/>
+              <a:t> on GPU (GPGPU))</a:t>
+            </a:r>
+          </a:p>
+          <a:p>
+            <a:pPr lvl="1"/>
+            <a:r>
+              <a:rPr lang="de-DE" dirty="0" err="1"/>
+              <a:t>OpenCL</a:t>
+            </a:r>
+            <a:endParaRPr lang="de-DE" dirty="0"/>
+          </a:p>
+          <a:p>
+            <a:endParaRPr lang="de-DE" dirty="0"/>
+          </a:p>
+          <a:p>
+            <a:endParaRPr lang="de-DE" dirty="0"/>
+          </a:p>
+          <a:p>
+            <a:r>
+              <a:rPr lang="de-DE" dirty="0"/>
+              <a:t>Ein Work-Item berechnet einen Strahl.</a:t>
+            </a:r>
+          </a:p>
+          <a:p>
+            <a:r>
+              <a:rPr lang="de-DE" dirty="0"/>
+              <a:t>Bei einer Auflösung mit einem Strahl pro Pixel kann als </a:t>
+            </a:r>
+            <a:r>
+              <a:rPr lang="de-DE" dirty="0" err="1"/>
+              <a:t>NDRange</a:t>
+            </a:r>
+            <a:r>
+              <a:rPr lang="de-DE" dirty="0"/>
+              <a:t> die Bilddimension genommen werden mit Breite und Höhe (Tiefe z = 1).</a:t>
+            </a:r>
+          </a:p>
         </p:txBody>
       </p:sp>
       <p:sp>
@@ -2180,7 +2139,7 @@
     </p:spTree>
     <p:extLst>
       <p:ext uri="{BB962C8B-B14F-4D97-AF65-F5344CB8AC3E}">
-        <p14:creationId xmlns:p14="http://schemas.microsoft.com/office/powerpoint/2010/main" val="3385818242"/>
+        <p14:creationId xmlns:p14="http://schemas.microsoft.com/office/powerpoint/2010/main" val="2307871628"/>
       </p:ext>
     </p:extLst>
   </p:cSld>
@@ -4323,7 +4282,7 @@
           <p:cNvPr id="2" name="Inhaltsplatzhalter 1">
             <a:extLst>
               <a:ext uri="{FF2B5EF4-FFF2-40B4-BE49-F238E27FC236}">
-                <a16:creationId xmlns:a16="http://schemas.microsoft.com/office/drawing/2014/main" id="{F4836894-3CA2-4AF5-BD82-BDC9EE081C6B}"/>
+                <a16:creationId xmlns:a16="http://schemas.microsoft.com/office/drawing/2014/main" id="{2196B620-9307-4A32-8E0F-A79CD82C6141}"/>
               </a:ext>
             </a:extLst>
           </p:cNvPr>
@@ -4336,20 +4295,83 @@
         </p:nvSpPr>
         <p:spPr/>
         <p:txBody>
-          <a:bodyPr/>
-          <a:lstStyle/>
-          <a:p>
-            <a:r>
-              <a:rPr lang="de-DE" dirty="0"/>
-              <a:t>Unterteilung des Problems in (unabhängige) Teilprobleme</a:t>
+          <a:bodyPr>
+            <a:normAutofit lnSpcReduction="10000"/>
+          </a:bodyPr>
+          <a:lstStyle/>
+          <a:p>
+            <a:r>
+              <a:rPr lang="de-DE" dirty="0"/>
+              <a:t>Simulation der Blickposition durch die Maus</a:t>
+            </a:r>
+          </a:p>
+          <a:p>
+            <a:r>
+              <a:rPr lang="de-DE" dirty="0"/>
+              <a:t>Reduzierung der Abtastrate im peripheren Bereich</a:t>
             </a:r>
           </a:p>
           <a:p>
             <a:pPr lvl="1"/>
             <a:r>
               <a:rPr lang="de-DE" dirty="0"/>
-              <a:t>Teilprobleme werden (parallel) von Work-Items berechnet</a:t>
-            </a:r>
+              <a:t>Objektraum</a:t>
+            </a:r>
+          </a:p>
+          <a:p>
+            <a:pPr lvl="1"/>
+            <a:r>
+              <a:rPr lang="de-DE" dirty="0"/>
+              <a:t>Bildraum</a:t>
+            </a:r>
+          </a:p>
+          <a:p>
+            <a:r>
+              <a:rPr lang="de-DE" dirty="0"/>
+              <a:t>Methode 1:</a:t>
+            </a:r>
+          </a:p>
+          <a:p>
+            <a:pPr lvl="1"/>
+            <a:r>
+              <a:rPr lang="de-DE" dirty="0"/>
+              <a:t>Zwei </a:t>
+            </a:r>
+            <a:r>
+              <a:rPr lang="de-DE" dirty="0" err="1"/>
+              <a:t>Raycasts</a:t>
+            </a:r>
+            <a:endParaRPr lang="de-DE" dirty="0"/>
+          </a:p>
+          <a:p>
+            <a:pPr lvl="1"/>
+            <a:r>
+              <a:rPr lang="de-DE" dirty="0"/>
+              <a:t>Zusammenfügen der Bilder</a:t>
+            </a:r>
+          </a:p>
+          <a:p>
+            <a:r>
+              <a:rPr lang="de-DE" dirty="0"/>
+              <a:t>Methode 2:</a:t>
+            </a:r>
+          </a:p>
+          <a:p>
+            <a:pPr lvl="1"/>
+            <a:r>
+              <a:rPr lang="de-DE" dirty="0"/>
+              <a:t>Index Mapping</a:t>
+            </a:r>
+          </a:p>
+          <a:p>
+            <a:pPr lvl="1"/>
+            <a:r>
+              <a:rPr lang="de-DE" dirty="0"/>
+              <a:t>Bilineare Interpolation</a:t>
+            </a:r>
+          </a:p>
+          <a:p>
+            <a:endParaRPr lang="de-DE" dirty="0"/>
           </a:p>
         </p:txBody>
       </p:sp>
@@ -4358,7 +4380,7 @@
           <p:cNvPr id="3" name="Foliennummernplatzhalter 2">
             <a:extLst>
               <a:ext uri="{FF2B5EF4-FFF2-40B4-BE49-F238E27FC236}">
-                <a16:creationId xmlns:a16="http://schemas.microsoft.com/office/drawing/2014/main" id="{5B709438-26A9-4385-BA8A-641816833063}"/>
+                <a16:creationId xmlns:a16="http://schemas.microsoft.com/office/drawing/2014/main" id="{81704736-F46B-49C0-9EFA-AA28A087FC33}"/>
               </a:ext>
             </a:extLst>
           </p:cNvPr>
@@ -4387,7 +4409,7 @@
           <p:cNvPr id="4" name="Titel 3">
             <a:extLst>
               <a:ext uri="{FF2B5EF4-FFF2-40B4-BE49-F238E27FC236}">
-                <a16:creationId xmlns:a16="http://schemas.microsoft.com/office/drawing/2014/main" id="{C5AC0E11-120C-432F-B238-E27B61B805EB}"/>
+                <a16:creationId xmlns:a16="http://schemas.microsoft.com/office/drawing/2014/main" id="{76FB193F-48F1-49DB-BECE-D330734D424E}"/>
               </a:ext>
             </a:extLst>
           </p:cNvPr>
@@ -4405,51 +4427,15 @@
           <a:p>
             <a:r>
               <a:rPr lang="de-DE" dirty="0"/>
-              <a:t>GPU Architektur</a:t>
-            </a:r>
-          </a:p>
-        </p:txBody>
-      </p:sp>
-      <p:pic>
-        <p:nvPicPr>
-          <p:cNvPr id="6" name="Grafik 5">
-            <a:extLst>
-              <a:ext uri="{FF2B5EF4-FFF2-40B4-BE49-F238E27FC236}">
-                <a16:creationId xmlns:a16="http://schemas.microsoft.com/office/drawing/2014/main" id="{E7653E6C-1A93-4A93-952E-D7DFFDF5ED76}"/>
-              </a:ext>
-            </a:extLst>
-          </p:cNvPr>
-          <p:cNvPicPr>
-            <a:picLocks noChangeAspect="1"/>
-          </p:cNvPicPr>
-          <p:nvPr/>
-        </p:nvPicPr>
-        <p:blipFill>
-          <a:blip r:embed="rId3" cstate="print">
-            <a:extLst>
-              <a:ext uri="{28A0092B-C50C-407E-A947-70E740481C1C}">
-                <a14:useLocalDpi xmlns:a14="http://schemas.microsoft.com/office/drawing/2010/main" val="0"/>
-              </a:ext>
-            </a:extLst>
-          </a:blip>
-          <a:stretch>
-            <a:fillRect/>
-          </a:stretch>
-        </p:blipFill>
-        <p:spPr>
-          <a:xfrm>
-            <a:off x="2245242" y="1942631"/>
-            <a:ext cx="4653516" cy="2870467"/>
-          </a:xfrm>
-          <a:prstGeom prst="rect">
-            <a:avLst/>
-          </a:prstGeom>
-        </p:spPr>
-      </p:pic>
+              <a:t>Entwurf</a:t>
+            </a:r>
+          </a:p>
+        </p:txBody>
+      </p:sp>
     </p:spTree>
     <p:extLst>
       <p:ext uri="{BB962C8B-B14F-4D97-AF65-F5344CB8AC3E}">
-        <p14:creationId xmlns:p14="http://schemas.microsoft.com/office/powerpoint/2010/main" val="3368222175"/>
+        <p14:creationId xmlns:p14="http://schemas.microsoft.com/office/powerpoint/2010/main" val="2764741092"/>
       </p:ext>
     </p:extLst>
   </p:cSld>
@@ -4476,99 +4462,12 @@
           <a:chExt cx="0" cy="0"/>
         </a:xfrm>
       </p:grpSpPr>
-      <p:pic>
-        <p:nvPicPr>
-          <p:cNvPr id="6" name="Grafik 5">
+      <p:sp>
+        <p:nvSpPr>
+          <p:cNvPr id="3" name="Foliennummernplatzhalter 2">
             <a:extLst>
               <a:ext uri="{FF2B5EF4-FFF2-40B4-BE49-F238E27FC236}">
-                <a16:creationId xmlns:a16="http://schemas.microsoft.com/office/drawing/2014/main" id="{2C21BC88-F61B-4C6C-BB1E-EA62F451EA28}"/>
-              </a:ext>
-            </a:extLst>
-          </p:cNvPr>
-          <p:cNvPicPr>
-            <a:picLocks noChangeAspect="1"/>
-          </p:cNvPicPr>
-          <p:nvPr/>
-        </p:nvPicPr>
-        <p:blipFill>
-          <a:blip r:embed="rId2" cstate="print">
-            <a:extLst>
-              <a:ext uri="{28A0092B-C50C-407E-A947-70E740481C1C}">
-                <a14:useLocalDpi xmlns:a14="http://schemas.microsoft.com/office/drawing/2010/main" val="0"/>
-              </a:ext>
-            </a:extLst>
-          </a:blip>
-          <a:stretch>
-            <a:fillRect/>
-          </a:stretch>
-        </p:blipFill>
-        <p:spPr>
-          <a:xfrm>
-            <a:off x="5796136" y="2015376"/>
-            <a:ext cx="2675643" cy="2678922"/>
-          </a:xfrm>
-          <a:prstGeom prst="rect">
-            <a:avLst/>
-          </a:prstGeom>
-        </p:spPr>
-      </p:pic>
-      <p:sp>
-        <p:nvSpPr>
-          <p:cNvPr id="2" name="Inhaltsplatzhalter 1">
-            <a:extLst>
-              <a:ext uri="{FF2B5EF4-FFF2-40B4-BE49-F238E27FC236}">
-                <a16:creationId xmlns:a16="http://schemas.microsoft.com/office/drawing/2014/main" id="{3D844259-2023-4D76-83F4-D37F8E85EDA0}"/>
-              </a:ext>
-            </a:extLst>
-          </p:cNvPr>
-          <p:cNvSpPr>
-            <a:spLocks noGrp="1"/>
-          </p:cNvSpPr>
-          <p:nvPr>
-            <p:ph idx="1"/>
-          </p:nvPr>
-        </p:nvSpPr>
-        <p:spPr/>
-        <p:txBody>
-          <a:bodyPr/>
-          <a:lstStyle/>
-          <a:p>
-            <a:r>
-              <a:rPr lang="de-DE" dirty="0"/>
-              <a:t>Work-Groups und Work-Items sind Abstraktionen</a:t>
-            </a:r>
-          </a:p>
-          <a:p>
-            <a:r>
-              <a:rPr lang="de-DE" dirty="0"/>
-              <a:t>Auf der Hardware werden Thread-Blocks ausgeführt</a:t>
-            </a:r>
-          </a:p>
-          <a:p>
-            <a:pPr lvl="1"/>
-            <a:r>
-              <a:rPr lang="de-DE" dirty="0" err="1"/>
-              <a:t>Lockstep</a:t>
-            </a:r>
-            <a:r>
-              <a:rPr lang="de-DE" dirty="0"/>
-              <a:t> Ausführung</a:t>
-            </a:r>
-          </a:p>
-          <a:p>
-            <a:r>
-              <a:rPr lang="de-DE" dirty="0"/>
-              <a:t>Thread-Blocks sollten möglichst konvergieren</a:t>
-            </a:r>
-          </a:p>
-        </p:txBody>
-      </p:sp>
-      <p:sp>
-        <p:nvSpPr>
-          <p:cNvPr id="3" name="Foliennummernplatzhalter 2">
-            <a:extLst>
-              <a:ext uri="{FF2B5EF4-FFF2-40B4-BE49-F238E27FC236}">
-                <a16:creationId xmlns:a16="http://schemas.microsoft.com/office/drawing/2014/main" id="{1F0E0CD3-69AF-4ED6-ACC3-214206D87F21}"/>
+                <a16:creationId xmlns:a16="http://schemas.microsoft.com/office/drawing/2014/main" id="{FC907AE8-75FA-4153-8576-FAD37DFF097F}"/>
               </a:ext>
             </a:extLst>
           </p:cNvPr>
@@ -4587,313 +4486,6 @@
             <a:fld id="{29AD3987-26BA-49DC-BA24-72731371DC9F}" type="slidenum">
               <a:rPr lang="de-DE" smtClean="0"/>
               <a:t>11</a:t>
-            </a:fld>
-            <a:endParaRPr lang="de-DE" dirty="0"/>
-          </a:p>
-        </p:txBody>
-      </p:sp>
-      <p:sp>
-        <p:nvSpPr>
-          <p:cNvPr id="4" name="Titel 3">
-            <a:extLst>
-              <a:ext uri="{FF2B5EF4-FFF2-40B4-BE49-F238E27FC236}">
-                <a16:creationId xmlns:a16="http://schemas.microsoft.com/office/drawing/2014/main" id="{B273A717-8F24-4A08-8FA0-7205C61F1624}"/>
-              </a:ext>
-            </a:extLst>
-          </p:cNvPr>
-          <p:cNvSpPr>
-            <a:spLocks noGrp="1"/>
-          </p:cNvSpPr>
-          <p:nvPr>
-            <p:ph type="title"/>
-          </p:nvPr>
-        </p:nvSpPr>
-        <p:spPr/>
-        <p:txBody>
-          <a:bodyPr/>
-          <a:lstStyle/>
-          <a:p>
-            <a:r>
-              <a:rPr lang="de-DE" dirty="0"/>
-              <a:t>GPU Architektur</a:t>
-            </a:r>
-          </a:p>
-        </p:txBody>
-      </p:sp>
-      <p:sp>
-        <p:nvSpPr>
-          <p:cNvPr id="5" name="Textfeld 4">
-            <a:extLst>
-              <a:ext uri="{FF2B5EF4-FFF2-40B4-BE49-F238E27FC236}">
-                <a16:creationId xmlns:a16="http://schemas.microsoft.com/office/drawing/2014/main" id="{F95D9F85-6F56-48AB-B30D-F9804400295F}"/>
-              </a:ext>
-            </a:extLst>
-          </p:cNvPr>
-          <p:cNvSpPr txBox="1"/>
-          <p:nvPr/>
-        </p:nvSpPr>
-        <p:spPr>
-          <a:xfrm>
-            <a:off x="1475656" y="4155926"/>
-            <a:ext cx="2335126" cy="369332"/>
-          </a:xfrm>
-          <a:prstGeom prst="rect">
-            <a:avLst/>
-          </a:prstGeom>
-          <a:noFill/>
-        </p:spPr>
-        <p:txBody>
-          <a:bodyPr wrap="none" rtlCol="0">
-            <a:spAutoFit/>
-          </a:bodyPr>
-          <a:lstStyle/>
-          <a:p>
-            <a:r>
-              <a:rPr lang="de-DE" dirty="0"/>
-              <a:t>TODO: nur1-2 Folien </a:t>
-            </a:r>
-          </a:p>
-        </p:txBody>
-      </p:sp>
-    </p:spTree>
-    <p:extLst>
-      <p:ext uri="{BB962C8B-B14F-4D97-AF65-F5344CB8AC3E}">
-        <p14:creationId xmlns:p14="http://schemas.microsoft.com/office/powerpoint/2010/main" val="1071932652"/>
-      </p:ext>
-    </p:extLst>
-  </p:cSld>
-  <p:clrMapOvr>
-    <a:masterClrMapping/>
-  </p:clrMapOvr>
-</p:sld>
-</file>
-
-<file path=ppt/slides/slide12.xml><?xml version="1.0" encoding="utf-8"?>
-<p:sld xmlns:a="http://schemas.openxmlformats.org/drawingml/2006/main" xmlns:r="http://schemas.openxmlformats.org/officeDocument/2006/relationships" xmlns:p="http://schemas.openxmlformats.org/presentationml/2006/main">
-  <p:cSld>
-    <p:spTree>
-      <p:nvGrpSpPr>
-        <p:cNvPr id="1" name=""/>
-        <p:cNvGrpSpPr/>
-        <p:nvPr/>
-      </p:nvGrpSpPr>
-      <p:grpSpPr>
-        <a:xfrm>
-          <a:off x="0" y="0"/>
-          <a:ext cx="0" cy="0"/>
-          <a:chOff x="0" y="0"/>
-          <a:chExt cx="0" cy="0"/>
-        </a:xfrm>
-      </p:grpSpPr>
-      <p:sp>
-        <p:nvSpPr>
-          <p:cNvPr id="2" name="Inhaltsplatzhalter 1">
-            <a:extLst>
-              <a:ext uri="{FF2B5EF4-FFF2-40B4-BE49-F238E27FC236}">
-                <a16:creationId xmlns:a16="http://schemas.microsoft.com/office/drawing/2014/main" id="{2196B620-9307-4A32-8E0F-A79CD82C6141}"/>
-              </a:ext>
-            </a:extLst>
-          </p:cNvPr>
-          <p:cNvSpPr>
-            <a:spLocks noGrp="1"/>
-          </p:cNvSpPr>
-          <p:nvPr>
-            <p:ph idx="1"/>
-          </p:nvPr>
-        </p:nvSpPr>
-        <p:spPr/>
-        <p:txBody>
-          <a:bodyPr>
-            <a:normAutofit lnSpcReduction="10000"/>
-          </a:bodyPr>
-          <a:lstStyle/>
-          <a:p>
-            <a:r>
-              <a:rPr lang="de-DE" dirty="0"/>
-              <a:t>Simulation der Blickposition durch die Maus</a:t>
-            </a:r>
-          </a:p>
-          <a:p>
-            <a:r>
-              <a:rPr lang="de-DE" dirty="0"/>
-              <a:t>Reduzierung der Abtastrate im peripheren Bereich</a:t>
-            </a:r>
-          </a:p>
-          <a:p>
-            <a:pPr lvl="1"/>
-            <a:r>
-              <a:rPr lang="de-DE" dirty="0"/>
-              <a:t>Objektraum</a:t>
-            </a:r>
-          </a:p>
-          <a:p>
-            <a:pPr lvl="1"/>
-            <a:r>
-              <a:rPr lang="de-DE" dirty="0"/>
-              <a:t>Bildraum</a:t>
-            </a:r>
-          </a:p>
-          <a:p>
-            <a:r>
-              <a:rPr lang="de-DE" dirty="0"/>
-              <a:t>Methode 1:</a:t>
-            </a:r>
-          </a:p>
-          <a:p>
-            <a:pPr lvl="1"/>
-            <a:r>
-              <a:rPr lang="de-DE" dirty="0"/>
-              <a:t>Zwei </a:t>
-            </a:r>
-            <a:r>
-              <a:rPr lang="de-DE" dirty="0" err="1"/>
-              <a:t>Raycasts</a:t>
-            </a:r>
-            <a:endParaRPr lang="de-DE" dirty="0"/>
-          </a:p>
-          <a:p>
-            <a:pPr lvl="1"/>
-            <a:r>
-              <a:rPr lang="de-DE" dirty="0"/>
-              <a:t>Zusammenfügen der Bilder</a:t>
-            </a:r>
-          </a:p>
-          <a:p>
-            <a:r>
-              <a:rPr lang="de-DE" dirty="0"/>
-              <a:t>Methode 2:</a:t>
-            </a:r>
-          </a:p>
-          <a:p>
-            <a:pPr lvl="1"/>
-            <a:r>
-              <a:rPr lang="de-DE" dirty="0"/>
-              <a:t>Index Mapping</a:t>
-            </a:r>
-          </a:p>
-          <a:p>
-            <a:pPr lvl="1"/>
-            <a:r>
-              <a:rPr lang="de-DE" dirty="0"/>
-              <a:t>Bilineare Interpolation</a:t>
-            </a:r>
-          </a:p>
-          <a:p>
-            <a:endParaRPr lang="de-DE" dirty="0"/>
-          </a:p>
-        </p:txBody>
-      </p:sp>
-      <p:sp>
-        <p:nvSpPr>
-          <p:cNvPr id="3" name="Foliennummernplatzhalter 2">
-            <a:extLst>
-              <a:ext uri="{FF2B5EF4-FFF2-40B4-BE49-F238E27FC236}">
-                <a16:creationId xmlns:a16="http://schemas.microsoft.com/office/drawing/2014/main" id="{81704736-F46B-49C0-9EFA-AA28A087FC33}"/>
-              </a:ext>
-            </a:extLst>
-          </p:cNvPr>
-          <p:cNvSpPr>
-            <a:spLocks noGrp="1"/>
-          </p:cNvSpPr>
-          <p:nvPr>
-            <p:ph type="sldNum" sz="quarter" idx="12"/>
-          </p:nvPr>
-        </p:nvSpPr>
-        <p:spPr/>
-        <p:txBody>
-          <a:bodyPr/>
-          <a:lstStyle/>
-          <a:p>
-            <a:fld id="{29AD3987-26BA-49DC-BA24-72731371DC9F}" type="slidenum">
-              <a:rPr lang="de-DE" smtClean="0"/>
-              <a:t>12</a:t>
-            </a:fld>
-            <a:endParaRPr lang="de-DE" dirty="0"/>
-          </a:p>
-        </p:txBody>
-      </p:sp>
-      <p:sp>
-        <p:nvSpPr>
-          <p:cNvPr id="4" name="Titel 3">
-            <a:extLst>
-              <a:ext uri="{FF2B5EF4-FFF2-40B4-BE49-F238E27FC236}">
-                <a16:creationId xmlns:a16="http://schemas.microsoft.com/office/drawing/2014/main" id="{76FB193F-48F1-49DB-BECE-D330734D424E}"/>
-              </a:ext>
-            </a:extLst>
-          </p:cNvPr>
-          <p:cNvSpPr>
-            <a:spLocks noGrp="1"/>
-          </p:cNvSpPr>
-          <p:nvPr>
-            <p:ph type="title"/>
-          </p:nvPr>
-        </p:nvSpPr>
-        <p:spPr/>
-        <p:txBody>
-          <a:bodyPr/>
-          <a:lstStyle/>
-          <a:p>
-            <a:r>
-              <a:rPr lang="de-DE" dirty="0"/>
-              <a:t>Entwurf</a:t>
-            </a:r>
-          </a:p>
-        </p:txBody>
-      </p:sp>
-    </p:spTree>
-    <p:extLst>
-      <p:ext uri="{BB962C8B-B14F-4D97-AF65-F5344CB8AC3E}">
-        <p14:creationId xmlns:p14="http://schemas.microsoft.com/office/powerpoint/2010/main" val="2764741092"/>
-      </p:ext>
-    </p:extLst>
-  </p:cSld>
-  <p:clrMapOvr>
-    <a:masterClrMapping/>
-  </p:clrMapOvr>
-</p:sld>
-</file>
-
-<file path=ppt/slides/slide13.xml><?xml version="1.0" encoding="utf-8"?>
-<p:sld xmlns:a="http://schemas.openxmlformats.org/drawingml/2006/main" xmlns:r="http://schemas.openxmlformats.org/officeDocument/2006/relationships" xmlns:p="http://schemas.openxmlformats.org/presentationml/2006/main">
-  <p:cSld>
-    <p:spTree>
-      <p:nvGrpSpPr>
-        <p:cNvPr id="1" name=""/>
-        <p:cNvGrpSpPr/>
-        <p:nvPr/>
-      </p:nvGrpSpPr>
-      <p:grpSpPr>
-        <a:xfrm>
-          <a:off x="0" y="0"/>
-          <a:ext cx="0" cy="0"/>
-          <a:chOff x="0" y="0"/>
-          <a:chExt cx="0" cy="0"/>
-        </a:xfrm>
-      </p:grpSpPr>
-      <p:sp>
-        <p:nvSpPr>
-          <p:cNvPr id="3" name="Foliennummernplatzhalter 2">
-            <a:extLst>
-              <a:ext uri="{FF2B5EF4-FFF2-40B4-BE49-F238E27FC236}">
-                <a16:creationId xmlns:a16="http://schemas.microsoft.com/office/drawing/2014/main" id="{FC907AE8-75FA-4153-8576-FAD37DFF097F}"/>
-              </a:ext>
-            </a:extLst>
-          </p:cNvPr>
-          <p:cNvSpPr>
-            <a:spLocks noGrp="1"/>
-          </p:cNvSpPr>
-          <p:nvPr>
-            <p:ph type="sldNum" sz="quarter" idx="12"/>
-          </p:nvPr>
-        </p:nvSpPr>
-        <p:spPr/>
-        <p:txBody>
-          <a:bodyPr/>
-          <a:lstStyle/>
-          <a:p>
-            <a:fld id="{29AD3987-26BA-49DC-BA24-72731371DC9F}" type="slidenum">
-              <a:rPr lang="de-DE" smtClean="0"/>
-              <a:t>13</a:t>
             </a:fld>
             <a:endParaRPr lang="de-DE" dirty="0"/>
           </a:p>
@@ -5012,7 +4604,7 @@
 </p:sld>
 </file>
 
-<file path=ppt/slides/slide14.xml><?xml version="1.0" encoding="utf-8"?>
+<file path=ppt/slides/slide12.xml><?xml version="1.0" encoding="utf-8"?>
 <p:sld xmlns:a="http://schemas.openxmlformats.org/drawingml/2006/main" xmlns:r="http://schemas.openxmlformats.org/officeDocument/2006/relationships" xmlns:p="http://schemas.openxmlformats.org/presentationml/2006/main">
   <p:cSld>
     <p:spTree>
@@ -5034,7 +4626,7 @@
           <p:cNvPr id="3" name="Foliennummernplatzhalter 2">
             <a:extLst>
               <a:ext uri="{FF2B5EF4-FFF2-40B4-BE49-F238E27FC236}">
-                <a16:creationId xmlns:a16="http://schemas.microsoft.com/office/drawing/2014/main" id="{87F5C460-EC07-4F65-AC06-B7309CBAC798}"/>
+                <a16:creationId xmlns:a16="http://schemas.microsoft.com/office/drawing/2014/main" id="{06CF4AEC-21FF-4FA7-B6DD-2B9F3A20BDC5}"/>
               </a:ext>
             </a:extLst>
           </p:cNvPr>
@@ -5052,7 +4644,94 @@
           <a:p>
             <a:fld id="{29AD3987-26BA-49DC-BA24-72731371DC9F}" type="slidenum">
               <a:rPr lang="de-DE" smtClean="0"/>
-              <a:t>14</a:t>
+              <a:t>12</a:t>
+            </a:fld>
+            <a:endParaRPr lang="de-DE" dirty="0"/>
+          </a:p>
+        </p:txBody>
+      </p:sp>
+      <p:sp>
+        <p:nvSpPr>
+          <p:cNvPr id="4" name="Titel 3">
+            <a:extLst>
+              <a:ext uri="{FF2B5EF4-FFF2-40B4-BE49-F238E27FC236}">
+                <a16:creationId xmlns:a16="http://schemas.microsoft.com/office/drawing/2014/main" id="{F6C24409-7847-41DD-842B-2C4B631C79F2}"/>
+              </a:ext>
+            </a:extLst>
+          </p:cNvPr>
+          <p:cNvSpPr>
+            <a:spLocks noGrp="1"/>
+          </p:cNvSpPr>
+          <p:nvPr>
+            <p:ph type="title"/>
+          </p:nvPr>
+        </p:nvSpPr>
+        <p:spPr/>
+        <p:txBody>
+          <a:bodyPr/>
+          <a:lstStyle/>
+          <a:p>
+            <a:r>
+              <a:rPr lang="de-DE" dirty="0"/>
+              <a:t>Methode 1</a:t>
+            </a:r>
+          </a:p>
+        </p:txBody>
+      </p:sp>
+    </p:spTree>
+    <p:extLst>
+      <p:ext uri="{BB962C8B-B14F-4D97-AF65-F5344CB8AC3E}">
+        <p14:creationId xmlns:p14="http://schemas.microsoft.com/office/powerpoint/2010/main" val="3769900491"/>
+      </p:ext>
+    </p:extLst>
+  </p:cSld>
+  <p:clrMapOvr>
+    <a:masterClrMapping/>
+  </p:clrMapOvr>
+</p:sld>
+</file>
+
+<file path=ppt/slides/slide13.xml><?xml version="1.0" encoding="utf-8"?>
+<p:sld xmlns:a="http://schemas.openxmlformats.org/drawingml/2006/main" xmlns:r="http://schemas.openxmlformats.org/officeDocument/2006/relationships" xmlns:p="http://schemas.openxmlformats.org/presentationml/2006/main">
+  <p:cSld>
+    <p:spTree>
+      <p:nvGrpSpPr>
+        <p:cNvPr id="1" name=""/>
+        <p:cNvGrpSpPr/>
+        <p:nvPr/>
+      </p:nvGrpSpPr>
+      <p:grpSpPr>
+        <a:xfrm>
+          <a:off x="0" y="0"/>
+          <a:ext cx="0" cy="0"/>
+          <a:chOff x="0" y="0"/>
+          <a:chExt cx="0" cy="0"/>
+        </a:xfrm>
+      </p:grpSpPr>
+      <p:sp>
+        <p:nvSpPr>
+          <p:cNvPr id="3" name="Foliennummernplatzhalter 2">
+            <a:extLst>
+              <a:ext uri="{FF2B5EF4-FFF2-40B4-BE49-F238E27FC236}">
+                <a16:creationId xmlns:a16="http://schemas.microsoft.com/office/drawing/2014/main" id="{87F5C460-EC07-4F65-AC06-B7309CBAC798}"/>
+              </a:ext>
+            </a:extLst>
+          </p:cNvPr>
+          <p:cNvSpPr>
+            <a:spLocks noGrp="1"/>
+          </p:cNvSpPr>
+          <p:nvPr>
+            <p:ph type="sldNum" sz="quarter" idx="12"/>
+          </p:nvPr>
+        </p:nvSpPr>
+        <p:spPr/>
+        <p:txBody>
+          <a:bodyPr/>
+          <a:lstStyle/>
+          <a:p>
+            <a:fld id="{29AD3987-26BA-49DC-BA24-72731371DC9F}" type="slidenum">
+              <a:rPr lang="de-DE" smtClean="0"/>
+              <a:t>13</a:t>
             </a:fld>
             <a:endParaRPr lang="de-DE" dirty="0"/>
           </a:p>
@@ -5197,6 +4876,118 @@
     <p:extLst>
       <p:ext uri="{BB962C8B-B14F-4D97-AF65-F5344CB8AC3E}">
         <p14:creationId xmlns:p14="http://schemas.microsoft.com/office/powerpoint/2010/main" val="2161052520"/>
+      </p:ext>
+    </p:extLst>
+  </p:cSld>
+  <p:clrMapOvr>
+    <a:masterClrMapping/>
+  </p:clrMapOvr>
+</p:sld>
+</file>
+
+<file path=ppt/slides/slide14.xml><?xml version="1.0" encoding="utf-8"?>
+<p:sld xmlns:a="http://schemas.openxmlformats.org/drawingml/2006/main" xmlns:r="http://schemas.openxmlformats.org/officeDocument/2006/relationships" xmlns:p="http://schemas.openxmlformats.org/presentationml/2006/main">
+  <p:cSld>
+    <p:spTree>
+      <p:nvGrpSpPr>
+        <p:cNvPr id="1" name=""/>
+        <p:cNvGrpSpPr/>
+        <p:nvPr/>
+      </p:nvGrpSpPr>
+      <p:grpSpPr>
+        <a:xfrm>
+          <a:off x="0" y="0"/>
+          <a:ext cx="0" cy="0"/>
+          <a:chOff x="0" y="0"/>
+          <a:chExt cx="0" cy="0"/>
+        </a:xfrm>
+      </p:grpSpPr>
+      <p:sp>
+        <p:nvSpPr>
+          <p:cNvPr id="2" name="Inhaltsplatzhalter 1">
+            <a:extLst>
+              <a:ext uri="{FF2B5EF4-FFF2-40B4-BE49-F238E27FC236}">
+                <a16:creationId xmlns:a16="http://schemas.microsoft.com/office/drawing/2014/main" id="{D085E8EF-DA4C-4D5D-82B1-33486C8EB248}"/>
+              </a:ext>
+            </a:extLst>
+          </p:cNvPr>
+          <p:cNvSpPr>
+            <a:spLocks noGrp="1"/>
+          </p:cNvSpPr>
+          <p:nvPr>
+            <p:ph idx="1"/>
+          </p:nvPr>
+        </p:nvSpPr>
+        <p:spPr/>
+        <p:txBody>
+          <a:bodyPr/>
+          <a:lstStyle/>
+          <a:p>
+            <a:endParaRPr lang="de-DE"/>
+          </a:p>
+        </p:txBody>
+      </p:sp>
+      <p:sp>
+        <p:nvSpPr>
+          <p:cNvPr id="3" name="Foliennummernplatzhalter 2">
+            <a:extLst>
+              <a:ext uri="{FF2B5EF4-FFF2-40B4-BE49-F238E27FC236}">
+                <a16:creationId xmlns:a16="http://schemas.microsoft.com/office/drawing/2014/main" id="{89BD4092-489C-498B-A2A8-399EDCDACAEE}"/>
+              </a:ext>
+            </a:extLst>
+          </p:cNvPr>
+          <p:cNvSpPr>
+            <a:spLocks noGrp="1"/>
+          </p:cNvSpPr>
+          <p:nvPr>
+            <p:ph type="sldNum" sz="quarter" idx="12"/>
+          </p:nvPr>
+        </p:nvSpPr>
+        <p:spPr/>
+        <p:txBody>
+          <a:bodyPr/>
+          <a:lstStyle/>
+          <a:p>
+            <a:fld id="{29AD3987-26BA-49DC-BA24-72731371DC9F}" type="slidenum">
+              <a:rPr lang="de-DE" smtClean="0"/>
+              <a:t>14</a:t>
+            </a:fld>
+            <a:endParaRPr lang="de-DE" dirty="0"/>
+          </a:p>
+        </p:txBody>
+      </p:sp>
+      <p:sp>
+        <p:nvSpPr>
+          <p:cNvPr id="4" name="Titel 3">
+            <a:extLst>
+              <a:ext uri="{FF2B5EF4-FFF2-40B4-BE49-F238E27FC236}">
+                <a16:creationId xmlns:a16="http://schemas.microsoft.com/office/drawing/2014/main" id="{2426994F-F454-4E9F-BE04-254D47DBF028}"/>
+              </a:ext>
+            </a:extLst>
+          </p:cNvPr>
+          <p:cNvSpPr>
+            <a:spLocks noGrp="1"/>
+          </p:cNvSpPr>
+          <p:nvPr>
+            <p:ph type="title"/>
+          </p:nvPr>
+        </p:nvSpPr>
+        <p:spPr/>
+        <p:txBody>
+          <a:bodyPr/>
+          <a:lstStyle/>
+          <a:p>
+            <a:r>
+              <a:rPr lang="de-DE" dirty="0"/>
+              <a:t>Video h.264</a:t>
+            </a:r>
+          </a:p>
+        </p:txBody>
+      </p:sp>
+    </p:spTree>
+    <p:extLst>
+      <p:ext uri="{BB962C8B-B14F-4D97-AF65-F5344CB8AC3E}">
+        <p14:creationId xmlns:p14="http://schemas.microsoft.com/office/powerpoint/2010/main" val="2991516518"/>
       </p:ext>
     </p:extLst>
   </p:cSld>
@@ -5225,35 +5016,10 @@
       </p:grpSpPr>
       <p:sp>
         <p:nvSpPr>
-          <p:cNvPr id="2" name="Inhaltsplatzhalter 1">
+          <p:cNvPr id="3" name="Foliennummernplatzhalter 2">
             <a:extLst>
               <a:ext uri="{FF2B5EF4-FFF2-40B4-BE49-F238E27FC236}">
-                <a16:creationId xmlns:a16="http://schemas.microsoft.com/office/drawing/2014/main" id="{D085E8EF-DA4C-4D5D-82B1-33486C8EB248}"/>
-              </a:ext>
-            </a:extLst>
-          </p:cNvPr>
-          <p:cNvSpPr>
-            <a:spLocks noGrp="1"/>
-          </p:cNvSpPr>
-          <p:nvPr>
-            <p:ph idx="1"/>
-          </p:nvPr>
-        </p:nvSpPr>
-        <p:spPr/>
-        <p:txBody>
-          <a:bodyPr/>
-          <a:lstStyle/>
-          <a:p>
-            <a:endParaRPr lang="de-DE"/>
-          </a:p>
-        </p:txBody>
-      </p:sp>
-      <p:sp>
-        <p:nvSpPr>
-          <p:cNvPr id="3" name="Foliennummernplatzhalter 2">
-            <a:extLst>
-              <a:ext uri="{FF2B5EF4-FFF2-40B4-BE49-F238E27FC236}">
-                <a16:creationId xmlns:a16="http://schemas.microsoft.com/office/drawing/2014/main" id="{89BD4092-489C-498B-A2A8-399EDCDACAEE}"/>
+                <a16:creationId xmlns:a16="http://schemas.microsoft.com/office/drawing/2014/main" id="{075C3468-4FAE-4482-A6B1-80A1C1D916C8}"/>
               </a:ext>
             </a:extLst>
           </p:cNvPr>
@@ -5272,93 +5038,6 @@
             <a:fld id="{29AD3987-26BA-49DC-BA24-72731371DC9F}" type="slidenum">
               <a:rPr lang="de-DE" smtClean="0"/>
               <a:t>15</a:t>
-            </a:fld>
-            <a:endParaRPr lang="de-DE" dirty="0"/>
-          </a:p>
-        </p:txBody>
-      </p:sp>
-      <p:sp>
-        <p:nvSpPr>
-          <p:cNvPr id="4" name="Titel 3">
-            <a:extLst>
-              <a:ext uri="{FF2B5EF4-FFF2-40B4-BE49-F238E27FC236}">
-                <a16:creationId xmlns:a16="http://schemas.microsoft.com/office/drawing/2014/main" id="{2426994F-F454-4E9F-BE04-254D47DBF028}"/>
-              </a:ext>
-            </a:extLst>
-          </p:cNvPr>
-          <p:cNvSpPr>
-            <a:spLocks noGrp="1"/>
-          </p:cNvSpPr>
-          <p:nvPr>
-            <p:ph type="title"/>
-          </p:nvPr>
-        </p:nvSpPr>
-        <p:spPr/>
-        <p:txBody>
-          <a:bodyPr/>
-          <a:lstStyle/>
-          <a:p>
-            <a:r>
-              <a:rPr lang="de-DE" dirty="0"/>
-              <a:t>Video h.264</a:t>
-            </a:r>
-          </a:p>
-        </p:txBody>
-      </p:sp>
-    </p:spTree>
-    <p:extLst>
-      <p:ext uri="{BB962C8B-B14F-4D97-AF65-F5344CB8AC3E}">
-        <p14:creationId xmlns:p14="http://schemas.microsoft.com/office/powerpoint/2010/main" val="2991516518"/>
-      </p:ext>
-    </p:extLst>
-  </p:cSld>
-  <p:clrMapOvr>
-    <a:masterClrMapping/>
-  </p:clrMapOvr>
-</p:sld>
-</file>
-
-<file path=ppt/slides/slide16.xml><?xml version="1.0" encoding="utf-8"?>
-<p:sld xmlns:a="http://schemas.openxmlformats.org/drawingml/2006/main" xmlns:r="http://schemas.openxmlformats.org/officeDocument/2006/relationships" xmlns:p="http://schemas.openxmlformats.org/presentationml/2006/main">
-  <p:cSld>
-    <p:spTree>
-      <p:nvGrpSpPr>
-        <p:cNvPr id="1" name=""/>
-        <p:cNvGrpSpPr/>
-        <p:nvPr/>
-      </p:nvGrpSpPr>
-      <p:grpSpPr>
-        <a:xfrm>
-          <a:off x="0" y="0"/>
-          <a:ext cx="0" cy="0"/>
-          <a:chOff x="0" y="0"/>
-          <a:chExt cx="0" cy="0"/>
-        </a:xfrm>
-      </p:grpSpPr>
-      <p:sp>
-        <p:nvSpPr>
-          <p:cNvPr id="3" name="Foliennummernplatzhalter 2">
-            <a:extLst>
-              <a:ext uri="{FF2B5EF4-FFF2-40B4-BE49-F238E27FC236}">
-                <a16:creationId xmlns:a16="http://schemas.microsoft.com/office/drawing/2014/main" id="{075C3468-4FAE-4482-A6B1-80A1C1D916C8}"/>
-              </a:ext>
-            </a:extLst>
-          </p:cNvPr>
-          <p:cNvSpPr>
-            <a:spLocks noGrp="1"/>
-          </p:cNvSpPr>
-          <p:nvPr>
-            <p:ph type="sldNum" sz="quarter" idx="12"/>
-          </p:nvPr>
-        </p:nvSpPr>
-        <p:spPr/>
-        <p:txBody>
-          <a:bodyPr/>
-          <a:lstStyle/>
-          <a:p>
-            <a:fld id="{29AD3987-26BA-49DC-BA24-72731371DC9F}" type="slidenum">
-              <a:rPr lang="de-DE" smtClean="0"/>
-              <a:t>16</a:t>
             </a:fld>
             <a:endParaRPr lang="de-DE" dirty="0"/>
           </a:p>
@@ -5442,7 +5121,7 @@
 </p:sld>
 </file>
 
-<file path=ppt/slides/slide17.xml><?xml version="1.0" encoding="utf-8"?>
+<file path=ppt/slides/slide16.xml><?xml version="1.0" encoding="utf-8"?>
 <p:sld xmlns:a="http://schemas.openxmlformats.org/drawingml/2006/main" xmlns:r="http://schemas.openxmlformats.org/officeDocument/2006/relationships" xmlns:p="http://schemas.openxmlformats.org/presentationml/2006/main">
   <p:cSld>
     <p:spTree>
@@ -5482,7 +5161,7 @@
           <a:p>
             <a:fld id="{29AD3987-26BA-49DC-BA24-72731371DC9F}" type="slidenum">
               <a:rPr lang="de-DE" smtClean="0"/>
-              <a:t>17</a:t>
+              <a:t>16</a:t>
             </a:fld>
             <a:endParaRPr lang="de-DE" dirty="0"/>
           </a:p>
@@ -5537,6 +5216,118 @@
 </p:sld>
 </file>
 
+<file path=ppt/slides/slide17.xml><?xml version="1.0" encoding="utf-8"?>
+<p:sld xmlns:a="http://schemas.openxmlformats.org/drawingml/2006/main" xmlns:r="http://schemas.openxmlformats.org/officeDocument/2006/relationships" xmlns:p="http://schemas.openxmlformats.org/presentationml/2006/main">
+  <p:cSld>
+    <p:spTree>
+      <p:nvGrpSpPr>
+        <p:cNvPr id="1" name=""/>
+        <p:cNvGrpSpPr/>
+        <p:nvPr/>
+      </p:nvGrpSpPr>
+      <p:grpSpPr>
+        <a:xfrm>
+          <a:off x="0" y="0"/>
+          <a:ext cx="0" cy="0"/>
+          <a:chOff x="0" y="0"/>
+          <a:chExt cx="0" cy="0"/>
+        </a:xfrm>
+      </p:grpSpPr>
+      <p:sp>
+        <p:nvSpPr>
+          <p:cNvPr id="2" name="Inhaltsplatzhalter 1">
+            <a:extLst>
+              <a:ext uri="{FF2B5EF4-FFF2-40B4-BE49-F238E27FC236}">
+                <a16:creationId xmlns:a16="http://schemas.microsoft.com/office/drawing/2014/main" id="{65A8FDFA-9158-4F5B-B217-58F4813EA1D4}"/>
+              </a:ext>
+            </a:extLst>
+          </p:cNvPr>
+          <p:cNvSpPr>
+            <a:spLocks noGrp="1"/>
+          </p:cNvSpPr>
+          <p:nvPr>
+            <p:ph idx="1"/>
+          </p:nvPr>
+        </p:nvSpPr>
+        <p:spPr/>
+        <p:txBody>
+          <a:bodyPr/>
+          <a:lstStyle/>
+          <a:p>
+            <a:endParaRPr lang="de-DE" dirty="0"/>
+          </a:p>
+        </p:txBody>
+      </p:sp>
+      <p:sp>
+        <p:nvSpPr>
+          <p:cNvPr id="3" name="Foliennummernplatzhalter 2">
+            <a:extLst>
+              <a:ext uri="{FF2B5EF4-FFF2-40B4-BE49-F238E27FC236}">
+                <a16:creationId xmlns:a16="http://schemas.microsoft.com/office/drawing/2014/main" id="{3A92B2AE-FD91-476E-A0BA-A33507D415F7}"/>
+              </a:ext>
+            </a:extLst>
+          </p:cNvPr>
+          <p:cNvSpPr>
+            <a:spLocks noGrp="1"/>
+          </p:cNvSpPr>
+          <p:nvPr>
+            <p:ph type="sldNum" sz="quarter" idx="12"/>
+          </p:nvPr>
+        </p:nvSpPr>
+        <p:spPr/>
+        <p:txBody>
+          <a:bodyPr/>
+          <a:lstStyle/>
+          <a:p>
+            <a:fld id="{29AD3987-26BA-49DC-BA24-72731371DC9F}" type="slidenum">
+              <a:rPr lang="de-DE" smtClean="0"/>
+              <a:t>17</a:t>
+            </a:fld>
+            <a:endParaRPr lang="de-DE" dirty="0"/>
+          </a:p>
+        </p:txBody>
+      </p:sp>
+      <p:sp>
+        <p:nvSpPr>
+          <p:cNvPr id="4" name="Titel 3">
+            <a:extLst>
+              <a:ext uri="{FF2B5EF4-FFF2-40B4-BE49-F238E27FC236}">
+                <a16:creationId xmlns:a16="http://schemas.microsoft.com/office/drawing/2014/main" id="{1CEDDF61-A407-4902-8BFD-CC56DD364054}"/>
+              </a:ext>
+            </a:extLst>
+          </p:cNvPr>
+          <p:cNvSpPr>
+            <a:spLocks noGrp="1"/>
+          </p:cNvSpPr>
+          <p:nvPr>
+            <p:ph type="title"/>
+          </p:nvPr>
+        </p:nvSpPr>
+        <p:spPr/>
+        <p:txBody>
+          <a:bodyPr/>
+          <a:lstStyle/>
+          <a:p>
+            <a:r>
+              <a:rPr lang="de-DE" dirty="0"/>
+              <a:t>Fazit &amp; Ausblick</a:t>
+            </a:r>
+          </a:p>
+        </p:txBody>
+      </p:sp>
+    </p:spTree>
+    <p:extLst>
+      <p:ext uri="{BB962C8B-B14F-4D97-AF65-F5344CB8AC3E}">
+        <p14:creationId xmlns:p14="http://schemas.microsoft.com/office/powerpoint/2010/main" val="3815123622"/>
+      </p:ext>
+    </p:extLst>
+  </p:cSld>
+  <p:clrMapOvr>
+    <a:masterClrMapping/>
+  </p:clrMapOvr>
+</p:sld>
+</file>
+
 <file path=ppt/slides/slide18.xml><?xml version="1.0" encoding="utf-8"?>
 <p:sld xmlns:a="http://schemas.openxmlformats.org/drawingml/2006/main" xmlns:r="http://schemas.openxmlformats.org/officeDocument/2006/relationships" xmlns:p="http://schemas.openxmlformats.org/presentationml/2006/main">
   <p:cSld>
@@ -5559,7 +5350,7 @@
           <p:cNvPr id="2" name="Inhaltsplatzhalter 1">
             <a:extLst>
               <a:ext uri="{FF2B5EF4-FFF2-40B4-BE49-F238E27FC236}">
-                <a16:creationId xmlns:a16="http://schemas.microsoft.com/office/drawing/2014/main" id="{65A8FDFA-9158-4F5B-B217-58F4813EA1D4}"/>
+                <a16:creationId xmlns:a16="http://schemas.microsoft.com/office/drawing/2014/main" id="{002BA65F-1EFC-48C1-9C31-D228E1A6EE9B}"/>
               </a:ext>
             </a:extLst>
           </p:cNvPr>
@@ -5575,7 +5366,7 @@
           <a:bodyPr/>
           <a:lstStyle/>
           <a:p>
-            <a:endParaRPr lang="de-DE" dirty="0"/>
+            <a:endParaRPr lang="de-DE"/>
           </a:p>
         </p:txBody>
       </p:sp>
@@ -5584,7 +5375,7 @@
           <p:cNvPr id="3" name="Foliennummernplatzhalter 2">
             <a:extLst>
               <a:ext uri="{FF2B5EF4-FFF2-40B4-BE49-F238E27FC236}">
-                <a16:creationId xmlns:a16="http://schemas.microsoft.com/office/drawing/2014/main" id="{3A92B2AE-FD91-476E-A0BA-A33507D415F7}"/>
+                <a16:creationId xmlns:a16="http://schemas.microsoft.com/office/drawing/2014/main" id="{EE12B332-6480-47FC-9A50-7AAC660ABDFE}"/>
               </a:ext>
             </a:extLst>
           </p:cNvPr>
@@ -5603,118 +5394,6 @@
             <a:fld id="{29AD3987-26BA-49DC-BA24-72731371DC9F}" type="slidenum">
               <a:rPr lang="de-DE" smtClean="0"/>
               <a:t>18</a:t>
-            </a:fld>
-            <a:endParaRPr lang="de-DE" dirty="0"/>
-          </a:p>
-        </p:txBody>
-      </p:sp>
-      <p:sp>
-        <p:nvSpPr>
-          <p:cNvPr id="4" name="Titel 3">
-            <a:extLst>
-              <a:ext uri="{FF2B5EF4-FFF2-40B4-BE49-F238E27FC236}">
-                <a16:creationId xmlns:a16="http://schemas.microsoft.com/office/drawing/2014/main" id="{1CEDDF61-A407-4902-8BFD-CC56DD364054}"/>
-              </a:ext>
-            </a:extLst>
-          </p:cNvPr>
-          <p:cNvSpPr>
-            <a:spLocks noGrp="1"/>
-          </p:cNvSpPr>
-          <p:nvPr>
-            <p:ph type="title"/>
-          </p:nvPr>
-        </p:nvSpPr>
-        <p:spPr/>
-        <p:txBody>
-          <a:bodyPr/>
-          <a:lstStyle/>
-          <a:p>
-            <a:r>
-              <a:rPr lang="de-DE" dirty="0"/>
-              <a:t>Fazit &amp; Ausblick</a:t>
-            </a:r>
-          </a:p>
-        </p:txBody>
-      </p:sp>
-    </p:spTree>
-    <p:extLst>
-      <p:ext uri="{BB962C8B-B14F-4D97-AF65-F5344CB8AC3E}">
-        <p14:creationId xmlns:p14="http://schemas.microsoft.com/office/powerpoint/2010/main" val="3815123622"/>
-      </p:ext>
-    </p:extLst>
-  </p:cSld>
-  <p:clrMapOvr>
-    <a:masterClrMapping/>
-  </p:clrMapOvr>
-</p:sld>
-</file>
-
-<file path=ppt/slides/slide19.xml><?xml version="1.0" encoding="utf-8"?>
-<p:sld xmlns:a="http://schemas.openxmlformats.org/drawingml/2006/main" xmlns:r="http://schemas.openxmlformats.org/officeDocument/2006/relationships" xmlns:p="http://schemas.openxmlformats.org/presentationml/2006/main">
-  <p:cSld>
-    <p:spTree>
-      <p:nvGrpSpPr>
-        <p:cNvPr id="1" name=""/>
-        <p:cNvGrpSpPr/>
-        <p:nvPr/>
-      </p:nvGrpSpPr>
-      <p:grpSpPr>
-        <a:xfrm>
-          <a:off x="0" y="0"/>
-          <a:ext cx="0" cy="0"/>
-          <a:chOff x="0" y="0"/>
-          <a:chExt cx="0" cy="0"/>
-        </a:xfrm>
-      </p:grpSpPr>
-      <p:sp>
-        <p:nvSpPr>
-          <p:cNvPr id="2" name="Inhaltsplatzhalter 1">
-            <a:extLst>
-              <a:ext uri="{FF2B5EF4-FFF2-40B4-BE49-F238E27FC236}">
-                <a16:creationId xmlns:a16="http://schemas.microsoft.com/office/drawing/2014/main" id="{002BA65F-1EFC-48C1-9C31-D228E1A6EE9B}"/>
-              </a:ext>
-            </a:extLst>
-          </p:cNvPr>
-          <p:cNvSpPr>
-            <a:spLocks noGrp="1"/>
-          </p:cNvSpPr>
-          <p:nvPr>
-            <p:ph idx="1"/>
-          </p:nvPr>
-        </p:nvSpPr>
-        <p:spPr/>
-        <p:txBody>
-          <a:bodyPr/>
-          <a:lstStyle/>
-          <a:p>
-            <a:endParaRPr lang="de-DE"/>
-          </a:p>
-        </p:txBody>
-      </p:sp>
-      <p:sp>
-        <p:nvSpPr>
-          <p:cNvPr id="3" name="Foliennummernplatzhalter 2">
-            <a:extLst>
-              <a:ext uri="{FF2B5EF4-FFF2-40B4-BE49-F238E27FC236}">
-                <a16:creationId xmlns:a16="http://schemas.microsoft.com/office/drawing/2014/main" id="{EE12B332-6480-47FC-9A50-7AAC660ABDFE}"/>
-              </a:ext>
-            </a:extLst>
-          </p:cNvPr>
-          <p:cNvSpPr>
-            <a:spLocks noGrp="1"/>
-          </p:cNvSpPr>
-          <p:nvPr>
-            <p:ph type="sldNum" sz="quarter" idx="12"/>
-          </p:nvPr>
-        </p:nvSpPr>
-        <p:spPr/>
-        <p:txBody>
-          <a:bodyPr/>
-          <a:lstStyle/>
-          <a:p>
-            <a:fld id="{29AD3987-26BA-49DC-BA24-72731371DC9F}" type="slidenum">
-              <a:rPr lang="de-DE" smtClean="0"/>
-              <a:t>19</a:t>
             </a:fld>
             <a:endParaRPr lang="de-DE" dirty="0"/>
           </a:p>
@@ -7480,132 +7159,12 @@
           <a:chExt cx="0" cy="0"/>
         </a:xfrm>
       </p:grpSpPr>
-      <p:sp>
-        <p:nvSpPr>
-          <p:cNvPr id="2" name="Inhaltsplatzhalter 1">
-            <a:extLst>
-              <a:ext uri="{FF2B5EF4-FFF2-40B4-BE49-F238E27FC236}">
-                <a16:creationId xmlns:a16="http://schemas.microsoft.com/office/drawing/2014/main" id="{2BFC54A6-CF1E-4705-BBE0-0F5AF5BE1FA3}"/>
-              </a:ext>
-            </a:extLst>
-          </p:cNvPr>
-          <p:cNvSpPr>
-            <a:spLocks noGrp="1"/>
-          </p:cNvSpPr>
-          <p:nvPr>
-            <p:ph idx="1"/>
-          </p:nvPr>
-        </p:nvSpPr>
-        <p:spPr/>
-        <p:txBody>
-          <a:bodyPr/>
-          <a:lstStyle/>
-          <a:p>
-            <a:r>
-              <a:rPr lang="de-DE" dirty="0"/>
-              <a:t>Hoch parallel</a:t>
-            </a:r>
-          </a:p>
-          <a:p>
-            <a:pPr lvl="1"/>
-            <a:r>
-              <a:rPr lang="de-DE" dirty="0"/>
-              <a:t>Strahlen können unabhängig voneinander verfolgt werden</a:t>
-            </a:r>
-          </a:p>
-          <a:p>
-            <a:r>
-              <a:rPr lang="de-DE" dirty="0"/>
-              <a:t>Programmierbar (General Purpose </a:t>
-            </a:r>
-            <a:r>
-              <a:rPr lang="de-DE" dirty="0" err="1"/>
-              <a:t>Computation</a:t>
-            </a:r>
-            <a:r>
-              <a:rPr lang="de-DE" dirty="0"/>
-              <a:t> on GPU (GPGPU))</a:t>
-            </a:r>
-          </a:p>
-          <a:p>
-            <a:pPr lvl="1"/>
-            <a:r>
-              <a:rPr lang="de-DE" dirty="0" err="1"/>
-              <a:t>OpenCL</a:t>
-            </a:r>
-            <a:endParaRPr lang="de-DE" dirty="0"/>
-          </a:p>
-          <a:p>
-            <a:pPr marL="0" indent="0">
-              <a:buNone/>
-            </a:pPr>
-            <a:endParaRPr lang="de-DE" dirty="0"/>
-          </a:p>
-        </p:txBody>
-      </p:sp>
-      <p:sp>
-        <p:nvSpPr>
-          <p:cNvPr id="3" name="Foliennummernplatzhalter 2">
-            <a:extLst>
-              <a:ext uri="{FF2B5EF4-FFF2-40B4-BE49-F238E27FC236}">
-                <a16:creationId xmlns:a16="http://schemas.microsoft.com/office/drawing/2014/main" id="{C68930AE-E0C2-4512-88F5-C8FB2408B8A7}"/>
-              </a:ext>
-            </a:extLst>
-          </p:cNvPr>
-          <p:cNvSpPr>
-            <a:spLocks noGrp="1"/>
-          </p:cNvSpPr>
-          <p:nvPr>
-            <p:ph type="sldNum" sz="quarter" idx="12"/>
-          </p:nvPr>
-        </p:nvSpPr>
-        <p:spPr/>
-        <p:txBody>
-          <a:bodyPr/>
-          <a:lstStyle/>
-          <a:p>
-            <a:fld id="{29AD3987-26BA-49DC-BA24-72731371DC9F}" type="slidenum">
-              <a:rPr lang="de-DE" smtClean="0"/>
-              <a:t>9</a:t>
-            </a:fld>
-            <a:endParaRPr lang="de-DE" dirty="0"/>
-          </a:p>
-        </p:txBody>
-      </p:sp>
-      <p:sp>
-        <p:nvSpPr>
-          <p:cNvPr id="4" name="Titel 3">
-            <a:extLst>
-              <a:ext uri="{FF2B5EF4-FFF2-40B4-BE49-F238E27FC236}">
-                <a16:creationId xmlns:a16="http://schemas.microsoft.com/office/drawing/2014/main" id="{8E1DF498-9417-4C18-AE3C-AD5C3FECA02A}"/>
-              </a:ext>
-            </a:extLst>
-          </p:cNvPr>
-          <p:cNvSpPr>
-            <a:spLocks noGrp="1"/>
-          </p:cNvSpPr>
-          <p:nvPr>
-            <p:ph type="title"/>
-          </p:nvPr>
-        </p:nvSpPr>
-        <p:spPr/>
-        <p:txBody>
-          <a:bodyPr/>
-          <a:lstStyle/>
-          <a:p>
-            <a:r>
-              <a:rPr lang="de-DE" dirty="0"/>
-              <a:t>GPU Architektur</a:t>
-            </a:r>
-          </a:p>
-        </p:txBody>
-      </p:sp>
       <p:pic>
         <p:nvPicPr>
-          <p:cNvPr id="6" name="Grafik 5">
+          <p:cNvPr id="7" name="Grafik 6">
             <a:extLst>
               <a:ext uri="{FF2B5EF4-FFF2-40B4-BE49-F238E27FC236}">
-                <a16:creationId xmlns:a16="http://schemas.microsoft.com/office/drawing/2014/main" id="{AA132576-CFEF-4A97-B41A-C44527DEF4F1}"/>
+                <a16:creationId xmlns:a16="http://schemas.microsoft.com/office/drawing/2014/main" id="{D692FB39-14F9-4236-A78F-AB5BBE32F907}"/>
               </a:ext>
             </a:extLst>
           </p:cNvPr>
@@ -7615,7 +7174,7 @@
           <p:nvPr/>
         </p:nvPicPr>
         <p:blipFill>
-          <a:blip r:embed="rId3">
+          <a:blip r:embed="rId3" cstate="print">
             <a:extLst>
               <a:ext uri="{28A0092B-C50C-407E-A947-70E740481C1C}">
                 <a14:useLocalDpi xmlns:a14="http://schemas.microsoft.com/office/drawing/2010/main" val="0"/>
@@ -7628,18 +7187,193 @@
         </p:blipFill>
         <p:spPr>
           <a:xfrm>
-            <a:off x="2443426" y="2662925"/>
-            <a:ext cx="4257148" cy="1939675"/>
+            <a:off x="6398962" y="2475475"/>
+            <a:ext cx="2493518" cy="2496574"/>
           </a:xfrm>
           <a:prstGeom prst="rect">
             <a:avLst/>
           </a:prstGeom>
         </p:spPr>
       </p:pic>
+      <p:pic>
+        <p:nvPicPr>
+          <p:cNvPr id="6" name="Grafik 5">
+            <a:extLst>
+              <a:ext uri="{FF2B5EF4-FFF2-40B4-BE49-F238E27FC236}">
+                <a16:creationId xmlns:a16="http://schemas.microsoft.com/office/drawing/2014/main" id="{E7653E6C-1A93-4A93-952E-D7DFFDF5ED76}"/>
+              </a:ext>
+            </a:extLst>
+          </p:cNvPr>
+          <p:cNvPicPr>
+            <a:picLocks noChangeAspect="1"/>
+          </p:cNvPicPr>
+          <p:nvPr/>
+        </p:nvPicPr>
+        <p:blipFill>
+          <a:blip r:embed="rId4" cstate="print">
+            <a:extLst>
+              <a:ext uri="{28A0092B-C50C-407E-A947-70E740481C1C}">
+                <a14:useLocalDpi xmlns:a14="http://schemas.microsoft.com/office/drawing/2010/main" val="0"/>
+              </a:ext>
+            </a:extLst>
+          </a:blip>
+          <a:stretch>
+            <a:fillRect/>
+          </a:stretch>
+        </p:blipFill>
+        <p:spPr>
+          <a:xfrm>
+            <a:off x="5508104" y="123478"/>
+            <a:ext cx="3534155" cy="2180002"/>
+          </a:xfrm>
+          <a:prstGeom prst="rect">
+            <a:avLst/>
+          </a:prstGeom>
+        </p:spPr>
+      </p:pic>
+      <p:sp>
+        <p:nvSpPr>
+          <p:cNvPr id="2" name="Inhaltsplatzhalter 1">
+            <a:extLst>
+              <a:ext uri="{FF2B5EF4-FFF2-40B4-BE49-F238E27FC236}">
+                <a16:creationId xmlns:a16="http://schemas.microsoft.com/office/drawing/2014/main" id="{F4836894-3CA2-4AF5-BD82-BDC9EE081C6B}"/>
+              </a:ext>
+            </a:extLst>
+          </p:cNvPr>
+          <p:cNvSpPr>
+            <a:spLocks noGrp="1"/>
+          </p:cNvSpPr>
+          <p:nvPr>
+            <p:ph idx="1"/>
+          </p:nvPr>
+        </p:nvSpPr>
+        <p:spPr/>
+        <p:txBody>
+          <a:bodyPr/>
+          <a:lstStyle/>
+          <a:p>
+            <a:r>
+              <a:rPr lang="de-DE" dirty="0"/>
+              <a:t>Unterteilung des Problems in (unabhängige) </a:t>
+            </a:r>
+            <a:br>
+              <a:rPr lang="de-DE" dirty="0"/>
+            </a:br>
+            <a:r>
+              <a:rPr lang="de-DE" dirty="0"/>
+              <a:t>Teilprobleme</a:t>
+            </a:r>
+          </a:p>
+          <a:p>
+            <a:pPr lvl="1"/>
+            <a:r>
+              <a:rPr lang="de-DE" dirty="0"/>
+              <a:t>Teilprobleme werden (parallel) von</a:t>
+            </a:r>
+            <a:br>
+              <a:rPr lang="de-DE" dirty="0"/>
+            </a:br>
+            <a:r>
+              <a:rPr lang="de-DE" dirty="0"/>
+              <a:t> Work-Items berechnet</a:t>
+            </a:r>
+          </a:p>
+          <a:p>
+            <a:r>
+              <a:rPr lang="de-DE" dirty="0"/>
+              <a:t>Work-Groups und Work-Items sind Abstraktionen</a:t>
+            </a:r>
+          </a:p>
+          <a:p>
+            <a:r>
+              <a:rPr lang="de-DE" dirty="0"/>
+              <a:t>Auf der Hardware werden Thread-Blocks ausgeführt</a:t>
+            </a:r>
+          </a:p>
+          <a:p>
+            <a:pPr lvl="1"/>
+            <a:r>
+              <a:rPr lang="de-DE" dirty="0" err="1"/>
+              <a:t>Lockstep</a:t>
+            </a:r>
+            <a:r>
+              <a:rPr lang="de-DE" dirty="0"/>
+              <a:t> Ausführung</a:t>
+            </a:r>
+          </a:p>
+          <a:p>
+            <a:r>
+              <a:rPr lang="de-DE" dirty="0"/>
+              <a:t>Thread-Blocks sollten möglichst konvergieren</a:t>
+            </a:r>
+          </a:p>
+          <a:p>
+            <a:pPr lvl="1"/>
+            <a:endParaRPr lang="de-DE" dirty="0"/>
+          </a:p>
+        </p:txBody>
+      </p:sp>
+      <p:sp>
+        <p:nvSpPr>
+          <p:cNvPr id="3" name="Foliennummernplatzhalter 2">
+            <a:extLst>
+              <a:ext uri="{FF2B5EF4-FFF2-40B4-BE49-F238E27FC236}">
+                <a16:creationId xmlns:a16="http://schemas.microsoft.com/office/drawing/2014/main" id="{5B709438-26A9-4385-BA8A-641816833063}"/>
+              </a:ext>
+            </a:extLst>
+          </p:cNvPr>
+          <p:cNvSpPr>
+            <a:spLocks noGrp="1"/>
+          </p:cNvSpPr>
+          <p:nvPr>
+            <p:ph type="sldNum" sz="quarter" idx="12"/>
+          </p:nvPr>
+        </p:nvSpPr>
+        <p:spPr/>
+        <p:txBody>
+          <a:bodyPr/>
+          <a:lstStyle/>
+          <a:p>
+            <a:fld id="{29AD3987-26BA-49DC-BA24-72731371DC9F}" type="slidenum">
+              <a:rPr lang="de-DE" smtClean="0"/>
+              <a:t>9</a:t>
+            </a:fld>
+            <a:endParaRPr lang="de-DE" dirty="0"/>
+          </a:p>
+        </p:txBody>
+      </p:sp>
+      <p:sp>
+        <p:nvSpPr>
+          <p:cNvPr id="4" name="Titel 3">
+            <a:extLst>
+              <a:ext uri="{FF2B5EF4-FFF2-40B4-BE49-F238E27FC236}">
+                <a16:creationId xmlns:a16="http://schemas.microsoft.com/office/drawing/2014/main" id="{C5AC0E11-120C-432F-B238-E27B61B805EB}"/>
+              </a:ext>
+            </a:extLst>
+          </p:cNvPr>
+          <p:cNvSpPr>
+            <a:spLocks noGrp="1"/>
+          </p:cNvSpPr>
+          <p:nvPr>
+            <p:ph type="title"/>
+          </p:nvPr>
+        </p:nvSpPr>
+        <p:spPr/>
+        <p:txBody>
+          <a:bodyPr/>
+          <a:lstStyle/>
+          <a:p>
+            <a:r>
+              <a:rPr lang="de-DE" dirty="0"/>
+              <a:t>GPU Architektur</a:t>
+            </a:r>
+          </a:p>
+        </p:txBody>
+      </p:sp>
     </p:spTree>
     <p:extLst>
       <p:ext uri="{BB962C8B-B14F-4D97-AF65-F5344CB8AC3E}">
-        <p14:creationId xmlns:p14="http://schemas.microsoft.com/office/powerpoint/2010/main" val="3045631903"/>
+        <p14:creationId xmlns:p14="http://schemas.microsoft.com/office/powerpoint/2010/main" val="3368222175"/>
       </p:ext>
     </p:extLst>
   </p:cSld>

</xml_diff>

<commit_message>
Vortrag: Implementierung zusammengesetztes Bild eingefügt für Methode 1.
</commit_message>
<xml_diff>
--- a/Dokumente/Vortrag/Wahrnehmungsorientiertes_Volumen-Rendering.pptx
+++ b/Dokumente/Vortrag/Wahrnehmungsorientiertes_Volumen-Rendering.pptx
@@ -4678,6 +4678,42 @@
           </a:p>
         </p:txBody>
       </p:sp>
+      <p:pic>
+        <p:nvPicPr>
+          <p:cNvPr id="5" name="Grafik 4">
+            <a:extLst>
+              <a:ext uri="{FF2B5EF4-FFF2-40B4-BE49-F238E27FC236}">
+                <a16:creationId xmlns:a16="http://schemas.microsoft.com/office/drawing/2014/main" id="{470BCC0C-DB06-4460-A722-9AF25325505F}"/>
+              </a:ext>
+            </a:extLst>
+          </p:cNvPr>
+          <p:cNvPicPr>
+            <a:picLocks noChangeAspect="1"/>
+          </p:cNvPicPr>
+          <p:nvPr/>
+        </p:nvPicPr>
+        <p:blipFill>
+          <a:blip r:embed="rId2">
+            <a:extLst>
+              <a:ext uri="{28A0092B-C50C-407E-A947-70E740481C1C}">
+                <a14:useLocalDpi xmlns:a14="http://schemas.microsoft.com/office/drawing/2010/main" val="0"/>
+              </a:ext>
+            </a:extLst>
+          </a:blip>
+          <a:stretch>
+            <a:fillRect/>
+          </a:stretch>
+        </p:blipFill>
+        <p:spPr>
+          <a:xfrm>
+            <a:off x="1949660" y="930214"/>
+            <a:ext cx="5142620" cy="3855782"/>
+          </a:xfrm>
+          <a:prstGeom prst="rect">
+            <a:avLst/>
+          </a:prstGeom>
+        </p:spPr>
+      </p:pic>
     </p:spTree>
     <p:extLst>
       <p:ext uri="{BB962C8B-B14F-4D97-AF65-F5344CB8AC3E}">

</xml_diff>